<commit_message>
Mohammad and Vikram's comments on the lecture
</commit_message>
<xml_diff>
--- a/RMT-lecture.pptx
+++ b/RMT-lecture.pptx
@@ -287,8 +287,8 @@
               <c:idx val="0"/>
               <c:layout>
                 <c:manualLayout>
-                  <c:x val="-5.9988885118929212E-2"/>
-                  <c:y val="6.2562771983825038E-2"/>
+                  <c:x val="-0.0599888851189292"/>
+                  <c:y val="0.0625627719838251"/>
                 </c:manualLayout>
               </c:layout>
               <c:tx>
@@ -327,8 +327,8 @@
               <c:idx val="1"/>
               <c:layout>
                 <c:manualLayout>
-                  <c:x val="-1.3164933135215507E-2"/>
-                  <c:y val="6.8273659431002248E-2"/>
+                  <c:x val="-0.0131649331352155"/>
+                  <c:y val="0.0682736594310022"/>
                 </c:manualLayout>
               </c:layout>
               <c:tx>
@@ -367,8 +367,8 @@
               <c:idx val="2"/>
               <c:layout>
                 <c:manualLayout>
-                  <c:x val="-2.3354471107159207E-2"/>
-                  <c:y val="7.3984546878179347E-2"/>
+                  <c:x val="-0.0233544711071592"/>
+                  <c:y val="0.0739845468781794"/>
                 </c:manualLayout>
               </c:layout>
               <c:tx>
@@ -377,16 +377,16 @@
                   <a:lstStyle/>
                   <a:p>
                     <a:r>
-                      <a:rPr lang="en-US" smtClean="0"/>
+                      <a:rPr lang="is-IS" smtClean="0"/>
                       <a:t>IXP 2400</a:t>
                     </a:r>
                   </a:p>
                   <a:p>
                     <a:r>
-                      <a:rPr lang="en-US" smtClean="0"/>
+                      <a:rPr lang="is-IS" smtClean="0"/>
                       <a:t>(NPU)</a:t>
                     </a:r>
-                    <a:endParaRPr lang="en-US"/>
+                    <a:endParaRPr lang="is-IS"/>
                   </a:p>
                 </c:rich>
               </c:tx>
@@ -407,8 +407,8 @@
               <c:idx val="5"/>
               <c:layout>
                 <c:manualLayout>
-                  <c:x val="-8.7908207195178376E-2"/>
-                  <c:y val="7.7944973216260455E-2"/>
+                  <c:x val="-0.0879082071951784"/>
+                  <c:y val="0.0779449732162605"/>
                 </c:manualLayout>
               </c:layout>
               <c:tx>
@@ -447,8 +447,8 @@
               <c:idx val="6"/>
               <c:layout>
                 <c:manualLayout>
-                  <c:x val="-7.8157904588392488E-2"/>
-                  <c:y val="6.36788948696414E-2"/>
+                  <c:x val="-0.0781579045883925"/>
+                  <c:y val="0.0636788948696414"/>
                 </c:manualLayout>
               </c:layout>
               <c:tx>
@@ -532,8 +532,8 @@
                 <c:ext xmlns:c15="http://schemas.microsoft.com/office/drawing/2012/chart" uri="{CE6537A1-D6FC-4f65-9D91-7224C49458BB}">
                   <c15:layout>
                     <c:manualLayout>
-                      <c:w val="0.13690330309345247"/>
-                      <c:h val="0.14436901015419934"/>
+                      <c:w val="0.136903303093452"/>
+                      <c:h val="0.144369010154199"/>
                     </c:manualLayout>
                   </c15:layout>
                 </c:ext>
@@ -543,8 +543,8 @@
               <c:idx val="7"/>
               <c:layout>
                 <c:manualLayout>
-                  <c:x val="-3.4191562600561338E-4"/>
-                  <c:y val="7.5770795805976773E-2"/>
+                  <c:x val="-0.000341915626005613"/>
+                  <c:y val="0.0757707958059768"/>
                 </c:manualLayout>
               </c:layout>
               <c:tx>
@@ -644,28 +644,28 @@
                 <c:formatCode>General</c:formatCode>
                 <c:ptCount val="8"/>
                 <c:pt idx="0">
-                  <c:v>1999</c:v>
+                  <c:v>1999.0</c:v>
                 </c:pt>
                 <c:pt idx="1">
-                  <c:v>2000</c:v>
+                  <c:v>2000.0</c:v>
                 </c:pt>
                 <c:pt idx="2">
-                  <c:v>2002</c:v>
+                  <c:v>2002.0</c:v>
                 </c:pt>
                 <c:pt idx="3">
-                  <c:v>2004</c:v>
+                  <c:v>2004.0</c:v>
                 </c:pt>
                 <c:pt idx="4">
-                  <c:v>2007</c:v>
+                  <c:v>2007.0</c:v>
                 </c:pt>
                 <c:pt idx="5">
-                  <c:v>2009</c:v>
+                  <c:v>2009.0</c:v>
                 </c:pt>
                 <c:pt idx="6">
-                  <c:v>2010</c:v>
+                  <c:v>2010.0</c:v>
                 </c:pt>
                 <c:pt idx="7">
-                  <c:v>2014</c:v>
+                  <c:v>2014.0</c:v>
                 </c:pt>
               </c:numCache>
             </c:numRef>
@@ -683,16 +683,16 @@
                   <c:v>0.17</c:v>
                 </c:pt>
                 <c:pt idx="2">
-                  <c:v>4</c:v>
+                  <c:v>4.0</c:v>
                 </c:pt>
                 <c:pt idx="5">
-                  <c:v>35</c:v>
+                  <c:v>35.0</c:v>
                 </c:pt>
                 <c:pt idx="6">
-                  <c:v>40</c:v>
+                  <c:v>40.0</c:v>
                 </c:pt>
                 <c:pt idx="7">
-                  <c:v>100</c:v>
+                  <c:v>100.0</c:v>
                 </c:pt>
               </c:numCache>
             </c:numRef>
@@ -771,8 +771,8 @@
               <c:idx val="3"/>
               <c:layout>
                 <c:manualLayout>
-                  <c:x val="-0.12323611686697057"/>
-                  <c:y val="-6.1520422605671143E-2"/>
+                  <c:x val="-0.123236116866971"/>
+                  <c:y val="-0.0615204226056711"/>
                 </c:manualLayout>
               </c:layout>
               <c:tx>
@@ -957,28 +957,28 @@
                 <c:formatCode>General</c:formatCode>
                 <c:ptCount val="8"/>
                 <c:pt idx="0">
-                  <c:v>1999</c:v>
+                  <c:v>1999.0</c:v>
                 </c:pt>
                 <c:pt idx="1">
-                  <c:v>2000</c:v>
+                  <c:v>2000.0</c:v>
                 </c:pt>
                 <c:pt idx="2">
-                  <c:v>2002</c:v>
+                  <c:v>2002.0</c:v>
                 </c:pt>
                 <c:pt idx="3">
-                  <c:v>2004</c:v>
+                  <c:v>2004.0</c:v>
                 </c:pt>
                 <c:pt idx="4">
-                  <c:v>2007</c:v>
+                  <c:v>2007.0</c:v>
                 </c:pt>
                 <c:pt idx="5">
-                  <c:v>2009</c:v>
+                  <c:v>2009.0</c:v>
                 </c:pt>
                 <c:pt idx="6">
-                  <c:v>2010</c:v>
+                  <c:v>2010.0</c:v>
                 </c:pt>
                 <c:pt idx="7">
-                  <c:v>2014</c:v>
+                  <c:v>2014.0</c:v>
                 </c:pt>
               </c:numCache>
             </c:numRef>
@@ -990,19 +990,19 @@
                 <c:formatCode>General</c:formatCode>
                 <c:ptCount val="8"/>
                 <c:pt idx="0">
-                  <c:v>32</c:v>
+                  <c:v>32.0</c:v>
                 </c:pt>
                 <c:pt idx="3">
-                  <c:v>80</c:v>
+                  <c:v>80.0</c:v>
                 </c:pt>
                 <c:pt idx="4">
-                  <c:v>240</c:v>
+                  <c:v>240.0</c:v>
                 </c:pt>
                 <c:pt idx="6">
-                  <c:v>640</c:v>
+                  <c:v>640.0</c:v>
                 </c:pt>
                 <c:pt idx="7">
-                  <c:v>3200</c:v>
+                  <c:v>3200.0</c:v>
                 </c:pt>
               </c:numCache>
             </c:numRef>
@@ -1020,11 +1020,11 @@
         </c:dLbls>
         <c:marker val="1"/>
         <c:smooth val="0"/>
-        <c:axId val="255404488"/>
-        <c:axId val="254181224"/>
+        <c:axId val="1371963920"/>
+        <c:axId val="1372503296"/>
       </c:lineChart>
       <c:catAx>
-        <c:axId val="255404488"/>
+        <c:axId val="1371963920"/>
         <c:scaling>
           <c:orientation val="minMax"/>
         </c:scaling>
@@ -1123,7 +1123,7 @@
             <a:endParaRPr lang="en-US"/>
           </a:p>
         </c:txPr>
-        <c:crossAx val="254181224"/>
+        <c:crossAx val="1372503296"/>
         <c:crosses val="autoZero"/>
         <c:auto val="1"/>
         <c:lblAlgn val="ctr"/>
@@ -1131,11 +1131,11 @@
         <c:noMultiLvlLbl val="0"/>
       </c:catAx>
       <c:valAx>
-        <c:axId val="254181224"/>
+        <c:axId val="1372503296"/>
         <c:scaling>
-          <c:logBase val="10"/>
+          <c:logBase val="10.0"/>
           <c:orientation val="minMax"/>
-          <c:min val="1.0000000000000002E-2"/>
+          <c:min val="0.01"/>
         </c:scaling>
         <c:delete val="0"/>
         <c:axPos val="l"/>
@@ -1245,7 +1245,7 @@
             <a:endParaRPr lang="en-US"/>
           </a:p>
         </c:txPr>
-        <c:crossAx val="255404488"/>
+        <c:crossAx val="1371963920"/>
         <c:crosses val="autoZero"/>
         <c:crossBetween val="between"/>
       </c:valAx>
@@ -1954,7 +1954,7 @@
           <a:p>
             <a:fld id="{191B5B68-7703-4B2D-8923-97CC0DFF0515}" type="datetimeFigureOut">
               <a:rPr lang="en-US" smtClean="0"/>
-              <a:t>4/26/2016</a:t>
+              <a:t>10/31/16</a:t>
             </a:fld>
             <a:endParaRPr lang="en-US"/>
           </a:p>
@@ -2249,12 +2249,7 @@
             <p:ph type="sldImg"/>
           </p:nvPr>
         </p:nvSpPr>
-        <p:spPr>
-          <a:xfrm>
-            <a:off x="685800" y="1143000"/>
-            <a:ext cx="5486400" cy="3086100"/>
-          </a:xfrm>
-        </p:spPr>
+        <p:spPr/>
       </p:sp>
       <p:sp>
         <p:nvSpPr>
@@ -2273,7 +2268,7 @@
           <a:p>
             <a:r>
               <a:rPr lang="en-US" dirty="0" smtClean="0"/>
-              <a:t>Burgeoning </a:t>
+              <a:t>Remind them that </a:t>
             </a:r>
             <a:r>
               <a:rPr lang="en-US" dirty="0" err="1" smtClean="0"/>
@@ -2281,13 +2276,17 @@
             </a:r>
             <a:r>
               <a:rPr lang="en-US" dirty="0" smtClean="0"/>
-              <a:t> spec.</a:t>
+              <a:t> is based on match + action.</a:t>
             </a:r>
           </a:p>
           <a:p>
             <a:r>
               <a:rPr lang="en-US" dirty="0" smtClean="0"/>
-              <a:t>This is really not all that revolutionary. Every other domain does this: NVIDIA’s GPUs, TI’s DSPs, mobile phones, </a:t>
+              <a:t>But it is restricted to a</a:t>
+            </a:r>
+            <a:r>
+              <a:rPr lang="en-US" baseline="0" dirty="0" smtClean="0"/>
+              <a:t> specific set of headers, and nothing more.</a:t>
             </a:r>
             <a:endParaRPr lang="en-US" dirty="0"/>
           </a:p>
@@ -2310,7 +2309,7 @@
           <a:p>
             <a:fld id="{AE764910-0912-401B-9F58-2B7602DC4522}" type="slidenum">
               <a:rPr lang="en-US" smtClean="0"/>
-              <a:t>6</a:t>
+              <a:t>4</a:t>
             </a:fld>
             <a:endParaRPr lang="en-US"/>
           </a:p>
@@ -2319,7 +2318,7 @@
     </p:spTree>
     <p:extLst>
       <p:ext uri="{BB962C8B-B14F-4D97-AF65-F5344CB8AC3E}">
-        <p14:creationId xmlns:p14="http://schemas.microsoft.com/office/powerpoint/2010/main" val="3975167046"/>
+        <p14:creationId xmlns:p14="http://schemas.microsoft.com/office/powerpoint/2010/main" val="1021342452"/>
       </p:ext>
     </p:extLst>
   </p:cSld>
@@ -2375,11 +2374,23 @@
           <a:p>
             <a:r>
               <a:rPr lang="en-US" dirty="0" smtClean="0"/>
-              <a:t>Say </a:t>
+              <a:t>Ok, so with this pipeline model, here’s what a fixed function switch looks like</a:t>
+            </a:r>
+          </a:p>
+          <a:p>
+            <a:r>
+              <a:rPr lang="en-US" dirty="0" smtClean="0"/>
+              <a:t>Each table is hardwired</a:t>
             </a:r>
             <a:r>
               <a:rPr lang="en-US" baseline="0" dirty="0" smtClean="0"/>
-              <a:t>that it’s not very different from how grep works on Linux.</a:t>
+              <a:t> to a specific task.</a:t>
+            </a:r>
+          </a:p>
+          <a:p>
+            <a:r>
+              <a:rPr lang="en-US" baseline="0" dirty="0" smtClean="0"/>
+              <a:t>If you want to size smaller or larger tables, you are out of luck.</a:t>
             </a:r>
             <a:endParaRPr lang="en-US" dirty="0"/>
           </a:p>
@@ -2402,7 +2413,7 @@
           <a:p>
             <a:fld id="{AE764910-0912-401B-9F58-2B7602DC4522}" type="slidenum">
               <a:rPr lang="en-US" smtClean="0"/>
-              <a:t>24</a:t>
+              <a:t>14</a:t>
             </a:fld>
             <a:endParaRPr lang="en-US"/>
           </a:p>
@@ -2411,7 +2422,7 @@
     </p:spTree>
     <p:extLst>
       <p:ext uri="{BB962C8B-B14F-4D97-AF65-F5344CB8AC3E}">
-        <p14:creationId xmlns:p14="http://schemas.microsoft.com/office/powerpoint/2010/main" val="4114549825"/>
+        <p14:creationId xmlns:p14="http://schemas.microsoft.com/office/powerpoint/2010/main" val="1706514526"/>
       </p:ext>
     </p:extLst>
   </p:cSld>
@@ -2448,12 +2459,7 @@
             <p:ph type="sldImg"/>
           </p:nvPr>
         </p:nvSpPr>
-        <p:spPr>
-          <a:xfrm>
-            <a:off x="685800" y="1143000"/>
-            <a:ext cx="5486400" cy="3086100"/>
-          </a:xfrm>
-        </p:spPr>
+        <p:spPr/>
       </p:sp>
       <p:sp>
         <p:nvSpPr>
@@ -2470,9 +2476,35 @@
           <a:bodyPr/>
           <a:lstStyle/>
           <a:p>
-            <a:pPr marL="228600" indent="-228600">
-              <a:buAutoNum type="arabicPeriod"/>
-            </a:pPr>
+            <a:r>
+              <a:rPr lang="en-US" dirty="0" smtClean="0"/>
+              <a:t>Trade width and height flexibly within</a:t>
+            </a:r>
+            <a:r>
+              <a:rPr lang="en-US" baseline="0" dirty="0" smtClean="0"/>
+              <a:t> the table.</a:t>
+            </a:r>
+          </a:p>
+          <a:p>
+            <a:endParaRPr lang="en-US" baseline="0" dirty="0" smtClean="0"/>
+          </a:p>
+          <a:p>
+            <a:r>
+              <a:rPr lang="en-US" baseline="0" dirty="0" smtClean="0"/>
+              <a:t>Maybe show how different logical tables can share resources within and across stages.</a:t>
+            </a:r>
+          </a:p>
+          <a:p>
+            <a:r>
+              <a:rPr lang="en-US" baseline="0" dirty="0" smtClean="0"/>
+              <a:t>Maybe use Nick’s slides to illustrate this.</a:t>
+            </a:r>
+          </a:p>
+          <a:p>
+            <a:r>
+              <a:rPr lang="en-US" baseline="0" dirty="0" smtClean="0"/>
+              <a:t>Add some examples.</a:t>
+            </a:r>
             <a:endParaRPr lang="en-US" dirty="0"/>
           </a:p>
         </p:txBody>
@@ -2492,10 +2524,9 @@
           <a:bodyPr/>
           <a:lstStyle/>
           <a:p>
-            <a:fld id="{30C17C4F-F342-4E4F-BDF4-6D69381014F1}" type="slidenum">
+            <a:fld id="{AE764910-0912-401B-9F58-2B7602DC4522}" type="slidenum">
               <a:rPr lang="en-US" smtClean="0"/>
-              <a:pPr/>
-              <a:t>25</a:t>
+              <a:t>15</a:t>
             </a:fld>
             <a:endParaRPr lang="en-US"/>
           </a:p>
@@ -2504,7 +2535,7 @@
     </p:spTree>
     <p:extLst>
       <p:ext uri="{BB962C8B-B14F-4D97-AF65-F5344CB8AC3E}">
-        <p14:creationId xmlns:p14="http://schemas.microsoft.com/office/powerpoint/2010/main" val="3612265134"/>
+        <p14:creationId xmlns:p14="http://schemas.microsoft.com/office/powerpoint/2010/main" val="1439908967"/>
       </p:ext>
     </p:extLst>
   </p:cSld>
@@ -2541,12 +2572,7 @@
             <p:ph type="sldImg"/>
           </p:nvPr>
         </p:nvSpPr>
-        <p:spPr>
-          <a:xfrm>
-            <a:off x="685800" y="1143000"/>
-            <a:ext cx="5486400" cy="3086100"/>
-          </a:xfrm>
-        </p:spPr>
+        <p:spPr/>
       </p:sp>
       <p:sp>
         <p:nvSpPr>
@@ -2565,75 +2591,48 @@
           <a:p>
             <a:r>
               <a:rPr lang="en-US" dirty="0" smtClean="0"/>
-              <a:t>To make it possible to efficiently use multiple stages of match</a:t>
-            </a:r>
-            <a:r>
-              <a:rPr lang="en-US" baseline="0" dirty="0" smtClean="0"/>
-              <a:t> </a:t>
-            </a:r>
-            <a:r>
-              <a:rPr lang="en-US" dirty="0" smtClean="0"/>
-              <a:t>tables, it</a:t>
-            </a:r>
-            <a:r>
-              <a:rPr lang="en-US" baseline="0" dirty="0" smtClean="0"/>
-              <a:t> is assumed that the RMT Model can be configured to map Logical Tables to the Physical Tables.</a:t>
-            </a:r>
-          </a:p>
-          <a:p>
-            <a:endParaRPr lang="en-US" baseline="0" dirty="0" smtClean="0"/>
-          </a:p>
-          <a:p>
-            <a:r>
-              <a:rPr lang="en-US" baseline="0" dirty="0" smtClean="0"/>
-              <a:t>To create bigger tables, one table may traverse multiple stages.</a:t>
-            </a:r>
-          </a:p>
-          <a:p>
-            <a:r>
-              <a:rPr lang="en-US" baseline="0" dirty="0" smtClean="0"/>
-              <a:t>To create many smaller tables, several tables can be packed into one stage.</a:t>
-            </a:r>
-          </a:p>
-          <a:p>
-            <a:r>
-              <a:rPr lang="en-US" baseline="0" dirty="0" smtClean="0"/>
-              <a:t>To make the allocation even more flexible, the Action instructions and the Statistic could share the same table space. </a:t>
-            </a:r>
-          </a:p>
-          <a:p>
-            <a:r>
-              <a:rPr lang="en-US" baseline="0" dirty="0" smtClean="0"/>
-              <a:t>This slide gives a crude representation of how the the Logical Tables could be mapped to the Physical Tables.</a:t>
-            </a:r>
-          </a:p>
-          <a:p>
-            <a:endParaRPr lang="en-US" baseline="0" dirty="0" smtClean="0"/>
-          </a:p>
-          <a:p>
-            <a:r>
-              <a:rPr lang="en-US" baseline="0" dirty="0" smtClean="0"/>
-              <a:t>In practice, the control plane would need to create a Table Flow Graph (to accompany the Parse Graph) to decide how the Logical Tables are mapped. </a:t>
-            </a:r>
-          </a:p>
-          <a:p>
-            <a:endParaRPr lang="en-US" dirty="0" smtClean="0"/>
-          </a:p>
-          <a:p>
-            <a:r>
-              <a:rPr lang="en-US" dirty="0" smtClean="0"/>
-              <a:t>The control plane</a:t>
-            </a:r>
-            <a:r>
-              <a:rPr lang="en-US" baseline="0" dirty="0" smtClean="0"/>
-              <a:t> is assumed to know the number and size of the physical stages available. </a:t>
-            </a:r>
-          </a:p>
-          <a:p>
-            <a:r>
-              <a:rPr lang="en-US" baseline="0" dirty="0" smtClean="0"/>
-              <a:t>There could be as few as 1 stage. A given switch might only allow Logical Tables to directly correspond to Physical Tables.</a:t>
-            </a:r>
+              <a:t>This is all you really need to know about the paper </a:t>
+            </a:r>
+            <a:r>
+              <a:rPr lang="en-US" dirty="0" smtClean="0">
+                <a:sym typeface="Wingdings" panose="05000000000000000000" pitchFamily="2" charset="2"/>
+              </a:rPr>
+              <a:t></a:t>
+            </a:r>
+          </a:p>
+          <a:p>
+            <a:r>
+              <a:rPr lang="en-US" dirty="0" smtClean="0">
+                <a:sym typeface="Wingdings" panose="05000000000000000000" pitchFamily="2" charset="2"/>
+              </a:rPr>
+              <a:t>The rest is just how to make it run at 1 </a:t>
+            </a:r>
+            <a:r>
+              <a:rPr lang="en-US" dirty="0" smtClean="0">
+                <a:sym typeface="Wingdings" panose="05000000000000000000" pitchFamily="2" charset="2"/>
+              </a:rPr>
+              <a:t>GHz</a:t>
+            </a:r>
+          </a:p>
+          <a:p>
+            <a:endParaRPr lang="en-US" dirty="0" smtClean="0">
+              <a:sym typeface="Wingdings" panose="05000000000000000000" pitchFamily="2" charset="2"/>
+            </a:endParaRPr>
+          </a:p>
+          <a:p>
+            <a:r>
+              <a:rPr lang="en-US" dirty="0" smtClean="0">
+                <a:sym typeface="Wingdings" panose="05000000000000000000" pitchFamily="2" charset="2"/>
+              </a:rPr>
+              <a:t>The idea that you can take different</a:t>
+            </a:r>
+            <a:r>
+              <a:rPr lang="en-US" baseline="0" dirty="0" smtClean="0">
+                <a:sym typeface="Wingdings" panose="05000000000000000000" pitchFamily="2" charset="2"/>
+              </a:rPr>
+              <a:t> logical tables and split them across pipelines in a flexible way.</a:t>
+            </a:r>
+            <a:endParaRPr lang="en-US" dirty="0"/>
           </a:p>
         </p:txBody>
       </p:sp>
@@ -2652,10 +2651,9 @@
           <a:bodyPr/>
           <a:lstStyle/>
           <a:p>
-            <a:fld id="{24087B50-CBD5-6641-B9E0-7A5AF62DAEF6}" type="slidenum">
+            <a:fld id="{AE764910-0912-401B-9F58-2B7602DC4522}" type="slidenum">
               <a:rPr lang="en-US" smtClean="0"/>
-              <a:pPr/>
-              <a:t>26</a:t>
+              <a:t>16</a:t>
             </a:fld>
             <a:endParaRPr lang="en-US"/>
           </a:p>
@@ -2664,7 +2662,7 @@
     </p:spTree>
     <p:extLst>
       <p:ext uri="{BB962C8B-B14F-4D97-AF65-F5344CB8AC3E}">
-        <p14:creationId xmlns:p14="http://schemas.microsoft.com/office/powerpoint/2010/main" val="2110096367"/>
+        <p14:creationId xmlns:p14="http://schemas.microsoft.com/office/powerpoint/2010/main" val="723529385"/>
       </p:ext>
     </p:extLst>
   </p:cSld>
@@ -2701,12 +2699,7 @@
             <p:ph type="sldImg"/>
           </p:nvPr>
         </p:nvSpPr>
-        <p:spPr>
-          <a:xfrm>
-            <a:off x="685800" y="1143000"/>
-            <a:ext cx="5486400" cy="3086100"/>
-          </a:xfrm>
-        </p:spPr>
+        <p:spPr/>
       </p:sp>
       <p:sp>
         <p:nvSpPr>
@@ -2725,48 +2718,30 @@
           <a:p>
             <a:r>
               <a:rPr lang="en-US" dirty="0" smtClean="0"/>
-              <a:t>Action processing is assumed to be</a:t>
-            </a:r>
+              <a:t>How do you program these things?</a:t>
+            </a:r>
+            <a:endParaRPr lang="en-US" dirty="0"/>
+          </a:p>
+          <a:p>
+            <a:endParaRPr lang="en-US" dirty="0"/>
+          </a:p>
+          <a:p>
+            <a:pPr marL="228600" indent="-228600">
+              <a:buAutoNum type="arabicPeriod"/>
+            </a:pPr>
             <a:r>
               <a:rPr lang="en-US" baseline="0" dirty="0" smtClean="0"/>
-              <a:t> available in each physical stage of the pipeline.</a:t>
-            </a:r>
-          </a:p>
-          <a:p>
+              <a:t>Parse graph for the parser.</a:t>
+            </a:r>
+          </a:p>
+          <a:p>
+            <a:pPr marL="228600" indent="-228600">
+              <a:buAutoNum type="arabicPeriod"/>
+            </a:pPr>
             <a:r>
               <a:rPr lang="en-US" baseline="0" dirty="0" smtClean="0"/>
-              <a:t>The headers are available along with the match result and metadata. Optional state could be available to the Action Processors.</a:t>
-            </a:r>
-          </a:p>
-          <a:p>
-            <a:endParaRPr lang="en-US" dirty="0" smtClean="0"/>
-          </a:p>
-          <a:p>
-            <a:r>
-              <a:rPr lang="en-US" dirty="0" smtClean="0"/>
-              <a:t>There</a:t>
-            </a:r>
-            <a:r>
-              <a:rPr lang="en-US" baseline="0" dirty="0" smtClean="0"/>
-              <a:t> are assumed to be some number of processors (could be 1, could be hundreds) to perform Actions on headers.</a:t>
-            </a:r>
-          </a:p>
-          <a:p>
-            <a:r>
-              <a:rPr lang="en-US" baseline="0" dirty="0" smtClean="0"/>
-              <a:t>The Action instruction set is assumed to be protocol independent  (e.g. “insert these 8 bits starting at bit 19 of the 3</a:t>
-            </a:r>
-            <a:r>
-              <a:rPr lang="en-US" baseline="30000" dirty="0" smtClean="0"/>
-              <a:t>rd</a:t>
-            </a:r>
-            <a:r>
-              <a:rPr lang="en-US" baseline="0" dirty="0" smtClean="0"/>
-              <a:t> header”). </a:t>
-            </a:r>
-          </a:p>
-          <a:p>
-            <a:endParaRPr lang="en-US" dirty="0"/>
+              <a:t>Table graph for the tables.  (one animation for each).</a:t>
+            </a:r>
           </a:p>
         </p:txBody>
       </p:sp>
@@ -2785,10 +2760,9 @@
           <a:bodyPr/>
           <a:lstStyle/>
           <a:p>
-            <a:fld id="{24087B50-CBD5-6641-B9E0-7A5AF62DAEF6}" type="slidenum">
+            <a:fld id="{AE764910-0912-401B-9F58-2B7602DC4522}" type="slidenum">
               <a:rPr lang="en-US" smtClean="0"/>
-              <a:pPr/>
-              <a:t>27</a:t>
+              <a:t>22</a:t>
             </a:fld>
             <a:endParaRPr lang="en-US"/>
           </a:p>
@@ -2797,7 +2771,7 @@
     </p:spTree>
     <p:extLst>
       <p:ext uri="{BB962C8B-B14F-4D97-AF65-F5344CB8AC3E}">
-        <p14:creationId xmlns:p14="http://schemas.microsoft.com/office/powerpoint/2010/main" val="2669907279"/>
+        <p14:creationId xmlns:p14="http://schemas.microsoft.com/office/powerpoint/2010/main" val="945139473"/>
       </p:ext>
     </p:extLst>
   </p:cSld>
@@ -2853,7 +2827,11 @@
           <a:p>
             <a:r>
               <a:rPr lang="en-US" dirty="0" smtClean="0"/>
-              <a:t>Allows you to edit packet fields in parallel.</a:t>
+              <a:t>Say </a:t>
+            </a:r>
+            <a:r>
+              <a:rPr lang="en-US" baseline="0" dirty="0" smtClean="0"/>
+              <a:t>that it’s not very different from how grep works on Linux.</a:t>
             </a:r>
             <a:endParaRPr lang="en-US" dirty="0"/>
           </a:p>
@@ -2876,7 +2854,7 @@
           <a:p>
             <a:fld id="{AE764910-0912-401B-9F58-2B7602DC4522}" type="slidenum">
               <a:rPr lang="en-US" smtClean="0"/>
-              <a:t>28</a:t>
+              <a:t>24</a:t>
             </a:fld>
             <a:endParaRPr lang="en-US"/>
           </a:p>
@@ -2885,7 +2863,7 @@
     </p:spTree>
     <p:extLst>
       <p:ext uri="{BB962C8B-B14F-4D97-AF65-F5344CB8AC3E}">
-        <p14:creationId xmlns:p14="http://schemas.microsoft.com/office/powerpoint/2010/main" val="3861286882"/>
+        <p14:creationId xmlns:p14="http://schemas.microsoft.com/office/powerpoint/2010/main" val="4114549825"/>
       </p:ext>
     </p:extLst>
   </p:cSld>
@@ -2922,7 +2900,12 @@
             <p:ph type="sldImg"/>
           </p:nvPr>
         </p:nvSpPr>
-        <p:spPr/>
+        <p:spPr>
+          <a:xfrm>
+            <a:off x="685800" y="1143000"/>
+            <a:ext cx="5486400" cy="3086100"/>
+          </a:xfrm>
+        </p:spPr>
       </p:sp>
       <p:sp>
         <p:nvSpPr>
@@ -2939,26 +2922,9 @@
           <a:bodyPr/>
           <a:lstStyle/>
           <a:p>
-            <a:r>
-              <a:rPr lang="en-US" dirty="0" smtClean="0"/>
-              <a:t>Mention latency here: each stage about a</a:t>
-            </a:r>
-            <a:r>
-              <a:rPr lang="en-US" baseline="0" dirty="0" smtClean="0"/>
-              <a:t> few 10 ns.</a:t>
-            </a:r>
-          </a:p>
-          <a:p>
-            <a:r>
-              <a:rPr lang="en-US" baseline="0" dirty="0" smtClean="0"/>
-              <a:t>More parsers than pipelines.</a:t>
-            </a:r>
-          </a:p>
-          <a:p>
-            <a:r>
-              <a:rPr lang="en-US" baseline="0" dirty="0" smtClean="0"/>
-              <a:t>Q: What about latency here?</a:t>
-            </a:r>
+            <a:pPr marL="228600" indent="-228600">
+              <a:buAutoNum type="arabicPeriod"/>
+            </a:pPr>
             <a:endParaRPr lang="en-US" dirty="0"/>
           </a:p>
         </p:txBody>
@@ -2978,9 +2944,10 @@
           <a:bodyPr/>
           <a:lstStyle/>
           <a:p>
-            <a:fld id="{AE764910-0912-401B-9F58-2B7602DC4522}" type="slidenum">
+            <a:fld id="{30C17C4F-F342-4E4F-BDF4-6D69381014F1}" type="slidenum">
               <a:rPr lang="en-US" smtClean="0"/>
-              <a:t>29</a:t>
+              <a:pPr/>
+              <a:t>25</a:t>
             </a:fld>
             <a:endParaRPr lang="en-US"/>
           </a:p>
@@ -2989,7 +2956,7 @@
     </p:spTree>
     <p:extLst>
       <p:ext uri="{BB962C8B-B14F-4D97-AF65-F5344CB8AC3E}">
-        <p14:creationId xmlns:p14="http://schemas.microsoft.com/office/powerpoint/2010/main" val="789887834"/>
+        <p14:creationId xmlns:p14="http://schemas.microsoft.com/office/powerpoint/2010/main" val="3612265134"/>
       </p:ext>
     </p:extLst>
   </p:cSld>
@@ -3050,13 +3017,75 @@
           <a:p>
             <a:r>
               <a:rPr lang="en-US" dirty="0" smtClean="0"/>
-              <a:t>Prop:</a:t>
+              <a:t>To make it possible to efficiently use multiple stages of match</a:t>
             </a:r>
             <a:r>
               <a:rPr lang="en-US" baseline="0" dirty="0" smtClean="0"/>
-              <a:t> Explain the electronic design automation process on the blackboard here.</a:t>
-            </a:r>
-            <a:endParaRPr lang="en-US" dirty="0"/>
+              <a:t> </a:t>
+            </a:r>
+            <a:r>
+              <a:rPr lang="en-US" dirty="0" smtClean="0"/>
+              <a:t>tables, it</a:t>
+            </a:r>
+            <a:r>
+              <a:rPr lang="en-US" baseline="0" dirty="0" smtClean="0"/>
+              <a:t> is assumed that the RMT Model can be configured to map Logical Tables to the Physical Tables.</a:t>
+            </a:r>
+          </a:p>
+          <a:p>
+            <a:endParaRPr lang="en-US" baseline="0" dirty="0" smtClean="0"/>
+          </a:p>
+          <a:p>
+            <a:r>
+              <a:rPr lang="en-US" baseline="0" dirty="0" smtClean="0"/>
+              <a:t>To create bigger tables, one table may traverse multiple stages.</a:t>
+            </a:r>
+          </a:p>
+          <a:p>
+            <a:r>
+              <a:rPr lang="en-US" baseline="0" dirty="0" smtClean="0"/>
+              <a:t>To create many smaller tables, several tables can be packed into one stage.</a:t>
+            </a:r>
+          </a:p>
+          <a:p>
+            <a:r>
+              <a:rPr lang="en-US" baseline="0" dirty="0" smtClean="0"/>
+              <a:t>To make the allocation even more flexible, the Action instructions and the Statistic could share the same table space. </a:t>
+            </a:r>
+          </a:p>
+          <a:p>
+            <a:r>
+              <a:rPr lang="en-US" baseline="0" dirty="0" smtClean="0"/>
+              <a:t>This slide gives a crude representation of how the the Logical Tables could be mapped to the Physical Tables.</a:t>
+            </a:r>
+          </a:p>
+          <a:p>
+            <a:endParaRPr lang="en-US" baseline="0" dirty="0" smtClean="0"/>
+          </a:p>
+          <a:p>
+            <a:r>
+              <a:rPr lang="en-US" baseline="0" dirty="0" smtClean="0"/>
+              <a:t>In practice, the control plane would need to create a Table Flow Graph (to accompany the Parse Graph) to decide how the Logical Tables are mapped. </a:t>
+            </a:r>
+          </a:p>
+          <a:p>
+            <a:endParaRPr lang="en-US" dirty="0" smtClean="0"/>
+          </a:p>
+          <a:p>
+            <a:r>
+              <a:rPr lang="en-US" dirty="0" smtClean="0"/>
+              <a:t>The control plane</a:t>
+            </a:r>
+            <a:r>
+              <a:rPr lang="en-US" baseline="0" dirty="0" smtClean="0"/>
+              <a:t> is assumed to know the number and size of the physical stages available. </a:t>
+            </a:r>
+          </a:p>
+          <a:p>
+            <a:r>
+              <a:rPr lang="en-US" baseline="0" dirty="0" smtClean="0"/>
+              <a:t>There could be as few as 1 stage. A given switch might only allow Logical Tables to directly correspond to Physical Tables.</a:t>
+            </a:r>
           </a:p>
         </p:txBody>
       </p:sp>
@@ -3075,9 +3104,10 @@
           <a:bodyPr/>
           <a:lstStyle/>
           <a:p>
-            <a:fld id="{AE764910-0912-401B-9F58-2B7602DC4522}" type="slidenum">
+            <a:fld id="{24087B50-CBD5-6641-B9E0-7A5AF62DAEF6}" type="slidenum">
               <a:rPr lang="en-US" smtClean="0"/>
-              <a:t>30</a:t>
+              <a:pPr/>
+              <a:t>26</a:t>
             </a:fld>
             <a:endParaRPr lang="en-US"/>
           </a:p>
@@ -3086,7 +3116,7 @@
     </p:spTree>
     <p:extLst>
       <p:ext uri="{BB962C8B-B14F-4D97-AF65-F5344CB8AC3E}">
-        <p14:creationId xmlns:p14="http://schemas.microsoft.com/office/powerpoint/2010/main" val="1516239367"/>
+        <p14:creationId xmlns:p14="http://schemas.microsoft.com/office/powerpoint/2010/main" val="2110096367"/>
       </p:ext>
     </p:extLst>
   </p:cSld>
@@ -3147,8 +3177,47 @@
           <a:p>
             <a:r>
               <a:rPr lang="en-US" dirty="0" smtClean="0"/>
-              <a:t>Give context on what metrics matter in hardware design.</a:t>
-            </a:r>
+              <a:t>Action processing is assumed to be</a:t>
+            </a:r>
+            <a:r>
+              <a:rPr lang="en-US" baseline="0" dirty="0" smtClean="0"/>
+              <a:t> available in each physical stage of the pipeline.</a:t>
+            </a:r>
+          </a:p>
+          <a:p>
+            <a:r>
+              <a:rPr lang="en-US" baseline="0" dirty="0" smtClean="0"/>
+              <a:t>The headers are available along with the match result and metadata. Optional state could be available to the Action Processors.</a:t>
+            </a:r>
+          </a:p>
+          <a:p>
+            <a:endParaRPr lang="en-US" dirty="0" smtClean="0"/>
+          </a:p>
+          <a:p>
+            <a:r>
+              <a:rPr lang="en-US" dirty="0" smtClean="0"/>
+              <a:t>There</a:t>
+            </a:r>
+            <a:r>
+              <a:rPr lang="en-US" baseline="0" dirty="0" smtClean="0"/>
+              <a:t> are assumed to be some number of processors (could be 1, could be hundreds) to perform Actions on headers.</a:t>
+            </a:r>
+          </a:p>
+          <a:p>
+            <a:r>
+              <a:rPr lang="en-US" baseline="0" dirty="0" smtClean="0"/>
+              <a:t>The Action instruction set is assumed to be protocol independent  (e.g. “insert these 8 bits starting at bit 19 of the 3</a:t>
+            </a:r>
+            <a:r>
+              <a:rPr lang="en-US" baseline="30000" dirty="0" smtClean="0"/>
+              <a:t>rd</a:t>
+            </a:r>
+            <a:r>
+              <a:rPr lang="en-US" baseline="0" dirty="0" smtClean="0"/>
+              <a:t> header”). </a:t>
+            </a:r>
+          </a:p>
+          <a:p>
             <a:endParaRPr lang="en-US" dirty="0"/>
           </a:p>
         </p:txBody>
@@ -3168,9 +3237,10 @@
           <a:bodyPr/>
           <a:lstStyle/>
           <a:p>
-            <a:fld id="{AE764910-0912-401B-9F58-2B7602DC4522}" type="slidenum">
+            <a:fld id="{24087B50-CBD5-6641-B9E0-7A5AF62DAEF6}" type="slidenum">
               <a:rPr lang="en-US" smtClean="0"/>
-              <a:t>31</a:t>
+              <a:pPr/>
+              <a:t>27</a:t>
             </a:fld>
             <a:endParaRPr lang="en-US"/>
           </a:p>
@@ -3179,7 +3249,7 @@
     </p:spTree>
     <p:extLst>
       <p:ext uri="{BB962C8B-B14F-4D97-AF65-F5344CB8AC3E}">
-        <p14:creationId xmlns:p14="http://schemas.microsoft.com/office/powerpoint/2010/main" val="2331962507"/>
+        <p14:creationId xmlns:p14="http://schemas.microsoft.com/office/powerpoint/2010/main" val="2669907279"/>
       </p:ext>
     </p:extLst>
   </p:cSld>
@@ -3216,12 +3286,7 @@
             <p:ph type="sldImg"/>
           </p:nvPr>
         </p:nvSpPr>
-        <p:spPr>
-          <a:xfrm>
-            <a:off x="381000" y="685800"/>
-            <a:ext cx="6096000" cy="3429000"/>
-          </a:xfrm>
-        </p:spPr>
+        <p:spPr/>
       </p:sp>
       <p:sp>
         <p:nvSpPr>
@@ -3240,23 +3305,7 @@
           <a:p>
             <a:r>
               <a:rPr lang="en-US" dirty="0" smtClean="0"/>
-              <a:t>This is the</a:t>
-            </a:r>
-            <a:r>
-              <a:rPr lang="en-US" baseline="0" dirty="0" smtClean="0"/>
-              <a:t> P4 API: a new API between the control-plane and the data plane.</a:t>
-            </a:r>
-          </a:p>
-          <a:p>
-            <a:r>
-              <a:rPr lang="en-US" baseline="0" dirty="0" smtClean="0"/>
-              <a:t>The data plane performs mostly stateless high-speed processing.</a:t>
-            </a:r>
-          </a:p>
-          <a:p>
-            <a:r>
-              <a:rPr lang="en-US" baseline="0" dirty="0" smtClean="0"/>
-              <a:t>The data plane is lean and fast; most of the complexity is still in the control plane. P4 does not address this aspect.</a:t>
+              <a:t>Allows you to edit packet fields in parallel.</a:t>
             </a:r>
             <a:endParaRPr lang="en-US" dirty="0"/>
           </a:p>
@@ -3272,22 +3321,14 @@
             <p:ph type="sldNum" sz="quarter" idx="10"/>
           </p:nvPr>
         </p:nvSpPr>
-        <p:spPr>
-          <a:xfrm>
-            <a:off x="3884613" y="8685213"/>
-            <a:ext cx="2971800" cy="457200"/>
-          </a:xfrm>
-          <a:prstGeom prst="rect">
-            <a:avLst/>
-          </a:prstGeom>
-        </p:spPr>
+        <p:spPr/>
         <p:txBody>
           <a:bodyPr/>
           <a:lstStyle/>
           <a:p>
-            <a:fld id="{D7C7F897-9DD6-3F44-9F39-5E102FFA3BB1}" type="slidenum">
+            <a:fld id="{AE764910-0912-401B-9F58-2B7602DC4522}" type="slidenum">
               <a:rPr lang="en-US" smtClean="0"/>
-              <a:t>34</a:t>
+              <a:t>28</a:t>
             </a:fld>
             <a:endParaRPr lang="en-US"/>
           </a:p>
@@ -3296,7 +3337,7 @@
     </p:spTree>
     <p:extLst>
       <p:ext uri="{BB962C8B-B14F-4D97-AF65-F5344CB8AC3E}">
-        <p14:creationId xmlns:p14="http://schemas.microsoft.com/office/powerpoint/2010/main" val="2204846612"/>
+        <p14:creationId xmlns:p14="http://schemas.microsoft.com/office/powerpoint/2010/main" val="3861286882"/>
       </p:ext>
     </p:extLst>
   </p:cSld>
@@ -3333,12 +3374,7 @@
             <p:ph type="sldImg"/>
           </p:nvPr>
         </p:nvSpPr>
-        <p:spPr>
-          <a:xfrm>
-            <a:off x="381000" y="685800"/>
-            <a:ext cx="6096000" cy="3429000"/>
-          </a:xfrm>
-        </p:spPr>
+        <p:spPr/>
       </p:sp>
       <p:sp>
         <p:nvSpPr>
@@ -3357,11 +3393,23 @@
           <a:p>
             <a:r>
               <a:rPr lang="en-US" dirty="0" smtClean="0"/>
-              <a:t>P4 should be portable across a large spectrum of switch</a:t>
+              <a:t>Mention latency here: each stage about a</a:t>
             </a:r>
             <a:r>
               <a:rPr lang="en-US" baseline="0" dirty="0" smtClean="0"/>
-              <a:t> implementations.</a:t>
+              <a:t> few 10 ns.</a:t>
+            </a:r>
+          </a:p>
+          <a:p>
+            <a:r>
+              <a:rPr lang="en-US" baseline="0" dirty="0" smtClean="0"/>
+              <a:t>More parsers than pipelines.</a:t>
+            </a:r>
+          </a:p>
+          <a:p>
+            <a:r>
+              <a:rPr lang="en-US" baseline="0" dirty="0" smtClean="0"/>
+              <a:t>Q: What about latency here?</a:t>
             </a:r>
             <a:endParaRPr lang="en-US" dirty="0"/>
           </a:p>
@@ -3377,22 +3425,14 @@
             <p:ph type="sldNum" sz="quarter" idx="10"/>
           </p:nvPr>
         </p:nvSpPr>
-        <p:spPr>
-          <a:xfrm>
-            <a:off x="3884613" y="8685213"/>
-            <a:ext cx="2971800" cy="457200"/>
-          </a:xfrm>
-          <a:prstGeom prst="rect">
-            <a:avLst/>
-          </a:prstGeom>
-        </p:spPr>
+        <p:spPr/>
         <p:txBody>
           <a:bodyPr/>
           <a:lstStyle/>
           <a:p>
-            <a:fld id="{D7C7F897-9DD6-3F44-9F39-5E102FFA3BB1}" type="slidenum">
+            <a:fld id="{AE764910-0912-401B-9F58-2B7602DC4522}" type="slidenum">
               <a:rPr lang="en-US" smtClean="0"/>
-              <a:t>35</a:t>
+              <a:t>29</a:t>
             </a:fld>
             <a:endParaRPr lang="en-US"/>
           </a:p>
@@ -3401,7 +3441,7 @@
     </p:spTree>
     <p:extLst>
       <p:ext uri="{BB962C8B-B14F-4D97-AF65-F5344CB8AC3E}">
-        <p14:creationId xmlns:p14="http://schemas.microsoft.com/office/powerpoint/2010/main" val="4078793271"/>
+        <p14:creationId xmlns:p14="http://schemas.microsoft.com/office/powerpoint/2010/main" val="789887834"/>
       </p:ext>
     </p:extLst>
   </p:cSld>
@@ -3438,7 +3478,12 @@
             <p:ph type="sldImg"/>
           </p:nvPr>
         </p:nvSpPr>
-        <p:spPr/>
+        <p:spPr>
+          <a:xfrm>
+            <a:off x="685800" y="1143000"/>
+            <a:ext cx="5486400" cy="3086100"/>
+          </a:xfrm>
+        </p:spPr>
       </p:sp>
       <p:sp>
         <p:nvSpPr>
@@ -3456,29 +3501,24 @@
           <a:lstStyle/>
           <a:p>
             <a:r>
-              <a:rPr lang="en-US" baseline="0" dirty="0" smtClean="0"/>
-              <a:t>Mention that it is on log scale</a:t>
-            </a:r>
-          </a:p>
-          <a:p>
-            <a:r>
-              <a:rPr lang="en-US" baseline="0" dirty="0" smtClean="0"/>
-              <a:t>Define line rate</a:t>
-            </a:r>
-          </a:p>
-          <a:p>
-            <a:r>
-              <a:rPr lang="en-US" baseline="0" dirty="0" smtClean="0"/>
-              <a:t>Unpredictable performance examples: hardware </a:t>
-            </a:r>
-            <a:r>
-              <a:rPr lang="en-US" baseline="0" dirty="0" err="1" smtClean="0"/>
-              <a:t>config</a:t>
-            </a:r>
-            <a:r>
-              <a:rPr lang="en-US" baseline="0" dirty="0" smtClean="0"/>
-              <a:t> (number of cores, RAM size, etc.)</a:t>
-            </a:r>
+              <a:rPr lang="en-US" dirty="0" smtClean="0"/>
+              <a:t>Burgeoning </a:t>
+            </a:r>
+            <a:r>
+              <a:rPr lang="en-US" dirty="0" err="1" smtClean="0"/>
+              <a:t>OpenFlow</a:t>
+            </a:r>
+            <a:r>
+              <a:rPr lang="en-US" dirty="0" smtClean="0"/>
+              <a:t> spec.</a:t>
+            </a:r>
+          </a:p>
+          <a:p>
+            <a:r>
+              <a:rPr lang="en-US" dirty="0" smtClean="0"/>
+              <a:t>This is really not all that revolutionary. Every other domain does this: NVIDIA’s GPUs, TI’s DSPs, mobile phones, </a:t>
+            </a:r>
+            <a:endParaRPr lang="en-US" dirty="0"/>
           </a:p>
         </p:txBody>
       </p:sp>
@@ -3497,9 +3537,9 @@
           <a:bodyPr/>
           <a:lstStyle/>
           <a:p>
-            <a:fld id="{16B09458-7AEF-4AD3-A567-0F11380064BE}" type="slidenum">
+            <a:fld id="{AE764910-0912-401B-9F58-2B7602DC4522}" type="slidenum">
               <a:rPr lang="en-US" smtClean="0"/>
-              <a:t>7</a:t>
+              <a:t>6</a:t>
             </a:fld>
             <a:endParaRPr lang="en-US"/>
           </a:p>
@@ -3508,7 +3548,7 @@
     </p:spTree>
     <p:extLst>
       <p:ext uri="{BB962C8B-B14F-4D97-AF65-F5344CB8AC3E}">
-        <p14:creationId xmlns:p14="http://schemas.microsoft.com/office/powerpoint/2010/main" val="1461934913"/>
+        <p14:creationId xmlns:p14="http://schemas.microsoft.com/office/powerpoint/2010/main" val="3975167046"/>
       </p:ext>
     </p:extLst>
   </p:cSld>
@@ -3547,8 +3587,8 @@
         </p:nvSpPr>
         <p:spPr>
           <a:xfrm>
-            <a:off x="381000" y="685800"/>
-            <a:ext cx="6096000" cy="3429000"/>
+            <a:off x="685800" y="1143000"/>
+            <a:ext cx="5486400" cy="3086100"/>
           </a:xfrm>
         </p:spPr>
       </p:sp>
@@ -3569,12 +3609,41 @@
           <a:p>
             <a:r>
               <a:rPr lang="en-US" dirty="0" smtClean="0"/>
-              <a:t>P4 expresses the behavior</a:t>
+              <a:t>Prop:</a:t>
             </a:r>
             <a:r>
               <a:rPr lang="en-US" baseline="0" dirty="0" smtClean="0"/>
-              <a:t> of significant data plane functions. It currently is not rich enough to describe the complete functionality of the data plane.</a:t>
-            </a:r>
+              <a:t> Explain the electronic design automation process on the blackboard here</a:t>
+            </a:r>
+            <a:r>
+              <a:rPr lang="en-US" baseline="0" dirty="0" smtClean="0"/>
+              <a:t>.</a:t>
+            </a:r>
+          </a:p>
+          <a:p>
+            <a:endParaRPr lang="en-US" baseline="0" dirty="0" smtClean="0"/>
+          </a:p>
+          <a:p>
+            <a:r>
+              <a:rPr lang="en-US" baseline="0" dirty="0" smtClean="0"/>
+              <a:t>Really simplify the area calculations and overheads here.</a:t>
+            </a:r>
+          </a:p>
+          <a:p>
+            <a:endParaRPr lang="en-US" baseline="0" dirty="0" smtClean="0"/>
+          </a:p>
+          <a:p>
+            <a:r>
+              <a:rPr lang="en-US" baseline="0" dirty="0" smtClean="0"/>
+              <a:t>Ask the students: what do you think is the makeup of the chip?</a:t>
+            </a:r>
+          </a:p>
+          <a:p>
+            <a:r>
+              <a:rPr lang="en-US" baseline="0" dirty="0" smtClean="0"/>
+              <a:t>What do you think a chip consists of?</a:t>
+            </a:r>
+            <a:endParaRPr lang="en-US" dirty="0"/>
           </a:p>
         </p:txBody>
       </p:sp>
@@ -3588,22 +3657,14 @@
             <p:ph type="sldNum" sz="quarter" idx="10"/>
           </p:nvPr>
         </p:nvSpPr>
-        <p:spPr>
-          <a:xfrm>
-            <a:off x="3884613" y="8685213"/>
-            <a:ext cx="2971800" cy="457200"/>
-          </a:xfrm>
-          <a:prstGeom prst="rect">
-            <a:avLst/>
-          </a:prstGeom>
-        </p:spPr>
+        <p:spPr/>
         <p:txBody>
           <a:bodyPr/>
           <a:lstStyle/>
           <a:p>
-            <a:fld id="{D7C7F897-9DD6-3F44-9F39-5E102FFA3BB1}" type="slidenum">
+            <a:fld id="{AE764910-0912-401B-9F58-2B7602DC4522}" type="slidenum">
               <a:rPr lang="en-US" smtClean="0"/>
-              <a:t>36</a:t>
+              <a:t>30</a:t>
             </a:fld>
             <a:endParaRPr lang="en-US"/>
           </a:p>
@@ -3612,7 +3673,7 @@
     </p:spTree>
     <p:extLst>
       <p:ext uri="{BB962C8B-B14F-4D97-AF65-F5344CB8AC3E}">
-        <p14:creationId xmlns:p14="http://schemas.microsoft.com/office/powerpoint/2010/main" val="3064939881"/>
+        <p14:creationId xmlns:p14="http://schemas.microsoft.com/office/powerpoint/2010/main" val="1516239367"/>
       </p:ext>
     </p:extLst>
   </p:cSld>
@@ -3651,8 +3712,8 @@
         </p:nvSpPr>
         <p:spPr>
           <a:xfrm>
-            <a:off x="381000" y="685800"/>
-            <a:ext cx="6096000" cy="3429000"/>
+            <a:off x="685800" y="1143000"/>
+            <a:ext cx="5486400" cy="3086100"/>
           </a:xfrm>
         </p:spPr>
       </p:sp>
@@ -3673,13 +3734,7 @@
           <a:p>
             <a:r>
               <a:rPr lang="en-US" dirty="0" smtClean="0"/>
-              <a:t>How is packet processing performed in P4?</a:t>
-            </a:r>
-          </a:p>
-          <a:p>
-            <a:r>
-              <a:rPr lang="en-US" dirty="0" smtClean="0"/>
-              <a:t>This is a high-level view.</a:t>
+              <a:t>Give context on what metrics matter in hardware design.</a:t>
             </a:r>
             <a:endParaRPr lang="en-US" dirty="0"/>
           </a:p>
@@ -3695,22 +3750,14 @@
             <p:ph type="sldNum" sz="quarter" idx="10"/>
           </p:nvPr>
         </p:nvSpPr>
-        <p:spPr>
-          <a:xfrm>
-            <a:off x="3884613" y="8685213"/>
-            <a:ext cx="2971800" cy="457200"/>
-          </a:xfrm>
-          <a:prstGeom prst="rect">
-            <a:avLst/>
-          </a:prstGeom>
-        </p:spPr>
+        <p:spPr/>
         <p:txBody>
           <a:bodyPr/>
           <a:lstStyle/>
           <a:p>
-            <a:fld id="{D7C7F897-9DD6-3F44-9F39-5E102FFA3BB1}" type="slidenum">
+            <a:fld id="{AE764910-0912-401B-9F58-2B7602DC4522}" type="slidenum">
               <a:rPr lang="en-US" smtClean="0"/>
-              <a:t>37</a:t>
+              <a:t>31</a:t>
             </a:fld>
             <a:endParaRPr lang="en-US"/>
           </a:p>
@@ -3719,7 +3766,7 @@
     </p:spTree>
     <p:extLst>
       <p:ext uri="{BB962C8B-B14F-4D97-AF65-F5344CB8AC3E}">
-        <p14:creationId xmlns:p14="http://schemas.microsoft.com/office/powerpoint/2010/main" val="2415281448"/>
+        <p14:creationId xmlns:p14="http://schemas.microsoft.com/office/powerpoint/2010/main" val="2331962507"/>
       </p:ext>
     </p:extLst>
   </p:cSld>
@@ -3780,11 +3827,23 @@
           <a:p>
             <a:r>
               <a:rPr lang="en-US" dirty="0" smtClean="0"/>
-              <a:t>The</a:t>
+              <a:t>This is the</a:t>
             </a:r>
             <a:r>
               <a:rPr lang="en-US" baseline="0" dirty="0" smtClean="0"/>
-              <a:t> P4 language has elements corresponding to the previously-described function blocks: parsing, match/action, and reassembly.</a:t>
+              <a:t> P4 API: a new API between the control-plane and the data plane.</a:t>
+            </a:r>
+          </a:p>
+          <a:p>
+            <a:r>
+              <a:rPr lang="en-US" baseline="0" dirty="0" smtClean="0"/>
+              <a:t>The data plane performs mostly stateless high-speed processing.</a:t>
+            </a:r>
+          </a:p>
+          <a:p>
+            <a:r>
+              <a:rPr lang="en-US" baseline="0" dirty="0" smtClean="0"/>
+              <a:t>The data plane is lean and fast; most of the complexity is still in the control plane. P4 does not address this aspect.</a:t>
             </a:r>
             <a:endParaRPr lang="en-US" dirty="0"/>
           </a:p>
@@ -3815,7 +3874,7 @@
           <a:p>
             <a:fld id="{D7C7F897-9DD6-3F44-9F39-5E102FFA3BB1}" type="slidenum">
               <a:rPr lang="en-US" smtClean="0"/>
-              <a:t>38</a:t>
+              <a:t>34</a:t>
             </a:fld>
             <a:endParaRPr lang="en-US"/>
           </a:p>
@@ -3824,7 +3883,7 @@
     </p:spTree>
     <p:extLst>
       <p:ext uri="{BB962C8B-B14F-4D97-AF65-F5344CB8AC3E}">
-        <p14:creationId xmlns:p14="http://schemas.microsoft.com/office/powerpoint/2010/main" val="1277889343"/>
+        <p14:creationId xmlns:p14="http://schemas.microsoft.com/office/powerpoint/2010/main" val="2204846612"/>
       </p:ext>
     </p:extLst>
   </p:cSld>
@@ -3885,17 +3944,11 @@
           <a:p>
             <a:r>
               <a:rPr lang="en-US" dirty="0" smtClean="0"/>
-              <a:t>The parser is essentially a state-machine</a:t>
+              <a:t>P4 should be portable across a large spectrum of switch</a:t>
             </a:r>
             <a:r>
               <a:rPr lang="en-US" baseline="0" dirty="0" smtClean="0"/>
-              <a:t> driven by the packet header.</a:t>
-            </a:r>
-          </a:p>
-          <a:p>
-            <a:r>
-              <a:rPr lang="en-US" baseline="0" dirty="0" smtClean="0"/>
-              <a:t>It extracts packet fields into general-purpose registers (“metadata”).</a:t>
+              <a:t> implementations.</a:t>
             </a:r>
             <a:endParaRPr lang="en-US" dirty="0"/>
           </a:p>
@@ -3926,7 +3979,7 @@
           <a:p>
             <a:fld id="{D7C7F897-9DD6-3F44-9F39-5E102FFA3BB1}" type="slidenum">
               <a:rPr lang="en-US" smtClean="0"/>
-              <a:t>39</a:t>
+              <a:t>35</a:t>
             </a:fld>
             <a:endParaRPr lang="en-US"/>
           </a:p>
@@ -3935,7 +3988,7 @@
     </p:spTree>
     <p:extLst>
       <p:ext uri="{BB962C8B-B14F-4D97-AF65-F5344CB8AC3E}">
-        <p14:creationId xmlns:p14="http://schemas.microsoft.com/office/powerpoint/2010/main" val="34298508"/>
+        <p14:creationId xmlns:p14="http://schemas.microsoft.com/office/powerpoint/2010/main" val="4078793271"/>
       </p:ext>
     </p:extLst>
   </p:cSld>
@@ -3996,19 +4049,12 @@
           <a:p>
             <a:r>
               <a:rPr lang="en-US" dirty="0" smtClean="0"/>
-              <a:t>The Match performs</a:t>
+              <a:t>P4 expresses the behavior</a:t>
             </a:r>
             <a:r>
               <a:rPr lang="en-US" baseline="0" dirty="0" smtClean="0"/>
-              <a:t> table lookups based on metadata.</a:t>
-            </a:r>
-          </a:p>
-          <a:p>
-            <a:r>
-              <a:rPr lang="en-US" baseline="0" dirty="0" smtClean="0"/>
-              <a:t>The table contents is managed by the control plane.</a:t>
-            </a:r>
-            <a:endParaRPr lang="en-US" dirty="0"/>
+              <a:t> of significant data plane functions. It currently is not rich enough to describe the complete functionality of the data plane.</a:t>
+            </a:r>
           </a:p>
         </p:txBody>
       </p:sp>
@@ -4037,7 +4083,7 @@
           <a:p>
             <a:fld id="{D7C7F897-9DD6-3F44-9F39-5E102FFA3BB1}" type="slidenum">
               <a:rPr lang="en-US" smtClean="0"/>
-              <a:t>40</a:t>
+              <a:t>36</a:t>
             </a:fld>
             <a:endParaRPr lang="en-US"/>
           </a:p>
@@ -4046,7 +4092,7 @@
     </p:spTree>
     <p:extLst>
       <p:ext uri="{BB962C8B-B14F-4D97-AF65-F5344CB8AC3E}">
-        <p14:creationId xmlns:p14="http://schemas.microsoft.com/office/powerpoint/2010/main" val="561918384"/>
+        <p14:creationId xmlns:p14="http://schemas.microsoft.com/office/powerpoint/2010/main" val="3064939881"/>
       </p:ext>
     </p:extLst>
   </p:cSld>
@@ -4107,12 +4153,120 @@
           <a:p>
             <a:r>
               <a:rPr lang="en-US" dirty="0" smtClean="0"/>
-              <a:t>Actions are</a:t>
+              <a:t>How is packet processing performed in P4?</a:t>
+            </a:r>
+          </a:p>
+          <a:p>
+            <a:r>
+              <a:rPr lang="en-US" dirty="0" smtClean="0"/>
+              <a:t>This is a high-level view</a:t>
+            </a:r>
+            <a:r>
+              <a:rPr lang="en-US" dirty="0" smtClean="0"/>
+              <a:t>.</a:t>
+            </a:r>
+          </a:p>
+          <a:p>
+            <a:endParaRPr lang="en-US" dirty="0" smtClean="0"/>
+          </a:p>
+          <a:p>
+            <a:r>
+              <a:rPr lang="en-US" dirty="0" smtClean="0"/>
+              <a:t>Spend more time on the war stories and philosophical intuition.</a:t>
+            </a:r>
+          </a:p>
+          <a:p>
+            <a:endParaRPr lang="en-US" dirty="0" smtClean="0"/>
+          </a:p>
+          <a:p>
+            <a:r>
+              <a:rPr lang="en-US" dirty="0" smtClean="0"/>
+              <a:t>How are people using programmable switches? (INT)</a:t>
+            </a:r>
+          </a:p>
+          <a:p>
+            <a:r>
+              <a:rPr lang="en-US" dirty="0" smtClean="0"/>
+              <a:t>People</a:t>
             </a:r>
             <a:r>
               <a:rPr lang="en-US" baseline="0" dirty="0" smtClean="0"/>
-              <a:t> code fragments that manipulate metadata. They are driven by information obtained from table look-ups.</a:t>
-            </a:r>
+              <a:t> pushing parts of the application into the network.</a:t>
+            </a:r>
+          </a:p>
+          <a:p>
+            <a:r>
+              <a:rPr lang="en-US" baseline="0" dirty="0" smtClean="0"/>
+              <a:t>Give people a sense of how the opportunities are pretty diverse.</a:t>
+            </a:r>
+          </a:p>
+          <a:p>
+            <a:endParaRPr lang="en-US" baseline="0" dirty="0" smtClean="0"/>
+          </a:p>
+          <a:p>
+            <a:r>
+              <a:rPr lang="en-US" baseline="0" dirty="0" smtClean="0"/>
+              <a:t>One of the lessons for active networks: hard to conceive of killer applications for the data plane.</a:t>
+            </a:r>
+          </a:p>
+          <a:p>
+            <a:r>
+              <a:rPr lang="en-US" baseline="0" dirty="0" smtClean="0"/>
+              <a:t>The Road to SDN talks about how active networks was abandoned.</a:t>
+            </a:r>
+          </a:p>
+          <a:p>
+            <a:r>
+              <a:rPr lang="en-US" baseline="0" dirty="0" smtClean="0"/>
+              <a:t>Similar to how network virtualization was the reason for SDN.</a:t>
+            </a:r>
+          </a:p>
+          <a:p>
+            <a:r>
+              <a:rPr lang="en-US" baseline="0" dirty="0" smtClean="0"/>
+              <a:t>What’s the killer app for programmable data planes?: Measurement.</a:t>
+            </a:r>
+          </a:p>
+          <a:p>
+            <a:r>
+              <a:rPr lang="en-US" baseline="0" dirty="0" smtClean="0"/>
+              <a:t>We don’t know for sure. It’s still early.</a:t>
+            </a:r>
+          </a:p>
+          <a:p>
+            <a:endParaRPr lang="en-US" baseline="0" dirty="0" smtClean="0"/>
+          </a:p>
+          <a:p>
+            <a:r>
+              <a:rPr lang="en-US" baseline="0" dirty="0" smtClean="0"/>
+              <a:t>Similar to how GPUs are now being used for totally unknown applications.</a:t>
+            </a:r>
+          </a:p>
+          <a:p>
+            <a:r>
+              <a:rPr lang="en-US" baseline="0" dirty="0" smtClean="0"/>
+              <a:t>Differences between how microprocessors build chips vs. how switch industry builds switch.</a:t>
+            </a:r>
+          </a:p>
+          <a:p>
+            <a:endParaRPr lang="en-US" baseline="0" dirty="0" smtClean="0"/>
+          </a:p>
+          <a:p>
+            <a:r>
+              <a:rPr lang="en-US" baseline="0" dirty="0" smtClean="0"/>
+              <a:t>Maybe put these as a reflection at the end of RMT + P4.</a:t>
+            </a:r>
+          </a:p>
+          <a:p>
+            <a:r>
+              <a:rPr lang="en-US" baseline="0" smtClean="0"/>
+              <a:t>If there’s enough of this, maybe no need for Domino &amp; PIFO.</a:t>
+            </a:r>
+          </a:p>
+          <a:p>
+            <a:endParaRPr lang="en-US" dirty="0" smtClean="0"/>
+          </a:p>
+          <a:p>
             <a:endParaRPr lang="en-US" dirty="0"/>
           </a:p>
         </p:txBody>
@@ -4142,7 +4296,7 @@
           <a:p>
             <a:fld id="{D7C7F897-9DD6-3F44-9F39-5E102FFA3BB1}" type="slidenum">
               <a:rPr lang="en-US" smtClean="0"/>
-              <a:t>41</a:t>
+              <a:t>37</a:t>
             </a:fld>
             <a:endParaRPr lang="en-US"/>
           </a:p>
@@ -4151,7 +4305,7 @@
     </p:spTree>
     <p:extLst>
       <p:ext uri="{BB962C8B-B14F-4D97-AF65-F5344CB8AC3E}">
-        <p14:creationId xmlns:p14="http://schemas.microsoft.com/office/powerpoint/2010/main" val="2534114587"/>
+        <p14:creationId xmlns:p14="http://schemas.microsoft.com/office/powerpoint/2010/main" val="2415281448"/>
       </p:ext>
     </p:extLst>
   </p:cSld>
@@ -4212,11 +4366,11 @@
           <a:p>
             <a:r>
               <a:rPr lang="en-US" dirty="0" smtClean="0"/>
-              <a:t>P4 supports conditional</a:t>
+              <a:t>The</a:t>
             </a:r>
             <a:r>
               <a:rPr lang="en-US" baseline="0" dirty="0" smtClean="0"/>
-              <a:t> forward-only control-flow.</a:t>
+              <a:t> P4 language has elements corresponding to the previously-described function blocks: parsing, match/action, and reassembly.</a:t>
             </a:r>
             <a:endParaRPr lang="en-US" dirty="0"/>
           </a:p>
@@ -4247,7 +4401,7 @@
           <a:p>
             <a:fld id="{D7C7F897-9DD6-3F44-9F39-5E102FFA3BB1}" type="slidenum">
               <a:rPr lang="en-US" smtClean="0"/>
-              <a:t>42</a:t>
+              <a:t>38</a:t>
             </a:fld>
             <a:endParaRPr lang="en-US"/>
           </a:p>
@@ -4256,7 +4410,7 @@
     </p:spTree>
     <p:extLst>
       <p:ext uri="{BB962C8B-B14F-4D97-AF65-F5344CB8AC3E}">
-        <p14:creationId xmlns:p14="http://schemas.microsoft.com/office/powerpoint/2010/main" val="3114337228"/>
+        <p14:creationId xmlns:p14="http://schemas.microsoft.com/office/powerpoint/2010/main" val="1277889343"/>
       </p:ext>
     </p:extLst>
   </p:cSld>
@@ -4295,8 +4449,8 @@
         </p:nvSpPr>
         <p:spPr>
           <a:xfrm>
-            <a:off x="685800" y="1143000"/>
-            <a:ext cx="5486400" cy="3086100"/>
+            <a:off x="381000" y="685800"/>
+            <a:ext cx="6096000" cy="3429000"/>
           </a:xfrm>
         </p:spPr>
       </p:sp>
@@ -4316,16 +4470,18 @@
           <a:lstStyle/>
           <a:p>
             <a:r>
-              <a:rPr lang="en-US" dirty="0" err="1" smtClean="0"/>
-              <a:t>Lavanya’s</a:t>
-            </a:r>
-            <a:r>
               <a:rPr lang="en-US" dirty="0" smtClean="0"/>
-              <a:t> work on compilers for P4, maybe add a few slides</a:t>
+              <a:t>The parser is essentially a state-machine</a:t>
             </a:r>
             <a:r>
               <a:rPr lang="en-US" baseline="0" dirty="0" smtClean="0"/>
-              <a:t> as well.</a:t>
+              <a:t> driven by the packet header.</a:t>
+            </a:r>
+          </a:p>
+          <a:p>
+            <a:r>
+              <a:rPr lang="en-US" baseline="0" dirty="0" smtClean="0"/>
+              <a:t>It extracts packet fields into general-purpose registers (“metadata”).</a:t>
             </a:r>
             <a:endParaRPr lang="en-US" dirty="0"/>
           </a:p>
@@ -4341,14 +4497,22 @@
             <p:ph type="sldNum" sz="quarter" idx="10"/>
           </p:nvPr>
         </p:nvSpPr>
-        <p:spPr/>
+        <p:spPr>
+          <a:xfrm>
+            <a:off x="3884613" y="8685213"/>
+            <a:ext cx="2971800" cy="457200"/>
+          </a:xfrm>
+          <a:prstGeom prst="rect">
+            <a:avLst/>
+          </a:prstGeom>
+        </p:spPr>
         <p:txBody>
           <a:bodyPr/>
           <a:lstStyle/>
           <a:p>
-            <a:fld id="{AE764910-0912-401B-9F58-2B7602DC4522}" type="slidenum">
+            <a:fld id="{D7C7F897-9DD6-3F44-9F39-5E102FFA3BB1}" type="slidenum">
               <a:rPr lang="en-US" smtClean="0"/>
-              <a:t>43</a:t>
+              <a:t>39</a:t>
             </a:fld>
             <a:endParaRPr lang="en-US"/>
           </a:p>
@@ -4357,7 +4521,7 @@
     </p:spTree>
     <p:extLst>
       <p:ext uri="{BB962C8B-B14F-4D97-AF65-F5344CB8AC3E}">
-        <p14:creationId xmlns:p14="http://schemas.microsoft.com/office/powerpoint/2010/main" val="1653469993"/>
+        <p14:creationId xmlns:p14="http://schemas.microsoft.com/office/powerpoint/2010/main" val="34298508"/>
       </p:ext>
     </p:extLst>
   </p:cSld>
@@ -4418,35 +4582,17 @@
           <a:p>
             <a:r>
               <a:rPr lang="en-US" dirty="0" smtClean="0"/>
-              <a:t>Table contents is uploaded</a:t>
+              <a:t>The Match performs</a:t>
             </a:r>
             <a:r>
               <a:rPr lang="en-US" baseline="0" dirty="0" smtClean="0"/>
-              <a:t> into the data plane by the control plane.</a:t>
-            </a:r>
-          </a:p>
-          <a:p>
-            <a:r>
-              <a:rPr lang="en-US" dirty="0" smtClean="0"/>
-              <a:t>P4 control plane</a:t>
-            </a:r>
+              <a:t> table lookups based on metadata.</a:t>
+            </a:r>
+          </a:p>
+          <a:p>
             <a:r>
               <a:rPr lang="en-US" baseline="0" dirty="0" smtClean="0"/>
-              <a:t> is similar to </a:t>
-            </a:r>
-            <a:r>
-              <a:rPr lang="en-US" baseline="0" dirty="0" err="1" smtClean="0"/>
-              <a:t>OpenFlow</a:t>
-            </a:r>
-            <a:r>
-              <a:rPr lang="en-US" baseline="0" dirty="0" smtClean="0"/>
-              <a:t>.</a:t>
-            </a:r>
-          </a:p>
-          <a:p>
-            <a:r>
-              <a:rPr lang="en-US" baseline="0" dirty="0" smtClean="0"/>
-              <a:t>War stories from P4 working groups and such.</a:t>
+              <a:t>The table contents is managed by the control plane.</a:t>
             </a:r>
             <a:endParaRPr lang="en-US" dirty="0"/>
           </a:p>
@@ -4477,7 +4623,7 @@
           <a:p>
             <a:fld id="{D7C7F897-9DD6-3F44-9F39-5E102FFA3BB1}" type="slidenum">
               <a:rPr lang="en-US" smtClean="0"/>
-              <a:t>44</a:t>
+              <a:t>40</a:t>
             </a:fld>
             <a:endParaRPr lang="en-US"/>
           </a:p>
@@ -4486,7 +4632,7 @@
     </p:spTree>
     <p:extLst>
       <p:ext uri="{BB962C8B-B14F-4D97-AF65-F5344CB8AC3E}">
-        <p14:creationId xmlns:p14="http://schemas.microsoft.com/office/powerpoint/2010/main" val="2829025137"/>
+        <p14:creationId xmlns:p14="http://schemas.microsoft.com/office/powerpoint/2010/main" val="561918384"/>
       </p:ext>
     </p:extLst>
   </p:cSld>
@@ -4525,8 +4671,8 @@
         </p:nvSpPr>
         <p:spPr>
           <a:xfrm>
-            <a:off x="685800" y="1143000"/>
-            <a:ext cx="5486400" cy="3086100"/>
+            <a:off x="381000" y="685800"/>
+            <a:ext cx="6096000" cy="3429000"/>
           </a:xfrm>
         </p:spPr>
       </p:sp>
@@ -4547,21 +4693,11 @@
           <a:p>
             <a:r>
               <a:rPr lang="en-US" dirty="0" smtClean="0"/>
-              <a:t>Too early to say if this will </a:t>
-            </a:r>
-            <a:r>
-              <a:rPr lang="en-US" smtClean="0"/>
-              <a:t>be widely adopted or not.</a:t>
-            </a:r>
-          </a:p>
-          <a:p>
-            <a:r>
-              <a:rPr lang="en-US" dirty="0" smtClean="0"/>
-              <a:t>Staid companies</a:t>
+              <a:t>Actions are</a:t>
             </a:r>
             <a:r>
               <a:rPr lang="en-US" baseline="0" dirty="0" smtClean="0"/>
-              <a:t> such as AT&amp;T and CISCO showing up at the working group meetings.</a:t>
+              <a:t> code fragments that manipulate metadata. They are driven by information obtained from table look-ups.</a:t>
             </a:r>
             <a:endParaRPr lang="en-US" dirty="0"/>
           </a:p>
@@ -4577,14 +4713,22 @@
             <p:ph type="sldNum" sz="quarter" idx="10"/>
           </p:nvPr>
         </p:nvSpPr>
-        <p:spPr/>
+        <p:spPr>
+          <a:xfrm>
+            <a:off x="3884613" y="8685213"/>
+            <a:ext cx="2971800" cy="457200"/>
+          </a:xfrm>
+          <a:prstGeom prst="rect">
+            <a:avLst/>
+          </a:prstGeom>
+        </p:spPr>
         <p:txBody>
           <a:bodyPr/>
           <a:lstStyle/>
           <a:p>
-            <a:fld id="{AE764910-0912-401B-9F58-2B7602DC4522}" type="slidenum">
+            <a:fld id="{D7C7F897-9DD6-3F44-9F39-5E102FFA3BB1}" type="slidenum">
               <a:rPr lang="en-US" smtClean="0"/>
-              <a:t>47</a:t>
+              <a:t>41</a:t>
             </a:fld>
             <a:endParaRPr lang="en-US"/>
           </a:p>
@@ -4593,7 +4737,7 @@
     </p:spTree>
     <p:extLst>
       <p:ext uri="{BB962C8B-B14F-4D97-AF65-F5344CB8AC3E}">
-        <p14:creationId xmlns:p14="http://schemas.microsoft.com/office/powerpoint/2010/main" val="2380004939"/>
+        <p14:creationId xmlns:p14="http://schemas.microsoft.com/office/powerpoint/2010/main" val="2534114587"/>
       </p:ext>
     </p:extLst>
   </p:cSld>
@@ -4648,33 +4792,38 @@
           <a:lstStyle/>
           <a:p>
             <a:r>
-              <a:rPr lang="en-US" dirty="0" smtClean="0"/>
-              <a:t>Before we discuss the RMT model, let’s talk a bit about the switch architecture.</a:t>
-            </a:r>
-          </a:p>
-          <a:p>
-            <a:r>
-              <a:rPr lang="en-US" dirty="0" smtClean="0"/>
-              <a:t>The paper doesn’t go into much detail about this</a:t>
-            </a:r>
-            <a:r>
               <a:rPr lang="en-US" baseline="0" dirty="0" smtClean="0"/>
-              <a:t> and assumes a switch is going to have a pipeline of match-action tables (fixed or not). Why is this a good architecture?</a:t>
-            </a:r>
-          </a:p>
-          <a:p>
-            <a:endParaRPr lang="en-US" dirty="0" smtClean="0"/>
-          </a:p>
-          <a:p>
-            <a:r>
-              <a:rPr lang="en-US" dirty="0" smtClean="0"/>
-              <a:t>Q:</a:t>
-            </a:r>
+              <a:t>How would _you_ design a programmable router?</a:t>
+            </a:r>
+          </a:p>
+          <a:p>
+            <a:endParaRPr lang="en-US" baseline="0" dirty="0" smtClean="0"/>
+          </a:p>
+          <a:p>
             <a:r>
               <a:rPr lang="en-US" baseline="0" dirty="0" smtClean="0"/>
-              <a:t> Why is a switch architected as a pipeline? Are there other architectures?</a:t>
-            </a:r>
-            <a:endParaRPr lang="en-US" dirty="0"/>
+              <a:t>Mention that it is on log scale</a:t>
+            </a:r>
+          </a:p>
+          <a:p>
+            <a:r>
+              <a:rPr lang="en-US" baseline="0" dirty="0" smtClean="0"/>
+              <a:t>Define line rate</a:t>
+            </a:r>
+          </a:p>
+          <a:p>
+            <a:r>
+              <a:rPr lang="en-US" baseline="0" dirty="0" smtClean="0"/>
+              <a:t>Unpredictable performance examples: hardware </a:t>
+            </a:r>
+            <a:r>
+              <a:rPr lang="en-US" baseline="0" dirty="0" err="1" smtClean="0"/>
+              <a:t>config</a:t>
+            </a:r>
+            <a:r>
+              <a:rPr lang="en-US" baseline="0" dirty="0" smtClean="0"/>
+              <a:t> (number of cores, RAM size, etc.)</a:t>
+            </a:r>
           </a:p>
         </p:txBody>
       </p:sp>
@@ -4693,9 +4842,9 @@
           <a:bodyPr/>
           <a:lstStyle/>
           <a:p>
-            <a:fld id="{AE764910-0912-401B-9F58-2B7602DC4522}" type="slidenum">
+            <a:fld id="{16B09458-7AEF-4AD3-A567-0F11380064BE}" type="slidenum">
               <a:rPr lang="en-US" smtClean="0"/>
-              <a:t>9</a:t>
+              <a:t>7</a:t>
             </a:fld>
             <a:endParaRPr lang="en-US"/>
           </a:p>
@@ -4704,7 +4853,7 @@
     </p:spTree>
     <p:extLst>
       <p:ext uri="{BB962C8B-B14F-4D97-AF65-F5344CB8AC3E}">
-        <p14:creationId xmlns:p14="http://schemas.microsoft.com/office/powerpoint/2010/main" val="3910868144"/>
+        <p14:creationId xmlns:p14="http://schemas.microsoft.com/office/powerpoint/2010/main" val="1461934913"/>
       </p:ext>
     </p:extLst>
   </p:cSld>
@@ -4743,8 +4892,8 @@
         </p:nvSpPr>
         <p:spPr>
           <a:xfrm>
-            <a:off x="685800" y="1143000"/>
-            <a:ext cx="5486400" cy="3086100"/>
+            <a:off x="381000" y="685800"/>
+            <a:ext cx="6096000" cy="3429000"/>
           </a:xfrm>
         </p:spPr>
       </p:sp>
@@ -4765,7 +4914,11 @@
           <a:p>
             <a:r>
               <a:rPr lang="en-US" dirty="0" smtClean="0"/>
-              <a:t>Flesh this out a little more.</a:t>
+              <a:t>P4 supports conditional</a:t>
+            </a:r>
+            <a:r>
+              <a:rPr lang="en-US" baseline="0" dirty="0" smtClean="0"/>
+              <a:t> forward-only control-flow.</a:t>
             </a:r>
             <a:endParaRPr lang="en-US" dirty="0"/>
           </a:p>
@@ -4781,14 +4934,22 @@
             <p:ph type="sldNum" sz="quarter" idx="10"/>
           </p:nvPr>
         </p:nvSpPr>
-        <p:spPr/>
+        <p:spPr>
+          <a:xfrm>
+            <a:off x="3884613" y="8685213"/>
+            <a:ext cx="2971800" cy="457200"/>
+          </a:xfrm>
+          <a:prstGeom prst="rect">
+            <a:avLst/>
+          </a:prstGeom>
+        </p:spPr>
         <p:txBody>
           <a:bodyPr/>
           <a:lstStyle/>
           <a:p>
-            <a:fld id="{AE764910-0912-401B-9F58-2B7602DC4522}" type="slidenum">
+            <a:fld id="{D7C7F897-9DD6-3F44-9F39-5E102FFA3BB1}" type="slidenum">
               <a:rPr lang="en-US" smtClean="0"/>
-              <a:t>48</a:t>
+              <a:t>42</a:t>
             </a:fld>
             <a:endParaRPr lang="en-US"/>
           </a:p>
@@ -4797,7 +4958,7 @@
     </p:spTree>
     <p:extLst>
       <p:ext uri="{BB962C8B-B14F-4D97-AF65-F5344CB8AC3E}">
-        <p14:creationId xmlns:p14="http://schemas.microsoft.com/office/powerpoint/2010/main" val="1364917313"/>
+        <p14:creationId xmlns:p14="http://schemas.microsoft.com/office/powerpoint/2010/main" val="3114337228"/>
       </p:ext>
     </p:extLst>
   </p:cSld>
@@ -4857,6 +5018,529 @@
           <a:lstStyle/>
           <a:p>
             <a:r>
+              <a:rPr lang="en-US" dirty="0" err="1" smtClean="0"/>
+              <a:t>Lavanya’s</a:t>
+            </a:r>
+            <a:r>
+              <a:rPr lang="en-US" dirty="0" smtClean="0"/>
+              <a:t> work on compilers for P4, maybe add a few slides</a:t>
+            </a:r>
+            <a:r>
+              <a:rPr lang="en-US" baseline="0" dirty="0" smtClean="0"/>
+              <a:t> as well.</a:t>
+            </a:r>
+            <a:endParaRPr lang="en-US" dirty="0"/>
+          </a:p>
+        </p:txBody>
+      </p:sp>
+      <p:sp>
+        <p:nvSpPr>
+          <p:cNvPr id="4" name="Slide Number Placeholder 3"/>
+          <p:cNvSpPr>
+            <a:spLocks noGrp="1"/>
+          </p:cNvSpPr>
+          <p:nvPr>
+            <p:ph type="sldNum" sz="quarter" idx="10"/>
+          </p:nvPr>
+        </p:nvSpPr>
+        <p:spPr/>
+        <p:txBody>
+          <a:bodyPr/>
+          <a:lstStyle/>
+          <a:p>
+            <a:fld id="{AE764910-0912-401B-9F58-2B7602DC4522}" type="slidenum">
+              <a:rPr lang="en-US" smtClean="0"/>
+              <a:t>43</a:t>
+            </a:fld>
+            <a:endParaRPr lang="en-US"/>
+          </a:p>
+        </p:txBody>
+      </p:sp>
+    </p:spTree>
+    <p:extLst>
+      <p:ext uri="{BB962C8B-B14F-4D97-AF65-F5344CB8AC3E}">
+        <p14:creationId xmlns:p14="http://schemas.microsoft.com/office/powerpoint/2010/main" val="1653469993"/>
+      </p:ext>
+    </p:extLst>
+  </p:cSld>
+  <p:clrMapOvr>
+    <a:masterClrMapping/>
+  </p:clrMapOvr>
+</p:notes>
+</file>
+
+<file path=ppt/notesSlides/notesSlide32.xml><?xml version="1.0" encoding="utf-8"?>
+<p:notes xmlns:a="http://schemas.openxmlformats.org/drawingml/2006/main" xmlns:r="http://schemas.openxmlformats.org/officeDocument/2006/relationships" xmlns:p="http://schemas.openxmlformats.org/presentationml/2006/main">
+  <p:cSld>
+    <p:spTree>
+      <p:nvGrpSpPr>
+        <p:cNvPr id="1" name=""/>
+        <p:cNvGrpSpPr/>
+        <p:nvPr/>
+      </p:nvGrpSpPr>
+      <p:grpSpPr>
+        <a:xfrm>
+          <a:off x="0" y="0"/>
+          <a:ext cx="0" cy="0"/>
+          <a:chOff x="0" y="0"/>
+          <a:chExt cx="0" cy="0"/>
+        </a:xfrm>
+      </p:grpSpPr>
+      <p:sp>
+        <p:nvSpPr>
+          <p:cNvPr id="2" name="Slide Image Placeholder 1"/>
+          <p:cNvSpPr>
+            <a:spLocks noGrp="1" noRot="1" noChangeAspect="1"/>
+          </p:cNvSpPr>
+          <p:nvPr>
+            <p:ph type="sldImg"/>
+          </p:nvPr>
+        </p:nvSpPr>
+        <p:spPr>
+          <a:xfrm>
+            <a:off x="381000" y="685800"/>
+            <a:ext cx="6096000" cy="3429000"/>
+          </a:xfrm>
+        </p:spPr>
+      </p:sp>
+      <p:sp>
+        <p:nvSpPr>
+          <p:cNvPr id="3" name="Notes Placeholder 2"/>
+          <p:cNvSpPr>
+            <a:spLocks noGrp="1"/>
+          </p:cNvSpPr>
+          <p:nvPr>
+            <p:ph type="body" idx="1"/>
+          </p:nvPr>
+        </p:nvSpPr>
+        <p:spPr/>
+        <p:txBody>
+          <a:bodyPr/>
+          <a:lstStyle/>
+          <a:p>
+            <a:r>
+              <a:rPr lang="en-US" dirty="0" smtClean="0"/>
+              <a:t>Table contents is uploaded</a:t>
+            </a:r>
+            <a:r>
+              <a:rPr lang="en-US" baseline="0" dirty="0" smtClean="0"/>
+              <a:t> into the data plane by the control plane.</a:t>
+            </a:r>
+          </a:p>
+          <a:p>
+            <a:r>
+              <a:rPr lang="en-US" dirty="0" smtClean="0"/>
+              <a:t>P4 control plane</a:t>
+            </a:r>
+            <a:r>
+              <a:rPr lang="en-US" baseline="0" dirty="0" smtClean="0"/>
+              <a:t> is similar to </a:t>
+            </a:r>
+            <a:r>
+              <a:rPr lang="en-US" baseline="0" dirty="0" err="1" smtClean="0"/>
+              <a:t>OpenFlow</a:t>
+            </a:r>
+            <a:r>
+              <a:rPr lang="en-US" baseline="0" dirty="0" smtClean="0"/>
+              <a:t>.</a:t>
+            </a:r>
+          </a:p>
+          <a:p>
+            <a:r>
+              <a:rPr lang="en-US" baseline="0" dirty="0" smtClean="0"/>
+              <a:t>War stories from P4 working groups and such.</a:t>
+            </a:r>
+            <a:endParaRPr lang="en-US" dirty="0"/>
+          </a:p>
+        </p:txBody>
+      </p:sp>
+      <p:sp>
+        <p:nvSpPr>
+          <p:cNvPr id="4" name="Slide Number Placeholder 3"/>
+          <p:cNvSpPr>
+            <a:spLocks noGrp="1"/>
+          </p:cNvSpPr>
+          <p:nvPr>
+            <p:ph type="sldNum" sz="quarter" idx="10"/>
+          </p:nvPr>
+        </p:nvSpPr>
+        <p:spPr>
+          <a:xfrm>
+            <a:off x="3884613" y="8685213"/>
+            <a:ext cx="2971800" cy="457200"/>
+          </a:xfrm>
+          <a:prstGeom prst="rect">
+            <a:avLst/>
+          </a:prstGeom>
+        </p:spPr>
+        <p:txBody>
+          <a:bodyPr/>
+          <a:lstStyle/>
+          <a:p>
+            <a:fld id="{D7C7F897-9DD6-3F44-9F39-5E102FFA3BB1}" type="slidenum">
+              <a:rPr lang="en-US" smtClean="0"/>
+              <a:t>44</a:t>
+            </a:fld>
+            <a:endParaRPr lang="en-US"/>
+          </a:p>
+        </p:txBody>
+      </p:sp>
+    </p:spTree>
+    <p:extLst>
+      <p:ext uri="{BB962C8B-B14F-4D97-AF65-F5344CB8AC3E}">
+        <p14:creationId xmlns:p14="http://schemas.microsoft.com/office/powerpoint/2010/main" val="2829025137"/>
+      </p:ext>
+    </p:extLst>
+  </p:cSld>
+  <p:clrMapOvr>
+    <a:masterClrMapping/>
+  </p:clrMapOvr>
+</p:notes>
+</file>
+
+<file path=ppt/notesSlides/notesSlide33.xml><?xml version="1.0" encoding="utf-8"?>
+<p:notes xmlns:a="http://schemas.openxmlformats.org/drawingml/2006/main" xmlns:r="http://schemas.openxmlformats.org/officeDocument/2006/relationships" xmlns:p="http://schemas.openxmlformats.org/presentationml/2006/main">
+  <p:cSld>
+    <p:spTree>
+      <p:nvGrpSpPr>
+        <p:cNvPr id="1" name=""/>
+        <p:cNvGrpSpPr/>
+        <p:nvPr/>
+      </p:nvGrpSpPr>
+      <p:grpSpPr>
+        <a:xfrm>
+          <a:off x="0" y="0"/>
+          <a:ext cx="0" cy="0"/>
+          <a:chOff x="0" y="0"/>
+          <a:chExt cx="0" cy="0"/>
+        </a:xfrm>
+      </p:grpSpPr>
+      <p:sp>
+        <p:nvSpPr>
+          <p:cNvPr id="2" name="Slide Image Placeholder 1"/>
+          <p:cNvSpPr>
+            <a:spLocks noGrp="1" noRot="1" noChangeAspect="1"/>
+          </p:cNvSpPr>
+          <p:nvPr>
+            <p:ph type="sldImg"/>
+          </p:nvPr>
+        </p:nvSpPr>
+        <p:spPr/>
+      </p:sp>
+      <p:sp>
+        <p:nvSpPr>
+          <p:cNvPr id="3" name="Notes Placeholder 2"/>
+          <p:cNvSpPr>
+            <a:spLocks noGrp="1"/>
+          </p:cNvSpPr>
+          <p:nvPr>
+            <p:ph type="body" idx="1"/>
+          </p:nvPr>
+        </p:nvSpPr>
+        <p:spPr/>
+        <p:txBody>
+          <a:bodyPr/>
+          <a:lstStyle/>
+          <a:p>
+            <a:r>
+              <a:rPr lang="en-US" smtClean="0"/>
+              <a:t>Could  be interesting to class.</a:t>
+            </a:r>
+            <a:endParaRPr lang="en-US"/>
+          </a:p>
+        </p:txBody>
+      </p:sp>
+      <p:sp>
+        <p:nvSpPr>
+          <p:cNvPr id="4" name="Slide Number Placeholder 3"/>
+          <p:cNvSpPr>
+            <a:spLocks noGrp="1"/>
+          </p:cNvSpPr>
+          <p:nvPr>
+            <p:ph type="sldNum" sz="quarter" idx="10"/>
+          </p:nvPr>
+        </p:nvSpPr>
+        <p:spPr/>
+        <p:txBody>
+          <a:bodyPr/>
+          <a:lstStyle/>
+          <a:p>
+            <a:fld id="{AE764910-0912-401B-9F58-2B7602DC4522}" type="slidenum">
+              <a:rPr lang="en-US" smtClean="0"/>
+              <a:t>45</a:t>
+            </a:fld>
+            <a:endParaRPr lang="en-US"/>
+          </a:p>
+        </p:txBody>
+      </p:sp>
+    </p:spTree>
+    <p:extLst>
+      <p:ext uri="{BB962C8B-B14F-4D97-AF65-F5344CB8AC3E}">
+        <p14:creationId xmlns:p14="http://schemas.microsoft.com/office/powerpoint/2010/main" val="726480184"/>
+      </p:ext>
+    </p:extLst>
+  </p:cSld>
+  <p:clrMapOvr>
+    <a:masterClrMapping/>
+  </p:clrMapOvr>
+</p:notes>
+</file>
+
+<file path=ppt/notesSlides/notesSlide34.xml><?xml version="1.0" encoding="utf-8"?>
+<p:notes xmlns:a="http://schemas.openxmlformats.org/drawingml/2006/main" xmlns:r="http://schemas.openxmlformats.org/officeDocument/2006/relationships" xmlns:p="http://schemas.openxmlformats.org/presentationml/2006/main">
+  <p:cSld>
+    <p:spTree>
+      <p:nvGrpSpPr>
+        <p:cNvPr id="1" name=""/>
+        <p:cNvGrpSpPr/>
+        <p:nvPr/>
+      </p:nvGrpSpPr>
+      <p:grpSpPr>
+        <a:xfrm>
+          <a:off x="0" y="0"/>
+          <a:ext cx="0" cy="0"/>
+          <a:chOff x="0" y="0"/>
+          <a:chExt cx="0" cy="0"/>
+        </a:xfrm>
+      </p:grpSpPr>
+      <p:sp>
+        <p:nvSpPr>
+          <p:cNvPr id="2" name="Slide Image Placeholder 1"/>
+          <p:cNvSpPr>
+            <a:spLocks noGrp="1" noRot="1" noChangeAspect="1"/>
+          </p:cNvSpPr>
+          <p:nvPr>
+            <p:ph type="sldImg"/>
+          </p:nvPr>
+        </p:nvSpPr>
+        <p:spPr>
+          <a:xfrm>
+            <a:off x="685800" y="1143000"/>
+            <a:ext cx="5486400" cy="3086100"/>
+          </a:xfrm>
+        </p:spPr>
+      </p:sp>
+      <p:sp>
+        <p:nvSpPr>
+          <p:cNvPr id="3" name="Notes Placeholder 2"/>
+          <p:cNvSpPr>
+            <a:spLocks noGrp="1"/>
+          </p:cNvSpPr>
+          <p:nvPr>
+            <p:ph type="body" idx="1"/>
+          </p:nvPr>
+        </p:nvSpPr>
+        <p:spPr/>
+        <p:txBody>
+          <a:bodyPr/>
+          <a:lstStyle/>
+          <a:p>
+            <a:r>
+              <a:rPr lang="en-US" dirty="0" smtClean="0"/>
+              <a:t>Too early to say if this will be widely adopted or not.</a:t>
+            </a:r>
+          </a:p>
+          <a:p>
+            <a:r>
+              <a:rPr lang="en-US" dirty="0" smtClean="0"/>
+              <a:t>Staid companies</a:t>
+            </a:r>
+            <a:r>
+              <a:rPr lang="en-US" baseline="0" dirty="0" smtClean="0"/>
+              <a:t> such as AT&amp;T and CISCO showing up at the working group meetings.</a:t>
+            </a:r>
+          </a:p>
+          <a:p>
+            <a:endParaRPr lang="en-US" baseline="0" dirty="0" smtClean="0"/>
+          </a:p>
+          <a:p>
+            <a:r>
+              <a:rPr lang="en-US" baseline="0" dirty="0" smtClean="0"/>
+              <a:t>Spend more time on these slides and less time on paper details.</a:t>
+            </a:r>
+            <a:endParaRPr lang="en-US" dirty="0"/>
+          </a:p>
+        </p:txBody>
+      </p:sp>
+      <p:sp>
+        <p:nvSpPr>
+          <p:cNvPr id="4" name="Slide Number Placeholder 3"/>
+          <p:cNvSpPr>
+            <a:spLocks noGrp="1"/>
+          </p:cNvSpPr>
+          <p:nvPr>
+            <p:ph type="sldNum" sz="quarter" idx="10"/>
+          </p:nvPr>
+        </p:nvSpPr>
+        <p:spPr/>
+        <p:txBody>
+          <a:bodyPr/>
+          <a:lstStyle/>
+          <a:p>
+            <a:fld id="{AE764910-0912-401B-9F58-2B7602DC4522}" type="slidenum">
+              <a:rPr lang="en-US" smtClean="0"/>
+              <a:t>47</a:t>
+            </a:fld>
+            <a:endParaRPr lang="en-US"/>
+          </a:p>
+        </p:txBody>
+      </p:sp>
+    </p:spTree>
+    <p:extLst>
+      <p:ext uri="{BB962C8B-B14F-4D97-AF65-F5344CB8AC3E}">
+        <p14:creationId xmlns:p14="http://schemas.microsoft.com/office/powerpoint/2010/main" val="2380004939"/>
+      </p:ext>
+    </p:extLst>
+  </p:cSld>
+  <p:clrMapOvr>
+    <a:masterClrMapping/>
+  </p:clrMapOvr>
+</p:notes>
+</file>
+
+<file path=ppt/notesSlides/notesSlide35.xml><?xml version="1.0" encoding="utf-8"?>
+<p:notes xmlns:a="http://schemas.openxmlformats.org/drawingml/2006/main" xmlns:r="http://schemas.openxmlformats.org/officeDocument/2006/relationships" xmlns:p="http://schemas.openxmlformats.org/presentationml/2006/main">
+  <p:cSld>
+    <p:spTree>
+      <p:nvGrpSpPr>
+        <p:cNvPr id="1" name=""/>
+        <p:cNvGrpSpPr/>
+        <p:nvPr/>
+      </p:nvGrpSpPr>
+      <p:grpSpPr>
+        <a:xfrm>
+          <a:off x="0" y="0"/>
+          <a:ext cx="0" cy="0"/>
+          <a:chOff x="0" y="0"/>
+          <a:chExt cx="0" cy="0"/>
+        </a:xfrm>
+      </p:grpSpPr>
+      <p:sp>
+        <p:nvSpPr>
+          <p:cNvPr id="2" name="Slide Image Placeholder 1"/>
+          <p:cNvSpPr>
+            <a:spLocks noGrp="1" noRot="1" noChangeAspect="1"/>
+          </p:cNvSpPr>
+          <p:nvPr>
+            <p:ph type="sldImg"/>
+          </p:nvPr>
+        </p:nvSpPr>
+        <p:spPr>
+          <a:xfrm>
+            <a:off x="685800" y="1143000"/>
+            <a:ext cx="5486400" cy="3086100"/>
+          </a:xfrm>
+        </p:spPr>
+      </p:sp>
+      <p:sp>
+        <p:nvSpPr>
+          <p:cNvPr id="3" name="Notes Placeholder 2"/>
+          <p:cNvSpPr>
+            <a:spLocks noGrp="1"/>
+          </p:cNvSpPr>
+          <p:nvPr>
+            <p:ph type="body" idx="1"/>
+          </p:nvPr>
+        </p:nvSpPr>
+        <p:spPr/>
+        <p:txBody>
+          <a:bodyPr/>
+          <a:lstStyle/>
+          <a:p>
+            <a:r>
+              <a:rPr lang="en-US" dirty="0" smtClean="0"/>
+              <a:t>Flesh this out a little more.</a:t>
+            </a:r>
+            <a:endParaRPr lang="en-US" dirty="0"/>
+          </a:p>
+        </p:txBody>
+      </p:sp>
+      <p:sp>
+        <p:nvSpPr>
+          <p:cNvPr id="4" name="Slide Number Placeholder 3"/>
+          <p:cNvSpPr>
+            <a:spLocks noGrp="1"/>
+          </p:cNvSpPr>
+          <p:nvPr>
+            <p:ph type="sldNum" sz="quarter" idx="10"/>
+          </p:nvPr>
+        </p:nvSpPr>
+        <p:spPr/>
+        <p:txBody>
+          <a:bodyPr/>
+          <a:lstStyle/>
+          <a:p>
+            <a:fld id="{AE764910-0912-401B-9F58-2B7602DC4522}" type="slidenum">
+              <a:rPr lang="en-US" smtClean="0"/>
+              <a:t>48</a:t>
+            </a:fld>
+            <a:endParaRPr lang="en-US"/>
+          </a:p>
+        </p:txBody>
+      </p:sp>
+    </p:spTree>
+    <p:extLst>
+      <p:ext uri="{BB962C8B-B14F-4D97-AF65-F5344CB8AC3E}">
+        <p14:creationId xmlns:p14="http://schemas.microsoft.com/office/powerpoint/2010/main" val="1364917313"/>
+      </p:ext>
+    </p:extLst>
+  </p:cSld>
+  <p:clrMapOvr>
+    <a:masterClrMapping/>
+  </p:clrMapOvr>
+</p:notes>
+</file>
+
+<file path=ppt/notesSlides/notesSlide36.xml><?xml version="1.0" encoding="utf-8"?>
+<p:notes xmlns:a="http://schemas.openxmlformats.org/drawingml/2006/main" xmlns:r="http://schemas.openxmlformats.org/officeDocument/2006/relationships" xmlns:p="http://schemas.openxmlformats.org/presentationml/2006/main">
+  <p:cSld>
+    <p:spTree>
+      <p:nvGrpSpPr>
+        <p:cNvPr id="1" name=""/>
+        <p:cNvGrpSpPr/>
+        <p:nvPr/>
+      </p:nvGrpSpPr>
+      <p:grpSpPr>
+        <a:xfrm>
+          <a:off x="0" y="0"/>
+          <a:ext cx="0" cy="0"/>
+          <a:chOff x="0" y="0"/>
+          <a:chExt cx="0" cy="0"/>
+        </a:xfrm>
+      </p:grpSpPr>
+      <p:sp>
+        <p:nvSpPr>
+          <p:cNvPr id="2" name="Slide Image Placeholder 1"/>
+          <p:cNvSpPr>
+            <a:spLocks noGrp="1" noRot="1" noChangeAspect="1"/>
+          </p:cNvSpPr>
+          <p:nvPr>
+            <p:ph type="sldImg"/>
+          </p:nvPr>
+        </p:nvSpPr>
+        <p:spPr>
+          <a:xfrm>
+            <a:off x="685800" y="1143000"/>
+            <a:ext cx="5486400" cy="3086100"/>
+          </a:xfrm>
+        </p:spPr>
+      </p:sp>
+      <p:sp>
+        <p:nvSpPr>
+          <p:cNvPr id="3" name="Notes Placeholder 2"/>
+          <p:cNvSpPr>
+            <a:spLocks noGrp="1"/>
+          </p:cNvSpPr>
+          <p:nvPr>
+            <p:ph type="body" idx="1"/>
+          </p:nvPr>
+        </p:nvSpPr>
+        <p:spPr/>
+        <p:txBody>
+          <a:bodyPr/>
+          <a:lstStyle/>
+          <a:p>
+            <a:r>
               <a:rPr lang="en-US" dirty="0" smtClean="0"/>
               <a:t>Mention 28 nm CMOS earlier.</a:t>
             </a:r>
@@ -4916,7 +5600,7 @@
 </p:notes>
 </file>
 
-<file path=ppt/notesSlides/notesSlide32.xml><?xml version="1.0" encoding="utf-8"?>
+<file path=ppt/notesSlides/notesSlide37.xml><?xml version="1.0" encoding="utf-8"?>
 <p:notes xmlns:a="http://schemas.openxmlformats.org/drawingml/2006/main" xmlns:r="http://schemas.openxmlformats.org/officeDocument/2006/relationships" xmlns:p="http://schemas.openxmlformats.org/presentationml/2006/main">
   <p:cSld>
     <p:spTree>
@@ -5071,6 +5755,35 @@
           <a:bodyPr/>
           <a:lstStyle/>
           <a:p>
+            <a:r>
+              <a:rPr lang="en-US" dirty="0" smtClean="0"/>
+              <a:t>What is match-action?</a:t>
+            </a:r>
+          </a:p>
+          <a:p>
+            <a:pPr marL="0" marR="0" indent="0" algn="l" defTabSz="914400" rtl="0" eaLnBrk="1" fontAlgn="auto" latinLnBrk="0" hangingPunct="1">
+              <a:lnSpc>
+                <a:spcPct val="100000"/>
+              </a:lnSpc>
+              <a:spcBef>
+                <a:spcPts val="0"/>
+              </a:spcBef>
+              <a:spcAft>
+                <a:spcPts val="0"/>
+              </a:spcAft>
+              <a:buClrTx/>
+              <a:buSzTx/>
+              <a:buFontTx/>
+              <a:buNone/>
+              <a:tabLst/>
+              <a:defRPr/>
+            </a:pPr>
+            <a:r>
+              <a:rPr lang="en-US" dirty="0" smtClean="0"/>
+              <a:t>Why use a pipeline?</a:t>
+            </a:r>
+          </a:p>
+          <a:p>
             <a:endParaRPr lang="en-US" dirty="0"/>
           </a:p>
         </p:txBody>
@@ -5090,9 +5803,9 @@
           <a:bodyPr/>
           <a:lstStyle/>
           <a:p>
-            <a:fld id="{16B09458-7AEF-4AD3-A567-0F11380064BE}" type="slidenum">
+            <a:fld id="{AE764910-0912-401B-9F58-2B7602DC4522}" type="slidenum">
               <a:rPr lang="en-US" smtClean="0"/>
-              <a:t>10</a:t>
+              <a:t>8</a:t>
             </a:fld>
             <a:endParaRPr lang="en-US"/>
           </a:p>
@@ -5101,7 +5814,7 @@
     </p:spTree>
     <p:extLst>
       <p:ext uri="{BB962C8B-B14F-4D97-AF65-F5344CB8AC3E}">
-        <p14:creationId xmlns:p14="http://schemas.microsoft.com/office/powerpoint/2010/main" val="1333598809"/>
+        <p14:creationId xmlns:p14="http://schemas.microsoft.com/office/powerpoint/2010/main" val="685873912"/>
       </p:ext>
     </p:extLst>
   </p:cSld>
@@ -5155,6 +5868,33 @@
           <a:bodyPr/>
           <a:lstStyle/>
           <a:p>
+            <a:r>
+              <a:rPr lang="en-US" dirty="0" smtClean="0"/>
+              <a:t>Before we discuss the RMT model, let’s talk a bit about the switch architecture.</a:t>
+            </a:r>
+          </a:p>
+          <a:p>
+            <a:r>
+              <a:rPr lang="en-US" dirty="0" smtClean="0"/>
+              <a:t>The paper doesn’t go into much detail about this</a:t>
+            </a:r>
+            <a:r>
+              <a:rPr lang="en-US" baseline="0" dirty="0" smtClean="0"/>
+              <a:t> and assumes a switch is going to have a pipeline of match-action tables (fixed or not). Why is this a good architecture?</a:t>
+            </a:r>
+          </a:p>
+          <a:p>
+            <a:endParaRPr lang="en-US" dirty="0" smtClean="0"/>
+          </a:p>
+          <a:p>
+            <a:r>
+              <a:rPr lang="en-US" dirty="0" smtClean="0"/>
+              <a:t>Q:</a:t>
+            </a:r>
+            <a:r>
+              <a:rPr lang="en-US" baseline="0" dirty="0" smtClean="0"/>
+              <a:t> Why is a switch architected as a pipeline? Are there other architectures?</a:t>
+            </a:r>
             <a:endParaRPr lang="en-US" dirty="0"/>
           </a:p>
         </p:txBody>
@@ -5174,9 +5914,9 @@
           <a:bodyPr/>
           <a:lstStyle/>
           <a:p>
-            <a:fld id="{16B09458-7AEF-4AD3-A567-0F11380064BE}" type="slidenum">
+            <a:fld id="{AE764910-0912-401B-9F58-2B7602DC4522}" type="slidenum">
               <a:rPr lang="en-US" smtClean="0"/>
-              <a:t>11</a:t>
+              <a:t>9</a:t>
             </a:fld>
             <a:endParaRPr lang="en-US"/>
           </a:p>
@@ -5185,7 +5925,7 @@
     </p:spTree>
     <p:extLst>
       <p:ext uri="{BB962C8B-B14F-4D97-AF65-F5344CB8AC3E}">
-        <p14:creationId xmlns:p14="http://schemas.microsoft.com/office/powerpoint/2010/main" val="1623037269"/>
+        <p14:creationId xmlns:p14="http://schemas.microsoft.com/office/powerpoint/2010/main" val="3910868144"/>
       </p:ext>
     </p:extLst>
   </p:cSld>
@@ -5260,7 +6000,7 @@
           <a:p>
             <a:fld id="{16B09458-7AEF-4AD3-A567-0F11380064BE}" type="slidenum">
               <a:rPr lang="en-US" smtClean="0"/>
-              <a:t>12</a:t>
+              <a:t>10</a:t>
             </a:fld>
             <a:endParaRPr lang="en-US"/>
           </a:p>
@@ -5269,7 +6009,7 @@
     </p:spTree>
     <p:extLst>
       <p:ext uri="{BB962C8B-B14F-4D97-AF65-F5344CB8AC3E}">
-        <p14:creationId xmlns:p14="http://schemas.microsoft.com/office/powerpoint/2010/main" val="1160606866"/>
+        <p14:creationId xmlns:p14="http://schemas.microsoft.com/office/powerpoint/2010/main" val="1333598809"/>
       </p:ext>
     </p:extLst>
   </p:cSld>
@@ -5323,43 +6063,7 @@
           <a:bodyPr/>
           <a:lstStyle/>
           <a:p>
-            <a:r>
-              <a:rPr lang="en-US" dirty="0" smtClean="0"/>
-              <a:t>Net result is a reduction</a:t>
-            </a:r>
-            <a:r>
-              <a:rPr lang="en-US" baseline="0" dirty="0" smtClean="0"/>
-              <a:t> in die area.</a:t>
-            </a:r>
-            <a:endParaRPr lang="en-US" dirty="0" smtClean="0"/>
-          </a:p>
-          <a:p>
-            <a:endParaRPr lang="en-US" dirty="0" smtClean="0"/>
-          </a:p>
-          <a:p>
-            <a:r>
-              <a:rPr lang="en-US" dirty="0" smtClean="0"/>
-              <a:t>TODO: Make sure to</a:t>
-            </a:r>
-            <a:r>
-              <a:rPr lang="en-US" baseline="0" dirty="0" smtClean="0"/>
-              <a:t> mention that these are very, very restricted units and not general purpose processors.</a:t>
-            </a:r>
-          </a:p>
-          <a:p>
-            <a:r>
-              <a:rPr lang="en-US" baseline="0" dirty="0" smtClean="0"/>
-              <a:t>The game is designing these atoms or primitives</a:t>
-            </a:r>
-          </a:p>
-          <a:p>
-            <a:endParaRPr lang="en-US" baseline="0" dirty="0" smtClean="0"/>
-          </a:p>
-          <a:p>
-            <a:r>
-              <a:rPr lang="en-US" baseline="0" dirty="0" smtClean="0"/>
-              <a:t>TODO: Rambling a bit too much here.</a:t>
-            </a:r>
+            <a:endParaRPr lang="en-US" dirty="0"/>
           </a:p>
         </p:txBody>
       </p:sp>
@@ -5380,7 +6084,7 @@
           <a:p>
             <a:fld id="{16B09458-7AEF-4AD3-A567-0F11380064BE}" type="slidenum">
               <a:rPr lang="en-US" smtClean="0"/>
-              <a:t>13</a:t>
+              <a:t>11</a:t>
             </a:fld>
             <a:endParaRPr lang="en-US"/>
           </a:p>
@@ -5389,7 +6093,7 @@
     </p:spTree>
     <p:extLst>
       <p:ext uri="{BB962C8B-B14F-4D97-AF65-F5344CB8AC3E}">
-        <p14:creationId xmlns:p14="http://schemas.microsoft.com/office/powerpoint/2010/main" val="1687546240"/>
+        <p14:creationId xmlns:p14="http://schemas.microsoft.com/office/powerpoint/2010/main" val="1623037269"/>
       </p:ext>
     </p:extLst>
   </p:cSld>
@@ -5445,23 +6149,11 @@
           <a:p>
             <a:r>
               <a:rPr lang="en-US" dirty="0" smtClean="0"/>
-              <a:t>Ok, so with this pipeline model, here’s what a fixed function switch looks like</a:t>
-            </a:r>
-          </a:p>
-          <a:p>
-            <a:r>
-              <a:rPr lang="en-US" dirty="0" smtClean="0"/>
-              <a:t>Each table is hardwired</a:t>
+              <a:t>Rhetorical</a:t>
             </a:r>
             <a:r>
               <a:rPr lang="en-US" baseline="0" dirty="0" smtClean="0"/>
-              <a:t> to a specific task.</a:t>
-            </a:r>
-          </a:p>
-          <a:p>
-            <a:r>
-              <a:rPr lang="en-US" baseline="0" dirty="0" smtClean="0"/>
-              <a:t>If you want to size smaller or larger tables, you are out of luck.</a:t>
+              <a:t> question: What is the problem with this architecture?</a:t>
             </a:r>
             <a:endParaRPr lang="en-US" dirty="0"/>
           </a:p>
@@ -5482,9 +6174,9 @@
           <a:bodyPr/>
           <a:lstStyle/>
           <a:p>
-            <a:fld id="{AE764910-0912-401B-9F58-2B7602DC4522}" type="slidenum">
+            <a:fld id="{16B09458-7AEF-4AD3-A567-0F11380064BE}" type="slidenum">
               <a:rPr lang="en-US" smtClean="0"/>
-              <a:t>14</a:t>
+              <a:t>12</a:t>
             </a:fld>
             <a:endParaRPr lang="en-US"/>
           </a:p>
@@ -5493,7 +6185,7 @@
     </p:spTree>
     <p:extLst>
       <p:ext uri="{BB962C8B-B14F-4D97-AF65-F5344CB8AC3E}">
-        <p14:creationId xmlns:p14="http://schemas.microsoft.com/office/powerpoint/2010/main" val="1706514526"/>
+        <p14:creationId xmlns:p14="http://schemas.microsoft.com/office/powerpoint/2010/main" val="1160606866"/>
       </p:ext>
     </p:extLst>
   </p:cSld>
@@ -5549,23 +6241,41 @@
           <a:p>
             <a:r>
               <a:rPr lang="en-US" dirty="0" smtClean="0"/>
-              <a:t>This is all you really need to know about the paper </a:t>
-            </a:r>
-            <a:r>
-              <a:rPr lang="en-US" dirty="0" smtClean="0">
-                <a:sym typeface="Wingdings" panose="05000000000000000000" pitchFamily="2" charset="2"/>
-              </a:rPr>
-              <a:t></a:t>
-            </a:r>
-          </a:p>
-          <a:p>
-            <a:r>
-              <a:rPr lang="en-US" dirty="0" smtClean="0">
-                <a:sym typeface="Wingdings" panose="05000000000000000000" pitchFamily="2" charset="2"/>
-              </a:rPr>
-              <a:t>The rest is just how to make it run at 1 GHz</a:t>
-            </a:r>
-            <a:endParaRPr lang="en-US" dirty="0"/>
+              <a:t>Net result is a reduction</a:t>
+            </a:r>
+            <a:r>
+              <a:rPr lang="en-US" baseline="0" dirty="0" smtClean="0"/>
+              <a:t> in die area.</a:t>
+            </a:r>
+            <a:endParaRPr lang="en-US" dirty="0" smtClean="0"/>
+          </a:p>
+          <a:p>
+            <a:endParaRPr lang="en-US" dirty="0" smtClean="0"/>
+          </a:p>
+          <a:p>
+            <a:r>
+              <a:rPr lang="en-US" dirty="0" smtClean="0"/>
+              <a:t>TODO: Make sure to</a:t>
+            </a:r>
+            <a:r>
+              <a:rPr lang="en-US" baseline="0" dirty="0" smtClean="0"/>
+              <a:t> mention that these are very, very restricted units and not general purpose processors.</a:t>
+            </a:r>
+          </a:p>
+          <a:p>
+            <a:r>
+              <a:rPr lang="en-US" baseline="0" dirty="0" smtClean="0"/>
+              <a:t>The game is designing these atoms or primitives</a:t>
+            </a:r>
+          </a:p>
+          <a:p>
+            <a:endParaRPr lang="en-US" baseline="0" dirty="0" smtClean="0"/>
+          </a:p>
+          <a:p>
+            <a:r>
+              <a:rPr lang="en-US" baseline="0" dirty="0" smtClean="0"/>
+              <a:t>TODO: Rambling a bit too much here.</a:t>
+            </a:r>
           </a:p>
         </p:txBody>
       </p:sp>
@@ -5584,9 +6294,9 @@
           <a:bodyPr/>
           <a:lstStyle/>
           <a:p>
-            <a:fld id="{AE764910-0912-401B-9F58-2B7602DC4522}" type="slidenum">
+            <a:fld id="{16B09458-7AEF-4AD3-A567-0F11380064BE}" type="slidenum">
               <a:rPr lang="en-US" smtClean="0"/>
-              <a:t>16</a:t>
+              <a:t>13</a:t>
             </a:fld>
             <a:endParaRPr lang="en-US"/>
           </a:p>
@@ -5595,7 +6305,7 @@
     </p:spTree>
     <p:extLst>
       <p:ext uri="{BB962C8B-B14F-4D97-AF65-F5344CB8AC3E}">
-        <p14:creationId xmlns:p14="http://schemas.microsoft.com/office/powerpoint/2010/main" val="723529385"/>
+        <p14:creationId xmlns:p14="http://schemas.microsoft.com/office/powerpoint/2010/main" val="1687546240"/>
       </p:ext>
     </p:extLst>
   </p:cSld>
@@ -5736,7 +6446,7 @@
           <a:p>
             <a:fld id="{E04F2FE0-66D1-4517-A0FE-1ABC94B036F1}" type="datetimeFigureOut">
               <a:rPr lang="en-US" smtClean="0"/>
-              <a:t>4/26/2016</a:t>
+              <a:t>10/31/16</a:t>
             </a:fld>
             <a:endParaRPr lang="en-US"/>
           </a:p>
@@ -5906,7 +6616,7 @@
           <a:p>
             <a:fld id="{E04F2FE0-66D1-4517-A0FE-1ABC94B036F1}" type="datetimeFigureOut">
               <a:rPr lang="en-US" smtClean="0"/>
-              <a:t>4/26/2016</a:t>
+              <a:t>10/31/16</a:t>
             </a:fld>
             <a:endParaRPr lang="en-US"/>
           </a:p>
@@ -6086,7 +6796,7 @@
           <a:p>
             <a:fld id="{E04F2FE0-66D1-4517-A0FE-1ABC94B036F1}" type="datetimeFigureOut">
               <a:rPr lang="en-US" smtClean="0"/>
-              <a:t>4/26/2016</a:t>
+              <a:t>10/31/16</a:t>
             </a:fld>
             <a:endParaRPr lang="en-US"/>
           </a:p>
@@ -6256,7 +6966,7 @@
           <a:p>
             <a:fld id="{E04F2FE0-66D1-4517-A0FE-1ABC94B036F1}" type="datetimeFigureOut">
               <a:rPr lang="en-US" smtClean="0"/>
-              <a:t>4/26/2016</a:t>
+              <a:t>10/31/16</a:t>
             </a:fld>
             <a:endParaRPr lang="en-US"/>
           </a:p>
@@ -6502,7 +7212,7 @@
           <a:p>
             <a:fld id="{E04F2FE0-66D1-4517-A0FE-1ABC94B036F1}" type="datetimeFigureOut">
               <a:rPr lang="en-US" smtClean="0"/>
-              <a:t>4/26/2016</a:t>
+              <a:t>10/31/16</a:t>
             </a:fld>
             <a:endParaRPr lang="en-US"/>
           </a:p>
@@ -6734,7 +7444,7 @@
           <a:p>
             <a:fld id="{E04F2FE0-66D1-4517-A0FE-1ABC94B036F1}" type="datetimeFigureOut">
               <a:rPr lang="en-US" smtClean="0"/>
-              <a:t>4/26/2016</a:t>
+              <a:t>10/31/16</a:t>
             </a:fld>
             <a:endParaRPr lang="en-US"/>
           </a:p>
@@ -7101,7 +7811,7 @@
           <a:p>
             <a:fld id="{E04F2FE0-66D1-4517-A0FE-1ABC94B036F1}" type="datetimeFigureOut">
               <a:rPr lang="en-US" smtClean="0"/>
-              <a:t>4/26/2016</a:t>
+              <a:t>10/31/16</a:t>
             </a:fld>
             <a:endParaRPr lang="en-US"/>
           </a:p>
@@ -7219,7 +7929,7 @@
           <a:p>
             <a:fld id="{E04F2FE0-66D1-4517-A0FE-1ABC94B036F1}" type="datetimeFigureOut">
               <a:rPr lang="en-US" smtClean="0"/>
-              <a:t>4/26/2016</a:t>
+              <a:t>10/31/16</a:t>
             </a:fld>
             <a:endParaRPr lang="en-US"/>
           </a:p>
@@ -7314,7 +8024,7 @@
           <a:p>
             <a:fld id="{E04F2FE0-66D1-4517-A0FE-1ABC94B036F1}" type="datetimeFigureOut">
               <a:rPr lang="en-US" smtClean="0"/>
-              <a:t>4/26/2016</a:t>
+              <a:t>10/31/16</a:t>
             </a:fld>
             <a:endParaRPr lang="en-US"/>
           </a:p>
@@ -7591,7 +8301,7 @@
           <a:p>
             <a:fld id="{E04F2FE0-66D1-4517-A0FE-1ABC94B036F1}" type="datetimeFigureOut">
               <a:rPr lang="en-US" smtClean="0"/>
-              <a:t>4/26/2016</a:t>
+              <a:t>10/31/16</a:t>
             </a:fld>
             <a:endParaRPr lang="en-US"/>
           </a:p>
@@ -7848,7 +8558,7 @@
           <a:p>
             <a:fld id="{E04F2FE0-66D1-4517-A0FE-1ABC94B036F1}" type="datetimeFigureOut">
               <a:rPr lang="en-US" smtClean="0"/>
-              <a:t>4/26/2016</a:t>
+              <a:t>10/31/16</a:t>
             </a:fld>
             <a:endParaRPr lang="en-US"/>
           </a:p>
@@ -8061,7 +8771,7 @@
           <a:p>
             <a:fld id="{E04F2FE0-66D1-4517-A0FE-1ABC94B036F1}" type="datetimeFigureOut">
               <a:rPr lang="en-US" smtClean="0"/>
-              <a:t>4/26/2016</a:t>
+              <a:t>10/31/16</a:t>
             </a:fld>
             <a:endParaRPr lang="en-US"/>
           </a:p>
@@ -9356,7 +10066,7 @@
         <p:spPr>
           <a:xfrm>
             <a:off x="5244099" y="6403333"/>
-            <a:ext cx="1703800" cy="369332"/>
+            <a:ext cx="1820819" cy="369332"/>
           </a:xfrm>
           <a:prstGeom prst="rect">
             <a:avLst/>
@@ -9371,7 +10081,7 @@
           <a:p>
             <a:r>
               <a:rPr lang="en-US" dirty="0" smtClean="0"/>
-              <a:t>1 GHz processor</a:t>
+              <a:t>10 GHz processor</a:t>
             </a:r>
             <a:endParaRPr lang="en-US" dirty="0"/>
           </a:p>
@@ -9489,13 +10199,13 @@
       </p:sp>
       <p:sp>
         <p:nvSpPr>
-          <p:cNvPr id="76" name="Rounded Rectangle 75"/>
+          <p:cNvPr id="29" name="Rounded Rectangle 28"/>
           <p:cNvSpPr/>
           <p:nvPr/>
         </p:nvSpPr>
         <p:spPr>
           <a:xfrm>
-            <a:off x="2343150" y="3538218"/>
+            <a:off x="2057400" y="3238500"/>
             <a:ext cx="7429500" cy="1031625"/>
           </a:xfrm>
           <a:prstGeom prst="roundRect">
@@ -9530,8 +10240,11 @@
               <a:rPr lang="en-US" sz="3000" dirty="0" smtClean="0">
                 <a:latin typeface="Gadugi" panose="020B0502040204020203" pitchFamily="34" charset="0"/>
               </a:rPr>
-              <a:t>Only sustains 100 M packets per second</a:t>
-            </a:r>
+              <a:t>Can’t build a 10 GHz processor!</a:t>
+            </a:r>
+            <a:endParaRPr lang="en-US" sz="3000" dirty="0" smtClean="0">
+              <a:latin typeface="Gadugi" panose="020B0502040204020203" pitchFamily="34" charset="0"/>
+            </a:endParaRPr>
           </a:p>
         </p:txBody>
       </p:sp>
@@ -9579,7 +10292,7 @@
                                           </p:stCondLst>
                                         </p:cTn>
                                         <p:tgtEl>
-                                          <p:spTgt spid="76"/>
+                                          <p:spTgt spid="29"/>
                                         </p:tgtEl>
                                         <p:attrNameLst>
                                           <p:attrName>style.visibility</p:attrName>
@@ -9620,7 +10333,7 @@
       </p:par>
     </p:tnLst>
     <p:bldLst>
-      <p:bldP spid="76" grpId="0" animBg="1"/>
+      <p:bldP spid="29" grpId="0" animBg="1"/>
     </p:bldLst>
   </p:timing>
 </p:sld>
@@ -19526,11 +20239,7 @@
             <a:pPr lvl="1"/>
             <a:r>
               <a:rPr lang="en-US" dirty="0" smtClean="0"/>
-              <a:t>Add a different </a:t>
-            </a:r>
-            <a:r>
-              <a:rPr lang="en-US" dirty="0" smtClean="0"/>
-              <a:t>action</a:t>
+              <a:t>Add a different action</a:t>
             </a:r>
             <a:endParaRPr lang="en-US" dirty="0"/>
           </a:p>
@@ -19645,55 +20354,22 @@
           <a:p>
             <a:r>
               <a:rPr lang="en-US" dirty="0" smtClean="0"/>
-              <a:t>Pipeline of match-action </a:t>
-            </a:r>
+              <a:t>Pipeline of match-action tables</a:t>
+            </a:r>
+          </a:p>
+          <a:p>
+            <a:pPr lvl="1"/>
             <a:r>
               <a:rPr lang="en-US" dirty="0" smtClean="0"/>
-              <a:t>tables</a:t>
+              <a:t>Match on any parsed field</a:t>
             </a:r>
           </a:p>
           <a:p>
             <a:pPr lvl="1"/>
             <a:r>
               <a:rPr lang="en-US" dirty="0" smtClean="0"/>
-              <a:t>Match </a:t>
-            </a:r>
-            <a:r>
-              <a:rPr lang="en-US" dirty="0" smtClean="0"/>
-              <a:t>on any parsed </a:t>
-            </a:r>
-            <a:r>
-              <a:rPr lang="en-US" dirty="0" smtClean="0"/>
-              <a:t>field</a:t>
-            </a:r>
-          </a:p>
-          <a:p>
-            <a:pPr lvl="1"/>
-            <a:r>
-              <a:rPr lang="en-US" dirty="0" smtClean="0"/>
-              <a:t>Actions combine</a:t>
-            </a:r>
-            <a:r>
-              <a:rPr lang="en-US" dirty="0" smtClean="0"/>
-              <a:t> </a:t>
-            </a:r>
-            <a:r>
-              <a:rPr lang="en-US" dirty="0" smtClean="0"/>
-              <a:t>packet-editing </a:t>
-            </a:r>
-            <a:r>
-              <a:rPr lang="en-US" dirty="0" smtClean="0"/>
-              <a:t>operations </a:t>
-            </a:r>
-            <a:r>
-              <a:rPr lang="en-US" dirty="0" smtClean="0"/>
-              <a:t>(pkt.f1 = pkt.f2 op pkt.f3</a:t>
-            </a:r>
-            <a:r>
-              <a:rPr lang="en-US" dirty="0" smtClean="0"/>
-              <a:t>) in parallel</a:t>
-            </a:r>
-            <a:endParaRPr lang="en-US" dirty="0" smtClean="0"/>
+              <a:t>Actions combine packet-editing operations (pkt.f1 = pkt.f2 op pkt.f3) in parallel</a:t>
+            </a:r>
           </a:p>
         </p:txBody>
       </p:sp>
@@ -23104,7 +23780,7 @@
 </file>
 
 <file path=ppt/slides/slide22.xml><?xml version="1.0" encoding="utf-8"?>
-<p:sld xmlns:a="http://schemas.openxmlformats.org/drawingml/2006/main" xmlns:r="http://schemas.openxmlformats.org/officeDocument/2006/relationships" xmlns:p="http://schemas.openxmlformats.org/presentationml/2006/main">
+<p:sld xmlns:a="http://schemas.openxmlformats.org/drawingml/2006/main" xmlns:r="http://schemas.openxmlformats.org/officeDocument/2006/relationships" xmlns:p="http://schemas.openxmlformats.org/presentationml/2006/main" show="0">
   <p:cSld>
     <p:spTree>
       <p:nvGrpSpPr>
@@ -25681,6 +26357,14 @@
   <p:clrMapOvr>
     <a:masterClrMapping/>
   </p:clrMapOvr>
+  <mc:AlternateContent xmlns:mc="http://schemas.openxmlformats.org/markup-compatibility/2006">
+    <mc:Choice xmlns:p14="http://schemas.microsoft.com/office/powerpoint/2010/main" Requires="p14">
+      <p:transition spd="slow" p14:dur="2000"/>
+    </mc:Choice>
+    <mc:Fallback>
+      <p:transition spd="slow"/>
+    </mc:Fallback>
+  </mc:AlternateContent>
   <p:timing>
     <p:tnLst>
       <p:par>
@@ -37997,28 +38681,11 @@
           <a:p>
             <a:r>
               <a:rPr lang="en-US" dirty="0" smtClean="0"/>
-              <a:t>Design in 28 nm CMOS.</a:t>
-            </a:r>
-          </a:p>
-          <a:p>
+              <a:t>Key </a:t>
+            </a:r>
             <a:r>
               <a:rPr lang="en-US" dirty="0" smtClean="0"/>
-              <a:t>Many </a:t>
-            </a:r>
-            <a:r>
-              <a:rPr lang="en-US" dirty="0"/>
-              <a:t>functions identical:  I/O, data buffer, </a:t>
-            </a:r>
-            <a:r>
-              <a:rPr lang="en-US" dirty="0" smtClean="0"/>
-              <a:t>scheduling…</a:t>
-            </a:r>
-            <a:endParaRPr lang="en-US" dirty="0"/>
-          </a:p>
-          <a:p>
-            <a:r>
-              <a:rPr lang="en-US" dirty="0" smtClean="0"/>
-              <a:t>Key takeaway:</a:t>
+              <a:t>takeaway:</a:t>
             </a:r>
           </a:p>
           <a:p>
@@ -38205,104 +38872,6 @@
                                           <p:spTgt spid="3">
                                             <p:txEl>
                                               <p:pRg st="2" end="2"/>
-                                            </p:txEl>
-                                          </p:spTgt>
-                                        </p:tgtEl>
-                                        <p:attrNameLst>
-                                          <p:attrName>style.visibility</p:attrName>
-                                        </p:attrNameLst>
-                                      </p:cBhvr>
-                                      <p:to>
-                                        <p:strVal val="visible"/>
-                                      </p:to>
-                                    </p:set>
-                                  </p:childTnLst>
-                                </p:cTn>
-                              </p:par>
-                            </p:childTnLst>
-                          </p:cTn>
-                        </p:par>
-                      </p:childTnLst>
-                    </p:cTn>
-                  </p:par>
-                  <p:par>
-                    <p:cTn id="15" fill="hold">
-                      <p:stCondLst>
-                        <p:cond delay="indefinite"/>
-                      </p:stCondLst>
-                      <p:childTnLst>
-                        <p:par>
-                          <p:cTn id="16" fill="hold">
-                            <p:stCondLst>
-                              <p:cond delay="0"/>
-                            </p:stCondLst>
-                            <p:childTnLst>
-                              <p:par>
-                                <p:cTn id="17" presetID="1" presetClass="entr" presetSubtype="0" fill="hold" nodeType="clickEffect">
-                                  <p:stCondLst>
-                                    <p:cond delay="0"/>
-                                  </p:stCondLst>
-                                  <p:childTnLst>
-                                    <p:set>
-                                      <p:cBhvr>
-                                        <p:cTn id="18" dur="1" fill="hold">
-                                          <p:stCondLst>
-                                            <p:cond delay="0"/>
-                                          </p:stCondLst>
-                                        </p:cTn>
-                                        <p:tgtEl>
-                                          <p:spTgt spid="3">
-                                            <p:txEl>
-                                              <p:pRg st="3" end="3"/>
-                                            </p:txEl>
-                                          </p:spTgt>
-                                        </p:tgtEl>
-                                        <p:attrNameLst>
-                                          <p:attrName>style.visibility</p:attrName>
-                                        </p:attrNameLst>
-                                      </p:cBhvr>
-                                      <p:to>
-                                        <p:strVal val="visible"/>
-                                      </p:to>
-                                    </p:set>
-                                  </p:childTnLst>
-                                </p:cTn>
-                              </p:par>
-                            </p:childTnLst>
-                          </p:cTn>
-                        </p:par>
-                      </p:childTnLst>
-                    </p:cTn>
-                  </p:par>
-                  <p:par>
-                    <p:cTn id="19" fill="hold">
-                      <p:stCondLst>
-                        <p:cond delay="indefinite"/>
-                      </p:stCondLst>
-                      <p:childTnLst>
-                        <p:par>
-                          <p:cTn id="20" fill="hold">
-                            <p:stCondLst>
-                              <p:cond delay="0"/>
-                            </p:stCondLst>
-                            <p:childTnLst>
-                              <p:par>
-                                <p:cTn id="21" presetID="1" presetClass="entr" presetSubtype="0" fill="hold" nodeType="clickEffect">
-                                  <p:stCondLst>
-                                    <p:cond delay="0"/>
-                                  </p:stCondLst>
-                                  <p:childTnLst>
-                                    <p:set>
-                                      <p:cBhvr>
-                                        <p:cTn id="22" dur="1" fill="hold">
-                                          <p:stCondLst>
-                                            <p:cond delay="0"/>
-                                          </p:stCondLst>
-                                        </p:cTn>
-                                        <p:tgtEl>
-                                          <p:spTgt spid="3">
-                                            <p:txEl>
-                                              <p:pRg st="4" end="4"/>
                                             </p:txEl>
                                           </p:spTgt>
                                         </p:tgtEl>
@@ -40076,7 +40645,7 @@
 </file>
 
 <file path=ppt/slides/slide32.xml><?xml version="1.0" encoding="utf-8"?>
-<p:sld xmlns:a="http://schemas.openxmlformats.org/drawingml/2006/main" xmlns:r="http://schemas.openxmlformats.org/officeDocument/2006/relationships" xmlns:p="http://schemas.openxmlformats.org/presentationml/2006/main">
+<p:sld xmlns:a="http://schemas.openxmlformats.org/drawingml/2006/main" xmlns:r="http://schemas.openxmlformats.org/officeDocument/2006/relationships" xmlns:p="http://schemas.openxmlformats.org/presentationml/2006/main" show="0">
   <p:cSld>
     <p:spTree>
       <p:nvGrpSpPr>
@@ -40264,6 +40833,14 @@
   <p:clrMapOvr>
     <a:masterClrMapping/>
   </p:clrMapOvr>
+  <mc:AlternateContent xmlns:mc="http://schemas.openxmlformats.org/markup-compatibility/2006">
+    <mc:Choice xmlns:p14="http://schemas.microsoft.com/office/powerpoint/2010/main" Requires="p14">
+      <p:transition spd="slow" p14:dur="2000"/>
+    </mc:Choice>
+    <mc:Fallback>
+      <p:transition spd="slow"/>
+    </mc:Fallback>
+  </mc:AlternateContent>
   <p:timing>
     <p:tnLst>
       <p:par>
@@ -47755,7 +48332,7 @@
 </file>
 
 <file path=ppt/slides/slide39.xml><?xml version="1.0" encoding="utf-8"?>
-<p:sld xmlns:a="http://schemas.openxmlformats.org/drawingml/2006/main" xmlns:r="http://schemas.openxmlformats.org/officeDocument/2006/relationships" xmlns:p="http://schemas.openxmlformats.org/presentationml/2006/main">
+<p:sld xmlns:a="http://schemas.openxmlformats.org/drawingml/2006/main" xmlns:r="http://schemas.openxmlformats.org/officeDocument/2006/relationships" xmlns:p="http://schemas.openxmlformats.org/presentationml/2006/main" show="0">
   <p:cSld>
     <p:spTree>
       <p:nvGrpSpPr>
@@ -49269,12 +49846,12 @@
   <p:clrMapOvr>
     <a:masterClrMapping/>
   </p:clrMapOvr>
-  <mc:AlternateContent xmlns:mc="http://schemas.openxmlformats.org/markup-compatibility/2006" xmlns:p14="http://schemas.microsoft.com/office/powerpoint/2010/main">
-    <mc:Choice Requires="p14">
+  <mc:AlternateContent xmlns:mc="http://schemas.openxmlformats.org/markup-compatibility/2006">
+    <mc:Choice xmlns:p14="http://schemas.microsoft.com/office/powerpoint/2010/main" Requires="p14">
       <p:transition p14:dur="0"/>
     </mc:Choice>
-    <mc:Fallback xmlns="">
-      <p:transition xmlns:p14="http://schemas.microsoft.com/office/powerpoint/2010/main"/>
+    <mc:Fallback>
+      <p:transition/>
     </mc:Fallback>
   </mc:AlternateContent>
   <p:timing>
@@ -49725,7 +50302,7 @@
 </file>
 
 <file path=ppt/slides/slide40.xml><?xml version="1.0" encoding="utf-8"?>
-<p:sld xmlns:a="http://schemas.openxmlformats.org/drawingml/2006/main" xmlns:r="http://schemas.openxmlformats.org/officeDocument/2006/relationships" xmlns:p="http://schemas.openxmlformats.org/presentationml/2006/main">
+<p:sld xmlns:a="http://schemas.openxmlformats.org/drawingml/2006/main" xmlns:r="http://schemas.openxmlformats.org/officeDocument/2006/relationships" xmlns:p="http://schemas.openxmlformats.org/presentationml/2006/main" show="0">
   <p:cSld>
     <p:spTree>
       <p:nvGrpSpPr>
@@ -50233,6 +50810,14 @@
   <p:clrMapOvr>
     <a:masterClrMapping/>
   </p:clrMapOvr>
+  <mc:AlternateContent xmlns:mc="http://schemas.openxmlformats.org/markup-compatibility/2006">
+    <mc:Choice xmlns:p14="http://schemas.microsoft.com/office/powerpoint/2010/main" Requires="p14">
+      <p:transition spd="slow" p14:dur="2000"/>
+    </mc:Choice>
+    <mc:Fallback>
+      <p:transition spd="slow"/>
+    </mc:Fallback>
+  </mc:AlternateContent>
   <p:timing>
     <p:tnLst>
       <p:par>
@@ -50398,7 +50983,7 @@
 </file>
 
 <file path=ppt/slides/slide41.xml><?xml version="1.0" encoding="utf-8"?>
-<p:sld xmlns:a="http://schemas.openxmlformats.org/drawingml/2006/main" xmlns:r="http://schemas.openxmlformats.org/officeDocument/2006/relationships" xmlns:p="http://schemas.openxmlformats.org/presentationml/2006/main">
+<p:sld xmlns:a="http://schemas.openxmlformats.org/drawingml/2006/main" xmlns:r="http://schemas.openxmlformats.org/officeDocument/2006/relationships" xmlns:p="http://schemas.openxmlformats.org/presentationml/2006/main" show="0">
   <p:cSld>
     <p:spTree>
       <p:nvGrpSpPr>
@@ -51045,6 +51630,14 @@
   <p:clrMapOvr>
     <a:masterClrMapping/>
   </p:clrMapOvr>
+  <mc:AlternateContent xmlns:mc="http://schemas.openxmlformats.org/markup-compatibility/2006">
+    <mc:Choice xmlns:p14="http://schemas.microsoft.com/office/powerpoint/2010/main" Requires="p14">
+      <p:transition spd="slow" p14:dur="2000"/>
+    </mc:Choice>
+    <mc:Fallback>
+      <p:transition spd="slow"/>
+    </mc:Fallback>
+  </mc:AlternateContent>
   <p:timing>
     <p:tnLst>
       <p:par>
@@ -51056,7 +51649,7 @@
 </file>
 
 <file path=ppt/slides/slide42.xml><?xml version="1.0" encoding="utf-8"?>
-<p:sld xmlns:a="http://schemas.openxmlformats.org/drawingml/2006/main" xmlns:r="http://schemas.openxmlformats.org/officeDocument/2006/relationships" xmlns:p="http://schemas.openxmlformats.org/presentationml/2006/main">
+<p:sld xmlns:a="http://schemas.openxmlformats.org/drawingml/2006/main" xmlns:r="http://schemas.openxmlformats.org/officeDocument/2006/relationships" xmlns:p="http://schemas.openxmlformats.org/presentationml/2006/main" show="0">
   <p:cSld>
     <p:spTree>
       <p:nvGrpSpPr>
@@ -52034,6 +52627,14 @@
   <p:clrMapOvr>
     <a:masterClrMapping/>
   </p:clrMapOvr>
+  <mc:AlternateContent xmlns:mc="http://schemas.openxmlformats.org/markup-compatibility/2006">
+    <mc:Choice xmlns:p14="http://schemas.microsoft.com/office/powerpoint/2010/main" Requires="p14">
+      <p:transition spd="slow" p14:dur="2000"/>
+    </mc:Choice>
+    <mc:Fallback>
+      <p:transition spd="slow"/>
+    </mc:Fallback>
+  </mc:AlternateContent>
   <p:timing>
     <p:tnLst>
       <p:par>
@@ -53094,7 +53695,7 @@
 </file>
 
 <file path=ppt/slides/slide45.xml><?xml version="1.0" encoding="utf-8"?>
-<p:sld xmlns:a="http://schemas.openxmlformats.org/drawingml/2006/main" xmlns:r="http://schemas.openxmlformats.org/officeDocument/2006/relationships" xmlns:p="http://schemas.openxmlformats.org/presentationml/2006/main">
+<p:sld xmlns:a="http://schemas.openxmlformats.org/drawingml/2006/main" xmlns:r="http://schemas.openxmlformats.org/officeDocument/2006/relationships" xmlns:p="http://schemas.openxmlformats.org/presentationml/2006/main" show="0">
   <p:cSld>
     <p:spTree>
       <p:nvGrpSpPr>
@@ -53215,6 +53816,14 @@
   <p:clrMapOvr>
     <a:masterClrMapping/>
   </p:clrMapOvr>
+  <mc:AlternateContent xmlns:mc="http://schemas.openxmlformats.org/markup-compatibility/2006">
+    <mc:Choice xmlns:p14="http://schemas.microsoft.com/office/powerpoint/2010/main" Requires="p14">
+      <p:transition spd="slow" p14:dur="2000"/>
+    </mc:Choice>
+    <mc:Fallback>
+      <p:transition spd="slow"/>
+    </mc:Fallback>
+  </mc:AlternateContent>
   <p:timing>
     <p:tnLst>
       <p:par>
@@ -53823,11 +54432,7 @@
             </a:r>
             <a:r>
               <a:rPr lang="en-US" sz="11200" dirty="0" smtClean="0"/>
-              <a:t> </a:t>
-            </a:r>
-            <a:r>
-              <a:rPr lang="en-US" sz="11200" dirty="0" smtClean="0"/>
-              <a:t>algorithms (</a:t>
+              <a:t> algorithms (</a:t>
             </a:r>
             <a:r>
               <a:rPr lang="en-US" sz="11200" dirty="0" err="1" smtClean="0"/>
@@ -53854,11 +54459,7 @@
           <a:p>
             <a:r>
               <a:rPr lang="en-US" sz="11200" dirty="0" smtClean="0"/>
-              <a:t>Higher-level </a:t>
-            </a:r>
-            <a:r>
-              <a:rPr lang="en-US" sz="11200" dirty="0" smtClean="0"/>
-              <a:t>languages (</a:t>
+              <a:t>Higher-level languages (</a:t>
             </a:r>
             <a:r>
               <a:rPr lang="en-US" sz="11200" dirty="0" err="1" smtClean="0"/>
@@ -53872,11 +54473,7 @@
           <a:p>
             <a:r>
               <a:rPr lang="en-US" sz="11200" dirty="0" smtClean="0"/>
-              <a:t>Programmable </a:t>
-            </a:r>
-            <a:r>
-              <a:rPr lang="en-US" sz="11200" dirty="0" smtClean="0"/>
-              <a:t>scheduling (</a:t>
+              <a:t>Programmable scheduling (</a:t>
             </a:r>
             <a:r>
               <a:rPr lang="en-US" sz="11200" dirty="0" err="1" smtClean="0"/>
@@ -53890,11 +54487,7 @@
           <a:p>
             <a:r>
               <a:rPr lang="en-US" sz="11200" dirty="0" smtClean="0"/>
-              <a:t>Protocol-independent </a:t>
-            </a:r>
-            <a:r>
-              <a:rPr lang="en-US" sz="11200" dirty="0" smtClean="0"/>
-              <a:t>software switches (</a:t>
+              <a:t>Protocol-independent software switches (</a:t>
             </a:r>
             <a:r>
               <a:rPr lang="en-US" sz="11200" dirty="0" err="1" smtClean="0"/>
@@ -53908,11 +54501,7 @@
           <a:p>
             <a:r>
               <a:rPr lang="en-US" sz="11200" dirty="0" smtClean="0"/>
-              <a:t>Programmable </a:t>
-            </a:r>
-            <a:r>
-              <a:rPr lang="en-US" sz="11200" dirty="0" smtClean="0"/>
-              <a:t>NICs (Kaufman et al., </a:t>
+              <a:t>Programmable NICs (Kaufman et al., </a:t>
             </a:r>
             <a:r>
               <a:rPr lang="en-US" sz="11200" dirty="0" err="1" smtClean="0"/>
@@ -53926,11 +54515,7 @@
           <a:p>
             <a:r>
               <a:rPr lang="en-US" sz="11200" dirty="0" smtClean="0"/>
-              <a:t>Network </a:t>
-            </a:r>
-            <a:r>
-              <a:rPr lang="en-US" sz="11200" dirty="0" smtClean="0"/>
-              <a:t>measurement (Li et al., </a:t>
+              <a:t>Network measurement (Li et al., </a:t>
             </a:r>
             <a:r>
               <a:rPr lang="en-US" sz="11200" dirty="0" err="1" smtClean="0"/>
@@ -54385,11 +54970,11 @@
   <p:clrMapOvr>
     <a:masterClrMapping/>
   </p:clrMapOvr>
-  <mc:AlternateContent xmlns:mc="http://schemas.openxmlformats.org/markup-compatibility/2006" xmlns:p14="http://schemas.microsoft.com/office/powerpoint/2010/main">
-    <mc:Choice Requires="p14">
+  <mc:AlternateContent xmlns:mc="http://schemas.openxmlformats.org/markup-compatibility/2006">
+    <mc:Choice xmlns:p14="http://schemas.microsoft.com/office/powerpoint/2010/main" Requires="p14">
       <p:transition spd="slow" p14:dur="2000"/>
     </mc:Choice>
-    <mc:Fallback xmlns="">
+    <mc:Fallback>
       <p:transition spd="slow"/>
     </mc:Fallback>
   </mc:AlternateContent>
@@ -54746,8 +55331,21 @@
             </a:r>
             <a:r>
               <a:rPr lang="en-US" dirty="0"/>
-              <a:t>change headers</a:t>
-            </a:r>
+              <a:t>change </a:t>
+            </a:r>
+            <a:r>
+              <a:rPr lang="en-US" dirty="0" smtClean="0"/>
+              <a:t>headers (</a:t>
+            </a:r>
+            <a:r>
+              <a:rPr lang="en-US" dirty="0" err="1" smtClean="0"/>
+              <a:t>OpenFlow</a:t>
+            </a:r>
+            <a:r>
+              <a:rPr lang="en-US" dirty="0" smtClean="0"/>
+              <a:t> is very restricted in match and action)</a:t>
+            </a:r>
+            <a:endParaRPr lang="en-US" dirty="0"/>
           </a:p>
           <a:p>
             <a:endParaRPr lang="en-US" dirty="0" smtClean="0"/>
@@ -54772,23 +55370,11 @@
             </a:r>
             <a:r>
               <a:rPr lang="en-US" dirty="0"/>
-              <a:t>router algorithms never make it to production (PDQ, </a:t>
-            </a:r>
-            <a:r>
-              <a:rPr lang="en-US" dirty="0" err="1"/>
-              <a:t>pFabric</a:t>
-            </a:r>
-            <a:r>
-              <a:rPr lang="en-US" dirty="0"/>
-              <a:t>, D3, </a:t>
-            </a:r>
-            <a:r>
-              <a:rPr lang="en-US" dirty="0" err="1"/>
-              <a:t>CoDel</a:t>
+              <a:t>router algorithms never make it to production </a:t>
             </a:r>
             <a:r>
               <a:rPr lang="en-US" dirty="0" smtClean="0"/>
-              <a:t>)</a:t>
+              <a:t>(RED, WFQ, PIE, XCP)</a:t>
             </a:r>
             <a:endParaRPr lang="en-US" dirty="0"/>
           </a:p>
@@ -55040,11 +55626,11 @@
   <p:clrMapOvr>
     <a:masterClrMapping/>
   </p:clrMapOvr>
-  <mc:AlternateContent xmlns:mc="http://schemas.openxmlformats.org/markup-compatibility/2006" xmlns:p14="http://schemas.microsoft.com/office/powerpoint/2010/main">
-    <mc:Choice Requires="p14">
+  <mc:AlternateContent xmlns:mc="http://schemas.openxmlformats.org/markup-compatibility/2006">
+    <mc:Choice xmlns:p14="http://schemas.microsoft.com/office/powerpoint/2010/main" Requires="p14">
       <p:transition spd="slow" p14:dur="2000"/>
     </mc:Choice>
-    <mc:Fallback xmlns="">
+    <mc:Fallback>
       <p:transition spd="slow"/>
     </mc:Fallback>
   </mc:AlternateContent>
@@ -55625,11 +56211,7 @@
           <a:p>
             <a:r>
               <a:rPr lang="en-US" dirty="0" smtClean="0"/>
-              <a:t>People can’t make up their </a:t>
-            </a:r>
-            <a:r>
-              <a:rPr lang="en-US" dirty="0" smtClean="0"/>
-              <a:t>minds</a:t>
+              <a:t>People can’t make up their minds</a:t>
             </a:r>
             <a:endParaRPr lang="en-US" dirty="0" smtClean="0">
               <a:sym typeface="Wingdings" panose="05000000000000000000" pitchFamily="2" charset="2"/>
@@ -56533,11 +57115,11 @@
           <a:p>
             <a:r>
               <a:rPr lang="en-US" dirty="0" smtClean="0"/>
-              <a:t>Performance: 1 </a:t>
+              <a:t>Performance: 640 </a:t>
             </a:r>
             <a:r>
               <a:rPr lang="en-US" dirty="0" err="1" smtClean="0"/>
-              <a:t>Tbit</a:t>
+              <a:t>Gbit</a:t>
             </a:r>
             <a:r>
               <a:rPr lang="en-US" dirty="0" smtClean="0"/>
@@ -56552,6 +57134,24 @@
               <a:rPr lang="en-US" dirty="0" smtClean="0"/>
               <a:t>Programmability: New headers, new modifications to packet headers, flexibly size lookup tables, (limited) state modification</a:t>
             </a:r>
+          </a:p>
+          <a:p>
+            <a:endParaRPr lang="en-US" dirty="0"/>
+          </a:p>
+          <a:p>
+            <a:r>
+              <a:rPr lang="en-US" dirty="0" smtClean="0"/>
+              <a:t>Hardware architecture: Pipeline of match-action stages.</a:t>
+            </a:r>
+          </a:p>
+          <a:p>
+            <a:endParaRPr lang="en-US" dirty="0"/>
+          </a:p>
+          <a:p>
+            <a:endParaRPr lang="en-US" dirty="0"/>
+          </a:p>
+          <a:p>
+            <a:endParaRPr lang="en-US" dirty="0" smtClean="0"/>
           </a:p>
           <a:p>
             <a:endParaRPr lang="en-US" dirty="0" smtClean="0"/>
@@ -56657,6 +57257,55 @@
                                           <p:spTgt spid="5">
                                             <p:txEl>
                                               <p:pRg st="2" end="2"/>
+                                            </p:txEl>
+                                          </p:spTgt>
+                                        </p:tgtEl>
+                                        <p:attrNameLst>
+                                          <p:attrName>style.visibility</p:attrName>
+                                        </p:attrNameLst>
+                                      </p:cBhvr>
+                                      <p:to>
+                                        <p:strVal val="visible"/>
+                                      </p:to>
+                                    </p:set>
+                                  </p:childTnLst>
+                                </p:cTn>
+                              </p:par>
+                            </p:childTnLst>
+                          </p:cTn>
+                        </p:par>
+                      </p:childTnLst>
+                    </p:cTn>
+                  </p:par>
+                  <p:par>
+                    <p:cTn id="11" fill="hold">
+                      <p:stCondLst>
+                        <p:cond delay="indefinite"/>
+                      </p:stCondLst>
+                      <p:childTnLst>
+                        <p:par>
+                          <p:cTn id="12" fill="hold">
+                            <p:stCondLst>
+                              <p:cond delay="0"/>
+                            </p:stCondLst>
+                            <p:childTnLst>
+                              <p:par>
+                                <p:cTn id="13" presetID="1" presetClass="entr" presetSubtype="0" fill="hold" grpId="0" nodeType="clickEffect">
+                                  <p:stCondLst>
+                                    <p:cond delay="0"/>
+                                  </p:stCondLst>
+                                  <p:childTnLst>
+                                    <p:set>
+                                      <p:cBhvr>
+                                        <p:cTn id="14" dur="1" fill="hold">
+                                          <p:stCondLst>
+                                            <p:cond delay="0"/>
+                                          </p:stCondLst>
+                                        </p:cTn>
+                                        <p:tgtEl>
+                                          <p:spTgt spid="5">
+                                            <p:txEl>
+                                              <p:pRg st="4" end="4"/>
                                             </p:txEl>
                                           </p:spTgt>
                                         </p:tgtEl>

</xml_diff>

<commit_message>
Some more changes to RMT lecture
</commit_message>
<xml_diff>
--- a/RMT-lecture.pptx
+++ b/RMT-lecture.pptx
@@ -5,7 +5,7 @@
     <p:sldMasterId id="2147483672" r:id="rId1"/>
   </p:sldMasterIdLst>
   <p:notesMasterIdLst>
-    <p:notesMasterId r:id="rId45"/>
+    <p:notesMasterId r:id="rId46"/>
   </p:notesMasterIdLst>
   <p:sldIdLst>
     <p:sldId id="256" r:id="rId2"/>
@@ -43,14 +43,15 @@
     <p:sldId id="288" r:id="rId34"/>
     <p:sldId id="325" r:id="rId35"/>
     <p:sldId id="326" r:id="rId36"/>
-    <p:sldId id="314" r:id="rId37"/>
-    <p:sldId id="301" r:id="rId38"/>
-    <p:sldId id="299" r:id="rId39"/>
-    <p:sldId id="282" r:id="rId40"/>
-    <p:sldId id="298" r:id="rId41"/>
-    <p:sldId id="318" r:id="rId42"/>
-    <p:sldId id="319" r:id="rId43"/>
-    <p:sldId id="320" r:id="rId44"/>
+    <p:sldId id="327" r:id="rId37"/>
+    <p:sldId id="314" r:id="rId38"/>
+    <p:sldId id="301" r:id="rId39"/>
+    <p:sldId id="299" r:id="rId40"/>
+    <p:sldId id="282" r:id="rId41"/>
+    <p:sldId id="298" r:id="rId42"/>
+    <p:sldId id="318" r:id="rId43"/>
+    <p:sldId id="319" r:id="rId44"/>
+    <p:sldId id="320" r:id="rId45"/>
   </p:sldIdLst>
   <p:sldSz cx="12192000" cy="6858000"/>
   <p:notesSz cx="6858000" cy="9144000"/>
@@ -198,7 +199,6 @@
           </a:p>
         </c:rich>
       </c:tx>
-      <c:layout/>
       <c:overlay val="0"/>
       <c:spPr>
         <a:noFill/>
@@ -308,9 +308,7 @@
               <c:showPercent val="0"/>
               <c:showBubbleSize val="0"/>
               <c:extLst>
-                <c:ext xmlns:c15="http://schemas.microsoft.com/office/drawing/2012/chart" uri="{CE6537A1-D6FC-4f65-9D91-7224C49458BB}">
-                  <c15:layout/>
-                </c:ext>
+                <c:ext xmlns:c15="http://schemas.microsoft.com/office/drawing/2012/chart" uri="{CE6537A1-D6FC-4f65-9D91-7224C49458BB}"/>
               </c:extLst>
             </c:dLbl>
             <c:dLbl>
@@ -348,9 +346,7 @@
               <c:showPercent val="0"/>
               <c:showBubbleSize val="0"/>
               <c:extLst>
-                <c:ext xmlns:c15="http://schemas.microsoft.com/office/drawing/2012/chart" uri="{CE6537A1-D6FC-4f65-9D91-7224C49458BB}">
-                  <c15:layout/>
-                </c:ext>
+                <c:ext xmlns:c15="http://schemas.microsoft.com/office/drawing/2012/chart" uri="{CE6537A1-D6FC-4f65-9D91-7224C49458BB}"/>
               </c:extLst>
             </c:dLbl>
             <c:dLbl>
@@ -388,9 +384,7 @@
               <c:showPercent val="0"/>
               <c:showBubbleSize val="0"/>
               <c:extLst>
-                <c:ext xmlns:c15="http://schemas.microsoft.com/office/drawing/2012/chart" uri="{CE6537A1-D6FC-4f65-9D91-7224C49458BB}">
-                  <c15:layout/>
-                </c:ext>
+                <c:ext xmlns:c15="http://schemas.microsoft.com/office/drawing/2012/chart" uri="{CE6537A1-D6FC-4f65-9D91-7224C49458BB}"/>
               </c:extLst>
             </c:dLbl>
             <c:dLbl>
@@ -428,9 +422,7 @@
               <c:showPercent val="0"/>
               <c:showBubbleSize val="0"/>
               <c:extLst>
-                <c:ext xmlns:c15="http://schemas.microsoft.com/office/drawing/2012/chart" uri="{CE6537A1-D6FC-4f65-9D91-7224C49458BB}">
-                  <c15:layout/>
-                </c:ext>
+                <c:ext xmlns:c15="http://schemas.microsoft.com/office/drawing/2012/chart" uri="{CE6537A1-D6FC-4f65-9D91-7224C49458BB}"/>
               </c:extLst>
             </c:dLbl>
             <c:dLbl>
@@ -565,9 +557,7 @@
               <c:showPercent val="0"/>
               <c:showBubbleSize val="0"/>
               <c:extLst>
-                <c:ext xmlns:c15="http://schemas.microsoft.com/office/drawing/2012/chart" uri="{CE6537A1-D6FC-4f65-9D91-7224C49458BB}">
-                  <c15:layout/>
-                </c:ext>
+                <c:ext xmlns:c15="http://schemas.microsoft.com/office/drawing/2012/chart" uri="{CE6537A1-D6FC-4f65-9D91-7224C49458BB}"/>
               </c:extLst>
             </c:dLbl>
             <c:spPr>
@@ -730,7 +720,6 @@
           <c:dLbls>
             <c:dLbl>
               <c:idx val="0"/>
-              <c:layout/>
               <c:tx>
                 <c:rich>
                   <a:bodyPr/>
@@ -752,9 +741,7 @@
               <c:showPercent val="0"/>
               <c:showBubbleSize val="0"/>
               <c:extLst>
-                <c:ext xmlns:c15="http://schemas.microsoft.com/office/drawing/2012/chart" uri="{CE6537A1-D6FC-4f65-9D91-7224C49458BB}">
-                  <c15:layout/>
-                </c:ext>
+                <c:ext xmlns:c15="http://schemas.microsoft.com/office/drawing/2012/chart" uri="{CE6537A1-D6FC-4f65-9D91-7224C49458BB}"/>
               </c:extLst>
             </c:dLbl>
             <c:dLbl>
@@ -792,14 +779,11 @@
               <c:showPercent val="0"/>
               <c:showBubbleSize val="0"/>
               <c:extLst>
-                <c:ext xmlns:c15="http://schemas.microsoft.com/office/drawing/2012/chart" uri="{CE6537A1-D6FC-4f65-9D91-7224C49458BB}">
-                  <c15:layout/>
-                </c:ext>
+                <c:ext xmlns:c15="http://schemas.microsoft.com/office/drawing/2012/chart" uri="{CE6537A1-D6FC-4f65-9D91-7224C49458BB}"/>
               </c:extLst>
             </c:dLbl>
             <c:dLbl>
               <c:idx val="4"/>
-              <c:layout/>
               <c:tx>
                 <c:rich>
                   <a:bodyPr/>
@@ -821,14 +805,11 @@
               <c:showPercent val="0"/>
               <c:showBubbleSize val="0"/>
               <c:extLst>
-                <c:ext xmlns:c15="http://schemas.microsoft.com/office/drawing/2012/chart" uri="{CE6537A1-D6FC-4f65-9D91-7224C49458BB}">
-                  <c15:layout/>
-                </c:ext>
+                <c:ext xmlns:c15="http://schemas.microsoft.com/office/drawing/2012/chart" uri="{CE6537A1-D6FC-4f65-9D91-7224C49458BB}"/>
               </c:extLst>
             </c:dLbl>
             <c:dLbl>
               <c:idx val="6"/>
-              <c:layout/>
               <c:tx>
                 <c:rich>
                   <a:bodyPr/>
@@ -850,14 +831,11 @@
               <c:showPercent val="0"/>
               <c:showBubbleSize val="0"/>
               <c:extLst>
-                <c:ext xmlns:c15="http://schemas.microsoft.com/office/drawing/2012/chart" uri="{CE6537A1-D6FC-4f65-9D91-7224C49458BB}">
-                  <c15:layout/>
-                </c:ext>
+                <c:ext xmlns:c15="http://schemas.microsoft.com/office/drawing/2012/chart" uri="{CE6537A1-D6FC-4f65-9D91-7224C49458BB}"/>
               </c:extLst>
             </c:dLbl>
             <c:dLbl>
               <c:idx val="7"/>
-              <c:layout/>
               <c:tx>
                 <c:rich>
                   <a:bodyPr/>
@@ -878,9 +856,7 @@
               <c:showPercent val="0"/>
               <c:showBubbleSize val="0"/>
               <c:extLst>
-                <c:ext xmlns:c15="http://schemas.microsoft.com/office/drawing/2012/chart" uri="{CE6537A1-D6FC-4f65-9D91-7224C49458BB}">
-                  <c15:layout/>
-                </c:ext>
+                <c:ext xmlns:c15="http://schemas.microsoft.com/office/drawing/2012/chart" uri="{CE6537A1-D6FC-4f65-9D91-7224C49458BB}"/>
               </c:extLst>
             </c:dLbl>
             <c:spPr>
@@ -1010,11 +986,11 @@
         </c:dLbls>
         <c:marker val="1"/>
         <c:smooth val="0"/>
-        <c:axId val="1395888032"/>
-        <c:axId val="1395895648"/>
+        <c:axId val="1285330624"/>
+        <c:axId val="1467172784"/>
       </c:lineChart>
       <c:catAx>
-        <c:axId val="1395888032"/>
+        <c:axId val="1285330624"/>
         <c:scaling>
           <c:orientation val="minMax"/>
         </c:scaling>
@@ -1046,7 +1022,6 @@
               </a:p>
             </c:rich>
           </c:tx>
-          <c:layout/>
           <c:overlay val="0"/>
           <c:spPr>
             <a:noFill/>
@@ -1113,7 +1088,7 @@
             <a:endParaRPr lang="en-US"/>
           </a:p>
         </c:txPr>
-        <c:crossAx val="1395895648"/>
+        <c:crossAx val="1467172784"/>
         <c:crosses val="autoZero"/>
         <c:auto val="1"/>
         <c:lblAlgn val="ctr"/>
@@ -1121,7 +1096,7 @@
         <c:noMultiLvlLbl val="0"/>
       </c:catAx>
       <c:valAx>
-        <c:axId val="1395895648"/>
+        <c:axId val="1467172784"/>
         <c:scaling>
           <c:logBase val="10.0"/>
           <c:orientation val="minMax"/>
@@ -1174,7 +1149,6 @@
               </a:p>
             </c:rich>
           </c:tx>
-          <c:layout/>
           <c:overlay val="0"/>
           <c:spPr>
             <a:noFill/>
@@ -1235,7 +1209,7 @@
             <a:endParaRPr lang="en-US"/>
           </a:p>
         </c:txPr>
-        <c:crossAx val="1395888032"/>
+        <c:crossAx val="1285330624"/>
         <c:crosses val="autoZero"/>
         <c:crossBetween val="between"/>
       </c:valAx>
@@ -1249,7 +1223,6 @@
     </c:plotArea>
     <c:legend>
       <c:legendPos val="b"/>
-      <c:layout/>
       <c:overlay val="0"/>
       <c:spPr>
         <a:noFill/>
@@ -3978,10 +3951,12 @@
           <a:bodyPr/>
           <a:lstStyle/>
           <a:p>
-            <a:r>
-              <a:rPr lang="en-US" dirty="0" smtClean="0"/>
-              <a:t>Emphasize that this is a first step and things will get better.</a:t>
-            </a:r>
+            <a:endParaRPr lang="en-US" dirty="0" smtClean="0"/>
+          </a:p>
+          <a:p>
+            <a:endParaRPr lang="en-US" dirty="0" smtClean="0"/>
+          </a:p>
+          <a:p>
             <a:endParaRPr lang="en-US" dirty="0"/>
           </a:p>
         </p:txBody>
@@ -4066,6 +4041,27 @@
           <a:bodyPr/>
           <a:lstStyle/>
           <a:p>
+            <a:pPr lvl="1"/>
+            <a:r>
+              <a:rPr lang="en-US" dirty="0" smtClean="0"/>
+              <a:t>The steady state of a network is well understood.</a:t>
+            </a:r>
+          </a:p>
+          <a:p>
+            <a:pPr lvl="1"/>
+            <a:r>
+              <a:rPr lang="en-US" dirty="0" smtClean="0"/>
+              <a:t>When things change, people have a hard time debugging, and would like instrumentation.</a:t>
+            </a:r>
+            <a:endParaRPr lang="en-US" baseline="0" dirty="0" smtClean="0"/>
+          </a:p>
+          <a:p>
+            <a:endParaRPr lang="en-US" dirty="0" smtClean="0"/>
+          </a:p>
+          <a:p>
+            <a:endParaRPr lang="en-US" dirty="0" smtClean="0"/>
+          </a:p>
+          <a:p>
             <a:endParaRPr lang="en-US" dirty="0"/>
           </a:p>
         </p:txBody>
@@ -4096,7 +4092,7 @@
     </p:spTree>
     <p:extLst>
       <p:ext uri="{BB962C8B-B14F-4D97-AF65-F5344CB8AC3E}">
-        <p14:creationId xmlns:p14="http://schemas.microsoft.com/office/powerpoint/2010/main" val="1300451582"/>
+        <p14:creationId xmlns:p14="http://schemas.microsoft.com/office/powerpoint/2010/main" val="2093357049"/>
       </p:ext>
     </p:extLst>
   </p:cSld>
@@ -4133,12 +4129,7 @@
             <p:ph type="sldImg"/>
           </p:nvPr>
         </p:nvSpPr>
-        <p:spPr>
-          <a:xfrm>
-            <a:off x="685800" y="1143000"/>
-            <a:ext cx="5486400" cy="3086100"/>
-          </a:xfrm>
-        </p:spPr>
+        <p:spPr/>
       </p:sp>
       <p:sp>
         <p:nvSpPr>
@@ -4155,29 +4146,6 @@
           <a:bodyPr/>
           <a:lstStyle/>
           <a:p>
-            <a:r>
-              <a:rPr lang="en-US" dirty="0" smtClean="0"/>
-              <a:t>Too early to say if this will be widely adopted or not.</a:t>
-            </a:r>
-          </a:p>
-          <a:p>
-            <a:r>
-              <a:rPr lang="en-US" dirty="0" smtClean="0"/>
-              <a:t>Staid companies</a:t>
-            </a:r>
-            <a:r>
-              <a:rPr lang="en-US" baseline="0" dirty="0" smtClean="0"/>
-              <a:t> such as AT&amp;T and CISCO showing up at the working group meetings.</a:t>
-            </a:r>
-          </a:p>
-          <a:p>
-            <a:endParaRPr lang="en-US" baseline="0" dirty="0" smtClean="0"/>
-          </a:p>
-          <a:p>
-            <a:r>
-              <a:rPr lang="en-US" baseline="0" dirty="0" smtClean="0"/>
-              <a:t>Spend more time on these slides and less time on paper details.</a:t>
-            </a:r>
             <a:endParaRPr lang="en-US" dirty="0"/>
           </a:p>
         </p:txBody>
@@ -4208,7 +4176,7 @@
     </p:spTree>
     <p:extLst>
       <p:ext uri="{BB962C8B-B14F-4D97-AF65-F5344CB8AC3E}">
-        <p14:creationId xmlns:p14="http://schemas.microsoft.com/office/powerpoint/2010/main" val="2380004939"/>
+        <p14:creationId xmlns:p14="http://schemas.microsoft.com/office/powerpoint/2010/main" val="1300451582"/>
       </p:ext>
     </p:extLst>
   </p:cSld>
@@ -4269,7 +4237,26 @@
           <a:p>
             <a:r>
               <a:rPr lang="en-US" dirty="0" smtClean="0"/>
-              <a:t>Flesh this out a little more.</a:t>
+              <a:t>Too early to say if this will be widely adopted or not.</a:t>
+            </a:r>
+          </a:p>
+          <a:p>
+            <a:r>
+              <a:rPr lang="en-US" dirty="0" smtClean="0"/>
+              <a:t>Staid companies</a:t>
+            </a:r>
+            <a:r>
+              <a:rPr lang="en-US" baseline="0" dirty="0" smtClean="0"/>
+              <a:t> such as AT&amp;T and CISCO showing up at the working group meetings.</a:t>
+            </a:r>
+          </a:p>
+          <a:p>
+            <a:endParaRPr lang="en-US" baseline="0" dirty="0" smtClean="0"/>
+          </a:p>
+          <a:p>
+            <a:r>
+              <a:rPr lang="en-US" baseline="0" dirty="0" smtClean="0"/>
+              <a:t>Spend more time on these slides and less time on paper details.</a:t>
             </a:r>
             <a:endParaRPr lang="en-US" dirty="0"/>
           </a:p>
@@ -4301,7 +4288,7 @@
     </p:spTree>
     <p:extLst>
       <p:ext uri="{BB962C8B-B14F-4D97-AF65-F5344CB8AC3E}">
-        <p14:creationId xmlns:p14="http://schemas.microsoft.com/office/powerpoint/2010/main" val="1364917313"/>
+        <p14:creationId xmlns:p14="http://schemas.microsoft.com/office/powerpoint/2010/main" val="2380004939"/>
       </p:ext>
     </p:extLst>
   </p:cSld>
@@ -4362,23 +4349,7 @@
           <a:p>
             <a:r>
               <a:rPr lang="en-US" dirty="0" smtClean="0"/>
-              <a:t>Mention 28 nm CMOS earlier.</a:t>
-            </a:r>
-          </a:p>
-          <a:p>
-            <a:r>
-              <a:rPr lang="en-US" dirty="0" smtClean="0"/>
-              <a:t>Look at Nick’s slides on PISA.</a:t>
-            </a:r>
-          </a:p>
-          <a:p>
-            <a:r>
-              <a:rPr lang="en-US" dirty="0" smtClean="0"/>
-              <a:t>Figure out what points to emphasize:</a:t>
-            </a:r>
-            <a:r>
-              <a:rPr lang="en-US" baseline="0" dirty="0" smtClean="0"/>
-              <a:t> Logic doesn’t cost all that much relative to wires and memory isn’t too much. Add Nick’s slides on die area contributions of logic and memory.</a:t>
+              <a:t>Flesh this out a little more.</a:t>
             </a:r>
             <a:endParaRPr lang="en-US" dirty="0"/>
           </a:p>
@@ -4410,7 +4381,7 @@
     </p:spTree>
     <p:extLst>
       <p:ext uri="{BB962C8B-B14F-4D97-AF65-F5344CB8AC3E}">
-        <p14:creationId xmlns:p14="http://schemas.microsoft.com/office/powerpoint/2010/main" val="70594410"/>
+        <p14:creationId xmlns:p14="http://schemas.microsoft.com/office/powerpoint/2010/main" val="1364917313"/>
       </p:ext>
     </p:extLst>
   </p:cSld>
@@ -4449,8 +4420,8 @@
         </p:nvSpPr>
         <p:spPr>
           <a:xfrm>
-            <a:off x="381000" y="685800"/>
-            <a:ext cx="6096000" cy="3429000"/>
+            <a:off x="685800" y="1143000"/>
+            <a:ext cx="5486400" cy="3086100"/>
           </a:xfrm>
         </p:spPr>
       </p:sp>
@@ -4471,17 +4442,23 @@
           <a:p>
             <a:r>
               <a:rPr lang="en-US" dirty="0" smtClean="0"/>
-              <a:t>We will release the first version of the language soon.</a:t>
+              <a:t>Mention 28 nm CMOS earlier.</a:t>
             </a:r>
           </a:p>
           <a:p>
             <a:r>
               <a:rPr lang="en-US" dirty="0" smtClean="0"/>
-              <a:t>We are actively working on an improved version which fixed</a:t>
+              <a:t>Look at Nick’s slides on PISA.</a:t>
+            </a:r>
+          </a:p>
+          <a:p>
+            <a:r>
+              <a:rPr lang="en-US" dirty="0" smtClean="0"/>
+              <a:t>Figure out what points to emphasize:</a:t>
             </a:r>
             <a:r>
               <a:rPr lang="en-US" baseline="0" dirty="0" smtClean="0"/>
-              <a:t> some shortcomings – which we plan to release as well.</a:t>
+              <a:t> Logic doesn’t cost all that much relative to wires and memory isn’t too much. Add Nick’s slides on die area contributions of logic and memory.</a:t>
             </a:r>
             <a:endParaRPr lang="en-US" dirty="0"/>
           </a:p>
@@ -4497,20 +4474,12 @@
             <p:ph type="sldNum" sz="quarter" idx="10"/>
           </p:nvPr>
         </p:nvSpPr>
-        <p:spPr>
-          <a:xfrm>
-            <a:off x="3884613" y="8685213"/>
-            <a:ext cx="2971800" cy="457200"/>
-          </a:xfrm>
-          <a:prstGeom prst="rect">
-            <a:avLst/>
-          </a:prstGeom>
-        </p:spPr>
+        <p:spPr/>
         <p:txBody>
           <a:bodyPr/>
           <a:lstStyle/>
           <a:p>
-            <a:fld id="{D7C7F897-9DD6-3F44-9F39-5E102FFA3BB1}" type="slidenum">
+            <a:fld id="{AE764910-0912-401B-9F58-2B7602DC4522}" type="slidenum">
               <a:rPr lang="en-US" smtClean="0"/>
               <a:t>40</a:t>
             </a:fld>
@@ -4521,7 +4490,7 @@
     </p:spTree>
     <p:extLst>
       <p:ext uri="{BB962C8B-B14F-4D97-AF65-F5344CB8AC3E}">
-        <p14:creationId xmlns:p14="http://schemas.microsoft.com/office/powerpoint/2010/main" val="892162401"/>
+        <p14:creationId xmlns:p14="http://schemas.microsoft.com/office/powerpoint/2010/main" val="70594410"/>
       </p:ext>
     </p:extLst>
   </p:cSld>
@@ -4610,6 +4579,117 @@
     <p:extLst>
       <p:ext uri="{BB962C8B-B14F-4D97-AF65-F5344CB8AC3E}">
         <p14:creationId xmlns:p14="http://schemas.microsoft.com/office/powerpoint/2010/main" val="2099443857"/>
+      </p:ext>
+    </p:extLst>
+  </p:cSld>
+  <p:clrMapOvr>
+    <a:masterClrMapping/>
+  </p:clrMapOvr>
+</p:notes>
+</file>
+
+<file path=ppt/notesSlides/notesSlide30.xml><?xml version="1.0" encoding="utf-8"?>
+<p:notes xmlns:a="http://schemas.openxmlformats.org/drawingml/2006/main" xmlns:r="http://schemas.openxmlformats.org/officeDocument/2006/relationships" xmlns:p="http://schemas.openxmlformats.org/presentationml/2006/main">
+  <p:cSld>
+    <p:spTree>
+      <p:nvGrpSpPr>
+        <p:cNvPr id="1" name=""/>
+        <p:cNvGrpSpPr/>
+        <p:nvPr/>
+      </p:nvGrpSpPr>
+      <p:grpSpPr>
+        <a:xfrm>
+          <a:off x="0" y="0"/>
+          <a:ext cx="0" cy="0"/>
+          <a:chOff x="0" y="0"/>
+          <a:chExt cx="0" cy="0"/>
+        </a:xfrm>
+      </p:grpSpPr>
+      <p:sp>
+        <p:nvSpPr>
+          <p:cNvPr id="2" name="Slide Image Placeholder 1"/>
+          <p:cNvSpPr>
+            <a:spLocks noGrp="1" noRot="1" noChangeAspect="1"/>
+          </p:cNvSpPr>
+          <p:nvPr>
+            <p:ph type="sldImg"/>
+          </p:nvPr>
+        </p:nvSpPr>
+        <p:spPr>
+          <a:xfrm>
+            <a:off x="381000" y="685800"/>
+            <a:ext cx="6096000" cy="3429000"/>
+          </a:xfrm>
+        </p:spPr>
+      </p:sp>
+      <p:sp>
+        <p:nvSpPr>
+          <p:cNvPr id="3" name="Notes Placeholder 2"/>
+          <p:cNvSpPr>
+            <a:spLocks noGrp="1"/>
+          </p:cNvSpPr>
+          <p:nvPr>
+            <p:ph type="body" idx="1"/>
+          </p:nvPr>
+        </p:nvSpPr>
+        <p:spPr/>
+        <p:txBody>
+          <a:bodyPr/>
+          <a:lstStyle/>
+          <a:p>
+            <a:r>
+              <a:rPr lang="en-US" dirty="0" smtClean="0"/>
+              <a:t>We will release the first version of the language soon.</a:t>
+            </a:r>
+          </a:p>
+          <a:p>
+            <a:r>
+              <a:rPr lang="en-US" dirty="0" smtClean="0"/>
+              <a:t>We are actively working on an improved version which fixed</a:t>
+            </a:r>
+            <a:r>
+              <a:rPr lang="en-US" baseline="0" dirty="0" smtClean="0"/>
+              <a:t> some shortcomings – which we plan to release as well.</a:t>
+            </a:r>
+            <a:endParaRPr lang="en-US" dirty="0"/>
+          </a:p>
+        </p:txBody>
+      </p:sp>
+      <p:sp>
+        <p:nvSpPr>
+          <p:cNvPr id="4" name="Slide Number Placeholder 3"/>
+          <p:cNvSpPr>
+            <a:spLocks noGrp="1"/>
+          </p:cNvSpPr>
+          <p:nvPr>
+            <p:ph type="sldNum" sz="quarter" idx="10"/>
+          </p:nvPr>
+        </p:nvSpPr>
+        <p:spPr>
+          <a:xfrm>
+            <a:off x="3884613" y="8685213"/>
+            <a:ext cx="2971800" cy="457200"/>
+          </a:xfrm>
+          <a:prstGeom prst="rect">
+            <a:avLst/>
+          </a:prstGeom>
+        </p:spPr>
+        <p:txBody>
+          <a:bodyPr/>
+          <a:lstStyle/>
+          <a:p>
+            <a:fld id="{D7C7F897-9DD6-3F44-9F39-5E102FFA3BB1}" type="slidenum">
+              <a:rPr lang="en-US" smtClean="0"/>
+              <a:t>41</a:t>
+            </a:fld>
+            <a:endParaRPr lang="en-US"/>
+          </a:p>
+        </p:txBody>
+      </p:sp>
+    </p:spTree>
+    <p:extLst>
+      <p:ext uri="{BB962C8B-B14F-4D97-AF65-F5344CB8AC3E}">
+        <p14:creationId xmlns:p14="http://schemas.microsoft.com/office/powerpoint/2010/main" val="892162401"/>
       </p:ext>
     </p:extLst>
   </p:cSld>
@@ -19626,11 +19706,7 @@
             <a:pPr lvl="1"/>
             <a:r>
               <a:rPr lang="en-US" dirty="0" smtClean="0"/>
-              <a:t>Trade one memory </a:t>
-            </a:r>
-            <a:r>
-              <a:rPr lang="en-US" dirty="0" smtClean="0"/>
-              <a:t>dimension for another:</a:t>
+              <a:t>Trade one memory dimension for another:</a:t>
             </a:r>
           </a:p>
           <a:p>
@@ -19646,17 +19722,12 @@
               <a:rPr lang="en-US" dirty="0" smtClean="0"/>
               <a:t>A wider MAC address table with fewer rules.</a:t>
             </a:r>
-            <a:endParaRPr lang="en-US" dirty="0" smtClean="0"/>
           </a:p>
           <a:p>
             <a:pPr lvl="1"/>
             <a:r>
               <a:rPr lang="en-US" dirty="0" smtClean="0"/>
-              <a:t>Add a new </a:t>
-            </a:r>
-            <a:r>
-              <a:rPr lang="en-US" dirty="0" smtClean="0"/>
-              <a:t>table</a:t>
+              <a:t>Add a new table</a:t>
             </a:r>
           </a:p>
           <a:p>
@@ -19665,17 +19736,12 @@
               <a:rPr lang="en-US" dirty="0" smtClean="0"/>
               <a:t>Tunneling</a:t>
             </a:r>
-            <a:endParaRPr lang="en-US" dirty="0" smtClean="0"/>
           </a:p>
           <a:p>
             <a:pPr lvl="1"/>
             <a:r>
               <a:rPr lang="en-US" dirty="0" smtClean="0"/>
-              <a:t>Add a new header </a:t>
-            </a:r>
-            <a:r>
-              <a:rPr lang="en-US" dirty="0" smtClean="0"/>
-              <a:t>field</a:t>
+              <a:t>Add a new header field</a:t>
             </a:r>
           </a:p>
           <a:p>
@@ -19684,17 +19750,12 @@
               <a:rPr lang="en-US" dirty="0" smtClean="0"/>
               <a:t>VXLAN</a:t>
             </a:r>
-            <a:endParaRPr lang="en-US" dirty="0" smtClean="0"/>
           </a:p>
           <a:p>
             <a:pPr lvl="1"/>
             <a:r>
               <a:rPr lang="en-US" dirty="0" smtClean="0"/>
-              <a:t>Add a different </a:t>
-            </a:r>
-            <a:r>
-              <a:rPr lang="en-US" dirty="0" smtClean="0"/>
-              <a:t>action</a:t>
+              <a:t>Add a different action</a:t>
             </a:r>
           </a:p>
           <a:p>
@@ -19889,15 +19950,7 @@
           <a:p>
             <a:r>
               <a:rPr lang="en-US" dirty="0" smtClean="0"/>
-              <a:t>Configuring the </a:t>
-            </a:r>
-            <a:r>
-              <a:rPr lang="en-US" dirty="0" smtClean="0"/>
-              <a:t>RMT </a:t>
-            </a:r>
-            <a:r>
-              <a:rPr lang="en-US" dirty="0" smtClean="0"/>
-              <a:t>architecture</a:t>
+              <a:t>Configuring the RMT architecture</a:t>
             </a:r>
             <a:endParaRPr lang="en-US" dirty="0"/>
           </a:p>
@@ -23430,13 +23483,8 @@
           <a:p>
             <a:r>
               <a:rPr lang="en-US" dirty="0" smtClean="0"/>
-              <a:t>Configure TCAM based on parse </a:t>
-            </a:r>
-            <a:r>
-              <a:rPr lang="en-US" dirty="0" smtClean="0"/>
-              <a:t>graph</a:t>
-            </a:r>
-            <a:endParaRPr lang="en-US" dirty="0" smtClean="0"/>
+              <a:t>Configure TCAM based on parse graph</a:t>
+            </a:r>
           </a:p>
         </p:txBody>
       </p:sp>
@@ -34978,11 +35026,7 @@
           <a:p>
             <a:r>
               <a:rPr lang="en-US" dirty="0" smtClean="0"/>
-              <a:t>Data </a:t>
-            </a:r>
-            <a:r>
-              <a:rPr lang="en-US" dirty="0" smtClean="0"/>
-              <a:t>plane: packet-to-packet behavior of a switch, short timescales of a few ns</a:t>
+              <a:t>Data plane: packet-to-packet behavior of a switch, short timescales of a few ns</a:t>
             </a:r>
           </a:p>
           <a:p>
@@ -36170,15 +36214,7 @@
           <a:p>
             <a:r>
               <a:rPr lang="en-US" dirty="0" smtClean="0"/>
-              <a:t>Programming </a:t>
-            </a:r>
-            <a:r>
-              <a:rPr lang="en-US" dirty="0" smtClean="0"/>
-              <a:t>RMT: </a:t>
-            </a:r>
-            <a:r>
-              <a:rPr lang="en-US" dirty="0" smtClean="0"/>
-              <a:t>P4</a:t>
+              <a:t>Programming RMT: P4</a:t>
             </a:r>
             <a:endParaRPr lang="en-US" dirty="0"/>
           </a:p>
@@ -36244,15 +36280,7 @@
           <a:p>
             <a:r>
               <a:rPr lang="en-US" dirty="0" smtClean="0"/>
-              <a:t>SDN’s legacy: </a:t>
-            </a:r>
-            <a:r>
-              <a:rPr lang="en-US" dirty="0" smtClean="0"/>
-              <a:t>How </a:t>
-            </a:r>
-            <a:r>
-              <a:rPr lang="en-US" dirty="0" smtClean="0"/>
-              <a:t>do we retain control / data plane separation?</a:t>
+              <a:t>SDN’s legacy: How do we retain control / data plane separation?</a:t>
             </a:r>
             <a:endParaRPr lang="en-US" dirty="0"/>
           </a:p>
@@ -39070,22 +39098,14 @@
             <a:pPr lvl="1"/>
             <a:r>
               <a:rPr lang="en-US" dirty="0" smtClean="0"/>
-              <a:t>Programmable parser: </a:t>
-            </a:r>
+              <a:t>Programmable parser: headers, parsers</a:t>
+            </a:r>
+          </a:p>
+          <a:p>
+            <a:pPr lvl="1"/>
             <a:r>
               <a:rPr lang="en-US" dirty="0" smtClean="0"/>
-              <a:t>headers, parsers</a:t>
-            </a:r>
-          </a:p>
-          <a:p>
-            <a:pPr lvl="1"/>
-            <a:r>
-              <a:rPr lang="en-US" dirty="0" smtClean="0"/>
-              <a:t>Match-action: </a:t>
-            </a:r>
-            <a:r>
-              <a:rPr lang="en-US" dirty="0" smtClean="0"/>
-              <a:t>tables, actions</a:t>
+              <a:t>Match-action: tables, actions</a:t>
             </a:r>
           </a:p>
           <a:p>
@@ -39638,22 +39658,60 @@
             <a:pPr lvl="1"/>
             <a:r>
               <a:rPr lang="en-US" dirty="0" smtClean="0"/>
-              <a:t>The only constant is change. Gives you peace of mind.</a:t>
+              <a:t>But, the </a:t>
+            </a:r>
+            <a:r>
+              <a:rPr lang="en-US" dirty="0" smtClean="0"/>
+              <a:t>only constant is </a:t>
+            </a:r>
+            <a:r>
+              <a:rPr lang="en-US" dirty="0" smtClean="0"/>
+              <a:t>change.</a:t>
             </a:r>
           </a:p>
           <a:p>
             <a:pPr lvl="1"/>
             <a:r>
               <a:rPr lang="en-US" dirty="0" smtClean="0"/>
-              <a:t>Move beyond thinking about features to instructions.</a:t>
+              <a:t>Move </a:t>
+            </a:r>
+            <a:r>
+              <a:rPr lang="en-US" dirty="0" smtClean="0"/>
+              <a:t>beyond thinking about features to instructions.</a:t>
             </a:r>
           </a:p>
           <a:p>
             <a:pPr lvl="1"/>
             <a:r>
               <a:rPr lang="en-US" dirty="0" smtClean="0"/>
-              <a:t>Eliminate hardware bugs, everything is now software.</a:t>
-            </a:r>
+              <a:t>Eliminate hardware bugs, everything is now </a:t>
+            </a:r>
+            <a:r>
+              <a:rPr lang="en-US" dirty="0" smtClean="0"/>
+              <a:t>software/firmware.</a:t>
+            </a:r>
+          </a:p>
+          <a:p>
+            <a:pPr lvl="1"/>
+            <a:r>
+              <a:rPr lang="en-US" dirty="0" smtClean="0"/>
+              <a:t>Attractive to switch vendors like CISCO/Arista</a:t>
+            </a:r>
+          </a:p>
+          <a:p>
+            <a:pPr lvl="2"/>
+            <a:r>
+              <a:rPr lang="en-US" dirty="0" smtClean="0"/>
+              <a:t>Hardware development is costly.</a:t>
+            </a:r>
+          </a:p>
+          <a:p>
+            <a:pPr lvl="2"/>
+            <a:r>
+              <a:rPr lang="en-US" dirty="0" smtClean="0"/>
+              <a:t>Can be moved out of the company.</a:t>
+            </a:r>
+            <a:endParaRPr lang="en-US" dirty="0" smtClean="0"/>
           </a:p>
           <a:p>
             <a:pPr lvl="1"/>
@@ -39924,6 +39982,153 @@
                       </p:childTnLst>
                     </p:cTn>
                   </p:par>
+                  <p:par>
+                    <p:cTn id="23" fill="hold">
+                      <p:stCondLst>
+                        <p:cond delay="indefinite"/>
+                      </p:stCondLst>
+                      <p:childTnLst>
+                        <p:par>
+                          <p:cTn id="24" fill="hold">
+                            <p:stCondLst>
+                              <p:cond delay="0"/>
+                            </p:stCondLst>
+                            <p:childTnLst>
+                              <p:par>
+                                <p:cTn id="25" presetID="1" presetClass="entr" presetSubtype="0" fill="hold" nodeType="clickEffect">
+                                  <p:stCondLst>
+                                    <p:cond delay="0"/>
+                                  </p:stCondLst>
+                                  <p:childTnLst>
+                                    <p:set>
+                                      <p:cBhvr>
+                                        <p:cTn id="26" dur="1" fill="hold">
+                                          <p:stCondLst>
+                                            <p:cond delay="0"/>
+                                          </p:stCondLst>
+                                        </p:cTn>
+                                        <p:tgtEl>
+                                          <p:spTgt spid="3">
+                                            <p:txEl>
+                                              <p:pRg st="5" end="5"/>
+                                            </p:txEl>
+                                          </p:spTgt>
+                                        </p:tgtEl>
+                                        <p:attrNameLst>
+                                          <p:attrName>style.visibility</p:attrName>
+                                        </p:attrNameLst>
+                                      </p:cBhvr>
+                                      <p:to>
+                                        <p:strVal val="visible"/>
+                                      </p:to>
+                                    </p:set>
+                                  </p:childTnLst>
+                                </p:cTn>
+                              </p:par>
+                            </p:childTnLst>
+                          </p:cTn>
+                        </p:par>
+                      </p:childTnLst>
+                    </p:cTn>
+                  </p:par>
+                  <p:par>
+                    <p:cTn id="27" fill="hold">
+                      <p:stCondLst>
+                        <p:cond delay="indefinite"/>
+                      </p:stCondLst>
+                      <p:childTnLst>
+                        <p:par>
+                          <p:cTn id="28" fill="hold">
+                            <p:stCondLst>
+                              <p:cond delay="0"/>
+                            </p:stCondLst>
+                            <p:childTnLst>
+                              <p:par>
+                                <p:cTn id="29" presetID="1" presetClass="entr" presetSubtype="0" fill="hold" nodeType="clickEffect">
+                                  <p:stCondLst>
+                                    <p:cond delay="0"/>
+                                  </p:stCondLst>
+                                  <p:childTnLst>
+                                    <p:set>
+                                      <p:cBhvr>
+                                        <p:cTn id="30" dur="1" fill="hold">
+                                          <p:stCondLst>
+                                            <p:cond delay="0"/>
+                                          </p:stCondLst>
+                                        </p:cTn>
+                                        <p:tgtEl>
+                                          <p:spTgt spid="3">
+                                            <p:txEl>
+                                              <p:pRg st="6" end="6"/>
+                                            </p:txEl>
+                                          </p:spTgt>
+                                        </p:tgtEl>
+                                        <p:attrNameLst>
+                                          <p:attrName>style.visibility</p:attrName>
+                                        </p:attrNameLst>
+                                      </p:cBhvr>
+                                      <p:to>
+                                        <p:strVal val="visible"/>
+                                      </p:to>
+                                    </p:set>
+                                  </p:childTnLst>
+                                </p:cTn>
+                              </p:par>
+                            </p:childTnLst>
+                          </p:cTn>
+                        </p:par>
+                      </p:childTnLst>
+                    </p:cTn>
+                  </p:par>
+                  <p:par>
+                    <p:cTn id="31" fill="hold">
+                      <p:stCondLst>
+                        <p:cond delay="indefinite"/>
+                      </p:stCondLst>
+                      <p:childTnLst>
+                        <p:par>
+                          <p:cTn id="32" fill="hold">
+                            <p:stCondLst>
+                              <p:cond delay="0"/>
+                            </p:stCondLst>
+                            <p:childTnLst>
+                              <p:par>
+                                <p:cTn id="33" presetID="1" presetClass="entr" presetSubtype="0" fill="hold" nodeType="clickEffect">
+                                  <p:stCondLst>
+                                    <p:cond delay="0"/>
+                                  </p:stCondLst>
+                                  <p:childTnLst>
+                                    <p:set>
+                                      <p:cBhvr>
+                                        <p:cTn id="34" dur="1" fill="hold">
+                                          <p:stCondLst>
+                                            <p:cond delay="0"/>
+                                          </p:stCondLst>
+                                        </p:cTn>
+                                        <p:tgtEl>
+                                          <p:spTgt spid="3">
+                                            <p:txEl>
+                                              <p:pRg st="7" end="7"/>
+                                            </p:txEl>
+                                          </p:spTgt>
+                                        </p:tgtEl>
+                                        <p:attrNameLst>
+                                          <p:attrName>style.visibility</p:attrName>
+                                        </p:attrNameLst>
+                                      </p:cBhvr>
+                                      <p:to>
+                                        <p:strVal val="visible"/>
+                                      </p:to>
+                                    </p:set>
+                                  </p:childTnLst>
+                                </p:cTn>
+                              </p:par>
+                            </p:childTnLst>
+                          </p:cTn>
+                        </p:par>
+                      </p:childTnLst>
+                    </p:cTn>
+                  </p:par>
                 </p:childTnLst>
               </p:cTn>
               <p:prevCondLst>
@@ -39968,6 +40173,524 @@
       </p:grpSpPr>
       <p:sp>
         <p:nvSpPr>
+          <p:cNvPr id="2" name="Title 1"/>
+          <p:cNvSpPr>
+            <a:spLocks noGrp="1"/>
+          </p:cNvSpPr>
+          <p:nvPr>
+            <p:ph type="title"/>
+          </p:nvPr>
+        </p:nvSpPr>
+        <p:spPr/>
+        <p:txBody>
+          <a:bodyPr/>
+          <a:lstStyle/>
+          <a:p>
+            <a:r>
+              <a:rPr lang="en-US" dirty="0" smtClean="0"/>
+              <a:t>Why now?</a:t>
+            </a:r>
+            <a:endParaRPr lang="en-US" dirty="0"/>
+          </a:p>
+        </p:txBody>
+      </p:sp>
+      <p:sp>
+        <p:nvSpPr>
+          <p:cNvPr id="3" name="Content Placeholder 2"/>
+          <p:cNvSpPr>
+            <a:spLocks noGrp="1"/>
+          </p:cNvSpPr>
+          <p:nvPr>
+            <p:ph idx="1"/>
+          </p:nvPr>
+        </p:nvSpPr>
+        <p:spPr/>
+        <p:txBody>
+          <a:bodyPr>
+            <a:normAutofit/>
+          </a:bodyPr>
+          <a:lstStyle/>
+          <a:p>
+            <a:r>
+              <a:rPr lang="en-US" dirty="0" smtClean="0"/>
+              <a:t>When active </a:t>
+            </a:r>
+            <a:r>
+              <a:rPr lang="en-US" dirty="0"/>
+              <a:t>n</a:t>
+            </a:r>
+            <a:r>
+              <a:rPr lang="en-US" dirty="0" smtClean="0"/>
+              <a:t>etworks tried this is 1995, there was no pressing need</a:t>
+            </a:r>
+          </a:p>
+          <a:p>
+            <a:r>
+              <a:rPr lang="en-US" smtClean="0"/>
+              <a:t>What’s </a:t>
+            </a:r>
+            <a:r>
+              <a:rPr lang="en-US" dirty="0" smtClean="0"/>
+              <a:t>the killer app today?</a:t>
+            </a:r>
+          </a:p>
+          <a:p>
+            <a:pPr lvl="1"/>
+            <a:r>
+              <a:rPr lang="en-US" dirty="0" smtClean="0"/>
+              <a:t>For SDN, it was network virtualization.</a:t>
+            </a:r>
+          </a:p>
+          <a:p>
+            <a:pPr lvl="1"/>
+            <a:r>
+              <a:rPr lang="en-US" dirty="0" smtClean="0"/>
+              <a:t>I think it’s measurement/visibility/diagnostics/troubleshooting.</a:t>
+            </a:r>
+          </a:p>
+          <a:p>
+            <a:r>
+              <a:rPr lang="en-US" dirty="0" smtClean="0"/>
+              <a:t>Maybe push the application into the network:</a:t>
+            </a:r>
+          </a:p>
+          <a:p>
+            <a:pPr lvl="1"/>
+            <a:r>
+              <a:rPr lang="en-US" dirty="0" smtClean="0"/>
+              <a:t>Speculative </a:t>
+            </a:r>
+            <a:r>
+              <a:rPr lang="en-US" dirty="0" err="1" smtClean="0"/>
+              <a:t>Paxos</a:t>
+            </a:r>
+            <a:r>
+              <a:rPr lang="en-US" dirty="0" smtClean="0"/>
+              <a:t>, </a:t>
+            </a:r>
+            <a:r>
+              <a:rPr lang="en-US" dirty="0" err="1" smtClean="0"/>
+              <a:t>NetPaxos</a:t>
+            </a:r>
+            <a:r>
+              <a:rPr lang="en-US" dirty="0" smtClean="0"/>
+              <a:t>.</a:t>
+            </a:r>
+          </a:p>
+          <a:p>
+            <a:pPr lvl="1"/>
+            <a:r>
+              <a:rPr lang="en-US" dirty="0" smtClean="0"/>
+              <a:t>Like GPUs, maybe programmable switches will be used as application accelerators?</a:t>
+            </a:r>
+          </a:p>
+        </p:txBody>
+      </p:sp>
+    </p:spTree>
+    <p:extLst>
+      <p:ext uri="{BB962C8B-B14F-4D97-AF65-F5344CB8AC3E}">
+        <p14:creationId xmlns:p14="http://schemas.microsoft.com/office/powerpoint/2010/main" val="2094837881"/>
+      </p:ext>
+    </p:extLst>
+  </p:cSld>
+  <p:clrMapOvr>
+    <a:masterClrMapping/>
+  </p:clrMapOvr>
+  <p:timing>
+    <p:tnLst>
+      <p:par>
+        <p:cTn id="1" dur="indefinite" restart="never" nodeType="tmRoot">
+          <p:childTnLst>
+            <p:seq concurrent="1" nextAc="seek">
+              <p:cTn id="2" dur="indefinite" nodeType="mainSeq">
+                <p:childTnLst>
+                  <p:par>
+                    <p:cTn id="3" fill="hold">
+                      <p:stCondLst>
+                        <p:cond delay="indefinite"/>
+                      </p:stCondLst>
+                      <p:childTnLst>
+                        <p:par>
+                          <p:cTn id="4" fill="hold">
+                            <p:stCondLst>
+                              <p:cond delay="0"/>
+                            </p:stCondLst>
+                            <p:childTnLst>
+                              <p:par>
+                                <p:cTn id="5" presetID="1" presetClass="entr" presetSubtype="0" fill="hold" nodeType="clickEffect">
+                                  <p:stCondLst>
+                                    <p:cond delay="0"/>
+                                  </p:stCondLst>
+                                  <p:childTnLst>
+                                    <p:set>
+                                      <p:cBhvr>
+                                        <p:cTn id="6" dur="1" fill="hold">
+                                          <p:stCondLst>
+                                            <p:cond delay="0"/>
+                                          </p:stCondLst>
+                                        </p:cTn>
+                                        <p:tgtEl>
+                                          <p:spTgt spid="3">
+                                            <p:txEl>
+                                              <p:pRg st="0" end="0"/>
+                                            </p:txEl>
+                                          </p:spTgt>
+                                        </p:tgtEl>
+                                        <p:attrNameLst>
+                                          <p:attrName>style.visibility</p:attrName>
+                                        </p:attrNameLst>
+                                      </p:cBhvr>
+                                      <p:to>
+                                        <p:strVal val="visible"/>
+                                      </p:to>
+                                    </p:set>
+                                  </p:childTnLst>
+                                </p:cTn>
+                              </p:par>
+                            </p:childTnLst>
+                          </p:cTn>
+                        </p:par>
+                      </p:childTnLst>
+                    </p:cTn>
+                  </p:par>
+                  <p:par>
+                    <p:cTn id="7" fill="hold">
+                      <p:stCondLst>
+                        <p:cond delay="indefinite"/>
+                      </p:stCondLst>
+                      <p:childTnLst>
+                        <p:par>
+                          <p:cTn id="8" fill="hold">
+                            <p:stCondLst>
+                              <p:cond delay="0"/>
+                            </p:stCondLst>
+                            <p:childTnLst>
+                              <p:par>
+                                <p:cTn id="9" presetID="1" presetClass="entr" presetSubtype="0" fill="hold" nodeType="clickEffect">
+                                  <p:stCondLst>
+                                    <p:cond delay="0"/>
+                                  </p:stCondLst>
+                                  <p:childTnLst>
+                                    <p:set>
+                                      <p:cBhvr>
+                                        <p:cTn id="10" dur="1" fill="hold">
+                                          <p:stCondLst>
+                                            <p:cond delay="0"/>
+                                          </p:stCondLst>
+                                        </p:cTn>
+                                        <p:tgtEl>
+                                          <p:spTgt spid="3">
+                                            <p:txEl>
+                                              <p:pRg st="1" end="1"/>
+                                            </p:txEl>
+                                          </p:spTgt>
+                                        </p:tgtEl>
+                                        <p:attrNameLst>
+                                          <p:attrName>style.visibility</p:attrName>
+                                        </p:attrNameLst>
+                                      </p:cBhvr>
+                                      <p:to>
+                                        <p:strVal val="visible"/>
+                                      </p:to>
+                                    </p:set>
+                                  </p:childTnLst>
+                                </p:cTn>
+                              </p:par>
+                            </p:childTnLst>
+                          </p:cTn>
+                        </p:par>
+                      </p:childTnLst>
+                    </p:cTn>
+                  </p:par>
+                  <p:par>
+                    <p:cTn id="11" fill="hold">
+                      <p:stCondLst>
+                        <p:cond delay="indefinite"/>
+                      </p:stCondLst>
+                      <p:childTnLst>
+                        <p:par>
+                          <p:cTn id="12" fill="hold">
+                            <p:stCondLst>
+                              <p:cond delay="0"/>
+                            </p:stCondLst>
+                            <p:childTnLst>
+                              <p:par>
+                                <p:cTn id="13" presetID="1" presetClass="entr" presetSubtype="0" fill="hold" nodeType="clickEffect">
+                                  <p:stCondLst>
+                                    <p:cond delay="0"/>
+                                  </p:stCondLst>
+                                  <p:childTnLst>
+                                    <p:set>
+                                      <p:cBhvr>
+                                        <p:cTn id="14" dur="1" fill="hold">
+                                          <p:stCondLst>
+                                            <p:cond delay="0"/>
+                                          </p:stCondLst>
+                                        </p:cTn>
+                                        <p:tgtEl>
+                                          <p:spTgt spid="3">
+                                            <p:txEl>
+                                              <p:pRg st="2" end="2"/>
+                                            </p:txEl>
+                                          </p:spTgt>
+                                        </p:tgtEl>
+                                        <p:attrNameLst>
+                                          <p:attrName>style.visibility</p:attrName>
+                                        </p:attrNameLst>
+                                      </p:cBhvr>
+                                      <p:to>
+                                        <p:strVal val="visible"/>
+                                      </p:to>
+                                    </p:set>
+                                  </p:childTnLst>
+                                </p:cTn>
+                              </p:par>
+                            </p:childTnLst>
+                          </p:cTn>
+                        </p:par>
+                      </p:childTnLst>
+                    </p:cTn>
+                  </p:par>
+                  <p:par>
+                    <p:cTn id="15" fill="hold">
+                      <p:stCondLst>
+                        <p:cond delay="indefinite"/>
+                      </p:stCondLst>
+                      <p:childTnLst>
+                        <p:par>
+                          <p:cTn id="16" fill="hold">
+                            <p:stCondLst>
+                              <p:cond delay="0"/>
+                            </p:stCondLst>
+                            <p:childTnLst>
+                              <p:par>
+                                <p:cTn id="17" presetID="1" presetClass="entr" presetSubtype="0" fill="hold" nodeType="clickEffect">
+                                  <p:stCondLst>
+                                    <p:cond delay="0"/>
+                                  </p:stCondLst>
+                                  <p:childTnLst>
+                                    <p:set>
+                                      <p:cBhvr>
+                                        <p:cTn id="18" dur="1" fill="hold">
+                                          <p:stCondLst>
+                                            <p:cond delay="0"/>
+                                          </p:stCondLst>
+                                        </p:cTn>
+                                        <p:tgtEl>
+                                          <p:spTgt spid="3">
+                                            <p:txEl>
+                                              <p:pRg st="3" end="3"/>
+                                            </p:txEl>
+                                          </p:spTgt>
+                                        </p:tgtEl>
+                                        <p:attrNameLst>
+                                          <p:attrName>style.visibility</p:attrName>
+                                        </p:attrNameLst>
+                                      </p:cBhvr>
+                                      <p:to>
+                                        <p:strVal val="visible"/>
+                                      </p:to>
+                                    </p:set>
+                                  </p:childTnLst>
+                                </p:cTn>
+                              </p:par>
+                            </p:childTnLst>
+                          </p:cTn>
+                        </p:par>
+                      </p:childTnLst>
+                    </p:cTn>
+                  </p:par>
+                  <p:par>
+                    <p:cTn id="19" fill="hold">
+                      <p:stCondLst>
+                        <p:cond delay="indefinite"/>
+                      </p:stCondLst>
+                      <p:childTnLst>
+                        <p:par>
+                          <p:cTn id="20" fill="hold">
+                            <p:stCondLst>
+                              <p:cond delay="0"/>
+                            </p:stCondLst>
+                            <p:childTnLst>
+                              <p:par>
+                                <p:cTn id="21" presetID="1" presetClass="entr" presetSubtype="0" fill="hold" nodeType="clickEffect">
+                                  <p:stCondLst>
+                                    <p:cond delay="0"/>
+                                  </p:stCondLst>
+                                  <p:childTnLst>
+                                    <p:set>
+                                      <p:cBhvr>
+                                        <p:cTn id="22" dur="1" fill="hold">
+                                          <p:stCondLst>
+                                            <p:cond delay="0"/>
+                                          </p:stCondLst>
+                                        </p:cTn>
+                                        <p:tgtEl>
+                                          <p:spTgt spid="3">
+                                            <p:txEl>
+                                              <p:pRg st="4" end="4"/>
+                                            </p:txEl>
+                                          </p:spTgt>
+                                        </p:tgtEl>
+                                        <p:attrNameLst>
+                                          <p:attrName>style.visibility</p:attrName>
+                                        </p:attrNameLst>
+                                      </p:cBhvr>
+                                      <p:to>
+                                        <p:strVal val="visible"/>
+                                      </p:to>
+                                    </p:set>
+                                  </p:childTnLst>
+                                </p:cTn>
+                              </p:par>
+                            </p:childTnLst>
+                          </p:cTn>
+                        </p:par>
+                      </p:childTnLst>
+                    </p:cTn>
+                  </p:par>
+                  <p:par>
+                    <p:cTn id="23" fill="hold">
+                      <p:stCondLst>
+                        <p:cond delay="indefinite"/>
+                      </p:stCondLst>
+                      <p:childTnLst>
+                        <p:par>
+                          <p:cTn id="24" fill="hold">
+                            <p:stCondLst>
+                              <p:cond delay="0"/>
+                            </p:stCondLst>
+                            <p:childTnLst>
+                              <p:par>
+                                <p:cTn id="25" presetID="1" presetClass="entr" presetSubtype="0" fill="hold" nodeType="clickEffect">
+                                  <p:stCondLst>
+                                    <p:cond delay="0"/>
+                                  </p:stCondLst>
+                                  <p:childTnLst>
+                                    <p:set>
+                                      <p:cBhvr>
+                                        <p:cTn id="26" dur="1" fill="hold">
+                                          <p:stCondLst>
+                                            <p:cond delay="0"/>
+                                          </p:stCondLst>
+                                        </p:cTn>
+                                        <p:tgtEl>
+                                          <p:spTgt spid="3">
+                                            <p:txEl>
+                                              <p:pRg st="5" end="5"/>
+                                            </p:txEl>
+                                          </p:spTgt>
+                                        </p:tgtEl>
+                                        <p:attrNameLst>
+                                          <p:attrName>style.visibility</p:attrName>
+                                        </p:attrNameLst>
+                                      </p:cBhvr>
+                                      <p:to>
+                                        <p:strVal val="visible"/>
+                                      </p:to>
+                                    </p:set>
+                                  </p:childTnLst>
+                                </p:cTn>
+                              </p:par>
+                            </p:childTnLst>
+                          </p:cTn>
+                        </p:par>
+                      </p:childTnLst>
+                    </p:cTn>
+                  </p:par>
+                  <p:par>
+                    <p:cTn id="27" fill="hold">
+                      <p:stCondLst>
+                        <p:cond delay="indefinite"/>
+                      </p:stCondLst>
+                      <p:childTnLst>
+                        <p:par>
+                          <p:cTn id="28" fill="hold">
+                            <p:stCondLst>
+                              <p:cond delay="0"/>
+                            </p:stCondLst>
+                            <p:childTnLst>
+                              <p:par>
+                                <p:cTn id="29" presetID="1" presetClass="entr" presetSubtype="0" fill="hold" nodeType="clickEffect">
+                                  <p:stCondLst>
+                                    <p:cond delay="0"/>
+                                  </p:stCondLst>
+                                  <p:childTnLst>
+                                    <p:set>
+                                      <p:cBhvr>
+                                        <p:cTn id="30" dur="1" fill="hold">
+                                          <p:stCondLst>
+                                            <p:cond delay="0"/>
+                                          </p:stCondLst>
+                                        </p:cTn>
+                                        <p:tgtEl>
+                                          <p:spTgt spid="3">
+                                            <p:txEl>
+                                              <p:pRg st="6" end="6"/>
+                                            </p:txEl>
+                                          </p:spTgt>
+                                        </p:tgtEl>
+                                        <p:attrNameLst>
+                                          <p:attrName>style.visibility</p:attrName>
+                                        </p:attrNameLst>
+                                      </p:cBhvr>
+                                      <p:to>
+                                        <p:strVal val="visible"/>
+                                      </p:to>
+                                    </p:set>
+                                  </p:childTnLst>
+                                </p:cTn>
+                              </p:par>
+                            </p:childTnLst>
+                          </p:cTn>
+                        </p:par>
+                      </p:childTnLst>
+                    </p:cTn>
+                  </p:par>
+                </p:childTnLst>
+              </p:cTn>
+              <p:prevCondLst>
+                <p:cond evt="onPrev" delay="0">
+                  <p:tgtEl>
+                    <p:sldTgt/>
+                  </p:tgtEl>
+                </p:cond>
+              </p:prevCondLst>
+              <p:nextCondLst>
+                <p:cond evt="onNext" delay="0">
+                  <p:tgtEl>
+                    <p:sldTgt/>
+                  </p:tgtEl>
+                </p:cond>
+              </p:nextCondLst>
+            </p:seq>
+          </p:childTnLst>
+        </p:cTn>
+      </p:par>
+    </p:tnLst>
+  </p:timing>
+</p:sld>
+</file>
+
+<file path=ppt/slides/slide37.xml><?xml version="1.0" encoding="utf-8"?>
+<p:sld xmlns:a="http://schemas.openxmlformats.org/drawingml/2006/main" xmlns:r="http://schemas.openxmlformats.org/officeDocument/2006/relationships" xmlns:p="http://schemas.openxmlformats.org/presentationml/2006/main">
+  <p:cSld>
+    <p:spTree>
+      <p:nvGrpSpPr>
+        <p:cNvPr id="1" name=""/>
+        <p:cNvGrpSpPr/>
+        <p:nvPr/>
+      </p:nvGrpSpPr>
+      <p:grpSpPr>
+        <a:xfrm>
+          <a:off x="0" y="0"/>
+          <a:ext cx="0" cy="0"/>
+          <a:chOff x="0" y="0"/>
+          <a:chExt cx="0" cy="0"/>
+        </a:xfrm>
+      </p:grpSpPr>
+      <p:sp>
+        <p:nvSpPr>
           <p:cNvPr id="4" name="Title 3"/>
           <p:cNvSpPr>
             <a:spLocks noGrp="1"/>
@@ -40028,7 +40751,7 @@
 </p:sld>
 </file>
 
-<file path=ppt/slides/slide37.xml><?xml version="1.0" encoding="utf-8"?>
+<file path=ppt/slides/slide38.xml><?xml version="1.0" encoding="utf-8"?>
 <p:sld xmlns:a="http://schemas.openxmlformats.org/drawingml/2006/main" xmlns:r="http://schemas.openxmlformats.org/officeDocument/2006/relationships" xmlns:p="http://schemas.openxmlformats.org/presentationml/2006/main">
   <p:cSld>
     <p:spTree>
@@ -40424,7 +41147,7 @@
 </p:sld>
 </file>
 
-<file path=ppt/slides/slide38.xml><?xml version="1.0" encoding="utf-8"?>
+<file path=ppt/slides/slide39.xml><?xml version="1.0" encoding="utf-8"?>
 <p:sld xmlns:a="http://schemas.openxmlformats.org/drawingml/2006/main" xmlns:r="http://schemas.openxmlformats.org/officeDocument/2006/relationships" xmlns:p="http://schemas.openxmlformats.org/presentationml/2006/main">
   <p:cSld>
     <p:spTree>
@@ -40879,7 +41602,97 @@
 </p:sld>
 </file>
 
-<file path=ppt/slides/slide39.xml><?xml version="1.0" encoding="utf-8"?>
+<file path=ppt/slides/slide4.xml><?xml version="1.0" encoding="utf-8"?>
+<p:sld xmlns:a="http://schemas.openxmlformats.org/drawingml/2006/main" xmlns:r="http://schemas.openxmlformats.org/officeDocument/2006/relationships" xmlns:p="http://schemas.openxmlformats.org/presentationml/2006/main">
+  <p:cSld>
+    <p:spTree>
+      <p:nvGrpSpPr>
+        <p:cNvPr id="1" name=""/>
+        <p:cNvGrpSpPr/>
+        <p:nvPr/>
+      </p:nvGrpSpPr>
+      <p:grpSpPr>
+        <a:xfrm>
+          <a:off x="0" y="0"/>
+          <a:ext cx="0" cy="0"/>
+          <a:chOff x="0" y="0"/>
+          <a:chExt cx="0" cy="0"/>
+        </a:xfrm>
+      </p:grpSpPr>
+      <p:sp>
+        <p:nvSpPr>
+          <p:cNvPr id="2" name="Title 1"/>
+          <p:cNvSpPr>
+            <a:spLocks noGrp="1"/>
+          </p:cNvSpPr>
+          <p:nvPr>
+            <p:ph type="title"/>
+          </p:nvPr>
+        </p:nvSpPr>
+        <p:spPr/>
+        <p:txBody>
+          <a:bodyPr/>
+          <a:lstStyle/>
+          <a:p>
+            <a:r>
+              <a:rPr lang="en-US" dirty="0" smtClean="0"/>
+              <a:t>Software Defined Networking</a:t>
+            </a:r>
+            <a:endParaRPr lang="en-US" dirty="0"/>
+          </a:p>
+        </p:txBody>
+      </p:sp>
+      <p:sp>
+        <p:nvSpPr>
+          <p:cNvPr id="6" name="TextBox 5"/>
+          <p:cNvSpPr txBox="1"/>
+          <p:nvPr/>
+        </p:nvSpPr>
+        <p:spPr>
+          <a:xfrm>
+            <a:off x="318400" y="3009900"/>
+            <a:ext cx="11863440" cy="646331"/>
+          </a:xfrm>
+          <a:prstGeom prst="rect">
+            <a:avLst/>
+          </a:prstGeom>
+          <a:noFill/>
+        </p:spPr>
+        <p:txBody>
+          <a:bodyPr wrap="none" rtlCol="0">
+            <a:spAutoFit/>
+          </a:bodyPr>
+          <a:lstStyle/>
+          <a:p>
+            <a:r>
+              <a:rPr lang="en-US" sz="3600" dirty="0" smtClean="0"/>
+              <a:t>One big idea: Separate network control plane from data plane.</a:t>
+            </a:r>
+            <a:endParaRPr lang="en-US" sz="3600" dirty="0"/>
+          </a:p>
+        </p:txBody>
+      </p:sp>
+    </p:spTree>
+    <p:extLst>
+      <p:ext uri="{BB962C8B-B14F-4D97-AF65-F5344CB8AC3E}">
+        <p14:creationId xmlns:p14="http://schemas.microsoft.com/office/powerpoint/2010/main" val="275433245"/>
+      </p:ext>
+    </p:extLst>
+  </p:cSld>
+  <p:clrMapOvr>
+    <a:masterClrMapping/>
+  </p:clrMapOvr>
+  <p:timing>
+    <p:tnLst>
+      <p:par>
+        <p:cTn id="1" dur="indefinite" restart="never" nodeType="tmRoot"/>
+      </p:par>
+    </p:tnLst>
+  </p:timing>
+</p:sld>
+</file>
+
+<file path=ppt/slides/slide40.xml><?xml version="1.0" encoding="utf-8"?>
 <p:sld xmlns:a="http://schemas.openxmlformats.org/drawingml/2006/main" xmlns:r="http://schemas.openxmlformats.org/officeDocument/2006/relationships" xmlns:p="http://schemas.openxmlformats.org/presentationml/2006/main" show="0">
   <p:cSld>
     <p:spTree>
@@ -41020,7 +41833,7 @@
           <a:p>
             <a:fld id="{D5B0D96D-3F5C-E948-A9F0-6481128465F5}" type="slidenum">
               <a:rPr lang="en-US" smtClean="0"/>
-              <a:t>39</a:t>
+              <a:t>40</a:t>
             </a:fld>
             <a:endParaRPr lang="en-US"/>
           </a:p>
@@ -41317,337 +42130,6 @@
 </p:sld>
 </file>
 
-<file path=ppt/slides/slide4.xml><?xml version="1.0" encoding="utf-8"?>
-<p:sld xmlns:a="http://schemas.openxmlformats.org/drawingml/2006/main" xmlns:r="http://schemas.openxmlformats.org/officeDocument/2006/relationships" xmlns:p="http://schemas.openxmlformats.org/presentationml/2006/main">
-  <p:cSld>
-    <p:spTree>
-      <p:nvGrpSpPr>
-        <p:cNvPr id="1" name=""/>
-        <p:cNvGrpSpPr/>
-        <p:nvPr/>
-      </p:nvGrpSpPr>
-      <p:grpSpPr>
-        <a:xfrm>
-          <a:off x="0" y="0"/>
-          <a:ext cx="0" cy="0"/>
-          <a:chOff x="0" y="0"/>
-          <a:chExt cx="0" cy="0"/>
-        </a:xfrm>
-      </p:grpSpPr>
-      <p:sp>
-        <p:nvSpPr>
-          <p:cNvPr id="2" name="Title 1"/>
-          <p:cNvSpPr>
-            <a:spLocks noGrp="1"/>
-          </p:cNvSpPr>
-          <p:nvPr>
-            <p:ph type="title"/>
-          </p:nvPr>
-        </p:nvSpPr>
-        <p:spPr/>
-        <p:txBody>
-          <a:bodyPr/>
-          <a:lstStyle/>
-          <a:p>
-            <a:r>
-              <a:rPr lang="en-US" dirty="0" smtClean="0"/>
-              <a:t>Software Defined Networking</a:t>
-            </a:r>
-            <a:endParaRPr lang="en-US" dirty="0"/>
-          </a:p>
-        </p:txBody>
-      </p:sp>
-      <p:sp>
-        <p:nvSpPr>
-          <p:cNvPr id="6" name="TextBox 5"/>
-          <p:cNvSpPr txBox="1"/>
-          <p:nvPr/>
-        </p:nvSpPr>
-        <p:spPr>
-          <a:xfrm>
-            <a:off x="318400" y="3009900"/>
-            <a:ext cx="11863440" cy="646331"/>
-          </a:xfrm>
-          <a:prstGeom prst="rect">
-            <a:avLst/>
-          </a:prstGeom>
-          <a:noFill/>
-        </p:spPr>
-        <p:txBody>
-          <a:bodyPr wrap="none" rtlCol="0">
-            <a:spAutoFit/>
-          </a:bodyPr>
-          <a:lstStyle/>
-          <a:p>
-            <a:r>
-              <a:rPr lang="en-US" sz="3600" dirty="0" smtClean="0"/>
-              <a:t>One big idea: Separate network control plane from data plane.</a:t>
-            </a:r>
-            <a:endParaRPr lang="en-US" sz="3600" dirty="0"/>
-          </a:p>
-        </p:txBody>
-      </p:sp>
-    </p:spTree>
-    <p:extLst>
-      <p:ext uri="{BB962C8B-B14F-4D97-AF65-F5344CB8AC3E}">
-        <p14:creationId xmlns:p14="http://schemas.microsoft.com/office/powerpoint/2010/main" val="275433245"/>
-      </p:ext>
-    </p:extLst>
-  </p:cSld>
-  <p:clrMapOvr>
-    <a:masterClrMapping/>
-  </p:clrMapOvr>
-  <p:timing>
-    <p:tnLst>
-      <p:par>
-        <p:cTn id="1" dur="indefinite" restart="never" nodeType="tmRoot"/>
-      </p:par>
-    </p:tnLst>
-  </p:timing>
-</p:sld>
-</file>
-
-<file path=ppt/slides/slide40.xml><?xml version="1.0" encoding="utf-8"?>
-<p:sld xmlns:a="http://schemas.openxmlformats.org/drawingml/2006/main" xmlns:r="http://schemas.openxmlformats.org/officeDocument/2006/relationships" xmlns:p="http://schemas.openxmlformats.org/presentationml/2006/main" show="0">
-  <p:cSld>
-    <p:spTree>
-      <p:nvGrpSpPr>
-        <p:cNvPr id="1" name=""/>
-        <p:cNvGrpSpPr/>
-        <p:nvPr/>
-      </p:nvGrpSpPr>
-      <p:grpSpPr>
-        <a:xfrm>
-          <a:off x="0" y="0"/>
-          <a:ext cx="0" cy="0"/>
-          <a:chOff x="0" y="0"/>
-          <a:chExt cx="0" cy="0"/>
-        </a:xfrm>
-      </p:grpSpPr>
-      <p:sp>
-        <p:nvSpPr>
-          <p:cNvPr id="2" name="Title 1"/>
-          <p:cNvSpPr>
-            <a:spLocks noGrp="1"/>
-          </p:cNvSpPr>
-          <p:nvPr>
-            <p:ph type="title"/>
-          </p:nvPr>
-        </p:nvSpPr>
-        <p:spPr/>
-        <p:txBody>
-          <a:bodyPr/>
-          <a:lstStyle/>
-          <a:p>
-            <a:r>
-              <a:rPr lang="en-US" dirty="0" smtClean="0"/>
-              <a:t>P4 Summary</a:t>
-            </a:r>
-            <a:endParaRPr lang="en-US" dirty="0"/>
-          </a:p>
-        </p:txBody>
-      </p:sp>
-      <p:sp>
-        <p:nvSpPr>
-          <p:cNvPr id="3" name="Content Placeholder 2"/>
-          <p:cNvSpPr>
-            <a:spLocks noGrp="1"/>
-          </p:cNvSpPr>
-          <p:nvPr>
-            <p:ph idx="1"/>
-          </p:nvPr>
-        </p:nvSpPr>
-        <p:spPr>
-          <a:xfrm>
-            <a:off x="1028700" y="1891853"/>
-            <a:ext cx="9313863" cy="3743773"/>
-          </a:xfrm>
-        </p:spPr>
-        <p:txBody>
-          <a:bodyPr>
-            <a:noAutofit/>
-          </a:bodyPr>
-          <a:lstStyle/>
-          <a:p>
-            <a:pPr>
-              <a:lnSpc>
-                <a:spcPct val="80000"/>
-              </a:lnSpc>
-            </a:pPr>
-            <a:r>
-              <a:rPr lang="en-US" dirty="0">
-                <a:solidFill>
-                  <a:srgbClr val="000000"/>
-                </a:solidFill>
-              </a:rPr>
-              <a:t>Simple language</a:t>
-            </a:r>
-          </a:p>
-          <a:p>
-            <a:pPr lvl="1">
-              <a:lnSpc>
-                <a:spcPct val="80000"/>
-              </a:lnSpc>
-            </a:pPr>
-            <a:r>
-              <a:rPr lang="en-US" sz="2800" dirty="0">
-                <a:solidFill>
-                  <a:srgbClr val="000000"/>
-                </a:solidFill>
-              </a:rPr>
-              <a:t>Parsing, bit-field manipulation, table lookup, </a:t>
-            </a:r>
-            <a:br>
-              <a:rPr lang="en-US" sz="2800" dirty="0">
-                <a:solidFill>
-                  <a:srgbClr val="000000"/>
-                </a:solidFill>
-              </a:rPr>
-            </a:br>
-            <a:r>
-              <a:rPr lang="en-US" sz="2800" dirty="0">
-                <a:solidFill>
-                  <a:srgbClr val="000000"/>
-                </a:solidFill>
-              </a:rPr>
-              <a:t>control flow, packet reassembly</a:t>
-            </a:r>
-          </a:p>
-          <a:p>
-            <a:pPr>
-              <a:lnSpc>
-                <a:spcPct val="80000"/>
-              </a:lnSpc>
-            </a:pPr>
-            <a:r>
-              <a:rPr lang="en-US" dirty="0">
-                <a:solidFill>
-                  <a:srgbClr val="000000"/>
-                </a:solidFill>
-              </a:rPr>
-              <a:t>Efficient execution (high speed switching)</a:t>
-            </a:r>
-          </a:p>
-          <a:p>
-            <a:pPr>
-              <a:lnSpc>
-                <a:spcPct val="80000"/>
-              </a:lnSpc>
-            </a:pPr>
-            <a:r>
-              <a:rPr lang="en-US" dirty="0">
-                <a:solidFill>
-                  <a:srgbClr val="000000"/>
-                </a:solidFill>
-              </a:rPr>
-              <a:t>Simple cost model</a:t>
-            </a:r>
-          </a:p>
-          <a:p>
-            <a:pPr>
-              <a:lnSpc>
-                <a:spcPct val="80000"/>
-              </a:lnSpc>
-            </a:pPr>
-            <a:r>
-              <a:rPr lang="en-US" dirty="0">
-                <a:solidFill>
-                  <a:srgbClr val="000000"/>
-                </a:solidFill>
-              </a:rPr>
-              <a:t>Abstract resources</a:t>
-            </a:r>
-          </a:p>
-          <a:p>
-            <a:pPr>
-              <a:lnSpc>
-                <a:spcPct val="80000"/>
-              </a:lnSpc>
-            </a:pPr>
-            <a:r>
-              <a:rPr lang="en-US" dirty="0">
-                <a:solidFill>
-                  <a:srgbClr val="000000"/>
-                </a:solidFill>
-              </a:rPr>
-              <a:t>Portable</a:t>
-            </a:r>
-          </a:p>
-          <a:p>
-            <a:pPr>
-              <a:lnSpc>
-                <a:spcPct val="80000"/>
-              </a:lnSpc>
-            </a:pPr>
-            <a:r>
-              <a:rPr lang="en-US" dirty="0">
-                <a:solidFill>
-                  <a:srgbClr val="000000"/>
-                </a:solidFill>
-              </a:rPr>
-              <a:t>Expressive:</a:t>
-            </a:r>
-          </a:p>
-          <a:p>
-            <a:pPr lvl="1">
-              <a:lnSpc>
-                <a:spcPct val="80000"/>
-              </a:lnSpc>
-            </a:pPr>
-            <a:r>
-              <a:rPr lang="en-US" sz="2800" dirty="0">
-                <a:solidFill>
-                  <a:srgbClr val="000000"/>
-                </a:solidFill>
-              </a:rPr>
-              <a:t>New protocols, forwarding policies, </a:t>
-            </a:r>
-            <a:br>
-              <a:rPr lang="en-US" sz="2800" dirty="0">
-                <a:solidFill>
-                  <a:srgbClr val="000000"/>
-                </a:solidFill>
-              </a:rPr>
-            </a:br>
-            <a:r>
-              <a:rPr lang="en-US" sz="2800" dirty="0">
-                <a:solidFill>
-                  <a:srgbClr val="000000"/>
-                </a:solidFill>
-              </a:rPr>
-              <a:t>monitoring and instrumentation</a:t>
-            </a:r>
-          </a:p>
-        </p:txBody>
-      </p:sp>
-    </p:spTree>
-    <p:extLst>
-      <p:ext uri="{BB962C8B-B14F-4D97-AF65-F5344CB8AC3E}">
-        <p14:creationId xmlns:p14="http://schemas.microsoft.com/office/powerpoint/2010/main" val="717811122"/>
-      </p:ext>
-    </p:extLst>
-  </p:cSld>
-  <p:clrMapOvr>
-    <a:masterClrMapping/>
-  </p:clrMapOvr>
-  <mc:AlternateContent xmlns:mc="http://schemas.openxmlformats.org/markup-compatibility/2006">
-    <mc:Choice xmlns:p14="http://schemas.microsoft.com/office/powerpoint/2010/main" Requires="p14">
-      <p:transition spd="slow" p14:dur="2000"/>
-    </mc:Choice>
-    <mc:Fallback>
-      <p:transition spd="slow"/>
-    </mc:Fallback>
-  </mc:AlternateContent>
-  <p:timing>
-    <p:tnLst>
-      <p:par>
-        <p:cTn id="1" dur="indefinite" restart="never" nodeType="tmRoot"/>
-      </p:par>
-    </p:tnLst>
-  </p:timing>
-</p:sld>
-</file>
-
 <file path=ppt/slides/slide41.xml><?xml version="1.0" encoding="utf-8"?>
 <p:sld xmlns:a="http://schemas.openxmlformats.org/drawingml/2006/main" xmlns:r="http://schemas.openxmlformats.org/officeDocument/2006/relationships" xmlns:p="http://schemas.openxmlformats.org/presentationml/2006/main" show="0">
   <p:cSld>
@@ -41682,7 +42164,7 @@
           <a:p>
             <a:r>
               <a:rPr lang="en-US" dirty="0" smtClean="0"/>
-              <a:t>What does SDN want?</a:t>
+              <a:t>P4 Summary</a:t>
             </a:r>
             <a:endParaRPr lang="en-US" dirty="0"/>
           </a:p>
@@ -41698,81 +42180,173 @@
             <p:ph idx="1"/>
           </p:nvPr>
         </p:nvSpPr>
-        <p:spPr/>
-        <p:txBody>
-          <a:bodyPr/>
-          <a:lstStyle/>
-          <a:p>
-            <a:r>
-              <a:rPr lang="en-US" dirty="0" smtClean="0"/>
-              <a:t>Multiple stages of match-action</a:t>
-            </a:r>
-          </a:p>
-          <a:p>
-            <a:pPr lvl="1"/>
-            <a:r>
-              <a:rPr lang="en-US" dirty="0" smtClean="0"/>
-              <a:t>Flexible allocation</a:t>
-            </a:r>
-          </a:p>
-          <a:p>
-            <a:r>
-              <a:rPr lang="en-US" dirty="0" smtClean="0"/>
-              <a:t>Flexible actions</a:t>
-            </a:r>
-          </a:p>
-          <a:p>
-            <a:r>
-              <a:rPr lang="en-US" dirty="0" smtClean="0"/>
-              <a:t>Flexible header fields</a:t>
-            </a:r>
-          </a:p>
-          <a:p>
-            <a:endParaRPr lang="en-US" dirty="0"/>
-          </a:p>
-          <a:p>
-            <a:r>
-              <a:rPr lang="en-US" dirty="0" smtClean="0"/>
-              <a:t>No coincidence </a:t>
-            </a:r>
-            <a:r>
-              <a:rPr lang="en-US" dirty="0" err="1" smtClean="0"/>
-              <a:t>OpenFlow</a:t>
-            </a:r>
-            <a:r>
-              <a:rPr lang="en-US" dirty="0" smtClean="0"/>
-              <a:t> built this way…</a:t>
-            </a:r>
-          </a:p>
-        </p:txBody>
-      </p:sp>
-      <p:sp>
-        <p:nvSpPr>
-          <p:cNvPr id="4" name="Slide Number Placeholder 3"/>
-          <p:cNvSpPr>
-            <a:spLocks noGrp="1"/>
-          </p:cNvSpPr>
-          <p:nvPr>
-            <p:ph type="sldNum" sz="quarter" idx="12"/>
-          </p:nvPr>
-        </p:nvSpPr>
-        <p:spPr/>
-        <p:txBody>
-          <a:bodyPr/>
-          <a:lstStyle/>
-          <a:p>
-            <a:fld id="{D5B0D96D-3F5C-E948-A9F0-6481128465F5}" type="slidenum">
-              <a:rPr lang="en-US" smtClean="0"/>
-              <a:t>41</a:t>
-            </a:fld>
-            <a:endParaRPr lang="en-US"/>
+        <p:spPr>
+          <a:xfrm>
+            <a:off x="1028700" y="1891853"/>
+            <a:ext cx="9313863" cy="3743773"/>
+          </a:xfrm>
+        </p:spPr>
+        <p:txBody>
+          <a:bodyPr>
+            <a:noAutofit/>
+          </a:bodyPr>
+          <a:lstStyle/>
+          <a:p>
+            <a:pPr>
+              <a:lnSpc>
+                <a:spcPct val="80000"/>
+              </a:lnSpc>
+            </a:pPr>
+            <a:r>
+              <a:rPr lang="en-US" dirty="0">
+                <a:solidFill>
+                  <a:srgbClr val="000000"/>
+                </a:solidFill>
+              </a:rPr>
+              <a:t>Simple language</a:t>
+            </a:r>
+          </a:p>
+          <a:p>
+            <a:pPr lvl="1">
+              <a:lnSpc>
+                <a:spcPct val="80000"/>
+              </a:lnSpc>
+            </a:pPr>
+            <a:r>
+              <a:rPr lang="en-US" sz="2800" dirty="0">
+                <a:solidFill>
+                  <a:srgbClr val="000000"/>
+                </a:solidFill>
+              </a:rPr>
+              <a:t>Parsing, bit-field manipulation, table lookup, </a:t>
+            </a:r>
+            <a:br>
+              <a:rPr lang="en-US" sz="2800" dirty="0">
+                <a:solidFill>
+                  <a:srgbClr val="000000"/>
+                </a:solidFill>
+              </a:rPr>
+            </a:br>
+            <a:r>
+              <a:rPr lang="en-US" sz="2800" dirty="0">
+                <a:solidFill>
+                  <a:srgbClr val="000000"/>
+                </a:solidFill>
+              </a:rPr>
+              <a:t>control flow, packet reassembly</a:t>
+            </a:r>
+          </a:p>
+          <a:p>
+            <a:pPr>
+              <a:lnSpc>
+                <a:spcPct val="80000"/>
+              </a:lnSpc>
+            </a:pPr>
+            <a:r>
+              <a:rPr lang="en-US" dirty="0">
+                <a:solidFill>
+                  <a:srgbClr val="000000"/>
+                </a:solidFill>
+              </a:rPr>
+              <a:t>Efficient execution (high speed switching)</a:t>
+            </a:r>
+          </a:p>
+          <a:p>
+            <a:pPr>
+              <a:lnSpc>
+                <a:spcPct val="80000"/>
+              </a:lnSpc>
+            </a:pPr>
+            <a:r>
+              <a:rPr lang="en-US" dirty="0">
+                <a:solidFill>
+                  <a:srgbClr val="000000"/>
+                </a:solidFill>
+              </a:rPr>
+              <a:t>Simple cost model</a:t>
+            </a:r>
+          </a:p>
+          <a:p>
+            <a:pPr>
+              <a:lnSpc>
+                <a:spcPct val="80000"/>
+              </a:lnSpc>
+            </a:pPr>
+            <a:r>
+              <a:rPr lang="en-US" dirty="0">
+                <a:solidFill>
+                  <a:srgbClr val="000000"/>
+                </a:solidFill>
+              </a:rPr>
+              <a:t>Abstract resources</a:t>
+            </a:r>
+          </a:p>
+          <a:p>
+            <a:pPr>
+              <a:lnSpc>
+                <a:spcPct val="80000"/>
+              </a:lnSpc>
+            </a:pPr>
+            <a:r>
+              <a:rPr lang="en-US" dirty="0">
+                <a:solidFill>
+                  <a:srgbClr val="000000"/>
+                </a:solidFill>
+              </a:rPr>
+              <a:t>Portable</a:t>
+            </a:r>
+          </a:p>
+          <a:p>
+            <a:pPr>
+              <a:lnSpc>
+                <a:spcPct val="80000"/>
+              </a:lnSpc>
+            </a:pPr>
+            <a:r>
+              <a:rPr lang="en-US" dirty="0">
+                <a:solidFill>
+                  <a:srgbClr val="000000"/>
+                </a:solidFill>
+              </a:rPr>
+              <a:t>Expressive:</a:t>
+            </a:r>
+          </a:p>
+          <a:p>
+            <a:pPr lvl="1">
+              <a:lnSpc>
+                <a:spcPct val="80000"/>
+              </a:lnSpc>
+            </a:pPr>
+            <a:r>
+              <a:rPr lang="en-US" sz="2800" dirty="0">
+                <a:solidFill>
+                  <a:srgbClr val="000000"/>
+                </a:solidFill>
+              </a:rPr>
+              <a:t>New protocols, forwarding policies, </a:t>
+            </a:r>
+            <a:br>
+              <a:rPr lang="en-US" sz="2800" dirty="0">
+                <a:solidFill>
+                  <a:srgbClr val="000000"/>
+                </a:solidFill>
+              </a:rPr>
+            </a:br>
+            <a:r>
+              <a:rPr lang="en-US" sz="2800" dirty="0">
+                <a:solidFill>
+                  <a:srgbClr val="000000"/>
+                </a:solidFill>
+              </a:rPr>
+              <a:t>monitoring and instrumentation</a:t>
+            </a:r>
           </a:p>
         </p:txBody>
       </p:sp>
     </p:spTree>
     <p:extLst>
       <p:ext uri="{BB962C8B-B14F-4D97-AF65-F5344CB8AC3E}">
-        <p14:creationId xmlns:p14="http://schemas.microsoft.com/office/powerpoint/2010/main" val="1429536652"/>
+        <p14:creationId xmlns:p14="http://schemas.microsoft.com/office/powerpoint/2010/main" val="717811122"/>
       </p:ext>
     </p:extLst>
   </p:cSld>
@@ -41826,21 +42400,12 @@
         </p:nvSpPr>
         <p:spPr/>
         <p:txBody>
-          <a:bodyPr>
-            <a:normAutofit/>
-          </a:bodyPr>
+          <a:bodyPr/>
           <a:lstStyle/>
           <a:p>
             <a:r>
               <a:rPr lang="en-US" dirty="0" smtClean="0"/>
-              <a:t>What’s Hard about a </a:t>
-            </a:r>
-            <a:br>
-              <a:rPr lang="en-US" dirty="0" smtClean="0"/>
-            </a:br>
-            <a:r>
-              <a:rPr lang="en-US" dirty="0" smtClean="0"/>
-              <a:t>Flexible Switch Chip?</a:t>
+              <a:t>What does SDN want?</a:t>
             </a:r>
             <a:endParaRPr lang="en-US" dirty="0"/>
           </a:p>
@@ -41858,60 +42423,49 @@
         </p:nvSpPr>
         <p:spPr/>
         <p:txBody>
-          <a:bodyPr>
-            <a:normAutofit/>
-          </a:bodyPr>
+          <a:bodyPr/>
           <a:lstStyle/>
           <a:p>
             <a:r>
               <a:rPr lang="en-US" dirty="0" smtClean="0"/>
-              <a:t>Big chip</a:t>
-            </a:r>
-          </a:p>
-          <a:p>
+              <a:t>Multiple stages of match-action</a:t>
+            </a:r>
+          </a:p>
+          <a:p>
+            <a:pPr lvl="1"/>
             <a:r>
               <a:rPr lang="en-US" dirty="0" smtClean="0"/>
-              <a:t>High frequency (1 GHz)</a:t>
+              <a:t>Flexible allocation</a:t>
             </a:r>
           </a:p>
           <a:p>
             <a:r>
               <a:rPr lang="en-US" dirty="0" smtClean="0"/>
-              <a:t>Wiring</a:t>
-            </a:r>
-            <a:r>
-              <a:rPr lang="en-US" dirty="0"/>
-              <a:t> </a:t>
-            </a:r>
+              <a:t>Flexible actions</a:t>
+            </a:r>
+          </a:p>
+          <a:p>
             <a:r>
               <a:rPr lang="en-US" dirty="0" smtClean="0"/>
-              <a:t>intensive</a:t>
-            </a:r>
+              <a:t>Flexible header fields</a:t>
+            </a:r>
+          </a:p>
+          <a:p>
+            <a:endParaRPr lang="en-US" dirty="0"/>
           </a:p>
           <a:p>
             <a:r>
               <a:rPr lang="en-US" dirty="0" smtClean="0"/>
-              <a:t>Many crossbars</a:t>
-            </a:r>
-          </a:p>
-          <a:p>
+              <a:t>No coincidence </a:t>
+            </a:r>
+            <a:r>
+              <a:rPr lang="en-US" dirty="0" err="1" smtClean="0"/>
+              <a:t>OpenFlow</a:t>
+            </a:r>
             <a:r>
               <a:rPr lang="en-US" dirty="0" smtClean="0"/>
-              <a:t>Lots of TCAM</a:t>
-            </a:r>
-          </a:p>
-          <a:p>
-            <a:r>
-              <a:rPr lang="en-US" dirty="0" smtClean="0"/>
-              <a:t>Interaction between physical design and architecture</a:t>
-            </a:r>
-          </a:p>
-          <a:p>
-            <a:r>
-              <a:rPr lang="en-US" dirty="0" smtClean="0"/>
-              <a:t>Good news? No need to read 7000 IETF RFC’s!</a:t>
-            </a:r>
-            <a:endParaRPr lang="en-US" dirty="0"/>
+              <a:t> built this way…</a:t>
+            </a:r>
           </a:p>
         </p:txBody>
       </p:sp>
@@ -41933,6 +42487,175 @@
             <a:fld id="{D5B0D96D-3F5C-E948-A9F0-6481128465F5}" type="slidenum">
               <a:rPr lang="en-US" smtClean="0"/>
               <a:t>42</a:t>
+            </a:fld>
+            <a:endParaRPr lang="en-US"/>
+          </a:p>
+        </p:txBody>
+      </p:sp>
+    </p:spTree>
+    <p:extLst>
+      <p:ext uri="{BB962C8B-B14F-4D97-AF65-F5344CB8AC3E}">
+        <p14:creationId xmlns:p14="http://schemas.microsoft.com/office/powerpoint/2010/main" val="1429536652"/>
+      </p:ext>
+    </p:extLst>
+  </p:cSld>
+  <p:clrMapOvr>
+    <a:masterClrMapping/>
+  </p:clrMapOvr>
+  <mc:AlternateContent xmlns:mc="http://schemas.openxmlformats.org/markup-compatibility/2006">
+    <mc:Choice xmlns:p14="http://schemas.microsoft.com/office/powerpoint/2010/main" Requires="p14">
+      <p:transition spd="slow" p14:dur="2000"/>
+    </mc:Choice>
+    <mc:Fallback>
+      <p:transition spd="slow"/>
+    </mc:Fallback>
+  </mc:AlternateContent>
+  <p:timing>
+    <p:tnLst>
+      <p:par>
+        <p:cTn id="1" dur="indefinite" restart="never" nodeType="tmRoot"/>
+      </p:par>
+    </p:tnLst>
+  </p:timing>
+</p:sld>
+</file>
+
+<file path=ppt/slides/slide43.xml><?xml version="1.0" encoding="utf-8"?>
+<p:sld xmlns:a="http://schemas.openxmlformats.org/drawingml/2006/main" xmlns:r="http://schemas.openxmlformats.org/officeDocument/2006/relationships" xmlns:p="http://schemas.openxmlformats.org/presentationml/2006/main" show="0">
+  <p:cSld>
+    <p:spTree>
+      <p:nvGrpSpPr>
+        <p:cNvPr id="1" name=""/>
+        <p:cNvGrpSpPr/>
+        <p:nvPr/>
+      </p:nvGrpSpPr>
+      <p:grpSpPr>
+        <a:xfrm>
+          <a:off x="0" y="0"/>
+          <a:ext cx="0" cy="0"/>
+          <a:chOff x="0" y="0"/>
+          <a:chExt cx="0" cy="0"/>
+        </a:xfrm>
+      </p:grpSpPr>
+      <p:sp>
+        <p:nvSpPr>
+          <p:cNvPr id="2" name="Title 1"/>
+          <p:cNvSpPr>
+            <a:spLocks noGrp="1"/>
+          </p:cNvSpPr>
+          <p:nvPr>
+            <p:ph type="title"/>
+          </p:nvPr>
+        </p:nvSpPr>
+        <p:spPr/>
+        <p:txBody>
+          <a:bodyPr>
+            <a:normAutofit/>
+          </a:bodyPr>
+          <a:lstStyle/>
+          <a:p>
+            <a:r>
+              <a:rPr lang="en-US" dirty="0" smtClean="0"/>
+              <a:t>What’s Hard about a </a:t>
+            </a:r>
+            <a:br>
+              <a:rPr lang="en-US" dirty="0" smtClean="0"/>
+            </a:br>
+            <a:r>
+              <a:rPr lang="en-US" dirty="0" smtClean="0"/>
+              <a:t>Flexible Switch Chip?</a:t>
+            </a:r>
+            <a:endParaRPr lang="en-US" dirty="0"/>
+          </a:p>
+        </p:txBody>
+      </p:sp>
+      <p:sp>
+        <p:nvSpPr>
+          <p:cNvPr id="3" name="Content Placeholder 2"/>
+          <p:cNvSpPr>
+            <a:spLocks noGrp="1"/>
+          </p:cNvSpPr>
+          <p:nvPr>
+            <p:ph idx="1"/>
+          </p:nvPr>
+        </p:nvSpPr>
+        <p:spPr/>
+        <p:txBody>
+          <a:bodyPr>
+            <a:normAutofit/>
+          </a:bodyPr>
+          <a:lstStyle/>
+          <a:p>
+            <a:r>
+              <a:rPr lang="en-US" dirty="0" smtClean="0"/>
+              <a:t>Big chip</a:t>
+            </a:r>
+          </a:p>
+          <a:p>
+            <a:r>
+              <a:rPr lang="en-US" dirty="0" smtClean="0"/>
+              <a:t>High frequency (1 GHz)</a:t>
+            </a:r>
+          </a:p>
+          <a:p>
+            <a:r>
+              <a:rPr lang="en-US" dirty="0" smtClean="0"/>
+              <a:t>Wiring</a:t>
+            </a:r>
+            <a:r>
+              <a:rPr lang="en-US" dirty="0"/>
+              <a:t> </a:t>
+            </a:r>
+            <a:r>
+              <a:rPr lang="en-US" dirty="0" smtClean="0"/>
+              <a:t>intensive</a:t>
+            </a:r>
+          </a:p>
+          <a:p>
+            <a:r>
+              <a:rPr lang="en-US" dirty="0" smtClean="0"/>
+              <a:t>Many crossbars</a:t>
+            </a:r>
+          </a:p>
+          <a:p>
+            <a:r>
+              <a:rPr lang="en-US" dirty="0" smtClean="0"/>
+              <a:t>Lots of TCAM</a:t>
+            </a:r>
+          </a:p>
+          <a:p>
+            <a:r>
+              <a:rPr lang="en-US" dirty="0" smtClean="0"/>
+              <a:t>Interaction between physical design and architecture</a:t>
+            </a:r>
+          </a:p>
+          <a:p>
+            <a:r>
+              <a:rPr lang="en-US" dirty="0" smtClean="0"/>
+              <a:t>Good news? No need to read 7000 IETF RFC’s!</a:t>
+            </a:r>
+            <a:endParaRPr lang="en-US" dirty="0"/>
+          </a:p>
+        </p:txBody>
+      </p:sp>
+      <p:sp>
+        <p:nvSpPr>
+          <p:cNvPr id="4" name="Slide Number Placeholder 3"/>
+          <p:cNvSpPr>
+            <a:spLocks noGrp="1"/>
+          </p:cNvSpPr>
+          <p:nvPr>
+            <p:ph type="sldNum" sz="quarter" idx="12"/>
+          </p:nvPr>
+        </p:nvSpPr>
+        <p:spPr/>
+        <p:txBody>
+          <a:bodyPr/>
+          <a:lstStyle/>
+          <a:p>
+            <a:fld id="{D5B0D96D-3F5C-E948-A9F0-6481128465F5}" type="slidenum">
+              <a:rPr lang="en-US" smtClean="0"/>
+              <a:t>43</a:t>
             </a:fld>
             <a:endParaRPr lang="en-US"/>
           </a:p>
@@ -41966,7 +42689,7 @@
 </p:sld>
 </file>
 
-<file path=ppt/slides/slide43.xml><?xml version="1.0" encoding="utf-8"?>
+<file path=ppt/slides/slide44.xml><?xml version="1.0" encoding="utf-8"?>
 <p:sld xmlns:a="http://schemas.openxmlformats.org/drawingml/2006/main" xmlns:r="http://schemas.openxmlformats.org/officeDocument/2006/relationships" xmlns:p="http://schemas.openxmlformats.org/presentationml/2006/main" show="0">
   <p:cSld>
     <p:spTree>
@@ -42162,29 +42885,16 @@
           <a:p>
             <a:r>
               <a:rPr lang="en-US" dirty="0" smtClean="0"/>
-              <a:t>Move </a:t>
-            </a:r>
+              <a:t>Move control plane out of the switch onto a server.</a:t>
+            </a:r>
+          </a:p>
+          <a:p>
+            <a:endParaRPr lang="en-US" dirty="0" smtClean="0"/>
+          </a:p>
+          <a:p>
             <a:r>
               <a:rPr lang="en-US" dirty="0" smtClean="0"/>
-              <a:t>control plane out of the </a:t>
-            </a:r>
-            <a:r>
-              <a:rPr lang="en-US" dirty="0" smtClean="0"/>
-              <a:t>switch onto a server.</a:t>
-            </a:r>
-            <a:endParaRPr lang="en-US" dirty="0" smtClean="0"/>
-          </a:p>
-          <a:p>
-            <a:endParaRPr lang="en-US" dirty="0" smtClean="0"/>
-          </a:p>
-          <a:p>
-            <a:r>
-              <a:rPr lang="en-US" dirty="0" smtClean="0"/>
-              <a:t>Well-defined API to data </a:t>
-            </a:r>
-            <a:r>
-              <a:rPr lang="en-US" dirty="0" smtClean="0"/>
-              <a:t>plane (</a:t>
+              <a:t>Well-defined API to data plane (</a:t>
             </a:r>
             <a:r>
               <a:rPr lang="en-US" dirty="0" err="1" smtClean="0"/>
@@ -42208,7 +42918,6 @@
               <a:rPr lang="en-US" dirty="0" smtClean="0"/>
               <a:t>Which headers: Lowest common denominator.</a:t>
             </a:r>
-            <a:endParaRPr lang="en-US" dirty="0" smtClean="0"/>
           </a:p>
           <a:p>
             <a:endParaRPr lang="en-US" dirty="0"/>
@@ -42232,7 +42941,6 @@
               <a:rPr lang="en-US" dirty="0" smtClean="0"/>
               <a:t>Access Control Policies</a:t>
             </a:r>
-            <a:endParaRPr lang="en-US" dirty="0" smtClean="0"/>
           </a:p>
           <a:p>
             <a:endParaRPr lang="en-US" dirty="0" smtClean="0"/>
@@ -43711,11 +44419,7 @@
             </a:r>
             <a:r>
               <a:rPr lang="en-US" dirty="0" smtClean="0"/>
-              <a:t>/s (also called line rate</a:t>
-            </a:r>
-            <a:r>
-              <a:rPr lang="en-US" dirty="0" smtClean="0"/>
-              <a:t>), now 6.4 </a:t>
+              <a:t>/s (also called line rate), now 6.4 </a:t>
             </a:r>
             <a:r>
               <a:rPr lang="en-US" dirty="0" err="1" smtClean="0"/>
@@ -43725,7 +44429,6 @@
               <a:rPr lang="en-US" dirty="0" smtClean="0"/>
               <a:t>/s.</a:t>
             </a:r>
-            <a:endParaRPr lang="en-US" dirty="0" smtClean="0"/>
           </a:p>
           <a:p>
             <a:endParaRPr lang="en-US" dirty="0"/>
@@ -43733,11 +44436,7 @@
           <a:p>
             <a:r>
               <a:rPr lang="en-US" dirty="0" smtClean="0"/>
-              <a:t>Programmability: New headers, new modifications to packet headers, flexibly size lookup tables, (limited) state </a:t>
-            </a:r>
-            <a:r>
-              <a:rPr lang="en-US" dirty="0" smtClean="0"/>
-              <a:t>modification</a:t>
+              <a:t>Programmability: New headers, new modifications to packet headers, flexibly size lookup tables, (limited) state modification</a:t>
             </a:r>
             <a:endParaRPr lang="en-US" dirty="0"/>
           </a:p>

</xml_diff>

<commit_message>
GO through lecture once
</commit_message>
<xml_diff>
--- a/RMT-lecture.pptx
+++ b/RMT-lecture.pptx
@@ -199,6 +199,7 @@
           </a:p>
         </c:rich>
       </c:tx>
+      <c:layout/>
       <c:overlay val="0"/>
       <c:spPr>
         <a:noFill/>
@@ -308,7 +309,9 @@
               <c:showPercent val="0"/>
               <c:showBubbleSize val="0"/>
               <c:extLst>
-                <c:ext xmlns:c15="http://schemas.microsoft.com/office/drawing/2012/chart" uri="{CE6537A1-D6FC-4f65-9D91-7224C49458BB}"/>
+                <c:ext xmlns:c15="http://schemas.microsoft.com/office/drawing/2012/chart" uri="{CE6537A1-D6FC-4f65-9D91-7224C49458BB}">
+                  <c15:layout/>
+                </c:ext>
               </c:extLst>
             </c:dLbl>
             <c:dLbl>
@@ -346,7 +349,9 @@
               <c:showPercent val="0"/>
               <c:showBubbleSize val="0"/>
               <c:extLst>
-                <c:ext xmlns:c15="http://schemas.microsoft.com/office/drawing/2012/chart" uri="{CE6537A1-D6FC-4f65-9D91-7224C49458BB}"/>
+                <c:ext xmlns:c15="http://schemas.microsoft.com/office/drawing/2012/chart" uri="{CE6537A1-D6FC-4f65-9D91-7224C49458BB}">
+                  <c15:layout/>
+                </c:ext>
               </c:extLst>
             </c:dLbl>
             <c:dLbl>
@@ -384,7 +389,9 @@
               <c:showPercent val="0"/>
               <c:showBubbleSize val="0"/>
               <c:extLst>
-                <c:ext xmlns:c15="http://schemas.microsoft.com/office/drawing/2012/chart" uri="{CE6537A1-D6FC-4f65-9D91-7224C49458BB}"/>
+                <c:ext xmlns:c15="http://schemas.microsoft.com/office/drawing/2012/chart" uri="{CE6537A1-D6FC-4f65-9D91-7224C49458BB}">
+                  <c15:layout/>
+                </c:ext>
               </c:extLst>
             </c:dLbl>
             <c:dLbl>
@@ -422,7 +429,9 @@
               <c:showPercent val="0"/>
               <c:showBubbleSize val="0"/>
               <c:extLst>
-                <c:ext xmlns:c15="http://schemas.microsoft.com/office/drawing/2012/chart" uri="{CE6537A1-D6FC-4f65-9D91-7224C49458BB}"/>
+                <c:ext xmlns:c15="http://schemas.microsoft.com/office/drawing/2012/chart" uri="{CE6537A1-D6FC-4f65-9D91-7224C49458BB}">
+                  <c15:layout/>
+                </c:ext>
               </c:extLst>
             </c:dLbl>
             <c:dLbl>
@@ -557,7 +566,9 @@
               <c:showPercent val="0"/>
               <c:showBubbleSize val="0"/>
               <c:extLst>
-                <c:ext xmlns:c15="http://schemas.microsoft.com/office/drawing/2012/chart" uri="{CE6537A1-D6FC-4f65-9D91-7224C49458BB}"/>
+                <c:ext xmlns:c15="http://schemas.microsoft.com/office/drawing/2012/chart" uri="{CE6537A1-D6FC-4f65-9D91-7224C49458BB}">
+                  <c15:layout/>
+                </c:ext>
               </c:extLst>
             </c:dLbl>
             <c:spPr>
@@ -720,6 +731,7 @@
           <c:dLbls>
             <c:dLbl>
               <c:idx val="0"/>
+              <c:layout/>
               <c:tx>
                 <c:rich>
                   <a:bodyPr/>
@@ -741,7 +753,9 @@
               <c:showPercent val="0"/>
               <c:showBubbleSize val="0"/>
               <c:extLst>
-                <c:ext xmlns:c15="http://schemas.microsoft.com/office/drawing/2012/chart" uri="{CE6537A1-D6FC-4f65-9D91-7224C49458BB}"/>
+                <c:ext xmlns:c15="http://schemas.microsoft.com/office/drawing/2012/chart" uri="{CE6537A1-D6FC-4f65-9D91-7224C49458BB}">
+                  <c15:layout/>
+                </c:ext>
               </c:extLst>
             </c:dLbl>
             <c:dLbl>
@@ -779,11 +793,14 @@
               <c:showPercent val="0"/>
               <c:showBubbleSize val="0"/>
               <c:extLst>
-                <c:ext xmlns:c15="http://schemas.microsoft.com/office/drawing/2012/chart" uri="{CE6537A1-D6FC-4f65-9D91-7224C49458BB}"/>
+                <c:ext xmlns:c15="http://schemas.microsoft.com/office/drawing/2012/chart" uri="{CE6537A1-D6FC-4f65-9D91-7224C49458BB}">
+                  <c15:layout/>
+                </c:ext>
               </c:extLst>
             </c:dLbl>
             <c:dLbl>
               <c:idx val="4"/>
+              <c:layout/>
               <c:tx>
                 <c:rich>
                   <a:bodyPr/>
@@ -805,11 +822,14 @@
               <c:showPercent val="0"/>
               <c:showBubbleSize val="0"/>
               <c:extLst>
-                <c:ext xmlns:c15="http://schemas.microsoft.com/office/drawing/2012/chart" uri="{CE6537A1-D6FC-4f65-9D91-7224C49458BB}"/>
+                <c:ext xmlns:c15="http://schemas.microsoft.com/office/drawing/2012/chart" uri="{CE6537A1-D6FC-4f65-9D91-7224C49458BB}">
+                  <c15:layout/>
+                </c:ext>
               </c:extLst>
             </c:dLbl>
             <c:dLbl>
               <c:idx val="6"/>
+              <c:layout/>
               <c:tx>
                 <c:rich>
                   <a:bodyPr/>
@@ -831,11 +851,14 @@
               <c:showPercent val="0"/>
               <c:showBubbleSize val="0"/>
               <c:extLst>
-                <c:ext xmlns:c15="http://schemas.microsoft.com/office/drawing/2012/chart" uri="{CE6537A1-D6FC-4f65-9D91-7224C49458BB}"/>
+                <c:ext xmlns:c15="http://schemas.microsoft.com/office/drawing/2012/chart" uri="{CE6537A1-D6FC-4f65-9D91-7224C49458BB}">
+                  <c15:layout/>
+                </c:ext>
               </c:extLst>
             </c:dLbl>
             <c:dLbl>
               <c:idx val="7"/>
+              <c:layout/>
               <c:tx>
                 <c:rich>
                   <a:bodyPr/>
@@ -856,7 +879,9 @@
               <c:showPercent val="0"/>
               <c:showBubbleSize val="0"/>
               <c:extLst>
-                <c:ext xmlns:c15="http://schemas.microsoft.com/office/drawing/2012/chart" uri="{CE6537A1-D6FC-4f65-9D91-7224C49458BB}"/>
+                <c:ext xmlns:c15="http://schemas.microsoft.com/office/drawing/2012/chart" uri="{CE6537A1-D6FC-4f65-9D91-7224C49458BB}">
+                  <c15:layout/>
+                </c:ext>
               </c:extLst>
             </c:dLbl>
             <c:spPr>
@@ -986,11 +1011,11 @@
         </c:dLbls>
         <c:marker val="1"/>
         <c:smooth val="0"/>
-        <c:axId val="1285330624"/>
-        <c:axId val="1467172784"/>
+        <c:axId val="1428219216"/>
+        <c:axId val="1291559520"/>
       </c:lineChart>
       <c:catAx>
-        <c:axId val="1285330624"/>
+        <c:axId val="1428219216"/>
         <c:scaling>
           <c:orientation val="minMax"/>
         </c:scaling>
@@ -1022,6 +1047,7 @@
               </a:p>
             </c:rich>
           </c:tx>
+          <c:layout/>
           <c:overlay val="0"/>
           <c:spPr>
             <a:noFill/>
@@ -1088,7 +1114,7 @@
             <a:endParaRPr lang="en-US"/>
           </a:p>
         </c:txPr>
-        <c:crossAx val="1467172784"/>
+        <c:crossAx val="1291559520"/>
         <c:crosses val="autoZero"/>
         <c:auto val="1"/>
         <c:lblAlgn val="ctr"/>
@@ -1096,7 +1122,7 @@
         <c:noMultiLvlLbl val="0"/>
       </c:catAx>
       <c:valAx>
-        <c:axId val="1467172784"/>
+        <c:axId val="1291559520"/>
         <c:scaling>
           <c:logBase val="10.0"/>
           <c:orientation val="minMax"/>
@@ -1149,6 +1175,7 @@
               </a:p>
             </c:rich>
           </c:tx>
+          <c:layout/>
           <c:overlay val="0"/>
           <c:spPr>
             <a:noFill/>
@@ -1209,7 +1236,7 @@
             <a:endParaRPr lang="en-US"/>
           </a:p>
         </c:txPr>
-        <c:crossAx val="1285330624"/>
+        <c:crossAx val="1428219216"/>
         <c:crosses val="autoZero"/>
         <c:crossBetween val="between"/>
       </c:valAx>
@@ -1223,6 +1250,7 @@
     </c:plotArea>
     <c:legend>
       <c:legendPos val="b"/>
+      <c:layout/>
       <c:overlay val="0"/>
       <c:spPr>
         <a:noFill/>
@@ -8230,7 +8258,15 @@
           <a:p>
             <a:r>
               <a:rPr lang="en-US" dirty="0" smtClean="0"/>
-              <a:t>Slides courtesy Patrick </a:t>
+              <a:t>Slides </a:t>
+            </a:r>
+            <a:r>
+              <a:rPr lang="en-US" dirty="0" smtClean="0"/>
+              <a:t>courtesy of </a:t>
+            </a:r>
+            <a:r>
+              <a:rPr lang="en-US" dirty="0" smtClean="0"/>
+              <a:t>Patrick </a:t>
             </a:r>
             <a:r>
               <a:rPr lang="en-US" dirty="0" err="1" smtClean="0"/>
@@ -8238,7 +8274,11 @@
             </a:r>
             <a:r>
               <a:rPr lang="en-US" dirty="0" smtClean="0"/>
-              <a:t> and Mihai </a:t>
+              <a:t>, Nick McKeown, </a:t>
+            </a:r>
+            <a:r>
+              <a:rPr lang="en-US" dirty="0" smtClean="0"/>
+              <a:t>and Mihai </a:t>
             </a:r>
             <a:r>
               <a:rPr lang="en-US" dirty="0" err="1" smtClean="0"/>
@@ -39658,37 +39698,21 @@
             <a:pPr lvl="1"/>
             <a:r>
               <a:rPr lang="en-US" dirty="0" smtClean="0"/>
-              <a:t>But, the </a:t>
-            </a:r>
+              <a:t>But, the only constant is change.</a:t>
+            </a:r>
+          </a:p>
+          <a:p>
+            <a:pPr lvl="1"/>
             <a:r>
               <a:rPr lang="en-US" dirty="0" smtClean="0"/>
-              <a:t>only constant is </a:t>
-            </a:r>
+              <a:t>Move beyond thinking about features to instructions.</a:t>
+            </a:r>
+          </a:p>
+          <a:p>
+            <a:pPr lvl="1"/>
             <a:r>
               <a:rPr lang="en-US" dirty="0" smtClean="0"/>
-              <a:t>change.</a:t>
-            </a:r>
-          </a:p>
-          <a:p>
-            <a:pPr lvl="1"/>
-            <a:r>
-              <a:rPr lang="en-US" dirty="0" smtClean="0"/>
-              <a:t>Move </a:t>
-            </a:r>
-            <a:r>
-              <a:rPr lang="en-US" dirty="0" smtClean="0"/>
-              <a:t>beyond thinking about features to instructions.</a:t>
-            </a:r>
-          </a:p>
-          <a:p>
-            <a:pPr lvl="1"/>
-            <a:r>
-              <a:rPr lang="en-US" dirty="0" smtClean="0"/>
-              <a:t>Eliminate hardware bugs, everything is now </a:t>
-            </a:r>
-            <a:r>
-              <a:rPr lang="en-US" dirty="0" smtClean="0"/>
-              <a:t>software/firmware.</a:t>
+              <a:t>Eliminate hardware bugs, everything is now software/firmware.</a:t>
             </a:r>
           </a:p>
           <a:p>
@@ -39711,7 +39735,6 @@
               <a:rPr lang="en-US" dirty="0" smtClean="0"/>
               <a:t>Can be moved out of the company.</a:t>
             </a:r>
-            <a:endParaRPr lang="en-US" dirty="0" smtClean="0"/>
           </a:p>
           <a:p>
             <a:pPr lvl="1"/>

</xml_diff>

<commit_message>
Some more tweaks to lecture
</commit_message>
<xml_diff>
--- a/RMT-lecture.pptx
+++ b/RMT-lecture.pptx
@@ -5,7 +5,7 @@
     <p:sldMasterId id="2147483672" r:id="rId1"/>
   </p:sldMasterIdLst>
   <p:notesMasterIdLst>
-    <p:notesMasterId r:id="rId46"/>
+    <p:notesMasterId r:id="rId47"/>
   </p:notesMasterIdLst>
   <p:sldIdLst>
     <p:sldId id="256" r:id="rId2"/>
@@ -37,21 +37,22 @@
     <p:sldId id="275" r:id="rId28"/>
     <p:sldId id="276" r:id="rId29"/>
     <p:sldId id="277" r:id="rId30"/>
-    <p:sldId id="324" r:id="rId31"/>
-    <p:sldId id="312" r:id="rId32"/>
-    <p:sldId id="287" r:id="rId33"/>
-    <p:sldId id="288" r:id="rId34"/>
-    <p:sldId id="325" r:id="rId35"/>
-    <p:sldId id="326" r:id="rId36"/>
-    <p:sldId id="327" r:id="rId37"/>
-    <p:sldId id="314" r:id="rId38"/>
-    <p:sldId id="301" r:id="rId39"/>
-    <p:sldId id="299" r:id="rId40"/>
-    <p:sldId id="282" r:id="rId41"/>
-    <p:sldId id="298" r:id="rId42"/>
-    <p:sldId id="318" r:id="rId43"/>
-    <p:sldId id="319" r:id="rId44"/>
-    <p:sldId id="320" r:id="rId45"/>
+    <p:sldId id="328" r:id="rId31"/>
+    <p:sldId id="324" r:id="rId32"/>
+    <p:sldId id="312" r:id="rId33"/>
+    <p:sldId id="287" r:id="rId34"/>
+    <p:sldId id="288" r:id="rId35"/>
+    <p:sldId id="325" r:id="rId36"/>
+    <p:sldId id="326" r:id="rId37"/>
+    <p:sldId id="327" r:id="rId38"/>
+    <p:sldId id="314" r:id="rId39"/>
+    <p:sldId id="301" r:id="rId40"/>
+    <p:sldId id="299" r:id="rId41"/>
+    <p:sldId id="282" r:id="rId42"/>
+    <p:sldId id="298" r:id="rId43"/>
+    <p:sldId id="318" r:id="rId44"/>
+    <p:sldId id="319" r:id="rId45"/>
+    <p:sldId id="320" r:id="rId46"/>
   </p:sldIdLst>
   <p:sldSz cx="12192000" cy="6858000"/>
   <p:notesSz cx="6858000" cy="9144000"/>
@@ -1011,11 +1012,11 @@
         </c:dLbls>
         <c:marker val="1"/>
         <c:smooth val="0"/>
-        <c:axId val="1428219216"/>
-        <c:axId val="1291559520"/>
+        <c:axId val="1302613136"/>
+        <c:axId val="1263131568"/>
       </c:lineChart>
       <c:catAx>
-        <c:axId val="1428219216"/>
+        <c:axId val="1302613136"/>
         <c:scaling>
           <c:orientation val="minMax"/>
         </c:scaling>
@@ -1114,7 +1115,7 @@
             <a:endParaRPr lang="en-US"/>
           </a:p>
         </c:txPr>
-        <c:crossAx val="1291559520"/>
+        <c:crossAx val="1263131568"/>
         <c:crosses val="autoZero"/>
         <c:auto val="1"/>
         <c:lblAlgn val="ctr"/>
@@ -1122,7 +1123,7 @@
         <c:noMultiLvlLbl val="0"/>
       </c:catAx>
       <c:valAx>
-        <c:axId val="1291559520"/>
+        <c:axId val="1263131568"/>
         <c:scaling>
           <c:logBase val="10.0"/>
           <c:orientation val="minMax"/>
@@ -1236,7 +1237,7 @@
             <a:endParaRPr lang="en-US"/>
           </a:p>
         </c:txPr>
-        <c:crossAx val="1428219216"/>
+        <c:crossAx val="1302613136"/>
         <c:crosses val="autoZero"/>
         <c:crossBetween val="between"/>
       </c:valAx>
@@ -1945,7 +1946,7 @@
           <a:p>
             <a:fld id="{191B5B68-7703-4B2D-8923-97CC0DFF0515}" type="datetimeFigureOut">
               <a:rPr lang="en-US" smtClean="0"/>
-              <a:t>10/31/16</a:t>
+              <a:t>11/1/16</a:t>
             </a:fld>
             <a:endParaRPr lang="en-US"/>
           </a:p>
@@ -3723,7 +3724,7 @@
           <a:p>
             <a:fld id="{D7C7F897-9DD6-3F44-9F39-5E102FFA3BB1}" type="slidenum">
               <a:rPr lang="en-US" smtClean="0"/>
-              <a:t>32</a:t>
+              <a:t>33</a:t>
             </a:fld>
             <a:endParaRPr lang="en-US"/>
           </a:p>
@@ -3828,7 +3829,7 @@
           <a:p>
             <a:fld id="{D7C7F897-9DD6-3F44-9F39-5E102FFA3BB1}" type="slidenum">
               <a:rPr lang="en-US" smtClean="0"/>
-              <a:t>33</a:t>
+              <a:t>34</a:t>
             </a:fld>
             <a:endParaRPr lang="en-US"/>
           </a:p>
@@ -3916,7 +3917,7 @@
           <a:p>
             <a:fld id="{AE764910-0912-401B-9F58-2B7602DC4522}" type="slidenum">
               <a:rPr lang="en-US" smtClean="0"/>
-              <a:t>34</a:t>
+              <a:t>35</a:t>
             </a:fld>
             <a:endParaRPr lang="en-US"/>
           </a:p>
@@ -4006,7 +4007,7 @@
           <a:p>
             <a:fld id="{AE764910-0912-401B-9F58-2B7602DC4522}" type="slidenum">
               <a:rPr lang="en-US" smtClean="0"/>
-              <a:t>35</a:t>
+              <a:t>36</a:t>
             </a:fld>
             <a:endParaRPr lang="en-US"/>
           </a:p>
@@ -4111,7 +4112,7 @@
           <a:p>
             <a:fld id="{AE764910-0912-401B-9F58-2B7602DC4522}" type="slidenum">
               <a:rPr lang="en-US" smtClean="0"/>
-              <a:t>36</a:t>
+              <a:t>37</a:t>
             </a:fld>
             <a:endParaRPr lang="en-US"/>
           </a:p>
@@ -4195,7 +4196,7 @@
           <a:p>
             <a:fld id="{AE764910-0912-401B-9F58-2B7602DC4522}" type="slidenum">
               <a:rPr lang="en-US" smtClean="0"/>
-              <a:t>37</a:t>
+              <a:t>38</a:t>
             </a:fld>
             <a:endParaRPr lang="en-US"/>
           </a:p>
@@ -4307,7 +4308,7 @@
           <a:p>
             <a:fld id="{AE764910-0912-401B-9F58-2B7602DC4522}" type="slidenum">
               <a:rPr lang="en-US" smtClean="0"/>
-              <a:t>38</a:t>
+              <a:t>39</a:t>
             </a:fld>
             <a:endParaRPr lang="en-US"/>
           </a:p>
@@ -4400,7 +4401,7 @@
           <a:p>
             <a:fld id="{AE764910-0912-401B-9F58-2B7602DC4522}" type="slidenum">
               <a:rPr lang="en-US" smtClean="0"/>
-              <a:t>39</a:t>
+              <a:t>40</a:t>
             </a:fld>
             <a:endParaRPr lang="en-US"/>
           </a:p>
@@ -4509,7 +4510,7 @@
           <a:p>
             <a:fld id="{AE764910-0912-401B-9F58-2B7602DC4522}" type="slidenum">
               <a:rPr lang="en-US" smtClean="0"/>
-              <a:t>40</a:t>
+              <a:t>41</a:t>
             </a:fld>
             <a:endParaRPr lang="en-US"/>
           </a:p>
@@ -4708,7 +4709,7 @@
           <a:p>
             <a:fld id="{D7C7F897-9DD6-3F44-9F39-5E102FFA3BB1}" type="slidenum">
               <a:rPr lang="en-US" smtClean="0"/>
-              <a:t>41</a:t>
+              <a:t>42</a:t>
             </a:fld>
             <a:endParaRPr lang="en-US"/>
           </a:p>
@@ -5483,7 +5484,7 @@
           <a:p>
             <a:fld id="{E04F2FE0-66D1-4517-A0FE-1ABC94B036F1}" type="datetimeFigureOut">
               <a:rPr lang="en-US" smtClean="0"/>
-              <a:t>10/31/16</a:t>
+              <a:t>11/1/16</a:t>
             </a:fld>
             <a:endParaRPr lang="en-US"/>
           </a:p>
@@ -5653,7 +5654,7 @@
           <a:p>
             <a:fld id="{E04F2FE0-66D1-4517-A0FE-1ABC94B036F1}" type="datetimeFigureOut">
               <a:rPr lang="en-US" smtClean="0"/>
-              <a:t>10/31/16</a:t>
+              <a:t>11/1/16</a:t>
             </a:fld>
             <a:endParaRPr lang="en-US"/>
           </a:p>
@@ -5833,7 +5834,7 @@
           <a:p>
             <a:fld id="{E04F2FE0-66D1-4517-A0FE-1ABC94B036F1}" type="datetimeFigureOut">
               <a:rPr lang="en-US" smtClean="0"/>
-              <a:t>10/31/16</a:t>
+              <a:t>11/1/16</a:t>
             </a:fld>
             <a:endParaRPr lang="en-US"/>
           </a:p>
@@ -6003,7 +6004,7 @@
           <a:p>
             <a:fld id="{E04F2FE0-66D1-4517-A0FE-1ABC94B036F1}" type="datetimeFigureOut">
               <a:rPr lang="en-US" smtClean="0"/>
-              <a:t>10/31/16</a:t>
+              <a:t>11/1/16</a:t>
             </a:fld>
             <a:endParaRPr lang="en-US"/>
           </a:p>
@@ -6249,7 +6250,7 @@
           <a:p>
             <a:fld id="{E04F2FE0-66D1-4517-A0FE-1ABC94B036F1}" type="datetimeFigureOut">
               <a:rPr lang="en-US" smtClean="0"/>
-              <a:t>10/31/16</a:t>
+              <a:t>11/1/16</a:t>
             </a:fld>
             <a:endParaRPr lang="en-US"/>
           </a:p>
@@ -6481,7 +6482,7 @@
           <a:p>
             <a:fld id="{E04F2FE0-66D1-4517-A0FE-1ABC94B036F1}" type="datetimeFigureOut">
               <a:rPr lang="en-US" smtClean="0"/>
-              <a:t>10/31/16</a:t>
+              <a:t>11/1/16</a:t>
             </a:fld>
             <a:endParaRPr lang="en-US"/>
           </a:p>
@@ -6848,7 +6849,7 @@
           <a:p>
             <a:fld id="{E04F2FE0-66D1-4517-A0FE-1ABC94B036F1}" type="datetimeFigureOut">
               <a:rPr lang="en-US" smtClean="0"/>
-              <a:t>10/31/16</a:t>
+              <a:t>11/1/16</a:t>
             </a:fld>
             <a:endParaRPr lang="en-US"/>
           </a:p>
@@ -6966,7 +6967,7 @@
           <a:p>
             <a:fld id="{E04F2FE0-66D1-4517-A0FE-1ABC94B036F1}" type="datetimeFigureOut">
               <a:rPr lang="en-US" smtClean="0"/>
-              <a:t>10/31/16</a:t>
+              <a:t>11/1/16</a:t>
             </a:fld>
             <a:endParaRPr lang="en-US"/>
           </a:p>
@@ -7061,7 +7062,7 @@
           <a:p>
             <a:fld id="{E04F2FE0-66D1-4517-A0FE-1ABC94B036F1}" type="datetimeFigureOut">
               <a:rPr lang="en-US" smtClean="0"/>
-              <a:t>10/31/16</a:t>
+              <a:t>11/1/16</a:t>
             </a:fld>
             <a:endParaRPr lang="en-US"/>
           </a:p>
@@ -7338,7 +7339,7 @@
           <a:p>
             <a:fld id="{E04F2FE0-66D1-4517-A0FE-1ABC94B036F1}" type="datetimeFigureOut">
               <a:rPr lang="en-US" smtClean="0"/>
-              <a:t>10/31/16</a:t>
+              <a:t>11/1/16</a:t>
             </a:fld>
             <a:endParaRPr lang="en-US"/>
           </a:p>
@@ -7595,7 +7596,7 @@
           <a:p>
             <a:fld id="{E04F2FE0-66D1-4517-A0FE-1ABC94B036F1}" type="datetimeFigureOut">
               <a:rPr lang="en-US" smtClean="0"/>
-              <a:t>10/31/16</a:t>
+              <a:t>11/1/16</a:t>
             </a:fld>
             <a:endParaRPr lang="en-US"/>
           </a:p>
@@ -7808,7 +7809,7 @@
           <a:p>
             <a:fld id="{E04F2FE0-66D1-4517-A0FE-1ABC94B036F1}" type="datetimeFigureOut">
               <a:rPr lang="en-US" smtClean="0"/>
-              <a:t>10/31/16</a:t>
+              <a:t>11/1/16</a:t>
             </a:fld>
             <a:endParaRPr lang="en-US"/>
           </a:p>
@@ -8258,15 +8259,7 @@
           <a:p>
             <a:r>
               <a:rPr lang="en-US" dirty="0" smtClean="0"/>
-              <a:t>Slides </a:t>
-            </a:r>
-            <a:r>
-              <a:rPr lang="en-US" dirty="0" smtClean="0"/>
-              <a:t>courtesy of </a:t>
-            </a:r>
-            <a:r>
-              <a:rPr lang="en-US" dirty="0" smtClean="0"/>
-              <a:t>Patrick </a:t>
+              <a:t>Slides courtesy of Patrick </a:t>
             </a:r>
             <a:r>
               <a:rPr lang="en-US" dirty="0" err="1" smtClean="0"/>
@@ -8274,11 +8267,7 @@
             </a:r>
             <a:r>
               <a:rPr lang="en-US" dirty="0" smtClean="0"/>
-              <a:t>, Nick McKeown, </a:t>
-            </a:r>
-            <a:r>
-              <a:rPr lang="en-US" dirty="0" smtClean="0"/>
-              <a:t>and Mihai </a:t>
+              <a:t>, Nick McKeown, and Mihai </a:t>
             </a:r>
             <a:r>
               <a:rPr lang="en-US" dirty="0" err="1" smtClean="0"/>
@@ -19802,9 +19791,19 @@
             <a:pPr lvl="2"/>
             <a:r>
               <a:rPr lang="en-US" dirty="0" smtClean="0"/>
-              <a:t>Compute RTT sums for RCP.</a:t>
+              <a:t>Compute RTT sums for RCP</a:t>
+            </a:r>
+            <a:r>
+              <a:rPr lang="en-US" dirty="0" smtClean="0"/>
+              <a:t>.</a:t>
             </a:r>
             <a:endParaRPr lang="en-US" dirty="0"/>
+          </a:p>
+          <a:p>
+            <a:r>
+              <a:rPr lang="en-US" dirty="0" smtClean="0"/>
+              <a:t>But, can’t do everything: regex, state machines, payload manipulation</a:t>
+            </a:r>
           </a:p>
         </p:txBody>
       </p:sp>
@@ -19844,7 +19843,479 @@
   <p:timing>
     <p:tnLst>
       <p:par>
-        <p:cTn id="1" dur="indefinite" restart="never" nodeType="tmRoot"/>
+        <p:cTn id="1" dur="indefinite" restart="never" nodeType="tmRoot">
+          <p:childTnLst>
+            <p:seq concurrent="1" nextAc="seek">
+              <p:cTn id="2" dur="indefinite" nodeType="mainSeq">
+                <p:childTnLst>
+                  <p:par>
+                    <p:cTn id="3" fill="hold">
+                      <p:stCondLst>
+                        <p:cond delay="indefinite"/>
+                      </p:stCondLst>
+                      <p:childTnLst>
+                        <p:par>
+                          <p:cTn id="4" fill="hold">
+                            <p:stCondLst>
+                              <p:cond delay="0"/>
+                            </p:stCondLst>
+                            <p:childTnLst>
+                              <p:par>
+                                <p:cTn id="5" presetID="1" presetClass="entr" presetSubtype="0" fill="hold" nodeType="clickEffect">
+                                  <p:stCondLst>
+                                    <p:cond delay="0"/>
+                                  </p:stCondLst>
+                                  <p:childTnLst>
+                                    <p:set>
+                                      <p:cBhvr>
+                                        <p:cTn id="6" dur="1" fill="hold">
+                                          <p:stCondLst>
+                                            <p:cond delay="0"/>
+                                          </p:stCondLst>
+                                        </p:cTn>
+                                        <p:tgtEl>
+                                          <p:spTgt spid="3">
+                                            <p:txEl>
+                                              <p:pRg st="0" end="0"/>
+                                            </p:txEl>
+                                          </p:spTgt>
+                                        </p:tgtEl>
+                                        <p:attrNameLst>
+                                          <p:attrName>style.visibility</p:attrName>
+                                        </p:attrNameLst>
+                                      </p:cBhvr>
+                                      <p:to>
+                                        <p:strVal val="visible"/>
+                                      </p:to>
+                                    </p:set>
+                                  </p:childTnLst>
+                                </p:cTn>
+                              </p:par>
+                            </p:childTnLst>
+                          </p:cTn>
+                        </p:par>
+                      </p:childTnLst>
+                    </p:cTn>
+                  </p:par>
+                  <p:par>
+                    <p:cTn id="7" fill="hold">
+                      <p:stCondLst>
+                        <p:cond delay="indefinite"/>
+                      </p:stCondLst>
+                      <p:childTnLst>
+                        <p:par>
+                          <p:cTn id="8" fill="hold">
+                            <p:stCondLst>
+                              <p:cond delay="0"/>
+                            </p:stCondLst>
+                            <p:childTnLst>
+                              <p:par>
+                                <p:cTn id="9" presetID="1" presetClass="entr" presetSubtype="0" fill="hold" nodeType="clickEffect">
+                                  <p:stCondLst>
+                                    <p:cond delay="0"/>
+                                  </p:stCondLst>
+                                  <p:childTnLst>
+                                    <p:set>
+                                      <p:cBhvr>
+                                        <p:cTn id="10" dur="1" fill="hold">
+                                          <p:stCondLst>
+                                            <p:cond delay="0"/>
+                                          </p:stCondLst>
+                                        </p:cTn>
+                                        <p:tgtEl>
+                                          <p:spTgt spid="3">
+                                            <p:txEl>
+                                              <p:pRg st="1" end="1"/>
+                                            </p:txEl>
+                                          </p:spTgt>
+                                        </p:tgtEl>
+                                        <p:attrNameLst>
+                                          <p:attrName>style.visibility</p:attrName>
+                                        </p:attrNameLst>
+                                      </p:cBhvr>
+                                      <p:to>
+                                        <p:strVal val="visible"/>
+                                      </p:to>
+                                    </p:set>
+                                  </p:childTnLst>
+                                </p:cTn>
+                              </p:par>
+                              <p:par>
+                                <p:cTn id="11" presetID="1" presetClass="entr" presetSubtype="0" fill="hold" nodeType="withEffect">
+                                  <p:stCondLst>
+                                    <p:cond delay="0"/>
+                                  </p:stCondLst>
+                                  <p:childTnLst>
+                                    <p:set>
+                                      <p:cBhvr>
+                                        <p:cTn id="12" dur="1" fill="hold">
+                                          <p:stCondLst>
+                                            <p:cond delay="0"/>
+                                          </p:stCondLst>
+                                        </p:cTn>
+                                        <p:tgtEl>
+                                          <p:spTgt spid="3">
+                                            <p:txEl>
+                                              <p:pRg st="2" end="2"/>
+                                            </p:txEl>
+                                          </p:spTgt>
+                                        </p:tgtEl>
+                                        <p:attrNameLst>
+                                          <p:attrName>style.visibility</p:attrName>
+                                        </p:attrNameLst>
+                                      </p:cBhvr>
+                                      <p:to>
+                                        <p:strVal val="visible"/>
+                                      </p:to>
+                                    </p:set>
+                                  </p:childTnLst>
+                                </p:cTn>
+                              </p:par>
+                              <p:par>
+                                <p:cTn id="13" presetID="1" presetClass="entr" presetSubtype="0" fill="hold" nodeType="withEffect">
+                                  <p:stCondLst>
+                                    <p:cond delay="0"/>
+                                  </p:stCondLst>
+                                  <p:childTnLst>
+                                    <p:set>
+                                      <p:cBhvr>
+                                        <p:cTn id="14" dur="1" fill="hold">
+                                          <p:stCondLst>
+                                            <p:cond delay="0"/>
+                                          </p:stCondLst>
+                                        </p:cTn>
+                                        <p:tgtEl>
+                                          <p:spTgt spid="3">
+                                            <p:txEl>
+                                              <p:pRg st="3" end="3"/>
+                                            </p:txEl>
+                                          </p:spTgt>
+                                        </p:tgtEl>
+                                        <p:attrNameLst>
+                                          <p:attrName>style.visibility</p:attrName>
+                                        </p:attrNameLst>
+                                      </p:cBhvr>
+                                      <p:to>
+                                        <p:strVal val="visible"/>
+                                      </p:to>
+                                    </p:set>
+                                  </p:childTnLst>
+                                </p:cTn>
+                              </p:par>
+                            </p:childTnLst>
+                          </p:cTn>
+                        </p:par>
+                      </p:childTnLst>
+                    </p:cTn>
+                  </p:par>
+                  <p:par>
+                    <p:cTn id="15" fill="hold">
+                      <p:stCondLst>
+                        <p:cond delay="indefinite"/>
+                      </p:stCondLst>
+                      <p:childTnLst>
+                        <p:par>
+                          <p:cTn id="16" fill="hold">
+                            <p:stCondLst>
+                              <p:cond delay="0"/>
+                            </p:stCondLst>
+                            <p:childTnLst>
+                              <p:par>
+                                <p:cTn id="17" presetID="1" presetClass="entr" presetSubtype="0" fill="hold" nodeType="clickEffect">
+                                  <p:stCondLst>
+                                    <p:cond delay="0"/>
+                                  </p:stCondLst>
+                                  <p:childTnLst>
+                                    <p:set>
+                                      <p:cBhvr>
+                                        <p:cTn id="18" dur="1" fill="hold">
+                                          <p:stCondLst>
+                                            <p:cond delay="0"/>
+                                          </p:stCondLst>
+                                        </p:cTn>
+                                        <p:tgtEl>
+                                          <p:spTgt spid="3">
+                                            <p:txEl>
+                                              <p:pRg st="4" end="4"/>
+                                            </p:txEl>
+                                          </p:spTgt>
+                                        </p:tgtEl>
+                                        <p:attrNameLst>
+                                          <p:attrName>style.visibility</p:attrName>
+                                        </p:attrNameLst>
+                                      </p:cBhvr>
+                                      <p:to>
+                                        <p:strVal val="visible"/>
+                                      </p:to>
+                                    </p:set>
+                                  </p:childTnLst>
+                                </p:cTn>
+                              </p:par>
+                              <p:par>
+                                <p:cTn id="19" presetID="1" presetClass="entr" presetSubtype="0" fill="hold" nodeType="withEffect">
+                                  <p:stCondLst>
+                                    <p:cond delay="0"/>
+                                  </p:stCondLst>
+                                  <p:childTnLst>
+                                    <p:set>
+                                      <p:cBhvr>
+                                        <p:cTn id="20" dur="1" fill="hold">
+                                          <p:stCondLst>
+                                            <p:cond delay="0"/>
+                                          </p:stCondLst>
+                                        </p:cTn>
+                                        <p:tgtEl>
+                                          <p:spTgt spid="3">
+                                            <p:txEl>
+                                              <p:pRg st="5" end="5"/>
+                                            </p:txEl>
+                                          </p:spTgt>
+                                        </p:tgtEl>
+                                        <p:attrNameLst>
+                                          <p:attrName>style.visibility</p:attrName>
+                                        </p:attrNameLst>
+                                      </p:cBhvr>
+                                      <p:to>
+                                        <p:strVal val="visible"/>
+                                      </p:to>
+                                    </p:set>
+                                  </p:childTnLst>
+                                </p:cTn>
+                              </p:par>
+                            </p:childTnLst>
+                          </p:cTn>
+                        </p:par>
+                      </p:childTnLst>
+                    </p:cTn>
+                  </p:par>
+                  <p:par>
+                    <p:cTn id="21" fill="hold">
+                      <p:stCondLst>
+                        <p:cond delay="indefinite"/>
+                      </p:stCondLst>
+                      <p:childTnLst>
+                        <p:par>
+                          <p:cTn id="22" fill="hold">
+                            <p:stCondLst>
+                              <p:cond delay="0"/>
+                            </p:stCondLst>
+                            <p:childTnLst>
+                              <p:par>
+                                <p:cTn id="23" presetID="1" presetClass="entr" presetSubtype="0" fill="hold" nodeType="clickEffect">
+                                  <p:stCondLst>
+                                    <p:cond delay="0"/>
+                                  </p:stCondLst>
+                                  <p:childTnLst>
+                                    <p:set>
+                                      <p:cBhvr>
+                                        <p:cTn id="24" dur="1" fill="hold">
+                                          <p:stCondLst>
+                                            <p:cond delay="0"/>
+                                          </p:stCondLst>
+                                        </p:cTn>
+                                        <p:tgtEl>
+                                          <p:spTgt spid="3">
+                                            <p:txEl>
+                                              <p:pRg st="6" end="6"/>
+                                            </p:txEl>
+                                          </p:spTgt>
+                                        </p:tgtEl>
+                                        <p:attrNameLst>
+                                          <p:attrName>style.visibility</p:attrName>
+                                        </p:attrNameLst>
+                                      </p:cBhvr>
+                                      <p:to>
+                                        <p:strVal val="visible"/>
+                                      </p:to>
+                                    </p:set>
+                                  </p:childTnLst>
+                                </p:cTn>
+                              </p:par>
+                              <p:par>
+                                <p:cTn id="25" presetID="1" presetClass="entr" presetSubtype="0" fill="hold" nodeType="withEffect">
+                                  <p:stCondLst>
+                                    <p:cond delay="0"/>
+                                  </p:stCondLst>
+                                  <p:childTnLst>
+                                    <p:set>
+                                      <p:cBhvr>
+                                        <p:cTn id="26" dur="1" fill="hold">
+                                          <p:stCondLst>
+                                            <p:cond delay="0"/>
+                                          </p:stCondLst>
+                                        </p:cTn>
+                                        <p:tgtEl>
+                                          <p:spTgt spid="3">
+                                            <p:txEl>
+                                              <p:pRg st="7" end="7"/>
+                                            </p:txEl>
+                                          </p:spTgt>
+                                        </p:tgtEl>
+                                        <p:attrNameLst>
+                                          <p:attrName>style.visibility</p:attrName>
+                                        </p:attrNameLst>
+                                      </p:cBhvr>
+                                      <p:to>
+                                        <p:strVal val="visible"/>
+                                      </p:to>
+                                    </p:set>
+                                  </p:childTnLst>
+                                </p:cTn>
+                              </p:par>
+                            </p:childTnLst>
+                          </p:cTn>
+                        </p:par>
+                      </p:childTnLst>
+                    </p:cTn>
+                  </p:par>
+                  <p:par>
+                    <p:cTn id="27" fill="hold">
+                      <p:stCondLst>
+                        <p:cond delay="indefinite"/>
+                      </p:stCondLst>
+                      <p:childTnLst>
+                        <p:par>
+                          <p:cTn id="28" fill="hold">
+                            <p:stCondLst>
+                              <p:cond delay="0"/>
+                            </p:stCondLst>
+                            <p:childTnLst>
+                              <p:par>
+                                <p:cTn id="29" presetID="1" presetClass="entr" presetSubtype="0" fill="hold" nodeType="clickEffect">
+                                  <p:stCondLst>
+                                    <p:cond delay="0"/>
+                                  </p:stCondLst>
+                                  <p:childTnLst>
+                                    <p:set>
+                                      <p:cBhvr>
+                                        <p:cTn id="30" dur="1" fill="hold">
+                                          <p:stCondLst>
+                                            <p:cond delay="0"/>
+                                          </p:stCondLst>
+                                        </p:cTn>
+                                        <p:tgtEl>
+                                          <p:spTgt spid="3">
+                                            <p:txEl>
+                                              <p:pRg st="8" end="8"/>
+                                            </p:txEl>
+                                          </p:spTgt>
+                                        </p:tgtEl>
+                                        <p:attrNameLst>
+                                          <p:attrName>style.visibility</p:attrName>
+                                        </p:attrNameLst>
+                                      </p:cBhvr>
+                                      <p:to>
+                                        <p:strVal val="visible"/>
+                                      </p:to>
+                                    </p:set>
+                                  </p:childTnLst>
+                                </p:cTn>
+                              </p:par>
+                              <p:par>
+                                <p:cTn id="31" presetID="1" presetClass="entr" presetSubtype="0" fill="hold" nodeType="withEffect">
+                                  <p:stCondLst>
+                                    <p:cond delay="0"/>
+                                  </p:stCondLst>
+                                  <p:childTnLst>
+                                    <p:set>
+                                      <p:cBhvr>
+                                        <p:cTn id="32" dur="1" fill="hold">
+                                          <p:stCondLst>
+                                            <p:cond delay="0"/>
+                                          </p:stCondLst>
+                                        </p:cTn>
+                                        <p:tgtEl>
+                                          <p:spTgt spid="3">
+                                            <p:txEl>
+                                              <p:pRg st="9" end="9"/>
+                                            </p:txEl>
+                                          </p:spTgt>
+                                        </p:tgtEl>
+                                        <p:attrNameLst>
+                                          <p:attrName>style.visibility</p:attrName>
+                                        </p:attrNameLst>
+                                      </p:cBhvr>
+                                      <p:to>
+                                        <p:strVal val="visible"/>
+                                      </p:to>
+                                    </p:set>
+                                  </p:childTnLst>
+                                </p:cTn>
+                              </p:par>
+                            </p:childTnLst>
+                          </p:cTn>
+                        </p:par>
+                      </p:childTnLst>
+                    </p:cTn>
+                  </p:par>
+                  <p:par>
+                    <p:cTn id="33" fill="hold">
+                      <p:stCondLst>
+                        <p:cond delay="indefinite"/>
+                      </p:stCondLst>
+                      <p:childTnLst>
+                        <p:par>
+                          <p:cTn id="34" fill="hold">
+                            <p:stCondLst>
+                              <p:cond delay="0"/>
+                            </p:stCondLst>
+                            <p:childTnLst>
+                              <p:par>
+                                <p:cTn id="35" presetID="1" presetClass="entr" presetSubtype="0" fill="hold" nodeType="clickEffect">
+                                  <p:stCondLst>
+                                    <p:cond delay="0"/>
+                                  </p:stCondLst>
+                                  <p:childTnLst>
+                                    <p:set>
+                                      <p:cBhvr>
+                                        <p:cTn id="36" dur="1" fill="hold">
+                                          <p:stCondLst>
+                                            <p:cond delay="0"/>
+                                          </p:stCondLst>
+                                        </p:cTn>
+                                        <p:tgtEl>
+                                          <p:spTgt spid="3">
+                                            <p:txEl>
+                                              <p:pRg st="10" end="10"/>
+                                            </p:txEl>
+                                          </p:spTgt>
+                                        </p:tgtEl>
+                                        <p:attrNameLst>
+                                          <p:attrName>style.visibility</p:attrName>
+                                        </p:attrNameLst>
+                                      </p:cBhvr>
+                                      <p:to>
+                                        <p:strVal val="visible"/>
+                                      </p:to>
+                                    </p:set>
+                                  </p:childTnLst>
+                                </p:cTn>
+                              </p:par>
+                            </p:childTnLst>
+                          </p:cTn>
+                        </p:par>
+                      </p:childTnLst>
+                    </p:cTn>
+                  </p:par>
+                </p:childTnLst>
+              </p:cTn>
+              <p:prevCondLst>
+                <p:cond evt="onPrev" delay="0">
+                  <p:tgtEl>
+                    <p:sldTgt/>
+                  </p:tgtEl>
+                </p:cond>
+              </p:prevCondLst>
+              <p:nextCondLst>
+                <p:cond evt="onNext" delay="0">
+                  <p:tgtEl>
+                    <p:sldTgt/>
+                  </p:tgtEl>
+                </p:cond>
+              </p:nextCondLst>
+            </p:seq>
+          </p:childTnLst>
+        </p:cTn>
       </p:par>
     </p:tnLst>
   </p:timing>
@@ -23391,7 +23862,15 @@
           <a:p>
             <a:r>
               <a:rPr lang="en-US" dirty="0" smtClean="0"/>
-              <a:t>How do the parser and match-action pipeline work at the hardware level?</a:t>
+              <a:t>How do the parser and match-action </a:t>
+            </a:r>
+            <a:r>
+              <a:rPr lang="en-US" dirty="0" smtClean="0"/>
+              <a:t>hardware</a:t>
+            </a:r>
+            <a:r>
+              <a:rPr lang="en-US" dirty="0" smtClean="0"/>
+              <a:t> work?</a:t>
             </a:r>
             <a:endParaRPr lang="en-US" dirty="0"/>
           </a:p>
@@ -35309,6 +35788,351 @@
           <a:p>
             <a:r>
               <a:rPr lang="en-US" dirty="0" smtClean="0"/>
+              <a:t>Questions</a:t>
+            </a:r>
+            <a:endParaRPr lang="en-US" dirty="0"/>
+          </a:p>
+        </p:txBody>
+      </p:sp>
+      <p:sp>
+        <p:nvSpPr>
+          <p:cNvPr id="3" name="Content Placeholder 2"/>
+          <p:cNvSpPr>
+            <a:spLocks noGrp="1"/>
+          </p:cNvSpPr>
+          <p:nvPr>
+            <p:ph idx="1"/>
+          </p:nvPr>
+        </p:nvSpPr>
+        <p:spPr/>
+        <p:txBody>
+          <a:bodyPr/>
+          <a:lstStyle/>
+          <a:p>
+            <a:r>
+              <a:rPr lang="en-US" dirty="0" smtClean="0"/>
+              <a:t>Why are there 16 parsers but only one pipeline?</a:t>
+            </a:r>
+          </a:p>
+          <a:p>
+            <a:endParaRPr lang="en-US" dirty="0"/>
+          </a:p>
+          <a:p>
+            <a:r>
+              <a:rPr lang="en-US" dirty="0" smtClean="0"/>
+              <a:t>This switch supports 640 </a:t>
+            </a:r>
+            <a:r>
+              <a:rPr lang="en-US" dirty="0" err="1" smtClean="0"/>
+              <a:t>Gbit</a:t>
+            </a:r>
+            <a:r>
+              <a:rPr lang="en-US" dirty="0" smtClean="0"/>
+              <a:t>/s. Switches today support &gt; 1 </a:t>
+            </a:r>
+            <a:r>
+              <a:rPr lang="en-US" dirty="0" err="1" smtClean="0"/>
+              <a:t>Tbit</a:t>
+            </a:r>
+            <a:r>
+              <a:rPr lang="en-US" dirty="0" smtClean="0"/>
+              <a:t>/s.  How does this happen?</a:t>
+            </a:r>
+          </a:p>
+          <a:p>
+            <a:endParaRPr lang="en-US" dirty="0"/>
+          </a:p>
+          <a:p>
+            <a:r>
+              <a:rPr lang="en-US" dirty="0" smtClean="0"/>
+              <a:t>What do you think the chip’s die consists of?</a:t>
+            </a:r>
+          </a:p>
+          <a:p>
+            <a:endParaRPr lang="en-US" dirty="0"/>
+          </a:p>
+          <a:p>
+            <a:r>
+              <a:rPr lang="en-US" dirty="0" smtClean="0"/>
+              <a:t>How much do each of these components contribute?</a:t>
+            </a:r>
+            <a:endParaRPr lang="en-US" dirty="0"/>
+          </a:p>
+        </p:txBody>
+      </p:sp>
+    </p:spTree>
+    <p:extLst>
+      <p:ext uri="{BB962C8B-B14F-4D97-AF65-F5344CB8AC3E}">
+        <p14:creationId xmlns:p14="http://schemas.microsoft.com/office/powerpoint/2010/main" val="1146696760"/>
+      </p:ext>
+    </p:extLst>
+  </p:cSld>
+  <p:clrMapOvr>
+    <a:masterClrMapping/>
+  </p:clrMapOvr>
+  <p:timing>
+    <p:tnLst>
+      <p:par>
+        <p:cTn id="1" dur="indefinite" restart="never" nodeType="tmRoot">
+          <p:childTnLst>
+            <p:seq concurrent="1" nextAc="seek">
+              <p:cTn id="2" dur="indefinite" nodeType="mainSeq">
+                <p:childTnLst>
+                  <p:par>
+                    <p:cTn id="3" fill="hold">
+                      <p:stCondLst>
+                        <p:cond delay="indefinite"/>
+                      </p:stCondLst>
+                      <p:childTnLst>
+                        <p:par>
+                          <p:cTn id="4" fill="hold">
+                            <p:stCondLst>
+                              <p:cond delay="0"/>
+                            </p:stCondLst>
+                            <p:childTnLst>
+                              <p:par>
+                                <p:cTn id="5" presetID="1" presetClass="entr" presetSubtype="0" fill="hold" nodeType="clickEffect">
+                                  <p:stCondLst>
+                                    <p:cond delay="0"/>
+                                  </p:stCondLst>
+                                  <p:childTnLst>
+                                    <p:set>
+                                      <p:cBhvr>
+                                        <p:cTn id="6" dur="1" fill="hold">
+                                          <p:stCondLst>
+                                            <p:cond delay="0"/>
+                                          </p:stCondLst>
+                                        </p:cTn>
+                                        <p:tgtEl>
+                                          <p:spTgt spid="3">
+                                            <p:txEl>
+                                              <p:pRg st="0" end="0"/>
+                                            </p:txEl>
+                                          </p:spTgt>
+                                        </p:tgtEl>
+                                        <p:attrNameLst>
+                                          <p:attrName>style.visibility</p:attrName>
+                                        </p:attrNameLst>
+                                      </p:cBhvr>
+                                      <p:to>
+                                        <p:strVal val="visible"/>
+                                      </p:to>
+                                    </p:set>
+                                  </p:childTnLst>
+                                </p:cTn>
+                              </p:par>
+                            </p:childTnLst>
+                          </p:cTn>
+                        </p:par>
+                      </p:childTnLst>
+                    </p:cTn>
+                  </p:par>
+                  <p:par>
+                    <p:cTn id="7" fill="hold">
+                      <p:stCondLst>
+                        <p:cond delay="indefinite"/>
+                      </p:stCondLst>
+                      <p:childTnLst>
+                        <p:par>
+                          <p:cTn id="8" fill="hold">
+                            <p:stCondLst>
+                              <p:cond delay="0"/>
+                            </p:stCondLst>
+                            <p:childTnLst>
+                              <p:par>
+                                <p:cTn id="9" presetID="1" presetClass="entr" presetSubtype="0" fill="hold" nodeType="clickEffect">
+                                  <p:stCondLst>
+                                    <p:cond delay="0"/>
+                                  </p:stCondLst>
+                                  <p:childTnLst>
+                                    <p:set>
+                                      <p:cBhvr>
+                                        <p:cTn id="10" dur="1" fill="hold">
+                                          <p:stCondLst>
+                                            <p:cond delay="0"/>
+                                          </p:stCondLst>
+                                        </p:cTn>
+                                        <p:tgtEl>
+                                          <p:spTgt spid="3">
+                                            <p:txEl>
+                                              <p:pRg st="2" end="2"/>
+                                            </p:txEl>
+                                          </p:spTgt>
+                                        </p:tgtEl>
+                                        <p:attrNameLst>
+                                          <p:attrName>style.visibility</p:attrName>
+                                        </p:attrNameLst>
+                                      </p:cBhvr>
+                                      <p:to>
+                                        <p:strVal val="visible"/>
+                                      </p:to>
+                                    </p:set>
+                                  </p:childTnLst>
+                                </p:cTn>
+                              </p:par>
+                            </p:childTnLst>
+                          </p:cTn>
+                        </p:par>
+                      </p:childTnLst>
+                    </p:cTn>
+                  </p:par>
+                  <p:par>
+                    <p:cTn id="11" fill="hold">
+                      <p:stCondLst>
+                        <p:cond delay="indefinite"/>
+                      </p:stCondLst>
+                      <p:childTnLst>
+                        <p:par>
+                          <p:cTn id="12" fill="hold">
+                            <p:stCondLst>
+                              <p:cond delay="0"/>
+                            </p:stCondLst>
+                            <p:childTnLst>
+                              <p:par>
+                                <p:cTn id="13" presetID="1" presetClass="entr" presetSubtype="0" fill="hold" nodeType="clickEffect">
+                                  <p:stCondLst>
+                                    <p:cond delay="0"/>
+                                  </p:stCondLst>
+                                  <p:childTnLst>
+                                    <p:set>
+                                      <p:cBhvr>
+                                        <p:cTn id="14" dur="1" fill="hold">
+                                          <p:stCondLst>
+                                            <p:cond delay="0"/>
+                                          </p:stCondLst>
+                                        </p:cTn>
+                                        <p:tgtEl>
+                                          <p:spTgt spid="3">
+                                            <p:txEl>
+                                              <p:pRg st="4" end="4"/>
+                                            </p:txEl>
+                                          </p:spTgt>
+                                        </p:tgtEl>
+                                        <p:attrNameLst>
+                                          <p:attrName>style.visibility</p:attrName>
+                                        </p:attrNameLst>
+                                      </p:cBhvr>
+                                      <p:to>
+                                        <p:strVal val="visible"/>
+                                      </p:to>
+                                    </p:set>
+                                  </p:childTnLst>
+                                </p:cTn>
+                              </p:par>
+                            </p:childTnLst>
+                          </p:cTn>
+                        </p:par>
+                      </p:childTnLst>
+                    </p:cTn>
+                  </p:par>
+                  <p:par>
+                    <p:cTn id="15" fill="hold">
+                      <p:stCondLst>
+                        <p:cond delay="indefinite"/>
+                      </p:stCondLst>
+                      <p:childTnLst>
+                        <p:par>
+                          <p:cTn id="16" fill="hold">
+                            <p:stCondLst>
+                              <p:cond delay="0"/>
+                            </p:stCondLst>
+                            <p:childTnLst>
+                              <p:par>
+                                <p:cTn id="17" presetID="1" presetClass="entr" presetSubtype="0" fill="hold" nodeType="clickEffect">
+                                  <p:stCondLst>
+                                    <p:cond delay="0"/>
+                                  </p:stCondLst>
+                                  <p:childTnLst>
+                                    <p:set>
+                                      <p:cBhvr>
+                                        <p:cTn id="18" dur="1" fill="hold">
+                                          <p:stCondLst>
+                                            <p:cond delay="0"/>
+                                          </p:stCondLst>
+                                        </p:cTn>
+                                        <p:tgtEl>
+                                          <p:spTgt spid="3">
+                                            <p:txEl>
+                                              <p:pRg st="6" end="6"/>
+                                            </p:txEl>
+                                          </p:spTgt>
+                                        </p:tgtEl>
+                                        <p:attrNameLst>
+                                          <p:attrName>style.visibility</p:attrName>
+                                        </p:attrNameLst>
+                                      </p:cBhvr>
+                                      <p:to>
+                                        <p:strVal val="visible"/>
+                                      </p:to>
+                                    </p:set>
+                                  </p:childTnLst>
+                                </p:cTn>
+                              </p:par>
+                            </p:childTnLst>
+                          </p:cTn>
+                        </p:par>
+                      </p:childTnLst>
+                    </p:cTn>
+                  </p:par>
+                </p:childTnLst>
+              </p:cTn>
+              <p:prevCondLst>
+                <p:cond evt="onPrev" delay="0">
+                  <p:tgtEl>
+                    <p:sldTgt/>
+                  </p:tgtEl>
+                </p:cond>
+              </p:prevCondLst>
+              <p:nextCondLst>
+                <p:cond evt="onNext" delay="0">
+                  <p:tgtEl>
+                    <p:sldTgt/>
+                  </p:tgtEl>
+                </p:cond>
+              </p:nextCondLst>
+            </p:seq>
+          </p:childTnLst>
+        </p:cTn>
+      </p:par>
+    </p:tnLst>
+  </p:timing>
+</p:sld>
+</file>
+
+<file path=ppt/slides/slide31.xml><?xml version="1.0" encoding="utf-8"?>
+<p:sld xmlns:a="http://schemas.openxmlformats.org/drawingml/2006/main" xmlns:r="http://schemas.openxmlformats.org/officeDocument/2006/relationships" xmlns:p="http://schemas.openxmlformats.org/presentationml/2006/main">
+  <p:cSld>
+    <p:spTree>
+      <p:nvGrpSpPr>
+        <p:cNvPr id="1" name=""/>
+        <p:cNvGrpSpPr/>
+        <p:nvPr/>
+      </p:nvGrpSpPr>
+      <p:grpSpPr>
+        <a:xfrm>
+          <a:off x="0" y="0"/>
+          <a:ext cx="0" cy="0"/>
+          <a:chOff x="0" y="0"/>
+          <a:chExt cx="0" cy="0"/>
+        </a:xfrm>
+      </p:grpSpPr>
+      <p:sp>
+        <p:nvSpPr>
+          <p:cNvPr id="2" name="Title 1"/>
+          <p:cNvSpPr>
+            <a:spLocks noGrp="1"/>
+          </p:cNvSpPr>
+          <p:nvPr>
+            <p:ph type="title"/>
+          </p:nvPr>
+        </p:nvSpPr>
+        <p:spPr/>
+        <p:txBody>
+          <a:bodyPr/>
+          <a:lstStyle/>
+          <a:p>
+            <a:r>
+              <a:rPr lang="en-US" dirty="0" smtClean="0"/>
               <a:t>Switch chip area</a:t>
             </a:r>
             <a:endParaRPr lang="en-US" dirty="0"/>
@@ -36220,7 +37044,7 @@
 </p:sld>
 </file>
 
-<file path=ppt/slides/slide31.xml><?xml version="1.0" encoding="utf-8"?>
+<file path=ppt/slides/slide32.xml><?xml version="1.0" encoding="utf-8"?>
 <p:sld xmlns:a="http://schemas.openxmlformats.org/drawingml/2006/main" xmlns:r="http://schemas.openxmlformats.org/officeDocument/2006/relationships" xmlns:p="http://schemas.openxmlformats.org/presentationml/2006/main">
   <p:cSld>
     <p:spTree>
@@ -36565,7 +37389,7 @@
 </p:sld>
 </file>
 
-<file path=ppt/slides/slide32.xml><?xml version="1.0" encoding="utf-8"?>
+<file path=ppt/slides/slide33.xml><?xml version="1.0" encoding="utf-8"?>
 <p:sld xmlns:a="http://schemas.openxmlformats.org/drawingml/2006/main" xmlns:r="http://schemas.openxmlformats.org/officeDocument/2006/relationships" xmlns:p="http://schemas.openxmlformats.org/presentationml/2006/main">
   <p:cSld>
     <p:spTree>
@@ -38290,7 +39114,7 @@
 </p:sld>
 </file>
 
-<file path=ppt/slides/slide33.xml><?xml version="1.0" encoding="utf-8"?>
+<file path=ppt/slides/slide34.xml><?xml version="1.0" encoding="utf-8"?>
 <p:sld xmlns:a="http://schemas.openxmlformats.org/drawingml/2006/main" xmlns:r="http://schemas.openxmlformats.org/officeDocument/2006/relationships" xmlns:p="http://schemas.openxmlformats.org/presentationml/2006/main">
   <p:cSld>
     <p:spTree>
@@ -39072,7 +39896,7 @@
 </p:sld>
 </file>
 
-<file path=ppt/slides/slide34.xml><?xml version="1.0" encoding="utf-8"?>
+<file path=ppt/slides/slide35.xml><?xml version="1.0" encoding="utf-8"?>
 <p:sld xmlns:a="http://schemas.openxmlformats.org/drawingml/2006/main" xmlns:r="http://schemas.openxmlformats.org/officeDocument/2006/relationships" xmlns:p="http://schemas.openxmlformats.org/presentationml/2006/main">
   <p:cSld>
     <p:spTree>
@@ -39162,8 +39986,13 @@
           <a:p>
             <a:r>
               <a:rPr lang="en-US" dirty="0" smtClean="0"/>
-              <a:t>Fairly simple language.</a:t>
-            </a:r>
+              <a:t>Fairly simple language</a:t>
+            </a:r>
+            <a:r>
+              <a:rPr lang="en-US" dirty="0" smtClean="0"/>
+              <a:t>. What do you think is missing?</a:t>
+            </a:r>
+            <a:endParaRPr lang="en-US" dirty="0" smtClean="0"/>
           </a:p>
           <a:p>
             <a:pPr lvl="1"/>
@@ -39178,8 +40007,17 @@
           <a:p>
             <a:r>
               <a:rPr lang="en-US" dirty="0" smtClean="0"/>
-              <a:t>Somewhat strange serial-parallel semantics</a:t>
-            </a:r>
+              <a:t>Somewhat strange serial-parallel </a:t>
+            </a:r>
+            <a:r>
+              <a:rPr lang="en-US" dirty="0" smtClean="0"/>
+              <a:t>semantics. </a:t>
+            </a:r>
+            <a:r>
+              <a:rPr lang="en-US" smtClean="0"/>
+              <a:t>Why?</a:t>
+            </a:r>
+            <a:endParaRPr lang="en-US" dirty="0" smtClean="0"/>
           </a:p>
           <a:p>
             <a:pPr lvl="1"/>
@@ -39625,7 +40463,7 @@
 </p:sld>
 </file>
 
-<file path=ppt/slides/slide35.xml><?xml version="1.0" encoding="utf-8"?>
+<file path=ppt/slides/slide36.xml><?xml version="1.0" encoding="utf-8"?>
 <p:sld xmlns:a="http://schemas.openxmlformats.org/drawingml/2006/main" xmlns:r="http://schemas.openxmlformats.org/officeDocument/2006/relationships" xmlns:p="http://schemas.openxmlformats.org/presentationml/2006/main">
   <p:cSld>
     <p:spTree>
@@ -40048,33 +40886,15 @@
                                   </p:childTnLst>
                                 </p:cTn>
                               </p:par>
-                            </p:childTnLst>
-                          </p:cTn>
-                        </p:par>
-                      </p:childTnLst>
-                    </p:cTn>
-                  </p:par>
-                  <p:par>
-                    <p:cTn id="27" fill="hold">
-                      <p:stCondLst>
-                        <p:cond delay="indefinite"/>
-                      </p:stCondLst>
-                      <p:childTnLst>
-                        <p:par>
-                          <p:cTn id="28" fill="hold">
-                            <p:stCondLst>
-                              <p:cond delay="0"/>
-                            </p:stCondLst>
-                            <p:childTnLst>
                               <p:par>
-                                <p:cTn id="29" presetID="1" presetClass="entr" presetSubtype="0" fill="hold" nodeType="clickEffect">
+                                <p:cTn id="27" presetID="1" presetClass="entr" presetSubtype="0" fill="hold" nodeType="withEffect">
                                   <p:stCondLst>
                                     <p:cond delay="0"/>
                                   </p:stCondLst>
                                   <p:childTnLst>
                                     <p:set>
                                       <p:cBhvr>
-                                        <p:cTn id="30" dur="1" fill="hold">
+                                        <p:cTn id="28" dur="1" fill="hold">
                                           <p:stCondLst>
                                             <p:cond delay="0"/>
                                           </p:stCondLst>
@@ -40097,33 +40917,15 @@
                                   </p:childTnLst>
                                 </p:cTn>
                               </p:par>
-                            </p:childTnLst>
-                          </p:cTn>
-                        </p:par>
-                      </p:childTnLst>
-                    </p:cTn>
-                  </p:par>
-                  <p:par>
-                    <p:cTn id="31" fill="hold">
-                      <p:stCondLst>
-                        <p:cond delay="indefinite"/>
-                      </p:stCondLst>
-                      <p:childTnLst>
-                        <p:par>
-                          <p:cTn id="32" fill="hold">
-                            <p:stCondLst>
-                              <p:cond delay="0"/>
-                            </p:stCondLst>
-                            <p:childTnLst>
                               <p:par>
-                                <p:cTn id="33" presetID="1" presetClass="entr" presetSubtype="0" fill="hold" nodeType="clickEffect">
+                                <p:cTn id="29" presetID="1" presetClass="entr" presetSubtype="0" fill="hold" nodeType="withEffect">
                                   <p:stCondLst>
                                     <p:cond delay="0"/>
                                   </p:stCondLst>
                                   <p:childTnLst>
                                     <p:set>
                                       <p:cBhvr>
-                                        <p:cTn id="34" dur="1" fill="hold">
+                                        <p:cTn id="30" dur="1" fill="hold">
                                           <p:stCondLst>
                                             <p:cond delay="0"/>
                                           </p:stCondLst>
@@ -40177,7 +40979,7 @@
 </p:sld>
 </file>
 
-<file path=ppt/slides/slide36.xml><?xml version="1.0" encoding="utf-8"?>
+<file path=ppt/slides/slide37.xml><?xml version="1.0" encoding="utf-8"?>
 <p:sld xmlns:a="http://schemas.openxmlformats.org/drawingml/2006/main" xmlns:r="http://schemas.openxmlformats.org/officeDocument/2006/relationships" xmlns:p="http://schemas.openxmlformats.org/presentationml/2006/main">
   <p:cSld>
     <p:spTree>
@@ -40249,12 +41051,8 @@
           </a:p>
           <a:p>
             <a:r>
-              <a:rPr lang="en-US" smtClean="0"/>
-              <a:t>What’s </a:t>
-            </a:r>
-            <a:r>
               <a:rPr lang="en-US" dirty="0" smtClean="0"/>
-              <a:t>the killer app today?</a:t>
+              <a:t>What’s the killer app today?</a:t>
             </a:r>
           </a:p>
           <a:p>
@@ -40268,14 +41066,43 @@
             <a:pPr lvl="1"/>
             <a:r>
               <a:rPr lang="en-US" dirty="0" smtClean="0"/>
-              <a:t>I think it’s measurement/visibility/diagnostics/troubleshooting.</a:t>
-            </a:r>
-          </a:p>
-          <a:p>
+              <a:t>I think it’s </a:t>
+            </a:r>
             <a:r>
               <a:rPr lang="en-US" dirty="0" smtClean="0"/>
-              <a:t>Maybe push the application into the network:</a:t>
-            </a:r>
+              <a:t>measurement/visibility/troubleshooting for </a:t>
+            </a:r>
+            <a:r>
+              <a:rPr lang="en-US" dirty="0" err="1" smtClean="0"/>
+              <a:t>prog</a:t>
+            </a:r>
+            <a:r>
+              <a:rPr lang="en-US" dirty="0" smtClean="0"/>
+              <a:t>. switches</a:t>
+            </a:r>
+            <a:endParaRPr lang="en-US" dirty="0" smtClean="0"/>
+          </a:p>
+          <a:p>
+            <a:r>
+              <a:rPr lang="en-US" dirty="0" smtClean="0"/>
+              <a:t>More far out: Maybe </a:t>
+            </a:r>
+            <a:r>
+              <a:rPr lang="en-US" dirty="0" smtClean="0"/>
+              <a:t>push the application into the </a:t>
+            </a:r>
+            <a:r>
+              <a:rPr lang="en-US" dirty="0" smtClean="0"/>
+              <a:t>network?</a:t>
+            </a:r>
+          </a:p>
+          <a:p>
+            <a:pPr lvl="1"/>
+            <a:r>
+              <a:rPr lang="en-US" dirty="0" smtClean="0"/>
+              <a:t>HTTP proxies?</a:t>
+            </a:r>
+            <a:endParaRPr lang="en-US" dirty="0" smtClean="0"/>
           </a:p>
           <a:p>
             <a:pPr lvl="1"/>
@@ -40615,26 +41442,39 @@
                                   </p:childTnLst>
                                 </p:cTn>
                               </p:par>
-                            </p:childTnLst>
-                          </p:cTn>
-                        </p:par>
-                      </p:childTnLst>
-                    </p:cTn>
-                  </p:par>
-                  <p:par>
-                    <p:cTn id="27" fill="hold">
-                      <p:stCondLst>
-                        <p:cond delay="indefinite"/>
-                      </p:stCondLst>
-                      <p:childTnLst>
-                        <p:par>
-                          <p:cTn id="28" fill="hold">
-                            <p:stCondLst>
-                              <p:cond delay="0"/>
-                            </p:stCondLst>
-                            <p:childTnLst>
                               <p:par>
-                                <p:cTn id="29" presetID="1" presetClass="entr" presetSubtype="0" fill="hold" nodeType="clickEffect">
+                                <p:cTn id="27" presetID="1" presetClass="entr" presetSubtype="0" fill="hold" nodeType="withEffect">
+                                  <p:stCondLst>
+                                    <p:cond delay="0"/>
+                                  </p:stCondLst>
+                                  <p:childTnLst>
+                                    <p:set>
+                                      <p:cBhvr>
+                                        <p:cTn id="28" dur="1" fill="hold">
+                                          <p:stCondLst>
+                                            <p:cond delay="0"/>
+                                          </p:stCondLst>
+                                        </p:cTn>
+                                        <p:tgtEl>
+                                          <p:spTgt spid="3">
+                                            <p:txEl>
+                                              <p:pRg st="6" end="6"/>
+                                            </p:txEl>
+                                          </p:spTgt>
+                                        </p:tgtEl>
+                                        <p:attrNameLst>
+                                          <p:attrName>style.visibility</p:attrName>
+                                        </p:attrNameLst>
+                                      </p:cBhvr>
+                                      <p:to>
+                                        <p:strVal val="visible"/>
+                                      </p:to>
+                                    </p:set>
+                                  </p:childTnLst>
+                                </p:cTn>
+                              </p:par>
+                              <p:par>
+                                <p:cTn id="29" presetID="1" presetClass="entr" presetSubtype="0" fill="hold" nodeType="withEffect">
                                   <p:stCondLst>
                                     <p:cond delay="0"/>
                                   </p:stCondLst>
@@ -40649,7 +41489,7 @@
                                         <p:tgtEl>
                                           <p:spTgt spid="3">
                                             <p:txEl>
-                                              <p:pRg st="6" end="6"/>
+                                              <p:pRg st="7" end="7"/>
                                             </p:txEl>
                                           </p:spTgt>
                                         </p:tgtEl>
@@ -40695,7 +41535,7 @@
 </p:sld>
 </file>
 
-<file path=ppt/slides/slide37.xml><?xml version="1.0" encoding="utf-8"?>
+<file path=ppt/slides/slide38.xml><?xml version="1.0" encoding="utf-8"?>
 <p:sld xmlns:a="http://schemas.openxmlformats.org/drawingml/2006/main" xmlns:r="http://schemas.openxmlformats.org/officeDocument/2006/relationships" xmlns:p="http://schemas.openxmlformats.org/presentationml/2006/main">
   <p:cSld>
     <p:spTree>
@@ -40774,7 +41614,7 @@
 </p:sld>
 </file>
 
-<file path=ppt/slides/slide38.xml><?xml version="1.0" encoding="utf-8"?>
+<file path=ppt/slides/slide39.xml><?xml version="1.0" encoding="utf-8"?>
 <p:sld xmlns:a="http://schemas.openxmlformats.org/drawingml/2006/main" xmlns:r="http://schemas.openxmlformats.org/officeDocument/2006/relationships" xmlns:p="http://schemas.openxmlformats.org/presentationml/2006/main">
   <p:cSld>
     <p:spTree>
@@ -41170,7 +42010,176 @@
 </p:sld>
 </file>
 
-<file path=ppt/slides/slide39.xml><?xml version="1.0" encoding="utf-8"?>
+<file path=ppt/slides/slide4.xml><?xml version="1.0" encoding="utf-8"?>
+<p:sld xmlns:a="http://schemas.openxmlformats.org/drawingml/2006/main" xmlns:r="http://schemas.openxmlformats.org/officeDocument/2006/relationships" xmlns:p="http://schemas.openxmlformats.org/presentationml/2006/main">
+  <p:cSld>
+    <p:spTree>
+      <p:nvGrpSpPr>
+        <p:cNvPr id="1" name=""/>
+        <p:cNvGrpSpPr/>
+        <p:nvPr/>
+      </p:nvGrpSpPr>
+      <p:grpSpPr>
+        <a:xfrm>
+          <a:off x="0" y="0"/>
+          <a:ext cx="0" cy="0"/>
+          <a:chOff x="0" y="0"/>
+          <a:chExt cx="0" cy="0"/>
+        </a:xfrm>
+      </p:grpSpPr>
+      <p:sp>
+        <p:nvSpPr>
+          <p:cNvPr id="2" name="Title 1"/>
+          <p:cNvSpPr>
+            <a:spLocks noGrp="1"/>
+          </p:cNvSpPr>
+          <p:nvPr>
+            <p:ph type="title"/>
+          </p:nvPr>
+        </p:nvSpPr>
+        <p:spPr/>
+        <p:txBody>
+          <a:bodyPr/>
+          <a:lstStyle/>
+          <a:p>
+            <a:r>
+              <a:rPr lang="en-US" dirty="0" smtClean="0"/>
+              <a:t>Software Defined </a:t>
+            </a:r>
+            <a:r>
+              <a:rPr lang="en-US" dirty="0" smtClean="0"/>
+              <a:t>Networking: What’s the idea?</a:t>
+            </a:r>
+            <a:endParaRPr lang="en-US" dirty="0"/>
+          </a:p>
+        </p:txBody>
+      </p:sp>
+      <p:sp>
+        <p:nvSpPr>
+          <p:cNvPr id="6" name="TextBox 5"/>
+          <p:cNvSpPr txBox="1"/>
+          <p:nvPr/>
+        </p:nvSpPr>
+        <p:spPr>
+          <a:xfrm>
+            <a:off x="1453094" y="3009900"/>
+            <a:ext cx="9285812" cy="646331"/>
+          </a:xfrm>
+          <a:prstGeom prst="rect">
+            <a:avLst/>
+          </a:prstGeom>
+          <a:noFill/>
+        </p:spPr>
+        <p:txBody>
+          <a:bodyPr wrap="none" rtlCol="0">
+            <a:spAutoFit/>
+          </a:bodyPr>
+          <a:lstStyle/>
+          <a:p>
+            <a:r>
+              <a:rPr lang="en-US" sz="3600" dirty="0" smtClean="0"/>
+              <a:t>Separate </a:t>
+            </a:r>
+            <a:r>
+              <a:rPr lang="en-US" sz="3600" dirty="0" smtClean="0"/>
+              <a:t>network control plane from data plane.</a:t>
+            </a:r>
+            <a:endParaRPr lang="en-US" sz="3600" dirty="0"/>
+          </a:p>
+        </p:txBody>
+      </p:sp>
+    </p:spTree>
+    <p:extLst>
+      <p:ext uri="{BB962C8B-B14F-4D97-AF65-F5344CB8AC3E}">
+        <p14:creationId xmlns:p14="http://schemas.microsoft.com/office/powerpoint/2010/main" val="275433245"/>
+      </p:ext>
+    </p:extLst>
+  </p:cSld>
+  <p:clrMapOvr>
+    <a:masterClrMapping/>
+  </p:clrMapOvr>
+  <p:timing>
+    <p:tnLst>
+      <p:par>
+        <p:cTn id="1" dur="indefinite" restart="never" nodeType="tmRoot">
+          <p:childTnLst>
+            <p:seq concurrent="1" nextAc="seek">
+              <p:cTn id="2" dur="indefinite" nodeType="mainSeq">
+                <p:childTnLst>
+                  <p:par>
+                    <p:cTn id="3" fill="hold">
+                      <p:stCondLst>
+                        <p:cond delay="indefinite"/>
+                      </p:stCondLst>
+                      <p:childTnLst>
+                        <p:par>
+                          <p:cTn id="4" fill="hold">
+                            <p:stCondLst>
+                              <p:cond delay="0"/>
+                            </p:stCondLst>
+                            <p:childTnLst>
+                              <p:par>
+                                <p:cTn id="5" presetID="1" presetClass="entr" presetSubtype="0" fill="hold" grpId="0" nodeType="clickEffect">
+                                  <p:stCondLst>
+                                    <p:cond delay="0"/>
+                                  </p:stCondLst>
+                                  <p:childTnLst>
+                                    <p:set>
+                                      <p:cBhvr>
+                                        <p:cTn id="6" dur="1" fill="hold">
+                                          <p:stCondLst>
+                                            <p:cond delay="0"/>
+                                          </p:stCondLst>
+                                        </p:cTn>
+                                        <p:tgtEl>
+                                          <p:spTgt spid="6"/>
+                                        </p:tgtEl>
+                                        <p:attrNameLst>
+                                          <p:attrName>style.visibility</p:attrName>
+                                        </p:attrNameLst>
+                                      </p:cBhvr>
+                                      <p:to>
+                                        <p:strVal val="visible"/>
+                                      </p:to>
+                                    </p:set>
+                                  </p:childTnLst>
+                                </p:cTn>
+                              </p:par>
+                            </p:childTnLst>
+                          </p:cTn>
+                        </p:par>
+                      </p:childTnLst>
+                    </p:cTn>
+                  </p:par>
+                </p:childTnLst>
+              </p:cTn>
+              <p:prevCondLst>
+                <p:cond evt="onPrev" delay="0">
+                  <p:tgtEl>
+                    <p:sldTgt/>
+                  </p:tgtEl>
+                </p:cond>
+              </p:prevCondLst>
+              <p:nextCondLst>
+                <p:cond evt="onNext" delay="0">
+                  <p:tgtEl>
+                    <p:sldTgt/>
+                  </p:tgtEl>
+                </p:cond>
+              </p:nextCondLst>
+            </p:seq>
+          </p:childTnLst>
+        </p:cTn>
+      </p:par>
+    </p:tnLst>
+    <p:bldLst>
+      <p:bldP spid="6" grpId="0"/>
+    </p:bldLst>
+  </p:timing>
+</p:sld>
+</file>
+
+<file path=ppt/slides/slide40.xml><?xml version="1.0" encoding="utf-8"?>
 <p:sld xmlns:a="http://schemas.openxmlformats.org/drawingml/2006/main" xmlns:r="http://schemas.openxmlformats.org/officeDocument/2006/relationships" xmlns:p="http://schemas.openxmlformats.org/presentationml/2006/main">
   <p:cSld>
     <p:spTree>
@@ -41625,97 +42634,7 @@
 </p:sld>
 </file>
 
-<file path=ppt/slides/slide4.xml><?xml version="1.0" encoding="utf-8"?>
-<p:sld xmlns:a="http://schemas.openxmlformats.org/drawingml/2006/main" xmlns:r="http://schemas.openxmlformats.org/officeDocument/2006/relationships" xmlns:p="http://schemas.openxmlformats.org/presentationml/2006/main">
-  <p:cSld>
-    <p:spTree>
-      <p:nvGrpSpPr>
-        <p:cNvPr id="1" name=""/>
-        <p:cNvGrpSpPr/>
-        <p:nvPr/>
-      </p:nvGrpSpPr>
-      <p:grpSpPr>
-        <a:xfrm>
-          <a:off x="0" y="0"/>
-          <a:ext cx="0" cy="0"/>
-          <a:chOff x="0" y="0"/>
-          <a:chExt cx="0" cy="0"/>
-        </a:xfrm>
-      </p:grpSpPr>
-      <p:sp>
-        <p:nvSpPr>
-          <p:cNvPr id="2" name="Title 1"/>
-          <p:cNvSpPr>
-            <a:spLocks noGrp="1"/>
-          </p:cNvSpPr>
-          <p:nvPr>
-            <p:ph type="title"/>
-          </p:nvPr>
-        </p:nvSpPr>
-        <p:spPr/>
-        <p:txBody>
-          <a:bodyPr/>
-          <a:lstStyle/>
-          <a:p>
-            <a:r>
-              <a:rPr lang="en-US" dirty="0" smtClean="0"/>
-              <a:t>Software Defined Networking</a:t>
-            </a:r>
-            <a:endParaRPr lang="en-US" dirty="0"/>
-          </a:p>
-        </p:txBody>
-      </p:sp>
-      <p:sp>
-        <p:nvSpPr>
-          <p:cNvPr id="6" name="TextBox 5"/>
-          <p:cNvSpPr txBox="1"/>
-          <p:nvPr/>
-        </p:nvSpPr>
-        <p:spPr>
-          <a:xfrm>
-            <a:off x="318400" y="3009900"/>
-            <a:ext cx="11863440" cy="646331"/>
-          </a:xfrm>
-          <a:prstGeom prst="rect">
-            <a:avLst/>
-          </a:prstGeom>
-          <a:noFill/>
-        </p:spPr>
-        <p:txBody>
-          <a:bodyPr wrap="none" rtlCol="0">
-            <a:spAutoFit/>
-          </a:bodyPr>
-          <a:lstStyle/>
-          <a:p>
-            <a:r>
-              <a:rPr lang="en-US" sz="3600" dirty="0" smtClean="0"/>
-              <a:t>One big idea: Separate network control plane from data plane.</a:t>
-            </a:r>
-            <a:endParaRPr lang="en-US" sz="3600" dirty="0"/>
-          </a:p>
-        </p:txBody>
-      </p:sp>
-    </p:spTree>
-    <p:extLst>
-      <p:ext uri="{BB962C8B-B14F-4D97-AF65-F5344CB8AC3E}">
-        <p14:creationId xmlns:p14="http://schemas.microsoft.com/office/powerpoint/2010/main" val="275433245"/>
-      </p:ext>
-    </p:extLst>
-  </p:cSld>
-  <p:clrMapOvr>
-    <a:masterClrMapping/>
-  </p:clrMapOvr>
-  <p:timing>
-    <p:tnLst>
-      <p:par>
-        <p:cTn id="1" dur="indefinite" restart="never" nodeType="tmRoot"/>
-      </p:par>
-    </p:tnLst>
-  </p:timing>
-</p:sld>
-</file>
-
-<file path=ppt/slides/slide40.xml><?xml version="1.0" encoding="utf-8"?>
+<file path=ppt/slides/slide41.xml><?xml version="1.0" encoding="utf-8"?>
 <p:sld xmlns:a="http://schemas.openxmlformats.org/drawingml/2006/main" xmlns:r="http://schemas.openxmlformats.org/officeDocument/2006/relationships" xmlns:p="http://schemas.openxmlformats.org/presentationml/2006/main" show="0">
   <p:cSld>
     <p:spTree>
@@ -41856,7 +42775,7 @@
           <a:p>
             <a:fld id="{D5B0D96D-3F5C-E948-A9F0-6481128465F5}" type="slidenum">
               <a:rPr lang="en-US" smtClean="0"/>
-              <a:t>40</a:t>
+              <a:t>41</a:t>
             </a:fld>
             <a:endParaRPr lang="en-US"/>
           </a:p>
@@ -42153,247 +43072,6 @@
 </p:sld>
 </file>
 
-<file path=ppt/slides/slide41.xml><?xml version="1.0" encoding="utf-8"?>
-<p:sld xmlns:a="http://schemas.openxmlformats.org/drawingml/2006/main" xmlns:r="http://schemas.openxmlformats.org/officeDocument/2006/relationships" xmlns:p="http://schemas.openxmlformats.org/presentationml/2006/main" show="0">
-  <p:cSld>
-    <p:spTree>
-      <p:nvGrpSpPr>
-        <p:cNvPr id="1" name=""/>
-        <p:cNvGrpSpPr/>
-        <p:nvPr/>
-      </p:nvGrpSpPr>
-      <p:grpSpPr>
-        <a:xfrm>
-          <a:off x="0" y="0"/>
-          <a:ext cx="0" cy="0"/>
-          <a:chOff x="0" y="0"/>
-          <a:chExt cx="0" cy="0"/>
-        </a:xfrm>
-      </p:grpSpPr>
-      <p:sp>
-        <p:nvSpPr>
-          <p:cNvPr id="2" name="Title 1"/>
-          <p:cNvSpPr>
-            <a:spLocks noGrp="1"/>
-          </p:cNvSpPr>
-          <p:nvPr>
-            <p:ph type="title"/>
-          </p:nvPr>
-        </p:nvSpPr>
-        <p:spPr/>
-        <p:txBody>
-          <a:bodyPr/>
-          <a:lstStyle/>
-          <a:p>
-            <a:r>
-              <a:rPr lang="en-US" dirty="0" smtClean="0"/>
-              <a:t>P4 Summary</a:t>
-            </a:r>
-            <a:endParaRPr lang="en-US" dirty="0"/>
-          </a:p>
-        </p:txBody>
-      </p:sp>
-      <p:sp>
-        <p:nvSpPr>
-          <p:cNvPr id="3" name="Content Placeholder 2"/>
-          <p:cNvSpPr>
-            <a:spLocks noGrp="1"/>
-          </p:cNvSpPr>
-          <p:nvPr>
-            <p:ph idx="1"/>
-          </p:nvPr>
-        </p:nvSpPr>
-        <p:spPr>
-          <a:xfrm>
-            <a:off x="1028700" y="1891853"/>
-            <a:ext cx="9313863" cy="3743773"/>
-          </a:xfrm>
-        </p:spPr>
-        <p:txBody>
-          <a:bodyPr>
-            <a:noAutofit/>
-          </a:bodyPr>
-          <a:lstStyle/>
-          <a:p>
-            <a:pPr>
-              <a:lnSpc>
-                <a:spcPct val="80000"/>
-              </a:lnSpc>
-            </a:pPr>
-            <a:r>
-              <a:rPr lang="en-US" dirty="0">
-                <a:solidFill>
-                  <a:srgbClr val="000000"/>
-                </a:solidFill>
-              </a:rPr>
-              <a:t>Simple language</a:t>
-            </a:r>
-          </a:p>
-          <a:p>
-            <a:pPr lvl="1">
-              <a:lnSpc>
-                <a:spcPct val="80000"/>
-              </a:lnSpc>
-            </a:pPr>
-            <a:r>
-              <a:rPr lang="en-US" sz="2800" dirty="0">
-                <a:solidFill>
-                  <a:srgbClr val="000000"/>
-                </a:solidFill>
-              </a:rPr>
-              <a:t>Parsing, bit-field manipulation, table lookup, </a:t>
-            </a:r>
-            <a:br>
-              <a:rPr lang="en-US" sz="2800" dirty="0">
-                <a:solidFill>
-                  <a:srgbClr val="000000"/>
-                </a:solidFill>
-              </a:rPr>
-            </a:br>
-            <a:r>
-              <a:rPr lang="en-US" sz="2800" dirty="0">
-                <a:solidFill>
-                  <a:srgbClr val="000000"/>
-                </a:solidFill>
-              </a:rPr>
-              <a:t>control flow, packet reassembly</a:t>
-            </a:r>
-          </a:p>
-          <a:p>
-            <a:pPr>
-              <a:lnSpc>
-                <a:spcPct val="80000"/>
-              </a:lnSpc>
-            </a:pPr>
-            <a:r>
-              <a:rPr lang="en-US" dirty="0">
-                <a:solidFill>
-                  <a:srgbClr val="000000"/>
-                </a:solidFill>
-              </a:rPr>
-              <a:t>Efficient execution (high speed switching)</a:t>
-            </a:r>
-          </a:p>
-          <a:p>
-            <a:pPr>
-              <a:lnSpc>
-                <a:spcPct val="80000"/>
-              </a:lnSpc>
-            </a:pPr>
-            <a:r>
-              <a:rPr lang="en-US" dirty="0">
-                <a:solidFill>
-                  <a:srgbClr val="000000"/>
-                </a:solidFill>
-              </a:rPr>
-              <a:t>Simple cost model</a:t>
-            </a:r>
-          </a:p>
-          <a:p>
-            <a:pPr>
-              <a:lnSpc>
-                <a:spcPct val="80000"/>
-              </a:lnSpc>
-            </a:pPr>
-            <a:r>
-              <a:rPr lang="en-US" dirty="0">
-                <a:solidFill>
-                  <a:srgbClr val="000000"/>
-                </a:solidFill>
-              </a:rPr>
-              <a:t>Abstract resources</a:t>
-            </a:r>
-          </a:p>
-          <a:p>
-            <a:pPr>
-              <a:lnSpc>
-                <a:spcPct val="80000"/>
-              </a:lnSpc>
-            </a:pPr>
-            <a:r>
-              <a:rPr lang="en-US" dirty="0">
-                <a:solidFill>
-                  <a:srgbClr val="000000"/>
-                </a:solidFill>
-              </a:rPr>
-              <a:t>Portable</a:t>
-            </a:r>
-          </a:p>
-          <a:p>
-            <a:pPr>
-              <a:lnSpc>
-                <a:spcPct val="80000"/>
-              </a:lnSpc>
-            </a:pPr>
-            <a:r>
-              <a:rPr lang="en-US" dirty="0">
-                <a:solidFill>
-                  <a:srgbClr val="000000"/>
-                </a:solidFill>
-              </a:rPr>
-              <a:t>Expressive:</a:t>
-            </a:r>
-          </a:p>
-          <a:p>
-            <a:pPr lvl="1">
-              <a:lnSpc>
-                <a:spcPct val="80000"/>
-              </a:lnSpc>
-            </a:pPr>
-            <a:r>
-              <a:rPr lang="en-US" sz="2800" dirty="0">
-                <a:solidFill>
-                  <a:srgbClr val="000000"/>
-                </a:solidFill>
-              </a:rPr>
-              <a:t>New protocols, forwarding policies, </a:t>
-            </a:r>
-            <a:br>
-              <a:rPr lang="en-US" sz="2800" dirty="0">
-                <a:solidFill>
-                  <a:srgbClr val="000000"/>
-                </a:solidFill>
-              </a:rPr>
-            </a:br>
-            <a:r>
-              <a:rPr lang="en-US" sz="2800" dirty="0">
-                <a:solidFill>
-                  <a:srgbClr val="000000"/>
-                </a:solidFill>
-              </a:rPr>
-              <a:t>monitoring and instrumentation</a:t>
-            </a:r>
-          </a:p>
-        </p:txBody>
-      </p:sp>
-    </p:spTree>
-    <p:extLst>
-      <p:ext uri="{BB962C8B-B14F-4D97-AF65-F5344CB8AC3E}">
-        <p14:creationId xmlns:p14="http://schemas.microsoft.com/office/powerpoint/2010/main" val="717811122"/>
-      </p:ext>
-    </p:extLst>
-  </p:cSld>
-  <p:clrMapOvr>
-    <a:masterClrMapping/>
-  </p:clrMapOvr>
-  <mc:AlternateContent xmlns:mc="http://schemas.openxmlformats.org/markup-compatibility/2006">
-    <mc:Choice xmlns:p14="http://schemas.microsoft.com/office/powerpoint/2010/main" Requires="p14">
-      <p:transition spd="slow" p14:dur="2000"/>
-    </mc:Choice>
-    <mc:Fallback>
-      <p:transition spd="slow"/>
-    </mc:Fallback>
-  </mc:AlternateContent>
-  <p:timing>
-    <p:tnLst>
-      <p:par>
-        <p:cTn id="1" dur="indefinite" restart="never" nodeType="tmRoot"/>
-      </p:par>
-    </p:tnLst>
-  </p:timing>
-</p:sld>
-</file>
-
 <file path=ppt/slides/slide42.xml><?xml version="1.0" encoding="utf-8"?>
 <p:sld xmlns:a="http://schemas.openxmlformats.org/drawingml/2006/main" xmlns:r="http://schemas.openxmlformats.org/officeDocument/2006/relationships" xmlns:p="http://schemas.openxmlformats.org/presentationml/2006/main" show="0">
   <p:cSld>
@@ -42428,7 +43106,7 @@
           <a:p>
             <a:r>
               <a:rPr lang="en-US" dirty="0" smtClean="0"/>
-              <a:t>What does SDN want?</a:t>
+              <a:t>P4 Summary</a:t>
             </a:r>
             <a:endParaRPr lang="en-US" dirty="0"/>
           </a:p>
@@ -42444,81 +43122,173 @@
             <p:ph idx="1"/>
           </p:nvPr>
         </p:nvSpPr>
-        <p:spPr/>
-        <p:txBody>
-          <a:bodyPr/>
-          <a:lstStyle/>
-          <a:p>
-            <a:r>
-              <a:rPr lang="en-US" dirty="0" smtClean="0"/>
-              <a:t>Multiple stages of match-action</a:t>
-            </a:r>
-          </a:p>
-          <a:p>
-            <a:pPr lvl="1"/>
-            <a:r>
-              <a:rPr lang="en-US" dirty="0" smtClean="0"/>
-              <a:t>Flexible allocation</a:t>
-            </a:r>
-          </a:p>
-          <a:p>
-            <a:r>
-              <a:rPr lang="en-US" dirty="0" smtClean="0"/>
-              <a:t>Flexible actions</a:t>
-            </a:r>
-          </a:p>
-          <a:p>
-            <a:r>
-              <a:rPr lang="en-US" dirty="0" smtClean="0"/>
-              <a:t>Flexible header fields</a:t>
-            </a:r>
-          </a:p>
-          <a:p>
-            <a:endParaRPr lang="en-US" dirty="0"/>
-          </a:p>
-          <a:p>
-            <a:r>
-              <a:rPr lang="en-US" dirty="0" smtClean="0"/>
-              <a:t>No coincidence </a:t>
-            </a:r>
-            <a:r>
-              <a:rPr lang="en-US" dirty="0" err="1" smtClean="0"/>
-              <a:t>OpenFlow</a:t>
-            </a:r>
-            <a:r>
-              <a:rPr lang="en-US" dirty="0" smtClean="0"/>
-              <a:t> built this way…</a:t>
-            </a:r>
-          </a:p>
-        </p:txBody>
-      </p:sp>
-      <p:sp>
-        <p:nvSpPr>
-          <p:cNvPr id="4" name="Slide Number Placeholder 3"/>
-          <p:cNvSpPr>
-            <a:spLocks noGrp="1"/>
-          </p:cNvSpPr>
-          <p:nvPr>
-            <p:ph type="sldNum" sz="quarter" idx="12"/>
-          </p:nvPr>
-        </p:nvSpPr>
-        <p:spPr/>
-        <p:txBody>
-          <a:bodyPr/>
-          <a:lstStyle/>
-          <a:p>
-            <a:fld id="{D5B0D96D-3F5C-E948-A9F0-6481128465F5}" type="slidenum">
-              <a:rPr lang="en-US" smtClean="0"/>
-              <a:t>42</a:t>
-            </a:fld>
-            <a:endParaRPr lang="en-US"/>
+        <p:spPr>
+          <a:xfrm>
+            <a:off x="1028700" y="1891853"/>
+            <a:ext cx="9313863" cy="3743773"/>
+          </a:xfrm>
+        </p:spPr>
+        <p:txBody>
+          <a:bodyPr>
+            <a:noAutofit/>
+          </a:bodyPr>
+          <a:lstStyle/>
+          <a:p>
+            <a:pPr>
+              <a:lnSpc>
+                <a:spcPct val="80000"/>
+              </a:lnSpc>
+            </a:pPr>
+            <a:r>
+              <a:rPr lang="en-US" dirty="0">
+                <a:solidFill>
+                  <a:srgbClr val="000000"/>
+                </a:solidFill>
+              </a:rPr>
+              <a:t>Simple language</a:t>
+            </a:r>
+          </a:p>
+          <a:p>
+            <a:pPr lvl="1">
+              <a:lnSpc>
+                <a:spcPct val="80000"/>
+              </a:lnSpc>
+            </a:pPr>
+            <a:r>
+              <a:rPr lang="en-US" sz="2800" dirty="0">
+                <a:solidFill>
+                  <a:srgbClr val="000000"/>
+                </a:solidFill>
+              </a:rPr>
+              <a:t>Parsing, bit-field manipulation, table lookup, </a:t>
+            </a:r>
+            <a:br>
+              <a:rPr lang="en-US" sz="2800" dirty="0">
+                <a:solidFill>
+                  <a:srgbClr val="000000"/>
+                </a:solidFill>
+              </a:rPr>
+            </a:br>
+            <a:r>
+              <a:rPr lang="en-US" sz="2800" dirty="0">
+                <a:solidFill>
+                  <a:srgbClr val="000000"/>
+                </a:solidFill>
+              </a:rPr>
+              <a:t>control flow, packet reassembly</a:t>
+            </a:r>
+          </a:p>
+          <a:p>
+            <a:pPr>
+              <a:lnSpc>
+                <a:spcPct val="80000"/>
+              </a:lnSpc>
+            </a:pPr>
+            <a:r>
+              <a:rPr lang="en-US" dirty="0">
+                <a:solidFill>
+                  <a:srgbClr val="000000"/>
+                </a:solidFill>
+              </a:rPr>
+              <a:t>Efficient execution (high speed switching)</a:t>
+            </a:r>
+          </a:p>
+          <a:p>
+            <a:pPr>
+              <a:lnSpc>
+                <a:spcPct val="80000"/>
+              </a:lnSpc>
+            </a:pPr>
+            <a:r>
+              <a:rPr lang="en-US" dirty="0">
+                <a:solidFill>
+                  <a:srgbClr val="000000"/>
+                </a:solidFill>
+              </a:rPr>
+              <a:t>Simple cost model</a:t>
+            </a:r>
+          </a:p>
+          <a:p>
+            <a:pPr>
+              <a:lnSpc>
+                <a:spcPct val="80000"/>
+              </a:lnSpc>
+            </a:pPr>
+            <a:r>
+              <a:rPr lang="en-US" dirty="0">
+                <a:solidFill>
+                  <a:srgbClr val="000000"/>
+                </a:solidFill>
+              </a:rPr>
+              <a:t>Abstract resources</a:t>
+            </a:r>
+          </a:p>
+          <a:p>
+            <a:pPr>
+              <a:lnSpc>
+                <a:spcPct val="80000"/>
+              </a:lnSpc>
+            </a:pPr>
+            <a:r>
+              <a:rPr lang="en-US" dirty="0">
+                <a:solidFill>
+                  <a:srgbClr val="000000"/>
+                </a:solidFill>
+              </a:rPr>
+              <a:t>Portable</a:t>
+            </a:r>
+          </a:p>
+          <a:p>
+            <a:pPr>
+              <a:lnSpc>
+                <a:spcPct val="80000"/>
+              </a:lnSpc>
+            </a:pPr>
+            <a:r>
+              <a:rPr lang="en-US" dirty="0">
+                <a:solidFill>
+                  <a:srgbClr val="000000"/>
+                </a:solidFill>
+              </a:rPr>
+              <a:t>Expressive:</a:t>
+            </a:r>
+          </a:p>
+          <a:p>
+            <a:pPr lvl="1">
+              <a:lnSpc>
+                <a:spcPct val="80000"/>
+              </a:lnSpc>
+            </a:pPr>
+            <a:r>
+              <a:rPr lang="en-US" sz="2800" dirty="0">
+                <a:solidFill>
+                  <a:srgbClr val="000000"/>
+                </a:solidFill>
+              </a:rPr>
+              <a:t>New protocols, forwarding policies, </a:t>
+            </a:r>
+            <a:br>
+              <a:rPr lang="en-US" sz="2800" dirty="0">
+                <a:solidFill>
+                  <a:srgbClr val="000000"/>
+                </a:solidFill>
+              </a:rPr>
+            </a:br>
+            <a:r>
+              <a:rPr lang="en-US" sz="2800" dirty="0">
+                <a:solidFill>
+                  <a:srgbClr val="000000"/>
+                </a:solidFill>
+              </a:rPr>
+              <a:t>monitoring and instrumentation</a:t>
+            </a:r>
           </a:p>
         </p:txBody>
       </p:sp>
     </p:spTree>
     <p:extLst>
       <p:ext uri="{BB962C8B-B14F-4D97-AF65-F5344CB8AC3E}">
-        <p14:creationId xmlns:p14="http://schemas.microsoft.com/office/powerpoint/2010/main" val="1429536652"/>
+        <p14:creationId xmlns:p14="http://schemas.microsoft.com/office/powerpoint/2010/main" val="717811122"/>
       </p:ext>
     </p:extLst>
   </p:cSld>
@@ -42572,21 +43342,12 @@
         </p:nvSpPr>
         <p:spPr/>
         <p:txBody>
-          <a:bodyPr>
-            <a:normAutofit/>
-          </a:bodyPr>
+          <a:bodyPr/>
           <a:lstStyle/>
           <a:p>
             <a:r>
               <a:rPr lang="en-US" dirty="0" smtClean="0"/>
-              <a:t>What’s Hard about a </a:t>
-            </a:r>
-            <a:br>
-              <a:rPr lang="en-US" dirty="0" smtClean="0"/>
-            </a:br>
-            <a:r>
-              <a:rPr lang="en-US" dirty="0" smtClean="0"/>
-              <a:t>Flexible Switch Chip?</a:t>
+              <a:t>What does SDN want?</a:t>
             </a:r>
             <a:endParaRPr lang="en-US" dirty="0"/>
           </a:p>
@@ -42604,60 +43365,49 @@
         </p:nvSpPr>
         <p:spPr/>
         <p:txBody>
-          <a:bodyPr>
-            <a:normAutofit/>
-          </a:bodyPr>
+          <a:bodyPr/>
           <a:lstStyle/>
           <a:p>
             <a:r>
               <a:rPr lang="en-US" dirty="0" smtClean="0"/>
-              <a:t>Big chip</a:t>
-            </a:r>
-          </a:p>
-          <a:p>
+              <a:t>Multiple stages of match-action</a:t>
+            </a:r>
+          </a:p>
+          <a:p>
+            <a:pPr lvl="1"/>
             <a:r>
               <a:rPr lang="en-US" dirty="0" smtClean="0"/>
-              <a:t>High frequency (1 GHz)</a:t>
+              <a:t>Flexible allocation</a:t>
             </a:r>
           </a:p>
           <a:p>
             <a:r>
               <a:rPr lang="en-US" dirty="0" smtClean="0"/>
-              <a:t>Wiring</a:t>
-            </a:r>
-            <a:r>
-              <a:rPr lang="en-US" dirty="0"/>
-              <a:t> </a:t>
-            </a:r>
+              <a:t>Flexible actions</a:t>
+            </a:r>
+          </a:p>
+          <a:p>
             <a:r>
               <a:rPr lang="en-US" dirty="0" smtClean="0"/>
-              <a:t>intensive</a:t>
-            </a:r>
+              <a:t>Flexible header fields</a:t>
+            </a:r>
+          </a:p>
+          <a:p>
+            <a:endParaRPr lang="en-US" dirty="0"/>
           </a:p>
           <a:p>
             <a:r>
               <a:rPr lang="en-US" dirty="0" smtClean="0"/>
-              <a:t>Many crossbars</a:t>
-            </a:r>
-          </a:p>
-          <a:p>
+              <a:t>No coincidence </a:t>
+            </a:r>
+            <a:r>
+              <a:rPr lang="en-US" dirty="0" err="1" smtClean="0"/>
+              <a:t>OpenFlow</a:t>
+            </a:r>
             <a:r>
               <a:rPr lang="en-US" dirty="0" smtClean="0"/>
-              <a:t>Lots of TCAM</a:t>
-            </a:r>
-          </a:p>
-          <a:p>
-            <a:r>
-              <a:rPr lang="en-US" dirty="0" smtClean="0"/>
-              <a:t>Interaction between physical design and architecture</a:t>
-            </a:r>
-          </a:p>
-          <a:p>
-            <a:r>
-              <a:rPr lang="en-US" dirty="0" smtClean="0"/>
-              <a:t>Good news? No need to read 7000 IETF RFC’s!</a:t>
-            </a:r>
-            <a:endParaRPr lang="en-US" dirty="0"/>
+              <a:t> built this way…</a:t>
+            </a:r>
           </a:p>
         </p:txBody>
       </p:sp>
@@ -42679,6 +43429,175 @@
             <a:fld id="{D5B0D96D-3F5C-E948-A9F0-6481128465F5}" type="slidenum">
               <a:rPr lang="en-US" smtClean="0"/>
               <a:t>43</a:t>
+            </a:fld>
+            <a:endParaRPr lang="en-US"/>
+          </a:p>
+        </p:txBody>
+      </p:sp>
+    </p:spTree>
+    <p:extLst>
+      <p:ext uri="{BB962C8B-B14F-4D97-AF65-F5344CB8AC3E}">
+        <p14:creationId xmlns:p14="http://schemas.microsoft.com/office/powerpoint/2010/main" val="1429536652"/>
+      </p:ext>
+    </p:extLst>
+  </p:cSld>
+  <p:clrMapOvr>
+    <a:masterClrMapping/>
+  </p:clrMapOvr>
+  <mc:AlternateContent xmlns:mc="http://schemas.openxmlformats.org/markup-compatibility/2006">
+    <mc:Choice xmlns:p14="http://schemas.microsoft.com/office/powerpoint/2010/main" Requires="p14">
+      <p:transition spd="slow" p14:dur="2000"/>
+    </mc:Choice>
+    <mc:Fallback>
+      <p:transition spd="slow"/>
+    </mc:Fallback>
+  </mc:AlternateContent>
+  <p:timing>
+    <p:tnLst>
+      <p:par>
+        <p:cTn id="1" dur="indefinite" restart="never" nodeType="tmRoot"/>
+      </p:par>
+    </p:tnLst>
+  </p:timing>
+</p:sld>
+</file>
+
+<file path=ppt/slides/slide44.xml><?xml version="1.0" encoding="utf-8"?>
+<p:sld xmlns:a="http://schemas.openxmlformats.org/drawingml/2006/main" xmlns:r="http://schemas.openxmlformats.org/officeDocument/2006/relationships" xmlns:p="http://schemas.openxmlformats.org/presentationml/2006/main" show="0">
+  <p:cSld>
+    <p:spTree>
+      <p:nvGrpSpPr>
+        <p:cNvPr id="1" name=""/>
+        <p:cNvGrpSpPr/>
+        <p:nvPr/>
+      </p:nvGrpSpPr>
+      <p:grpSpPr>
+        <a:xfrm>
+          <a:off x="0" y="0"/>
+          <a:ext cx="0" cy="0"/>
+          <a:chOff x="0" y="0"/>
+          <a:chExt cx="0" cy="0"/>
+        </a:xfrm>
+      </p:grpSpPr>
+      <p:sp>
+        <p:nvSpPr>
+          <p:cNvPr id="2" name="Title 1"/>
+          <p:cNvSpPr>
+            <a:spLocks noGrp="1"/>
+          </p:cNvSpPr>
+          <p:nvPr>
+            <p:ph type="title"/>
+          </p:nvPr>
+        </p:nvSpPr>
+        <p:spPr/>
+        <p:txBody>
+          <a:bodyPr>
+            <a:normAutofit/>
+          </a:bodyPr>
+          <a:lstStyle/>
+          <a:p>
+            <a:r>
+              <a:rPr lang="en-US" dirty="0" smtClean="0"/>
+              <a:t>What’s Hard about a </a:t>
+            </a:r>
+            <a:br>
+              <a:rPr lang="en-US" dirty="0" smtClean="0"/>
+            </a:br>
+            <a:r>
+              <a:rPr lang="en-US" dirty="0" smtClean="0"/>
+              <a:t>Flexible Switch Chip?</a:t>
+            </a:r>
+            <a:endParaRPr lang="en-US" dirty="0"/>
+          </a:p>
+        </p:txBody>
+      </p:sp>
+      <p:sp>
+        <p:nvSpPr>
+          <p:cNvPr id="3" name="Content Placeholder 2"/>
+          <p:cNvSpPr>
+            <a:spLocks noGrp="1"/>
+          </p:cNvSpPr>
+          <p:nvPr>
+            <p:ph idx="1"/>
+          </p:nvPr>
+        </p:nvSpPr>
+        <p:spPr/>
+        <p:txBody>
+          <a:bodyPr>
+            <a:normAutofit/>
+          </a:bodyPr>
+          <a:lstStyle/>
+          <a:p>
+            <a:r>
+              <a:rPr lang="en-US" dirty="0" smtClean="0"/>
+              <a:t>Big chip</a:t>
+            </a:r>
+          </a:p>
+          <a:p>
+            <a:r>
+              <a:rPr lang="en-US" dirty="0" smtClean="0"/>
+              <a:t>High frequency (1 GHz)</a:t>
+            </a:r>
+          </a:p>
+          <a:p>
+            <a:r>
+              <a:rPr lang="en-US" dirty="0" smtClean="0"/>
+              <a:t>Wiring</a:t>
+            </a:r>
+            <a:r>
+              <a:rPr lang="en-US" dirty="0"/>
+              <a:t> </a:t>
+            </a:r>
+            <a:r>
+              <a:rPr lang="en-US" dirty="0" smtClean="0"/>
+              <a:t>intensive</a:t>
+            </a:r>
+          </a:p>
+          <a:p>
+            <a:r>
+              <a:rPr lang="en-US" dirty="0" smtClean="0"/>
+              <a:t>Many crossbars</a:t>
+            </a:r>
+          </a:p>
+          <a:p>
+            <a:r>
+              <a:rPr lang="en-US" dirty="0" smtClean="0"/>
+              <a:t>Lots of TCAM</a:t>
+            </a:r>
+          </a:p>
+          <a:p>
+            <a:r>
+              <a:rPr lang="en-US" dirty="0" smtClean="0"/>
+              <a:t>Interaction between physical design and architecture</a:t>
+            </a:r>
+          </a:p>
+          <a:p>
+            <a:r>
+              <a:rPr lang="en-US" dirty="0" smtClean="0"/>
+              <a:t>Good news? No need to read 7000 IETF RFC’s!</a:t>
+            </a:r>
+            <a:endParaRPr lang="en-US" dirty="0"/>
+          </a:p>
+        </p:txBody>
+      </p:sp>
+      <p:sp>
+        <p:nvSpPr>
+          <p:cNvPr id="4" name="Slide Number Placeholder 3"/>
+          <p:cNvSpPr>
+            <a:spLocks noGrp="1"/>
+          </p:cNvSpPr>
+          <p:nvPr>
+            <p:ph type="sldNum" sz="quarter" idx="12"/>
+          </p:nvPr>
+        </p:nvSpPr>
+        <p:spPr/>
+        <p:txBody>
+          <a:bodyPr/>
+          <a:lstStyle/>
+          <a:p>
+            <a:fld id="{D5B0D96D-3F5C-E948-A9F0-6481128465F5}" type="slidenum">
+              <a:rPr lang="en-US" smtClean="0"/>
+              <a:t>44</a:t>
             </a:fld>
             <a:endParaRPr lang="en-US"/>
           </a:p>
@@ -42712,7 +43631,7 @@
 </p:sld>
 </file>
 
-<file path=ppt/slides/slide44.xml><?xml version="1.0" encoding="utf-8"?>
+<file path=ppt/slides/slide45.xml><?xml version="1.0" encoding="utf-8"?>
 <p:sld xmlns:a="http://schemas.openxmlformats.org/drawingml/2006/main" xmlns:r="http://schemas.openxmlformats.org/officeDocument/2006/relationships" xmlns:p="http://schemas.openxmlformats.org/presentationml/2006/main" show="0">
   <p:cSld>
     <p:spTree>
@@ -42939,8 +43858,13 @@
             <a:pPr lvl="1"/>
             <a:r>
               <a:rPr lang="en-US" dirty="0" smtClean="0"/>
-              <a:t>Which headers: Lowest common denominator.</a:t>
-            </a:r>
+              <a:t>Which headers: Lowest common </a:t>
+            </a:r>
+            <a:r>
+              <a:rPr lang="en-US" dirty="0" smtClean="0"/>
+              <a:t>denominator (TCP, UDP, IP, etc.)</a:t>
+            </a:r>
+            <a:endParaRPr lang="en-US" dirty="0" smtClean="0"/>
           </a:p>
           <a:p>
             <a:endParaRPr lang="en-US" dirty="0"/>
@@ -43421,7 +44345,7 @@
         <p:spPr/>
         <p:txBody>
           <a:bodyPr>
-            <a:normAutofit/>
+            <a:normAutofit lnSpcReduction="10000"/>
           </a:bodyPr>
           <a:lstStyle/>
           <a:p>
@@ -43458,8 +44382,27 @@
           <a:p>
             <a:r>
               <a:rPr lang="is-IS" dirty="0" smtClean="0"/>
-              <a:t>Lot of performance left on the table.</a:t>
-            </a:r>
+              <a:t>Lot </a:t>
+            </a:r>
+            <a:r>
+              <a:rPr lang="is-IS" dirty="0" smtClean="0"/>
+              <a:t>of performance left on the table</a:t>
+            </a:r>
+            <a:r>
+              <a:rPr lang="is-IS" dirty="0" smtClean="0"/>
+              <a:t>.</a:t>
+            </a:r>
+            <a:endParaRPr lang="is-IS" dirty="0"/>
+          </a:p>
+          <a:p>
+            <a:endParaRPr lang="is-IS" dirty="0" smtClean="0"/>
+          </a:p>
+          <a:p>
+            <a:r>
+              <a:rPr lang="is-IS" dirty="0" smtClean="0"/>
+              <a:t>What about new protocols like IPv6?</a:t>
+            </a:r>
+            <a:endParaRPr lang="is-IS" dirty="0" smtClean="0"/>
           </a:p>
         </p:txBody>
       </p:sp>
@@ -43657,6 +44600,55 @@
                                           <p:spTgt spid="3">
                                             <p:txEl>
                                               <p:pRg st="6" end="6"/>
+                                            </p:txEl>
+                                          </p:spTgt>
+                                        </p:tgtEl>
+                                        <p:attrNameLst>
+                                          <p:attrName>style.visibility</p:attrName>
+                                        </p:attrNameLst>
+                                      </p:cBhvr>
+                                      <p:to>
+                                        <p:strVal val="visible"/>
+                                      </p:to>
+                                    </p:set>
+                                  </p:childTnLst>
+                                </p:cTn>
+                              </p:par>
+                            </p:childTnLst>
+                          </p:cTn>
+                        </p:par>
+                      </p:childTnLst>
+                    </p:cTn>
+                  </p:par>
+                  <p:par>
+                    <p:cTn id="19" fill="hold">
+                      <p:stCondLst>
+                        <p:cond delay="indefinite"/>
+                      </p:stCondLst>
+                      <p:childTnLst>
+                        <p:par>
+                          <p:cTn id="20" fill="hold">
+                            <p:stCondLst>
+                              <p:cond delay="0"/>
+                            </p:stCondLst>
+                            <p:childTnLst>
+                              <p:par>
+                                <p:cTn id="21" presetID="1" presetClass="entr" presetSubtype="0" fill="hold" nodeType="clickEffect">
+                                  <p:stCondLst>
+                                    <p:cond delay="0"/>
+                                  </p:stCondLst>
+                                  <p:childTnLst>
+                                    <p:set>
+                                      <p:cBhvr>
+                                        <p:cTn id="22" dur="1" fill="hold">
+                                          <p:stCondLst>
+                                            <p:cond delay="0"/>
+                                          </p:stCondLst>
+                                        </p:cTn>
+                                        <p:tgtEl>
+                                          <p:spTgt spid="3">
+                                            <p:txEl>
+                                              <p:pRg st="8" end="8"/>
                                             </p:txEl>
                                           </p:spTgt>
                                         </p:tgtEl>

</xml_diff>

<commit_message>
More tweaks after blackboard rehearsal
</commit_message>
<xml_diff>
--- a/RMT-lecture.pptx
+++ b/RMT-lecture.pptx
@@ -1012,11 +1012,11 @@
         </c:dLbls>
         <c:marker val="1"/>
         <c:smooth val="0"/>
-        <c:axId val="1302613136"/>
-        <c:axId val="1263131568"/>
+        <c:axId val="1408270224"/>
+        <c:axId val="953087840"/>
       </c:lineChart>
       <c:catAx>
-        <c:axId val="1302613136"/>
+        <c:axId val="1408270224"/>
         <c:scaling>
           <c:orientation val="minMax"/>
         </c:scaling>
@@ -1115,7 +1115,7 @@
             <a:endParaRPr lang="en-US"/>
           </a:p>
         </c:txPr>
-        <c:crossAx val="1263131568"/>
+        <c:crossAx val="953087840"/>
         <c:crosses val="autoZero"/>
         <c:auto val="1"/>
         <c:lblAlgn val="ctr"/>
@@ -1123,7 +1123,7 @@
         <c:noMultiLvlLbl val="0"/>
       </c:catAx>
       <c:valAx>
-        <c:axId val="1263131568"/>
+        <c:axId val="953087840"/>
         <c:scaling>
           <c:logBase val="10.0"/>
           <c:orientation val="minMax"/>
@@ -1237,7 +1237,7 @@
             <a:endParaRPr lang="en-US"/>
           </a:p>
         </c:txPr>
-        <c:crossAx val="1302613136"/>
+        <c:crossAx val="1408270224"/>
         <c:crosses val="autoZero"/>
         <c:crossBetween val="between"/>
       </c:valAx>
@@ -19791,11 +19791,7 @@
             <a:pPr lvl="2"/>
             <a:r>
               <a:rPr lang="en-US" dirty="0" smtClean="0"/>
-              <a:t>Compute RTT sums for RCP</a:t>
-            </a:r>
-            <a:r>
-              <a:rPr lang="en-US" dirty="0" smtClean="0"/>
-              <a:t>.</a:t>
+              <a:t>Compute RTT sums for RCP.</a:t>
             </a:r>
             <a:endParaRPr lang="en-US" dirty="0"/>
           </a:p>
@@ -23862,15 +23858,7 @@
           <a:p>
             <a:r>
               <a:rPr lang="en-US" dirty="0" smtClean="0"/>
-              <a:t>How do the parser and match-action </a:t>
-            </a:r>
-            <a:r>
-              <a:rPr lang="en-US" dirty="0" smtClean="0"/>
-              <a:t>hardware</a:t>
-            </a:r>
-            <a:r>
-              <a:rPr lang="en-US" dirty="0" smtClean="0"/>
-              <a:t> work?</a:t>
+              <a:t>How do the parser and match-action hardware work?</a:t>
             </a:r>
             <a:endParaRPr lang="en-US" dirty="0"/>
           </a:p>
@@ -23984,16 +23972,16 @@
           <a:p>
             <a:r>
               <a:rPr lang="en-US" dirty="0" smtClean="0"/>
-              <a:t>State machine to capture parser’s operation (much like a finite automaton to detect regular expressions)</a:t>
-            </a:r>
-          </a:p>
-          <a:p>
-            <a:endParaRPr lang="en-US" dirty="0"/>
+              <a:t>State machine + field extraction in each state</a:t>
+            </a:r>
+          </a:p>
+          <a:p>
+            <a:endParaRPr lang="en-US" dirty="0" smtClean="0"/>
           </a:p>
           <a:p>
             <a:r>
               <a:rPr lang="en-US" dirty="0" smtClean="0"/>
-              <a:t>Implemented as a ternary content-addressable memory (CAM with wildcard bits)</a:t>
+              <a:t>State machine implemented as a TCAM</a:t>
             </a:r>
           </a:p>
           <a:p>
@@ -35028,6 +35016,57 @@
           </a:p>
         </p:txBody>
       </p:sp>
+      <p:sp>
+        <p:nvSpPr>
+          <p:cNvPr id="71" name="Rounded Rectangle 70"/>
+          <p:cNvSpPr/>
+          <p:nvPr/>
+        </p:nvSpPr>
+        <p:spPr>
+          <a:xfrm>
+            <a:off x="1943100" y="5943600"/>
+            <a:ext cx="7886700" cy="726825"/>
+          </a:xfrm>
+          <a:prstGeom prst="roundRect">
+            <a:avLst/>
+          </a:prstGeom>
+          <a:solidFill>
+            <a:srgbClr val="FF0000"/>
+          </a:solidFill>
+        </p:spPr>
+        <p:style>
+          <a:lnRef idx="2">
+            <a:schemeClr val="accent1">
+              <a:shade val="50000"/>
+            </a:schemeClr>
+          </a:lnRef>
+          <a:fillRef idx="1">
+            <a:schemeClr val="accent1"/>
+          </a:fillRef>
+          <a:effectRef idx="0">
+            <a:schemeClr val="accent1"/>
+          </a:effectRef>
+          <a:fontRef idx="minor">
+            <a:schemeClr val="lt1"/>
+          </a:fontRef>
+        </p:style>
+        <p:txBody>
+          <a:bodyPr rtlCol="0" anchor="ctr"/>
+          <a:lstStyle/>
+          <a:p>
+            <a:pPr algn="ctr"/>
+            <a:r>
+              <a:rPr lang="en-US" sz="3000" smtClean="0">
+                <a:latin typeface="Gadugi" panose="020B0502040204020203" pitchFamily="34" charset="0"/>
+              </a:rPr>
+              <a:t>Obvious parallelism: 200 VLIWs per stage</a:t>
+            </a:r>
+            <a:endParaRPr lang="en-US" sz="3000" dirty="0" smtClean="0">
+              <a:latin typeface="Gadugi" panose="020B0502040204020203" pitchFamily="34" charset="0"/>
+            </a:endParaRPr>
+          </a:p>
+        </p:txBody>
+      </p:sp>
     </p:spTree>
     <p:extLst>
       <p:ext uri="{BB962C8B-B14F-4D97-AF65-F5344CB8AC3E}">
@@ -35454,6 +35493,51 @@
                       </p:childTnLst>
                     </p:cTn>
                   </p:par>
+                  <p:par>
+                    <p:cTn id="40" fill="hold">
+                      <p:stCondLst>
+                        <p:cond delay="indefinite"/>
+                      </p:stCondLst>
+                      <p:childTnLst>
+                        <p:par>
+                          <p:cTn id="41" fill="hold">
+                            <p:stCondLst>
+                              <p:cond delay="0"/>
+                            </p:stCondLst>
+                            <p:childTnLst>
+                              <p:par>
+                                <p:cTn id="42" presetID="1" presetClass="entr" presetSubtype="0" fill="hold" grpId="0" nodeType="clickEffect">
+                                  <p:stCondLst>
+                                    <p:cond delay="0"/>
+                                  </p:stCondLst>
+                                  <p:childTnLst>
+                                    <p:set>
+                                      <p:cBhvr>
+                                        <p:cTn id="43" dur="1" fill="hold">
+                                          <p:stCondLst>
+                                            <p:cond delay="0"/>
+                                          </p:stCondLst>
+                                        </p:cTn>
+                                        <p:tgtEl>
+                                          <p:spTgt spid="71"/>
+                                        </p:tgtEl>
+                                        <p:attrNameLst>
+                                          <p:attrName>style.visibility</p:attrName>
+                                        </p:attrNameLst>
+                                      </p:cBhvr>
+                                      <p:to>
+                                        <p:strVal val="visible"/>
+                                      </p:to>
+                                    </p:set>
+                                  </p:childTnLst>
+                                </p:cTn>
+                              </p:par>
+                            </p:childTnLst>
+                          </p:cTn>
+                        </p:par>
+                      </p:childTnLst>
+                    </p:cTn>
+                  </p:par>
                 </p:childTnLst>
               </p:cTn>
               <p:prevCondLst>
@@ -35475,6 +35559,9 @@
         </p:cTn>
       </p:par>
     </p:tnLst>
+    <p:bldLst>
+      <p:bldP spid="71" grpId="0" animBg="1"/>
+    </p:bldLst>
   </p:timing>
 </p:sld>
 </file>
@@ -35806,7 +35893,9 @@
         </p:nvSpPr>
         <p:spPr/>
         <p:txBody>
-          <a:bodyPr/>
+          <a:bodyPr>
+            <a:normAutofit fontScale="92500" lnSpcReduction="10000"/>
+          </a:bodyPr>
           <a:lstStyle/>
           <a:p>
             <a:r>
@@ -35854,7 +35943,20 @@
           <a:p>
             <a:r>
               <a:rPr lang="en-US" dirty="0" smtClean="0"/>
-              <a:t>How much do each of these components contribute?</a:t>
+              <a:t>How much do each of these components contribute</a:t>
+            </a:r>
+            <a:r>
+              <a:rPr lang="en-US" dirty="0" smtClean="0"/>
+              <a:t>?</a:t>
+            </a:r>
+          </a:p>
+          <a:p>
+            <a:endParaRPr lang="en-US" dirty="0"/>
+          </a:p>
+          <a:p>
+            <a:r>
+              <a:rPr lang="en-US" smtClean="0"/>
+              <a:t>What does RMT not let you do?</a:t>
             </a:r>
             <a:endParaRPr lang="en-US" dirty="0"/>
           </a:p>
@@ -36054,6 +36156,55 @@
                                           <p:spTgt spid="3">
                                             <p:txEl>
                                               <p:pRg st="6" end="6"/>
+                                            </p:txEl>
+                                          </p:spTgt>
+                                        </p:tgtEl>
+                                        <p:attrNameLst>
+                                          <p:attrName>style.visibility</p:attrName>
+                                        </p:attrNameLst>
+                                      </p:cBhvr>
+                                      <p:to>
+                                        <p:strVal val="visible"/>
+                                      </p:to>
+                                    </p:set>
+                                  </p:childTnLst>
+                                </p:cTn>
+                              </p:par>
+                            </p:childTnLst>
+                          </p:cTn>
+                        </p:par>
+                      </p:childTnLst>
+                    </p:cTn>
+                  </p:par>
+                  <p:par>
+                    <p:cTn id="19" fill="hold">
+                      <p:stCondLst>
+                        <p:cond delay="indefinite"/>
+                      </p:stCondLst>
+                      <p:childTnLst>
+                        <p:par>
+                          <p:cTn id="20" fill="hold">
+                            <p:stCondLst>
+                              <p:cond delay="0"/>
+                            </p:stCondLst>
+                            <p:childTnLst>
+                              <p:par>
+                                <p:cTn id="21" presetID="1" presetClass="entr" presetSubtype="0" fill="hold" nodeType="clickEffect">
+                                  <p:stCondLst>
+                                    <p:cond delay="0"/>
+                                  </p:stCondLst>
+                                  <p:childTnLst>
+                                    <p:set>
+                                      <p:cBhvr>
+                                        <p:cTn id="22" dur="1" fill="hold">
+                                          <p:stCondLst>
+                                            <p:cond delay="0"/>
+                                          </p:stCondLst>
+                                        </p:cTn>
+                                        <p:tgtEl>
+                                          <p:spTgt spid="3">
+                                            <p:txEl>
+                                              <p:pRg st="8" end="8"/>
                                             </p:txEl>
                                           </p:spTgt>
                                         </p:tgtEl>
@@ -39986,13 +40137,8 @@
           <a:p>
             <a:r>
               <a:rPr lang="en-US" dirty="0" smtClean="0"/>
-              <a:t>Fairly simple language</a:t>
-            </a:r>
-            <a:r>
-              <a:rPr lang="en-US" dirty="0" smtClean="0"/>
-              <a:t>. What do you think is missing?</a:t>
-            </a:r>
-            <a:endParaRPr lang="en-US" dirty="0" smtClean="0"/>
+              <a:t>Fairly simple language. What do you think is missing?</a:t>
+            </a:r>
           </a:p>
           <a:p>
             <a:pPr lvl="1"/>
@@ -40007,11 +40153,7 @@
           <a:p>
             <a:r>
               <a:rPr lang="en-US" dirty="0" smtClean="0"/>
-              <a:t>Somewhat strange serial-parallel </a:t>
-            </a:r>
-            <a:r>
-              <a:rPr lang="en-US" dirty="0" smtClean="0"/>
-              <a:t>semantics. </a:t>
+              <a:t>Somewhat strange serial-parallel semantics. </a:t>
             </a:r>
             <a:r>
               <a:rPr lang="en-US" smtClean="0"/>
@@ -41066,11 +41208,7 @@
             <a:pPr lvl="1"/>
             <a:r>
               <a:rPr lang="en-US" dirty="0" smtClean="0"/>
-              <a:t>I think it’s </a:t>
-            </a:r>
-            <a:r>
-              <a:rPr lang="en-US" dirty="0" smtClean="0"/>
-              <a:t>measurement/visibility/troubleshooting for </a:t>
+              <a:t>I think it’s measurement/visibility/troubleshooting for </a:t>
             </a:r>
             <a:r>
               <a:rPr lang="en-US" dirty="0" err="1" smtClean="0"/>
@@ -41080,20 +41218,11 @@
               <a:rPr lang="en-US" dirty="0" smtClean="0"/>
               <a:t>. switches</a:t>
             </a:r>
-            <a:endParaRPr lang="en-US" dirty="0" smtClean="0"/>
           </a:p>
           <a:p>
             <a:r>
               <a:rPr lang="en-US" dirty="0" smtClean="0"/>
-              <a:t>More far out: Maybe </a:t>
-            </a:r>
-            <a:r>
-              <a:rPr lang="en-US" dirty="0" smtClean="0"/>
-              <a:t>push the application into the </a:t>
-            </a:r>
-            <a:r>
-              <a:rPr lang="en-US" dirty="0" smtClean="0"/>
-              <a:t>network?</a:t>
+              <a:t>More far out: Maybe push the application into the network?</a:t>
             </a:r>
           </a:p>
           <a:p>
@@ -41102,7 +41231,6 @@
               <a:rPr lang="en-US" dirty="0" smtClean="0"/>
               <a:t>HTTP proxies?</a:t>
             </a:r>
-            <a:endParaRPr lang="en-US" dirty="0" smtClean="0"/>
           </a:p>
           <a:p>
             <a:pPr lvl="1"/>
@@ -42044,11 +42172,7 @@
           <a:p>
             <a:r>
               <a:rPr lang="en-US" dirty="0" smtClean="0"/>
-              <a:t>Software Defined </a:t>
-            </a:r>
-            <a:r>
-              <a:rPr lang="en-US" dirty="0" smtClean="0"/>
-              <a:t>Networking: What’s the idea?</a:t>
+              <a:t>Software Defined Networking: What’s the idea?</a:t>
             </a:r>
             <a:endParaRPr lang="en-US" dirty="0"/>
           </a:p>
@@ -42078,11 +42202,7 @@
           <a:p>
             <a:r>
               <a:rPr lang="en-US" sz="3600" dirty="0" smtClean="0"/>
-              <a:t>Separate </a:t>
-            </a:r>
-            <a:r>
-              <a:rPr lang="en-US" sz="3600" dirty="0" smtClean="0"/>
-              <a:t>network control plane from data plane.</a:t>
+              <a:t>Separate network control plane from data plane.</a:t>
             </a:r>
             <a:endParaRPr lang="en-US" sz="3600" dirty="0"/>
           </a:p>
@@ -43858,13 +43978,8 @@
             <a:pPr lvl="1"/>
             <a:r>
               <a:rPr lang="en-US" dirty="0" smtClean="0"/>
-              <a:t>Which headers: Lowest common </a:t>
-            </a:r>
-            <a:r>
-              <a:rPr lang="en-US" dirty="0" smtClean="0"/>
-              <a:t>denominator (TCP, UDP, IP, etc.)</a:t>
-            </a:r>
-            <a:endParaRPr lang="en-US" dirty="0" smtClean="0"/>
+              <a:t>Which headers: Lowest common denominator (TCP, UDP, IP, etc.)</a:t>
+            </a:r>
           </a:p>
           <a:p>
             <a:endParaRPr lang="en-US" dirty="0"/>
@@ -44382,15 +44497,7 @@
           <a:p>
             <a:r>
               <a:rPr lang="is-IS" dirty="0" smtClean="0"/>
-              <a:t>Lot </a:t>
-            </a:r>
-            <a:r>
-              <a:rPr lang="is-IS" dirty="0" smtClean="0"/>
-              <a:t>of performance left on the table</a:t>
-            </a:r>
-            <a:r>
-              <a:rPr lang="is-IS" dirty="0" smtClean="0"/>
-              <a:t>.</a:t>
+              <a:t>Lot of performance left on the table.</a:t>
             </a:r>
             <a:endParaRPr lang="is-IS" dirty="0"/>
           </a:p>
@@ -44402,7 +44509,6 @@
               <a:rPr lang="is-IS" dirty="0" smtClean="0"/>
               <a:t>What about new protocols like IPv6?</a:t>
             </a:r>
-            <a:endParaRPr lang="is-IS" dirty="0" smtClean="0"/>
           </a:p>
         </p:txBody>
       </p:sp>

</xml_diff>

<commit_message>
Remark on absence of standards
</commit_message>
<xml_diff>
--- a/RMT-lecture.pptx
+++ b/RMT-lecture.pptx
@@ -200,7 +200,6 @@
           </a:p>
         </c:rich>
       </c:tx>
-      <c:layout/>
       <c:overlay val="0"/>
       <c:spPr>
         <a:noFill/>
@@ -310,9 +309,7 @@
               <c:showPercent val="0"/>
               <c:showBubbleSize val="0"/>
               <c:extLst>
-                <c:ext xmlns:c15="http://schemas.microsoft.com/office/drawing/2012/chart" uri="{CE6537A1-D6FC-4f65-9D91-7224C49458BB}">
-                  <c15:layout/>
-                </c:ext>
+                <c:ext xmlns:c15="http://schemas.microsoft.com/office/drawing/2012/chart" uri="{CE6537A1-D6FC-4f65-9D91-7224C49458BB}"/>
               </c:extLst>
             </c:dLbl>
             <c:dLbl>
@@ -350,9 +347,7 @@
               <c:showPercent val="0"/>
               <c:showBubbleSize val="0"/>
               <c:extLst>
-                <c:ext xmlns:c15="http://schemas.microsoft.com/office/drawing/2012/chart" uri="{CE6537A1-D6FC-4f65-9D91-7224C49458BB}">
-                  <c15:layout/>
-                </c:ext>
+                <c:ext xmlns:c15="http://schemas.microsoft.com/office/drawing/2012/chart" uri="{CE6537A1-D6FC-4f65-9D91-7224C49458BB}"/>
               </c:extLst>
             </c:dLbl>
             <c:dLbl>
@@ -390,9 +385,7 @@
               <c:showPercent val="0"/>
               <c:showBubbleSize val="0"/>
               <c:extLst>
-                <c:ext xmlns:c15="http://schemas.microsoft.com/office/drawing/2012/chart" uri="{CE6537A1-D6FC-4f65-9D91-7224C49458BB}">
-                  <c15:layout/>
-                </c:ext>
+                <c:ext xmlns:c15="http://schemas.microsoft.com/office/drawing/2012/chart" uri="{CE6537A1-D6FC-4f65-9D91-7224C49458BB}"/>
               </c:extLst>
             </c:dLbl>
             <c:dLbl>
@@ -430,9 +423,7 @@
               <c:showPercent val="0"/>
               <c:showBubbleSize val="0"/>
               <c:extLst>
-                <c:ext xmlns:c15="http://schemas.microsoft.com/office/drawing/2012/chart" uri="{CE6537A1-D6FC-4f65-9D91-7224C49458BB}">
-                  <c15:layout/>
-                </c:ext>
+                <c:ext xmlns:c15="http://schemas.microsoft.com/office/drawing/2012/chart" uri="{CE6537A1-D6FC-4f65-9D91-7224C49458BB}"/>
               </c:extLst>
             </c:dLbl>
             <c:dLbl>
@@ -567,9 +558,7 @@
               <c:showPercent val="0"/>
               <c:showBubbleSize val="0"/>
               <c:extLst>
-                <c:ext xmlns:c15="http://schemas.microsoft.com/office/drawing/2012/chart" uri="{CE6537A1-D6FC-4f65-9D91-7224C49458BB}">
-                  <c15:layout/>
-                </c:ext>
+                <c:ext xmlns:c15="http://schemas.microsoft.com/office/drawing/2012/chart" uri="{CE6537A1-D6FC-4f65-9D91-7224C49458BB}"/>
               </c:extLst>
             </c:dLbl>
             <c:spPr>
@@ -732,7 +721,6 @@
           <c:dLbls>
             <c:dLbl>
               <c:idx val="0"/>
-              <c:layout/>
               <c:tx>
                 <c:rich>
                   <a:bodyPr/>
@@ -754,9 +742,7 @@
               <c:showPercent val="0"/>
               <c:showBubbleSize val="0"/>
               <c:extLst>
-                <c:ext xmlns:c15="http://schemas.microsoft.com/office/drawing/2012/chart" uri="{CE6537A1-D6FC-4f65-9D91-7224C49458BB}">
-                  <c15:layout/>
-                </c:ext>
+                <c:ext xmlns:c15="http://schemas.microsoft.com/office/drawing/2012/chart" uri="{CE6537A1-D6FC-4f65-9D91-7224C49458BB}"/>
               </c:extLst>
             </c:dLbl>
             <c:dLbl>
@@ -794,14 +780,11 @@
               <c:showPercent val="0"/>
               <c:showBubbleSize val="0"/>
               <c:extLst>
-                <c:ext xmlns:c15="http://schemas.microsoft.com/office/drawing/2012/chart" uri="{CE6537A1-D6FC-4f65-9D91-7224C49458BB}">
-                  <c15:layout/>
-                </c:ext>
+                <c:ext xmlns:c15="http://schemas.microsoft.com/office/drawing/2012/chart" uri="{CE6537A1-D6FC-4f65-9D91-7224C49458BB}"/>
               </c:extLst>
             </c:dLbl>
             <c:dLbl>
               <c:idx val="4"/>
-              <c:layout/>
               <c:tx>
                 <c:rich>
                   <a:bodyPr/>
@@ -823,14 +806,11 @@
               <c:showPercent val="0"/>
               <c:showBubbleSize val="0"/>
               <c:extLst>
-                <c:ext xmlns:c15="http://schemas.microsoft.com/office/drawing/2012/chart" uri="{CE6537A1-D6FC-4f65-9D91-7224C49458BB}">
-                  <c15:layout/>
-                </c:ext>
+                <c:ext xmlns:c15="http://schemas.microsoft.com/office/drawing/2012/chart" uri="{CE6537A1-D6FC-4f65-9D91-7224C49458BB}"/>
               </c:extLst>
             </c:dLbl>
             <c:dLbl>
               <c:idx val="6"/>
-              <c:layout/>
               <c:tx>
                 <c:rich>
                   <a:bodyPr/>
@@ -852,14 +832,11 @@
               <c:showPercent val="0"/>
               <c:showBubbleSize val="0"/>
               <c:extLst>
-                <c:ext xmlns:c15="http://schemas.microsoft.com/office/drawing/2012/chart" uri="{CE6537A1-D6FC-4f65-9D91-7224C49458BB}">
-                  <c15:layout/>
-                </c:ext>
+                <c:ext xmlns:c15="http://schemas.microsoft.com/office/drawing/2012/chart" uri="{CE6537A1-D6FC-4f65-9D91-7224C49458BB}"/>
               </c:extLst>
             </c:dLbl>
             <c:dLbl>
               <c:idx val="7"/>
-              <c:layout/>
               <c:tx>
                 <c:rich>
                   <a:bodyPr/>
@@ -880,9 +857,7 @@
               <c:showPercent val="0"/>
               <c:showBubbleSize val="0"/>
               <c:extLst>
-                <c:ext xmlns:c15="http://schemas.microsoft.com/office/drawing/2012/chart" uri="{CE6537A1-D6FC-4f65-9D91-7224C49458BB}">
-                  <c15:layout/>
-                </c:ext>
+                <c:ext xmlns:c15="http://schemas.microsoft.com/office/drawing/2012/chart" uri="{CE6537A1-D6FC-4f65-9D91-7224C49458BB}"/>
               </c:extLst>
             </c:dLbl>
             <c:spPr>
@@ -1012,11 +987,11 @@
         </c:dLbls>
         <c:marker val="1"/>
         <c:smooth val="0"/>
-        <c:axId val="1408270224"/>
-        <c:axId val="953087840"/>
+        <c:axId val="1429119456"/>
+        <c:axId val="1260497392"/>
       </c:lineChart>
       <c:catAx>
-        <c:axId val="1408270224"/>
+        <c:axId val="1429119456"/>
         <c:scaling>
           <c:orientation val="minMax"/>
         </c:scaling>
@@ -1048,7 +1023,6 @@
               </a:p>
             </c:rich>
           </c:tx>
-          <c:layout/>
           <c:overlay val="0"/>
           <c:spPr>
             <a:noFill/>
@@ -1115,7 +1089,7 @@
             <a:endParaRPr lang="en-US"/>
           </a:p>
         </c:txPr>
-        <c:crossAx val="953087840"/>
+        <c:crossAx val="1260497392"/>
         <c:crosses val="autoZero"/>
         <c:auto val="1"/>
         <c:lblAlgn val="ctr"/>
@@ -1123,7 +1097,7 @@
         <c:noMultiLvlLbl val="0"/>
       </c:catAx>
       <c:valAx>
-        <c:axId val="953087840"/>
+        <c:axId val="1260497392"/>
         <c:scaling>
           <c:logBase val="10.0"/>
           <c:orientation val="minMax"/>
@@ -1176,7 +1150,6 @@
               </a:p>
             </c:rich>
           </c:tx>
-          <c:layout/>
           <c:overlay val="0"/>
           <c:spPr>
             <a:noFill/>
@@ -1237,7 +1210,7 @@
             <a:endParaRPr lang="en-US"/>
           </a:p>
         </c:txPr>
-        <c:crossAx val="1408270224"/>
+        <c:crossAx val="1429119456"/>
         <c:crosses val="autoZero"/>
         <c:crossBetween val="between"/>
       </c:valAx>
@@ -1251,7 +1224,6 @@
     </c:plotArea>
     <c:legend>
       <c:legendPos val="b"/>
-      <c:layout/>
       <c:overlay val="0"/>
       <c:spPr>
         <a:noFill/>
@@ -23972,7 +23944,7 @@
           <a:p>
             <a:r>
               <a:rPr lang="en-US" dirty="0" smtClean="0"/>
-              <a:t>State machine + field extraction in each state</a:t>
+              <a:t>State machine + field extraction in each state (Ethernet, IP, etc.)</a:t>
             </a:r>
           </a:p>
           <a:p>
@@ -35943,11 +35915,7 @@
           <a:p>
             <a:r>
               <a:rPr lang="en-US" dirty="0" smtClean="0"/>
-              <a:t>How much do each of these components contribute</a:t>
-            </a:r>
-            <a:r>
-              <a:rPr lang="en-US" dirty="0" smtClean="0"/>
-              <a:t>?</a:t>
+              <a:t>How much do each of these components contribute?</a:t>
             </a:r>
           </a:p>
           <a:p>
@@ -40685,6 +40653,13 @@
             <a:pPr lvl="1"/>
             <a:r>
               <a:rPr lang="en-US" dirty="0" smtClean="0"/>
+              <a:t>(Hopefully) no more lengthy standard meetings for a new protocol.</a:t>
+            </a:r>
+          </a:p>
+          <a:p>
+            <a:pPr lvl="1"/>
+            <a:r>
+              <a:rPr lang="en-US" dirty="0" smtClean="0"/>
               <a:t>Move beyond thinking about features to instructions.</a:t>
             </a:r>
           </a:p>
@@ -41028,15 +41003,33 @@
                                   </p:childTnLst>
                                 </p:cTn>
                               </p:par>
+                            </p:childTnLst>
+                          </p:cTn>
+                        </p:par>
+                      </p:childTnLst>
+                    </p:cTn>
+                  </p:par>
+                  <p:par>
+                    <p:cTn id="27" fill="hold">
+                      <p:stCondLst>
+                        <p:cond delay="indefinite"/>
+                      </p:stCondLst>
+                      <p:childTnLst>
+                        <p:par>
+                          <p:cTn id="28" fill="hold">
+                            <p:stCondLst>
+                              <p:cond delay="0"/>
+                            </p:stCondLst>
+                            <p:childTnLst>
                               <p:par>
-                                <p:cTn id="27" presetID="1" presetClass="entr" presetSubtype="0" fill="hold" nodeType="withEffect">
+                                <p:cTn id="29" presetID="1" presetClass="entr" presetSubtype="0" fill="hold" nodeType="clickEffect">
                                   <p:stCondLst>
                                     <p:cond delay="0"/>
                                   </p:stCondLst>
                                   <p:childTnLst>
                                     <p:set>
                                       <p:cBhvr>
-                                        <p:cTn id="28" dur="1" fill="hold">
+                                        <p:cTn id="30" dur="1" fill="hold">
                                           <p:stCondLst>
                                             <p:cond delay="0"/>
                                           </p:stCondLst>
@@ -41060,14 +41053,14 @@
                                 </p:cTn>
                               </p:par>
                               <p:par>
-                                <p:cTn id="29" presetID="1" presetClass="entr" presetSubtype="0" fill="hold" nodeType="withEffect">
+                                <p:cTn id="31" presetID="1" presetClass="entr" presetSubtype="0" fill="hold" nodeType="withEffect">
                                   <p:stCondLst>
                                     <p:cond delay="0"/>
                                   </p:stCondLst>
                                   <p:childTnLst>
                                     <p:set>
                                       <p:cBhvr>
-                                        <p:cTn id="30" dur="1" fill="hold">
+                                        <p:cTn id="32" dur="1" fill="hold">
                                           <p:stCondLst>
                                             <p:cond delay="0"/>
                                           </p:stCondLst>
@@ -41076,6 +41069,303 @@
                                           <p:spTgt spid="3">
                                             <p:txEl>
                                               <p:pRg st="7" end="7"/>
+                                            </p:txEl>
+                                          </p:spTgt>
+                                        </p:tgtEl>
+                                        <p:attrNameLst>
+                                          <p:attrName>style.visibility</p:attrName>
+                                        </p:attrNameLst>
+                                      </p:cBhvr>
+                                      <p:to>
+                                        <p:strVal val="visible"/>
+                                      </p:to>
+                                    </p:set>
+                                  </p:childTnLst>
+                                </p:cTn>
+                              </p:par>
+                              <p:par>
+                                <p:cTn id="33" presetID="1" presetClass="entr" presetSubtype="0" fill="hold" nodeType="withEffect">
+                                  <p:stCondLst>
+                                    <p:cond delay="0"/>
+                                  </p:stCondLst>
+                                  <p:childTnLst>
+                                    <p:set>
+                                      <p:cBhvr>
+                                        <p:cTn id="34" dur="1" fill="hold">
+                                          <p:stCondLst>
+                                            <p:cond delay="0"/>
+                                          </p:stCondLst>
+                                        </p:cTn>
+                                        <p:tgtEl>
+                                          <p:spTgt spid="3">
+                                            <p:txEl>
+                                              <p:pRg st="8" end="8"/>
+                                            </p:txEl>
+                                          </p:spTgt>
+                                        </p:tgtEl>
+                                        <p:attrNameLst>
+                                          <p:attrName>style.visibility</p:attrName>
+                                        </p:attrNameLst>
+                                      </p:cBhvr>
+                                      <p:to>
+                                        <p:strVal val="visible"/>
+                                      </p:to>
+                                    </p:set>
+                                  </p:childTnLst>
+                                </p:cTn>
+                              </p:par>
+                            </p:childTnLst>
+                          </p:cTn>
+                        </p:par>
+                      </p:childTnLst>
+                    </p:cTn>
+                  </p:par>
+                  <p:par>
+                    <p:cTn id="35" fill="hold">
+                      <p:stCondLst>
+                        <p:cond delay="indefinite"/>
+                      </p:stCondLst>
+                      <p:childTnLst>
+                        <p:par>
+                          <p:cTn id="36" fill="hold">
+                            <p:stCondLst>
+                              <p:cond delay="0"/>
+                            </p:stCondLst>
+                            <p:childTnLst>
+                              <p:par>
+                                <p:cTn id="37" presetID="1" presetClass="entr" presetSubtype="0" fill="hold" nodeType="clickEffect">
+                                  <p:stCondLst>
+                                    <p:cond delay="0"/>
+                                  </p:stCondLst>
+                                  <p:childTnLst>
+                                    <p:set>
+                                      <p:cBhvr>
+                                        <p:cTn id="38" dur="1" fill="hold">
+                                          <p:stCondLst>
+                                            <p:cond delay="0"/>
+                                          </p:stCondLst>
+                                        </p:cTn>
+                                        <p:tgtEl>
+                                          <p:spTgt spid="3">
+                                            <p:txEl>
+                                              <p:pRg st="1" end="1"/>
+                                            </p:txEl>
+                                          </p:spTgt>
+                                        </p:tgtEl>
+                                        <p:attrNameLst>
+                                          <p:attrName>style.visibility</p:attrName>
+                                        </p:attrNameLst>
+                                      </p:cBhvr>
+                                      <p:to>
+                                        <p:strVal val="visible"/>
+                                      </p:to>
+                                    </p:set>
+                                  </p:childTnLst>
+                                </p:cTn>
+                              </p:par>
+                              <p:par>
+                                <p:cTn id="39" presetID="1" presetClass="entr" presetSubtype="0" fill="hold" nodeType="withEffect">
+                                  <p:stCondLst>
+                                    <p:cond delay="0"/>
+                                  </p:stCondLst>
+                                  <p:childTnLst>
+                                    <p:set>
+                                      <p:cBhvr>
+                                        <p:cTn id="40" dur="1" fill="hold">
+                                          <p:stCondLst>
+                                            <p:cond delay="0"/>
+                                          </p:stCondLst>
+                                        </p:cTn>
+                                        <p:tgtEl>
+                                          <p:spTgt spid="3">
+                                            <p:txEl>
+                                              <p:pRg st="2" end="2"/>
+                                            </p:txEl>
+                                          </p:spTgt>
+                                        </p:tgtEl>
+                                        <p:attrNameLst>
+                                          <p:attrName>style.visibility</p:attrName>
+                                        </p:attrNameLst>
+                                      </p:cBhvr>
+                                      <p:to>
+                                        <p:strVal val="visible"/>
+                                      </p:to>
+                                    </p:set>
+                                  </p:childTnLst>
+                                </p:cTn>
+                              </p:par>
+                              <p:par>
+                                <p:cTn id="41" presetID="1" presetClass="entr" presetSubtype="0" fill="hold" nodeType="withEffect">
+                                  <p:stCondLst>
+                                    <p:cond delay="0"/>
+                                  </p:stCondLst>
+                                  <p:childTnLst>
+                                    <p:set>
+                                      <p:cBhvr>
+                                        <p:cTn id="42" dur="1" fill="hold">
+                                          <p:stCondLst>
+                                            <p:cond delay="0"/>
+                                          </p:stCondLst>
+                                        </p:cTn>
+                                        <p:tgtEl>
+                                          <p:spTgt spid="3">
+                                            <p:txEl>
+                                              <p:pRg st="3" end="3"/>
+                                            </p:txEl>
+                                          </p:spTgt>
+                                        </p:tgtEl>
+                                        <p:attrNameLst>
+                                          <p:attrName>style.visibility</p:attrName>
+                                        </p:attrNameLst>
+                                      </p:cBhvr>
+                                      <p:to>
+                                        <p:strVal val="visible"/>
+                                      </p:to>
+                                    </p:set>
+                                  </p:childTnLst>
+                                </p:cTn>
+                              </p:par>
+                              <p:par>
+                                <p:cTn id="43" presetID="1" presetClass="entr" presetSubtype="0" fill="hold" nodeType="withEffect">
+                                  <p:stCondLst>
+                                    <p:cond delay="0"/>
+                                  </p:stCondLst>
+                                  <p:childTnLst>
+                                    <p:set>
+                                      <p:cBhvr>
+                                        <p:cTn id="44" dur="1" fill="hold">
+                                          <p:stCondLst>
+                                            <p:cond delay="0"/>
+                                          </p:stCondLst>
+                                        </p:cTn>
+                                        <p:tgtEl>
+                                          <p:spTgt spid="3">
+                                            <p:txEl>
+                                              <p:pRg st="4" end="4"/>
+                                            </p:txEl>
+                                          </p:spTgt>
+                                        </p:tgtEl>
+                                        <p:attrNameLst>
+                                          <p:attrName>style.visibility</p:attrName>
+                                        </p:attrNameLst>
+                                      </p:cBhvr>
+                                      <p:to>
+                                        <p:strVal val="visible"/>
+                                      </p:to>
+                                    </p:set>
+                                  </p:childTnLst>
+                                </p:cTn>
+                              </p:par>
+                              <p:par>
+                                <p:cTn id="45" presetID="1" presetClass="entr" presetSubtype="0" fill="hold" nodeType="withEffect">
+                                  <p:stCondLst>
+                                    <p:cond delay="0"/>
+                                  </p:stCondLst>
+                                  <p:childTnLst>
+                                    <p:set>
+                                      <p:cBhvr>
+                                        <p:cTn id="46" dur="1" fill="hold">
+                                          <p:stCondLst>
+                                            <p:cond delay="0"/>
+                                          </p:stCondLst>
+                                        </p:cTn>
+                                        <p:tgtEl>
+                                          <p:spTgt spid="3">
+                                            <p:txEl>
+                                              <p:pRg st="5" end="5"/>
+                                            </p:txEl>
+                                          </p:spTgt>
+                                        </p:tgtEl>
+                                        <p:attrNameLst>
+                                          <p:attrName>style.visibility</p:attrName>
+                                        </p:attrNameLst>
+                                      </p:cBhvr>
+                                      <p:to>
+                                        <p:strVal val="visible"/>
+                                      </p:to>
+                                    </p:set>
+                                  </p:childTnLst>
+                                </p:cTn>
+                              </p:par>
+                              <p:par>
+                                <p:cTn id="47" presetID="1" presetClass="entr" presetSubtype="0" fill="hold" nodeType="withEffect">
+                                  <p:stCondLst>
+                                    <p:cond delay="0"/>
+                                  </p:stCondLst>
+                                  <p:childTnLst>
+                                    <p:set>
+                                      <p:cBhvr>
+                                        <p:cTn id="48" dur="1" fill="hold">
+                                          <p:stCondLst>
+                                            <p:cond delay="0"/>
+                                          </p:stCondLst>
+                                        </p:cTn>
+                                        <p:tgtEl>
+                                          <p:spTgt spid="3">
+                                            <p:txEl>
+                                              <p:pRg st="6" end="6"/>
+                                            </p:txEl>
+                                          </p:spTgt>
+                                        </p:tgtEl>
+                                        <p:attrNameLst>
+                                          <p:attrName>style.visibility</p:attrName>
+                                        </p:attrNameLst>
+                                      </p:cBhvr>
+                                      <p:to>
+                                        <p:strVal val="visible"/>
+                                      </p:to>
+                                    </p:set>
+                                  </p:childTnLst>
+                                </p:cTn>
+                              </p:par>
+                              <p:par>
+                                <p:cTn id="49" presetID="1" presetClass="entr" presetSubtype="0" fill="hold" nodeType="withEffect">
+                                  <p:stCondLst>
+                                    <p:cond delay="0"/>
+                                  </p:stCondLst>
+                                  <p:childTnLst>
+                                    <p:set>
+                                      <p:cBhvr>
+                                        <p:cTn id="50" dur="1" fill="hold">
+                                          <p:stCondLst>
+                                            <p:cond delay="0"/>
+                                          </p:stCondLst>
+                                        </p:cTn>
+                                        <p:tgtEl>
+                                          <p:spTgt spid="3">
+                                            <p:txEl>
+                                              <p:pRg st="7" end="7"/>
+                                            </p:txEl>
+                                          </p:spTgt>
+                                        </p:tgtEl>
+                                        <p:attrNameLst>
+                                          <p:attrName>style.visibility</p:attrName>
+                                        </p:attrNameLst>
+                                      </p:cBhvr>
+                                      <p:to>
+                                        <p:strVal val="visible"/>
+                                      </p:to>
+                                    </p:set>
+                                  </p:childTnLst>
+                                </p:cTn>
+                              </p:par>
+                              <p:par>
+                                <p:cTn id="51" presetID="1" presetClass="entr" presetSubtype="0" fill="hold" nodeType="withEffect">
+                                  <p:stCondLst>
+                                    <p:cond delay="0"/>
+                                  </p:stCondLst>
+                                  <p:childTnLst>
+                                    <p:set>
+                                      <p:cBhvr>
+                                        <p:cTn id="52" dur="1" fill="hold">
+                                          <p:stCondLst>
+                                            <p:cond delay="0"/>
+                                          </p:stCondLst>
+                                        </p:cTn>
+                                        <p:tgtEl>
+                                          <p:spTgt spid="3">
+                                            <p:txEl>
+                                              <p:pRg st="8" end="8"/>
                                             </p:txEl>
                                           </p:spTgt>
                                         </p:tgtEl>
@@ -42422,8 +42712,17 @@
             </a:r>
             <a:r>
               <a:rPr lang="en-US" sz="11200" dirty="0" smtClean="0"/>
-              <a:t> et al., PIFO; Mittal et al., UPS)</a:t>
-            </a:r>
+              <a:t> et al., PIFO; Mittal et al., </a:t>
+            </a:r>
+            <a:r>
+              <a:rPr lang="en-US" sz="11200" dirty="0" smtClean="0"/>
+              <a:t>Universal </a:t>
+            </a:r>
+            <a:r>
+              <a:rPr lang="en-US" sz="11200" smtClean="0"/>
+              <a:t>Packet Scheduling)</a:t>
+            </a:r>
+            <a:endParaRPr lang="en-US" sz="11200" dirty="0" smtClean="0"/>
           </a:p>
           <a:p>
             <a:r>

</xml_diff>

<commit_message>
Minor tweaks before today's lecture.
</commit_message>
<xml_diff>
--- a/RMT-lecture.pptx
+++ b/RMT-lecture.pptx
@@ -1951,7 +1951,7 @@
           <a:p>
             <a:fld id="{191B5B68-7703-4B2D-8923-97CC0DFF0515}" type="datetimeFigureOut">
               <a:rPr lang="en-US" smtClean="0"/>
-              <a:t>2/21/18</a:t>
+              <a:t>10/4/18</a:t>
             </a:fld>
             <a:endParaRPr lang="en-US"/>
           </a:p>
@@ -5263,7 +5263,7 @@
           <a:p>
             <a:fld id="{E04F2FE0-66D1-4517-A0FE-1ABC94B036F1}" type="datetimeFigureOut">
               <a:rPr lang="en-US" smtClean="0"/>
-              <a:t>2/21/18</a:t>
+              <a:t>10/4/18</a:t>
             </a:fld>
             <a:endParaRPr lang="en-US"/>
           </a:p>
@@ -5433,7 +5433,7 @@
           <a:p>
             <a:fld id="{E04F2FE0-66D1-4517-A0FE-1ABC94B036F1}" type="datetimeFigureOut">
               <a:rPr lang="en-US" smtClean="0"/>
-              <a:t>2/21/18</a:t>
+              <a:t>10/4/18</a:t>
             </a:fld>
             <a:endParaRPr lang="en-US"/>
           </a:p>
@@ -5613,7 +5613,7 @@
           <a:p>
             <a:fld id="{E04F2FE0-66D1-4517-A0FE-1ABC94B036F1}" type="datetimeFigureOut">
               <a:rPr lang="en-US" smtClean="0"/>
-              <a:t>2/21/18</a:t>
+              <a:t>10/4/18</a:t>
             </a:fld>
             <a:endParaRPr lang="en-US"/>
           </a:p>
@@ -5783,7 +5783,7 @@
           <a:p>
             <a:fld id="{E04F2FE0-66D1-4517-A0FE-1ABC94B036F1}" type="datetimeFigureOut">
               <a:rPr lang="en-US" smtClean="0"/>
-              <a:t>2/21/18</a:t>
+              <a:t>10/4/18</a:t>
             </a:fld>
             <a:endParaRPr lang="en-US"/>
           </a:p>
@@ -6029,7 +6029,7 @@
           <a:p>
             <a:fld id="{E04F2FE0-66D1-4517-A0FE-1ABC94B036F1}" type="datetimeFigureOut">
               <a:rPr lang="en-US" smtClean="0"/>
-              <a:t>2/21/18</a:t>
+              <a:t>10/4/18</a:t>
             </a:fld>
             <a:endParaRPr lang="en-US"/>
           </a:p>
@@ -6261,7 +6261,7 @@
           <a:p>
             <a:fld id="{E04F2FE0-66D1-4517-A0FE-1ABC94B036F1}" type="datetimeFigureOut">
               <a:rPr lang="en-US" smtClean="0"/>
-              <a:t>2/21/18</a:t>
+              <a:t>10/4/18</a:t>
             </a:fld>
             <a:endParaRPr lang="en-US"/>
           </a:p>
@@ -6628,7 +6628,7 @@
           <a:p>
             <a:fld id="{E04F2FE0-66D1-4517-A0FE-1ABC94B036F1}" type="datetimeFigureOut">
               <a:rPr lang="en-US" smtClean="0"/>
-              <a:t>2/21/18</a:t>
+              <a:t>10/4/18</a:t>
             </a:fld>
             <a:endParaRPr lang="en-US"/>
           </a:p>
@@ -6746,7 +6746,7 @@
           <a:p>
             <a:fld id="{E04F2FE0-66D1-4517-A0FE-1ABC94B036F1}" type="datetimeFigureOut">
               <a:rPr lang="en-US" smtClean="0"/>
-              <a:t>2/21/18</a:t>
+              <a:t>10/4/18</a:t>
             </a:fld>
             <a:endParaRPr lang="en-US"/>
           </a:p>
@@ -6841,7 +6841,7 @@
           <a:p>
             <a:fld id="{E04F2FE0-66D1-4517-A0FE-1ABC94B036F1}" type="datetimeFigureOut">
               <a:rPr lang="en-US" smtClean="0"/>
-              <a:t>2/21/18</a:t>
+              <a:t>10/4/18</a:t>
             </a:fld>
             <a:endParaRPr lang="en-US"/>
           </a:p>
@@ -7118,7 +7118,7 @@
           <a:p>
             <a:fld id="{E04F2FE0-66D1-4517-A0FE-1ABC94B036F1}" type="datetimeFigureOut">
               <a:rPr lang="en-US" smtClean="0"/>
-              <a:t>2/21/18</a:t>
+              <a:t>10/4/18</a:t>
             </a:fld>
             <a:endParaRPr lang="en-US"/>
           </a:p>
@@ -7375,7 +7375,7 @@
           <a:p>
             <a:fld id="{E04F2FE0-66D1-4517-A0FE-1ABC94B036F1}" type="datetimeFigureOut">
               <a:rPr lang="en-US" smtClean="0"/>
-              <a:t>2/21/18</a:t>
+              <a:t>10/4/18</a:t>
             </a:fld>
             <a:endParaRPr lang="en-US"/>
           </a:p>
@@ -7588,7 +7588,7 @@
           <a:p>
             <a:fld id="{E04F2FE0-66D1-4517-A0FE-1ABC94B036F1}" type="datetimeFigureOut">
               <a:rPr lang="en-US" smtClean="0"/>
-              <a:t>2/21/18</a:t>
+              <a:t>10/4/18</a:t>
             </a:fld>
             <a:endParaRPr lang="en-US"/>
           </a:p>
@@ -36481,104 +36481,6 @@
       </p:sp>
       <p:sp>
         <p:nvSpPr>
-          <p:cNvPr id="11" name="Rectangle 10"/>
-          <p:cNvSpPr/>
-          <p:nvPr/>
-        </p:nvSpPr>
-        <p:spPr>
-          <a:xfrm>
-            <a:off x="7188120" y="3879739"/>
-            <a:ext cx="1882380" cy="197959"/>
-          </a:xfrm>
-          <a:prstGeom prst="rect">
-            <a:avLst/>
-          </a:prstGeom>
-          <a:solidFill>
-            <a:srgbClr val="FFFF00"/>
-          </a:solidFill>
-          <a:ln>
-            <a:noFill/>
-          </a:ln>
-          <a:effectLst/>
-        </p:spPr>
-        <p:style>
-          <a:lnRef idx="1">
-            <a:schemeClr val="accent1"/>
-          </a:lnRef>
-          <a:fillRef idx="3">
-            <a:schemeClr val="accent1"/>
-          </a:fillRef>
-          <a:effectRef idx="2">
-            <a:schemeClr val="accent1"/>
-          </a:effectRef>
-          <a:fontRef idx="minor">
-            <a:schemeClr val="lt1"/>
-          </a:fontRef>
-        </p:style>
-        <p:txBody>
-          <a:bodyPr rtlCol="0" anchor="ctr"/>
-          <a:lstStyle/>
-          <a:p>
-            <a:pPr algn="ctr"/>
-            <a:endParaRPr lang="en-US" sz="2000" dirty="0">
-              <a:solidFill>
-                <a:srgbClr val="000000"/>
-              </a:solidFill>
-            </a:endParaRPr>
-          </a:p>
-        </p:txBody>
-      </p:sp>
-      <p:sp>
-        <p:nvSpPr>
-          <p:cNvPr id="12" name="Rectangle 11"/>
-          <p:cNvSpPr/>
-          <p:nvPr/>
-        </p:nvSpPr>
-        <p:spPr>
-          <a:xfrm>
-            <a:off x="7188120" y="3549983"/>
-            <a:ext cx="1882380" cy="329755"/>
-          </a:xfrm>
-          <a:prstGeom prst="rect">
-            <a:avLst/>
-          </a:prstGeom>
-          <a:solidFill>
-            <a:srgbClr val="FFFF00"/>
-          </a:solidFill>
-          <a:ln>
-            <a:noFill/>
-          </a:ln>
-          <a:effectLst/>
-        </p:spPr>
-        <p:style>
-          <a:lnRef idx="1">
-            <a:schemeClr val="accent1"/>
-          </a:lnRef>
-          <a:fillRef idx="3">
-            <a:schemeClr val="accent1"/>
-          </a:fillRef>
-          <a:effectRef idx="2">
-            <a:schemeClr val="accent1"/>
-          </a:effectRef>
-          <a:fontRef idx="minor">
-            <a:schemeClr val="lt1"/>
-          </a:fontRef>
-        </p:style>
-        <p:txBody>
-          <a:bodyPr rtlCol="0" anchor="ctr"/>
-          <a:lstStyle/>
-          <a:p>
-            <a:pPr algn="ctr"/>
-            <a:endParaRPr lang="en-US" sz="2000" dirty="0">
-              <a:solidFill>
-                <a:srgbClr val="000000"/>
-              </a:solidFill>
-            </a:endParaRPr>
-          </a:p>
-        </p:txBody>
-      </p:sp>
-      <p:sp>
-        <p:nvSpPr>
           <p:cNvPr id="13" name="Title 1"/>
           <p:cNvSpPr txBox="1">
             <a:spLocks/>
@@ -36620,7 +36522,7 @@
           <a:p>
             <a:r>
               <a:rPr lang="en-US" sz="2800" dirty="0"/>
-              <a:t>Programmability mostly affects logic, which is decreasing in area.</a:t>
+              <a:t>Programmability mostly affects logic, which is a small fraction of area.</a:t>
             </a:r>
           </a:p>
         </p:txBody>
@@ -36656,7 +36558,7 @@
                             </p:stCondLst>
                             <p:childTnLst>
                               <p:par>
-                                <p:cTn id="5" presetID="1" presetClass="entr" presetSubtype="0" fill="hold" grpId="0" nodeType="clickEffect">
+                                <p:cTn id="5" presetID="1" presetClass="entr" presetSubtype="0" fill="hold" nodeType="clickEffect">
                                   <p:stCondLst>
                                     <p:cond delay="0"/>
                                   </p:stCondLst>
@@ -36669,167 +36571,11 @@
                                           </p:stCondLst>
                                         </p:cTn>
                                         <p:tgtEl>
-                                          <p:spTgt spid="9"/>
-                                        </p:tgtEl>
-                                        <p:attrNameLst>
-                                          <p:attrName>style.visibility</p:attrName>
-                                        </p:attrNameLst>
-                                      </p:cBhvr>
-                                      <p:to>
-                                        <p:strVal val="visible"/>
-                                      </p:to>
-                                    </p:set>
-                                  </p:childTnLst>
-                                </p:cTn>
-                              </p:par>
-                              <p:par>
-                                <p:cTn id="7" presetID="1" presetClass="entr" presetSubtype="0" fill="hold" grpId="0" nodeType="withEffect">
-                                  <p:stCondLst>
-                                    <p:cond delay="0"/>
-                                  </p:stCondLst>
-                                  <p:childTnLst>
-                                    <p:set>
-                                      <p:cBhvr>
-                                        <p:cTn id="8" dur="1" fill="hold">
-                                          <p:stCondLst>
-                                            <p:cond delay="0"/>
-                                          </p:stCondLst>
-                                        </p:cTn>
-                                        <p:tgtEl>
-                                          <p:spTgt spid="10"/>
-                                        </p:tgtEl>
-                                        <p:attrNameLst>
-                                          <p:attrName>style.visibility</p:attrName>
-                                        </p:attrNameLst>
-                                      </p:cBhvr>
-                                      <p:to>
-                                        <p:strVal val="visible"/>
-                                      </p:to>
-                                    </p:set>
-                                  </p:childTnLst>
-                                </p:cTn>
-                              </p:par>
-                              <p:par>
-                                <p:cTn id="9" presetID="22" presetClass="entr" presetSubtype="1" fill="hold" grpId="0" nodeType="withEffect">
-                                  <p:stCondLst>
-                                    <p:cond delay="0"/>
-                                  </p:stCondLst>
-                                  <p:childTnLst>
-                                    <p:set>
-                                      <p:cBhvr>
-                                        <p:cTn id="10" dur="1" fill="hold">
-                                          <p:stCondLst>
-                                            <p:cond delay="0"/>
-                                          </p:stCondLst>
-                                        </p:cTn>
-                                        <p:tgtEl>
-                                          <p:spTgt spid="12"/>
-                                        </p:tgtEl>
-                                        <p:attrNameLst>
-                                          <p:attrName>style.visibility</p:attrName>
-                                        </p:attrNameLst>
-                                      </p:cBhvr>
-                                      <p:to>
-                                        <p:strVal val="visible"/>
-                                      </p:to>
-                                    </p:set>
-                                    <p:animEffect transition="in" filter="wipe(up)">
-                                      <p:cBhvr>
-                                        <p:cTn id="11" dur="500"/>
-                                        <p:tgtEl>
-                                          <p:spTgt spid="12"/>
-                                        </p:tgtEl>
-                                      </p:cBhvr>
-                                    </p:animEffect>
-                                  </p:childTnLst>
-                                </p:cTn>
-                              </p:par>
-                            </p:childTnLst>
-                          </p:cTn>
-                        </p:par>
-                      </p:childTnLst>
-                    </p:cTn>
-                  </p:par>
-                  <p:par>
-                    <p:cTn id="12" fill="hold">
-                      <p:stCondLst>
-                        <p:cond delay="indefinite"/>
-                      </p:stCondLst>
-                      <p:childTnLst>
-                        <p:par>
-                          <p:cTn id="13" fill="hold">
-                            <p:stCondLst>
-                              <p:cond delay="0"/>
-                            </p:stCondLst>
-                            <p:childTnLst>
-                              <p:par>
-                                <p:cTn id="14" presetID="22" presetClass="entr" presetSubtype="1" fill="hold" grpId="0" nodeType="clickEffect">
-                                  <p:stCondLst>
-                                    <p:cond delay="0"/>
-                                  </p:stCondLst>
-                                  <p:childTnLst>
-                                    <p:set>
-                                      <p:cBhvr>
-                                        <p:cTn id="15" dur="1" fill="hold">
-                                          <p:stCondLst>
-                                            <p:cond delay="0"/>
-                                          </p:stCondLst>
-                                        </p:cTn>
-                                        <p:tgtEl>
-                                          <p:spTgt spid="11"/>
-                                        </p:tgtEl>
-                                        <p:attrNameLst>
-                                          <p:attrName>style.visibility</p:attrName>
-                                        </p:attrNameLst>
-                                      </p:cBhvr>
-                                      <p:to>
-                                        <p:strVal val="visible"/>
-                                      </p:to>
-                                    </p:set>
-                                    <p:animEffect transition="in" filter="wipe(up)">
-                                      <p:cBhvr>
-                                        <p:cTn id="16" dur="500"/>
-                                        <p:tgtEl>
-                                          <p:spTgt spid="11"/>
-                                        </p:tgtEl>
-                                      </p:cBhvr>
-                                    </p:animEffect>
-                                  </p:childTnLst>
-                                </p:cTn>
-                              </p:par>
-                            </p:childTnLst>
-                          </p:cTn>
-                        </p:par>
-                      </p:childTnLst>
-                    </p:cTn>
-                  </p:par>
-                  <p:par>
-                    <p:cTn id="17" fill="hold">
-                      <p:stCondLst>
-                        <p:cond delay="indefinite"/>
-                      </p:stCondLst>
-                      <p:childTnLst>
-                        <p:par>
-                          <p:cTn id="18" fill="hold">
-                            <p:stCondLst>
-                              <p:cond delay="0"/>
-                            </p:stCondLst>
-                            <p:childTnLst>
-                              <p:par>
-                                <p:cTn id="19" presetID="1" presetClass="entr" presetSubtype="0" fill="hold" grpId="0" nodeType="clickEffect">
-                                  <p:stCondLst>
-                                    <p:cond delay="0"/>
-                                  </p:stCondLst>
-                                  <p:childTnLst>
-                                    <p:set>
-                                      <p:cBhvr>
-                                        <p:cTn id="20" dur="1" fill="hold">
-                                          <p:stCondLst>
-                                            <p:cond delay="0"/>
-                                          </p:stCondLst>
-                                        </p:cTn>
-                                        <p:tgtEl>
-                                          <p:spTgt spid="13"/>
+                                          <p:spTgt spid="13">
+                                            <p:txEl>
+                                              <p:pRg st="0" end="0"/>
+                                            </p:txEl>
+                                          </p:spTgt>
                                         </p:tgtEl>
                                         <p:attrNameLst>
                                           <p:attrName>style.visibility</p:attrName>
@@ -36869,13 +36615,6 @@
         </p:cTn>
       </p:par>
     </p:tnLst>
-    <p:bldLst>
-      <p:bldP spid="9" grpId="0" animBg="1"/>
-      <p:bldP spid="10" grpId="0" animBg="1"/>
-      <p:bldP spid="11" grpId="0" animBg="1"/>
-      <p:bldP spid="12" grpId="0" animBg="1"/>
-      <p:bldP spid="13" grpId="0"/>
-    </p:bldLst>
   </p:timing>
 </p:sld>
 </file>
@@ -41220,7 +40959,15 @@
             <a:pPr lvl="1"/>
             <a:r>
               <a:rPr lang="en-US" dirty="0"/>
-              <a:t>Like GPUs, maybe programmable switches will be used as application accelerators?</a:t>
+              <a:t>Like GPUs, maybe programmable switches will be used as application accelerators (e.g., </a:t>
+            </a:r>
+            <a:r>
+              <a:rPr lang="en-US" dirty="0" err="1"/>
+              <a:t>NetCache</a:t>
+            </a:r>
+            <a:r>
+              <a:rPr lang="en-US" dirty="0"/>
+              <a:t>)?</a:t>
             </a:r>
           </a:p>
         </p:txBody>
@@ -43943,7 +43690,7 @@
           <a:p>
             <a:r>
               <a:rPr lang="en-US" dirty="0"/>
-              <a:t>Each user ”programs” their own algorithm.</a:t>
+              <a:t>Each user “programs” their own algorithm.</a:t>
             </a:r>
           </a:p>
           <a:p>
@@ -43953,6 +43700,15 @@
             <a:r>
               <a:rPr lang="en-US" dirty="0"/>
               <a:t>Much like we program desktops, smartphones, etc.</a:t>
+            </a:r>
+          </a:p>
+          <a:p>
+            <a:endParaRPr lang="en-US" dirty="0"/>
+          </a:p>
+          <a:p>
+            <a:r>
+              <a:rPr lang="en-US" dirty="0"/>
+              <a:t>Vision: make the network (control and data planes) as easy to program as a computer.</a:t>
             </a:r>
             <a:endParaRPr lang="is-IS" dirty="0"/>
           </a:p>
@@ -44103,6 +43859,55 @@
                                           <p:spTgt spid="3">
                                             <p:txEl>
                                               <p:pRg st="4" end="4"/>
+                                            </p:txEl>
+                                          </p:spTgt>
+                                        </p:tgtEl>
+                                        <p:attrNameLst>
+                                          <p:attrName>style.visibility</p:attrName>
+                                        </p:attrNameLst>
+                                      </p:cBhvr>
+                                      <p:to>
+                                        <p:strVal val="visible"/>
+                                      </p:to>
+                                    </p:set>
+                                  </p:childTnLst>
+                                </p:cTn>
+                              </p:par>
+                            </p:childTnLst>
+                          </p:cTn>
+                        </p:par>
+                      </p:childTnLst>
+                    </p:cTn>
+                  </p:par>
+                  <p:par>
+                    <p:cTn id="15" fill="hold">
+                      <p:stCondLst>
+                        <p:cond delay="indefinite"/>
+                      </p:stCondLst>
+                      <p:childTnLst>
+                        <p:par>
+                          <p:cTn id="16" fill="hold">
+                            <p:stCondLst>
+                              <p:cond delay="0"/>
+                            </p:stCondLst>
+                            <p:childTnLst>
+                              <p:par>
+                                <p:cTn id="17" presetID="1" presetClass="entr" presetSubtype="0" fill="hold" nodeType="clickEffect">
+                                  <p:stCondLst>
+                                    <p:cond delay="0"/>
+                                  </p:stCondLst>
+                                  <p:childTnLst>
+                                    <p:set>
+                                      <p:cBhvr>
+                                        <p:cTn id="18" dur="1" fill="hold">
+                                          <p:stCondLst>
+                                            <p:cond delay="0"/>
+                                          </p:stCondLst>
+                                        </p:cTn>
+                                        <p:tgtEl>
+                                          <p:spTgt spid="3">
+                                            <p:txEl>
+                                              <p:pRg st="6" end="6"/>
                                             </p:txEl>
                                           </p:spTgt>
                                         </p:tgtEl>

</xml_diff>

<commit_message>
Hide the questions slide.
</commit_message>
<xml_diff>
--- a/RMT-lecture.pptx
+++ b/RMT-lecture.pptx
@@ -35534,7 +35534,7 @@
 </file>
 
 <file path=ppt/slides/slide31.xml><?xml version="1.0" encoding="utf-8"?>
-<p:sld xmlns:a="http://schemas.openxmlformats.org/drawingml/2006/main" xmlns:r="http://schemas.openxmlformats.org/officeDocument/2006/relationships" xmlns:p="http://schemas.openxmlformats.org/presentationml/2006/main">
+<p:sld xmlns:a="http://schemas.openxmlformats.org/drawingml/2006/main" xmlns:r="http://schemas.openxmlformats.org/officeDocument/2006/relationships" xmlns:p="http://schemas.openxmlformats.org/presentationml/2006/main" show="0">
   <p:cSld>
     <p:spTree>
       <p:nvGrpSpPr>
@@ -35971,7 +35971,7 @@
           <a:p>
             <a:r>
               <a:rPr lang="en-US" dirty="0"/>
-              <a:t>Switch chip area</a:t>
+              <a:t>How does programmability affect chip area?</a:t>
             </a:r>
           </a:p>
         </p:txBody>

</xml_diff>